<commit_message>
minor adjustments to plot and schematics
</commit_message>
<xml_diff>
--- a/Data/schematics.pptx
+++ b/Data/schematics.pptx
@@ -248,7 +248,7 @@
           <a:p>
             <a:fld id="{498A6A98-93B9-470F-BB23-351240910FD2}" type="datetimeFigureOut">
               <a:rPr lang="en-US" smtClean="0"/>
-              <a:t>10/30/2020</a:t>
+              <a:t>1/6/2021</a:t>
             </a:fld>
             <a:endParaRPr lang="en-US"/>
           </a:p>
@@ -418,7 +418,7 @@
           <a:p>
             <a:fld id="{498A6A98-93B9-470F-BB23-351240910FD2}" type="datetimeFigureOut">
               <a:rPr lang="en-US" smtClean="0"/>
-              <a:t>10/30/2020</a:t>
+              <a:t>1/6/2021</a:t>
             </a:fld>
             <a:endParaRPr lang="en-US"/>
           </a:p>
@@ -598,7 +598,7 @@
           <a:p>
             <a:fld id="{498A6A98-93B9-470F-BB23-351240910FD2}" type="datetimeFigureOut">
               <a:rPr lang="en-US" smtClean="0"/>
-              <a:t>10/30/2020</a:t>
+              <a:t>1/6/2021</a:t>
             </a:fld>
             <a:endParaRPr lang="en-US"/>
           </a:p>
@@ -768,7 +768,7 @@
           <a:p>
             <a:fld id="{498A6A98-93B9-470F-BB23-351240910FD2}" type="datetimeFigureOut">
               <a:rPr lang="en-US" smtClean="0"/>
-              <a:t>10/30/2020</a:t>
+              <a:t>1/6/2021</a:t>
             </a:fld>
             <a:endParaRPr lang="en-US"/>
           </a:p>
@@ -1014,7 +1014,7 @@
           <a:p>
             <a:fld id="{498A6A98-93B9-470F-BB23-351240910FD2}" type="datetimeFigureOut">
               <a:rPr lang="en-US" smtClean="0"/>
-              <a:t>10/30/2020</a:t>
+              <a:t>1/6/2021</a:t>
             </a:fld>
             <a:endParaRPr lang="en-US"/>
           </a:p>
@@ -1246,7 +1246,7 @@
           <a:p>
             <a:fld id="{498A6A98-93B9-470F-BB23-351240910FD2}" type="datetimeFigureOut">
               <a:rPr lang="en-US" smtClean="0"/>
-              <a:t>10/30/2020</a:t>
+              <a:t>1/6/2021</a:t>
             </a:fld>
             <a:endParaRPr lang="en-US"/>
           </a:p>
@@ -1613,7 +1613,7 @@
           <a:p>
             <a:fld id="{498A6A98-93B9-470F-BB23-351240910FD2}" type="datetimeFigureOut">
               <a:rPr lang="en-US" smtClean="0"/>
-              <a:t>10/30/2020</a:t>
+              <a:t>1/6/2021</a:t>
             </a:fld>
             <a:endParaRPr lang="en-US"/>
           </a:p>
@@ -1731,7 +1731,7 @@
           <a:p>
             <a:fld id="{498A6A98-93B9-470F-BB23-351240910FD2}" type="datetimeFigureOut">
               <a:rPr lang="en-US" smtClean="0"/>
-              <a:t>10/30/2020</a:t>
+              <a:t>1/6/2021</a:t>
             </a:fld>
             <a:endParaRPr lang="en-US"/>
           </a:p>
@@ -1826,7 +1826,7 @@
           <a:p>
             <a:fld id="{498A6A98-93B9-470F-BB23-351240910FD2}" type="datetimeFigureOut">
               <a:rPr lang="en-US" smtClean="0"/>
-              <a:t>10/30/2020</a:t>
+              <a:t>1/6/2021</a:t>
             </a:fld>
             <a:endParaRPr lang="en-US"/>
           </a:p>
@@ -2103,7 +2103,7 @@
           <a:p>
             <a:fld id="{498A6A98-93B9-470F-BB23-351240910FD2}" type="datetimeFigureOut">
               <a:rPr lang="en-US" smtClean="0"/>
-              <a:t>10/30/2020</a:t>
+              <a:t>1/6/2021</a:t>
             </a:fld>
             <a:endParaRPr lang="en-US"/>
           </a:p>
@@ -2356,7 +2356,7 @@
           <a:p>
             <a:fld id="{498A6A98-93B9-470F-BB23-351240910FD2}" type="datetimeFigureOut">
               <a:rPr lang="en-US" smtClean="0"/>
-              <a:t>10/30/2020</a:t>
+              <a:t>1/6/2021</a:t>
             </a:fld>
             <a:endParaRPr lang="en-US"/>
           </a:p>
@@ -2569,7 +2569,7 @@
           <a:p>
             <a:fld id="{498A6A98-93B9-470F-BB23-351240910FD2}" type="datetimeFigureOut">
               <a:rPr lang="en-US" smtClean="0"/>
-              <a:t>10/30/2020</a:t>
+              <a:t>1/6/2021</a:t>
             </a:fld>
             <a:endParaRPr lang="en-US"/>
           </a:p>
@@ -26444,7 +26444,7 @@
           </p:nvSpPr>
           <p:spPr>
             <a:xfrm>
-              <a:off x="5502040" y="1273019"/>
+              <a:off x="5209940" y="2111219"/>
               <a:ext cx="785793" cy="400110"/>
             </a:xfrm>
             <a:prstGeom prst="rect">
@@ -26459,34 +26459,18 @@
             <a:lstStyle/>
             <a:p>
               <a:r>
-                <a:rPr lang="el-GR" sz="2000" b="1" dirty="0">
-                  <a:solidFill>
-                    <a:schemeClr val="bg1"/>
-                  </a:solidFill>
-                </a:rPr>
+                <a:rPr lang="el-GR" sz="2000" dirty="0"/>
                 <a:t>θ</a:t>
               </a:r>
               <a:r>
-                <a:rPr lang="en-US" sz="2000" b="1" dirty="0">
-                  <a:solidFill>
-                    <a:schemeClr val="bg1"/>
-                  </a:solidFill>
-                </a:rPr>
+                <a:rPr lang="en-US" sz="2000" dirty="0"/>
                 <a:t> = 6</a:t>
               </a:r>
               <a:r>
-                <a:rPr lang="en-DE" sz="2000" b="1" dirty="0">
-                  <a:solidFill>
-                    <a:schemeClr val="bg1"/>
-                  </a:solidFill>
-                </a:rPr>
+                <a:rPr lang="aa-ET" sz="2000" dirty="0"/>
                 <a:t>°</a:t>
               </a:r>
-              <a:endParaRPr lang="en-US" sz="2000" b="1" dirty="0">
-                <a:solidFill>
-                  <a:schemeClr val="bg1"/>
-                </a:solidFill>
-              </a:endParaRPr>
+              <a:endParaRPr lang="en-US" sz="2000" dirty="0"/>
             </a:p>
           </p:txBody>
         </p:sp>
@@ -26498,7 +26482,7 @@
           </p:nvSpPr>
           <p:spPr>
             <a:xfrm>
-              <a:off x="10564197" y="2753565"/>
+              <a:off x="10272097" y="3591765"/>
               <a:ext cx="785793" cy="400110"/>
             </a:xfrm>
             <a:prstGeom prst="rect">
@@ -26513,42 +26497,22 @@
             <a:lstStyle/>
             <a:p>
               <a:r>
-                <a:rPr lang="el-GR" sz="2000" b="1" dirty="0">
-                  <a:solidFill>
-                    <a:schemeClr val="bg1"/>
-                  </a:solidFill>
-                </a:rPr>
+                <a:rPr lang="el-GR" sz="2000" dirty="0"/>
                 <a:t>θ</a:t>
               </a:r>
               <a:r>
-                <a:rPr lang="en-US" sz="2000" b="1" dirty="0">
-                  <a:solidFill>
-                    <a:schemeClr val="bg1"/>
-                  </a:solidFill>
-                </a:rPr>
+                <a:rPr lang="en-US" sz="2000" dirty="0"/>
                 <a:t> = </a:t>
               </a:r>
               <a:r>
-                <a:rPr lang="en-US" sz="2000" b="1" dirty="0" smtClean="0">
-                  <a:solidFill>
-                    <a:schemeClr val="bg1"/>
-                  </a:solidFill>
-                </a:rPr>
+                <a:rPr lang="en-US" sz="2000" dirty="0" smtClean="0"/>
                 <a:t>1</a:t>
               </a:r>
               <a:r>
-                <a:rPr lang="en-DE" sz="2000" b="1" dirty="0" smtClean="0">
-                  <a:solidFill>
-                    <a:schemeClr val="bg1"/>
-                  </a:solidFill>
-                </a:rPr>
+                <a:rPr lang="aa-ET" sz="2000" dirty="0" smtClean="0"/>
                 <a:t>°</a:t>
               </a:r>
-              <a:endParaRPr lang="en-US" sz="2000" b="1" dirty="0">
-                <a:solidFill>
-                  <a:schemeClr val="bg1"/>
-                </a:solidFill>
-              </a:endParaRPr>
+              <a:endParaRPr lang="en-US" sz="2000" dirty="0"/>
             </a:p>
           </p:txBody>
         </p:sp>
@@ -26560,7 +26524,7 @@
           </p:nvSpPr>
           <p:spPr>
             <a:xfrm>
-              <a:off x="5336755" y="2753565"/>
+              <a:off x="5044655" y="3591765"/>
               <a:ext cx="915635" cy="400110"/>
             </a:xfrm>
             <a:prstGeom prst="rect">
@@ -26575,42 +26539,22 @@
             <a:lstStyle/>
             <a:p>
               <a:r>
-                <a:rPr lang="el-GR" sz="2000" b="1" dirty="0">
-                  <a:solidFill>
-                    <a:schemeClr val="bg1"/>
-                  </a:solidFill>
-                </a:rPr>
+                <a:rPr lang="el-GR" sz="2000" dirty="0"/>
                 <a:t>θ</a:t>
               </a:r>
               <a:r>
-                <a:rPr lang="en-US" sz="2000" b="1" dirty="0">
-                  <a:solidFill>
-                    <a:schemeClr val="bg1"/>
-                  </a:solidFill>
-                </a:rPr>
+                <a:rPr lang="en-US" sz="2000" dirty="0"/>
                 <a:t> = </a:t>
               </a:r>
               <a:r>
-                <a:rPr lang="en-US" sz="2000" b="1" dirty="0" smtClean="0">
-                  <a:solidFill>
-                    <a:schemeClr val="bg1"/>
-                  </a:solidFill>
-                </a:rPr>
+                <a:rPr lang="en-US" sz="2000" dirty="0" smtClean="0"/>
                 <a:t>50</a:t>
               </a:r>
               <a:r>
-                <a:rPr lang="en-DE" sz="2000" b="1" dirty="0" smtClean="0">
-                  <a:solidFill>
-                    <a:schemeClr val="bg1"/>
-                  </a:solidFill>
-                </a:rPr>
+                <a:rPr lang="aa-ET" sz="2000" dirty="0" smtClean="0"/>
                 <a:t>°</a:t>
               </a:r>
-              <a:endParaRPr lang="en-US" sz="2000" b="1" dirty="0">
-                <a:solidFill>
-                  <a:schemeClr val="bg1"/>
-                </a:solidFill>
-              </a:endParaRPr>
+              <a:endParaRPr lang="en-US" sz="2000" dirty="0"/>
             </a:p>
           </p:txBody>
         </p:sp>
@@ -26622,7 +26566,7 @@
           </p:nvSpPr>
           <p:spPr>
             <a:xfrm>
-              <a:off x="10364719" y="1279063"/>
+              <a:off x="10072619" y="2117263"/>
               <a:ext cx="1045479" cy="400110"/>
             </a:xfrm>
             <a:prstGeom prst="rect">
@@ -26637,42 +26581,22 @@
             <a:lstStyle/>
             <a:p>
               <a:r>
-                <a:rPr lang="el-GR" sz="2000" b="1" dirty="0">
-                  <a:solidFill>
-                    <a:schemeClr val="bg1"/>
-                  </a:solidFill>
-                </a:rPr>
+                <a:rPr lang="el-GR" sz="2000" dirty="0"/>
                 <a:t>θ</a:t>
               </a:r>
               <a:r>
-                <a:rPr lang="en-US" sz="2000" b="1" dirty="0">
-                  <a:solidFill>
-                    <a:schemeClr val="bg1"/>
-                  </a:solidFill>
-                </a:rPr>
+                <a:rPr lang="en-US" sz="2000" dirty="0"/>
                 <a:t> = </a:t>
               </a:r>
               <a:r>
-                <a:rPr lang="en-US" sz="2000" b="1" dirty="0" smtClean="0">
-                  <a:solidFill>
-                    <a:schemeClr val="bg1"/>
-                  </a:solidFill>
-                </a:rPr>
+                <a:rPr lang="en-US" sz="2000" dirty="0" smtClean="0"/>
                 <a:t>150</a:t>
               </a:r>
               <a:r>
-                <a:rPr lang="en-DE" sz="2000" b="1" dirty="0" smtClean="0">
-                  <a:solidFill>
-                    <a:schemeClr val="bg1"/>
-                  </a:solidFill>
-                </a:rPr>
+                <a:rPr lang="aa-ET" sz="2000" dirty="0" smtClean="0"/>
                 <a:t>°</a:t>
               </a:r>
-              <a:endParaRPr lang="en-US" sz="2000" b="1" dirty="0">
-                <a:solidFill>
-                  <a:schemeClr val="bg1"/>
-                </a:solidFill>
-              </a:endParaRPr>
+              <a:endParaRPr lang="en-US" sz="2000" dirty="0"/>
             </a:p>
           </p:txBody>
         </p:sp>

</xml_diff>

<commit_message>
Changed most of discussion section.
Minor edits here and there.
</commit_message>
<xml_diff>
--- a/Data/schematics.pptx
+++ b/Data/schematics.pptx
@@ -248,7 +248,7 @@
           <a:p>
             <a:fld id="{498A6A98-93B9-470F-BB23-351240910FD2}" type="datetimeFigureOut">
               <a:rPr lang="en-US" smtClean="0"/>
-              <a:t>1/6/2021</a:t>
+              <a:t>1/13/2021</a:t>
             </a:fld>
             <a:endParaRPr lang="en-US"/>
           </a:p>
@@ -418,7 +418,7 @@
           <a:p>
             <a:fld id="{498A6A98-93B9-470F-BB23-351240910FD2}" type="datetimeFigureOut">
               <a:rPr lang="en-US" smtClean="0"/>
-              <a:t>1/6/2021</a:t>
+              <a:t>1/13/2021</a:t>
             </a:fld>
             <a:endParaRPr lang="en-US"/>
           </a:p>
@@ -598,7 +598,7 @@
           <a:p>
             <a:fld id="{498A6A98-93B9-470F-BB23-351240910FD2}" type="datetimeFigureOut">
               <a:rPr lang="en-US" smtClean="0"/>
-              <a:t>1/6/2021</a:t>
+              <a:t>1/13/2021</a:t>
             </a:fld>
             <a:endParaRPr lang="en-US"/>
           </a:p>
@@ -768,7 +768,7 @@
           <a:p>
             <a:fld id="{498A6A98-93B9-470F-BB23-351240910FD2}" type="datetimeFigureOut">
               <a:rPr lang="en-US" smtClean="0"/>
-              <a:t>1/6/2021</a:t>
+              <a:t>1/13/2021</a:t>
             </a:fld>
             <a:endParaRPr lang="en-US"/>
           </a:p>
@@ -1014,7 +1014,7 @@
           <a:p>
             <a:fld id="{498A6A98-93B9-470F-BB23-351240910FD2}" type="datetimeFigureOut">
               <a:rPr lang="en-US" smtClean="0"/>
-              <a:t>1/6/2021</a:t>
+              <a:t>1/13/2021</a:t>
             </a:fld>
             <a:endParaRPr lang="en-US"/>
           </a:p>
@@ -1246,7 +1246,7 @@
           <a:p>
             <a:fld id="{498A6A98-93B9-470F-BB23-351240910FD2}" type="datetimeFigureOut">
               <a:rPr lang="en-US" smtClean="0"/>
-              <a:t>1/6/2021</a:t>
+              <a:t>1/13/2021</a:t>
             </a:fld>
             <a:endParaRPr lang="en-US"/>
           </a:p>
@@ -1613,7 +1613,7 @@
           <a:p>
             <a:fld id="{498A6A98-93B9-470F-BB23-351240910FD2}" type="datetimeFigureOut">
               <a:rPr lang="en-US" smtClean="0"/>
-              <a:t>1/6/2021</a:t>
+              <a:t>1/13/2021</a:t>
             </a:fld>
             <a:endParaRPr lang="en-US"/>
           </a:p>
@@ -1731,7 +1731,7 @@
           <a:p>
             <a:fld id="{498A6A98-93B9-470F-BB23-351240910FD2}" type="datetimeFigureOut">
               <a:rPr lang="en-US" smtClean="0"/>
-              <a:t>1/6/2021</a:t>
+              <a:t>1/13/2021</a:t>
             </a:fld>
             <a:endParaRPr lang="en-US"/>
           </a:p>
@@ -1826,7 +1826,7 @@
           <a:p>
             <a:fld id="{498A6A98-93B9-470F-BB23-351240910FD2}" type="datetimeFigureOut">
               <a:rPr lang="en-US" smtClean="0"/>
-              <a:t>1/6/2021</a:t>
+              <a:t>1/13/2021</a:t>
             </a:fld>
             <a:endParaRPr lang="en-US"/>
           </a:p>
@@ -2103,7 +2103,7 @@
           <a:p>
             <a:fld id="{498A6A98-93B9-470F-BB23-351240910FD2}" type="datetimeFigureOut">
               <a:rPr lang="en-US" smtClean="0"/>
-              <a:t>1/6/2021</a:t>
+              <a:t>1/13/2021</a:t>
             </a:fld>
             <a:endParaRPr lang="en-US"/>
           </a:p>
@@ -2356,7 +2356,7 @@
           <a:p>
             <a:fld id="{498A6A98-93B9-470F-BB23-351240910FD2}" type="datetimeFigureOut">
               <a:rPr lang="en-US" smtClean="0"/>
-              <a:t>1/6/2021</a:t>
+              <a:t>1/13/2021</a:t>
             </a:fld>
             <a:endParaRPr lang="en-US"/>
           </a:p>
@@ -2569,7 +2569,7 @@
           <a:p>
             <a:fld id="{498A6A98-93B9-470F-BB23-351240910FD2}" type="datetimeFigureOut">
               <a:rPr lang="en-US" smtClean="0"/>
-              <a:t>1/6/2021</a:t>
+              <a:t>1/13/2021</a:t>
             </a:fld>
             <a:endParaRPr lang="en-US"/>
           </a:p>
@@ -26052,7 +26052,7 @@
       </p:grpSpPr>
       <p:grpSp>
         <p:nvGrpSpPr>
-          <p:cNvPr id="27" name="Group 26"/>
+          <p:cNvPr id="3" name="Group 2"/>
           <p:cNvGrpSpPr/>
           <p:nvPr/>
         </p:nvGrpSpPr>
@@ -26064,200 +26064,659 @@
             <a:chExt cx="11254865" cy="3279276"/>
           </a:xfrm>
         </p:grpSpPr>
-        <p:pic>
-          <p:nvPicPr>
-            <p:cNvPr id="9" name="Picture 8"/>
-            <p:cNvPicPr>
-              <a:picLocks noChangeAspect="1"/>
-            </p:cNvPicPr>
+        <p:grpSp>
+          <p:nvGrpSpPr>
+            <p:cNvPr id="27" name="Group 26"/>
+            <p:cNvGrpSpPr/>
             <p:nvPr/>
-          </p:nvPicPr>
-          <p:blipFill rotWithShape="1">
-            <a:blip r:embed="rId2">
-              <a:extLst>
-                <a:ext uri="{BEBA8EAE-BF5A-486C-A8C5-ECC9F3942E4B}">
-                  <a14:imgProps xmlns:a14="http://schemas.microsoft.com/office/drawing/2010/main">
-                    <a14:imgLayer r:embed="rId3">
-                      <a14:imgEffect>
-                        <a14:backgroundRemoval t="0" b="90000" l="10000" r="90000">
-                          <a14:backgroundMark x1="11905" y1="13014" x2="11905" y2="13014"/>
-                        </a14:backgroundRemoval>
-                      </a14:imgEffect>
-                    </a14:imgLayer>
-                  </a14:imgProps>
-                </a:ext>
-                <a:ext uri="{28A0092B-C50C-407E-A947-70E740481C1C}">
-                  <a14:useLocalDpi xmlns:a14="http://schemas.microsoft.com/office/drawing/2010/main" val="0"/>
-                </a:ext>
-              </a:extLst>
-            </a:blip>
-            <a:srcRect l="14547" t="29446" r="14547" b="45356"/>
-            <a:stretch/>
-          </p:blipFill>
-          <p:spPr>
+          </p:nvGrpSpPr>
+          <p:grpSpPr>
             <a:xfrm>
-              <a:off x="1329870" y="1273020"/>
-              <a:ext cx="5097600" cy="1260000"/>
+              <a:off x="270205" y="734290"/>
+              <a:ext cx="11254865" cy="3279276"/>
+              <a:chOff x="270205" y="734290"/>
+              <a:chExt cx="11254865" cy="3279276"/>
             </a:xfrm>
-            <a:prstGeom prst="rect">
-              <a:avLst/>
-            </a:prstGeom>
-            <a:ln w="38100">
+          </p:grpSpPr>
+          <p:pic>
+            <p:nvPicPr>
+              <p:cNvPr id="9" name="Picture 8"/>
+              <p:cNvPicPr>
+                <a:picLocks noChangeAspect="1"/>
+              </p:cNvPicPr>
+              <p:nvPr/>
+            </p:nvPicPr>
+            <p:blipFill rotWithShape="1">
+              <a:blip r:embed="rId2">
+                <a:extLst>
+                  <a:ext uri="{BEBA8EAE-BF5A-486C-A8C5-ECC9F3942E4B}">
+                    <a14:imgProps xmlns:a14="http://schemas.microsoft.com/office/drawing/2010/main">
+                      <a14:imgLayer r:embed="rId3">
+                        <a14:imgEffect>
+                          <a14:backgroundRemoval t="0" b="90000" l="10000" r="90000">
+                            <a14:backgroundMark x1="11905" y1="13014" x2="11905" y2="13014"/>
+                          </a14:backgroundRemoval>
+                        </a14:imgEffect>
+                      </a14:imgLayer>
+                    </a14:imgProps>
+                  </a:ext>
+                  <a:ext uri="{28A0092B-C50C-407E-A947-70E740481C1C}">
+                    <a14:useLocalDpi xmlns:a14="http://schemas.microsoft.com/office/drawing/2010/main" val="0"/>
+                  </a:ext>
+                </a:extLst>
+              </a:blip>
+              <a:srcRect l="14547" t="29446" r="14547" b="45356"/>
+              <a:stretch/>
+            </p:blipFill>
+            <p:spPr>
+              <a:xfrm>
+                <a:off x="1329870" y="1273020"/>
+                <a:ext cx="5097600" cy="1260000"/>
+              </a:xfrm>
+              <a:prstGeom prst="rect">
+                <a:avLst/>
+              </a:prstGeom>
+              <a:ln w="38100">
+                <a:noFill/>
+              </a:ln>
+            </p:spPr>
+          </p:pic>
+          <p:pic>
+            <p:nvPicPr>
+              <p:cNvPr id="10" name="Picture 9"/>
+              <p:cNvPicPr>
+                <a:picLocks noChangeAspect="1"/>
+              </p:cNvPicPr>
+              <p:nvPr/>
+            </p:nvPicPr>
+            <p:blipFill rotWithShape="1">
+              <a:blip r:embed="rId4">
+                <a:extLst>
+                  <a:ext uri="{BEBA8EAE-BF5A-486C-A8C5-ECC9F3942E4B}">
+                    <a14:imgProps xmlns:a14="http://schemas.microsoft.com/office/drawing/2010/main">
+                      <a14:imgLayer r:embed="rId5">
+                        <a14:imgEffect>
+                          <a14:backgroundRemoval t="0" b="90000" l="10000" r="90000">
+                            <a14:backgroundMark x1="12381" y1="10411" x2="12381" y2="10411"/>
+                          </a14:backgroundRemoval>
+                        </a14:imgEffect>
+                      </a14:imgLayer>
+                    </a14:imgProps>
+                  </a:ext>
+                  <a:ext uri="{28A0092B-C50C-407E-A947-70E740481C1C}">
+                    <a14:useLocalDpi xmlns:a14="http://schemas.microsoft.com/office/drawing/2010/main" val="0"/>
+                  </a:ext>
+                </a:extLst>
+              </a:blip>
+              <a:srcRect l="14547" t="29410" r="14547" b="45392"/>
+              <a:stretch/>
+            </p:blipFill>
+            <p:spPr>
+              <a:xfrm>
+                <a:off x="6427470" y="1273020"/>
+                <a:ext cx="5097600" cy="1260000"/>
+              </a:xfrm>
+              <a:prstGeom prst="rect">
+                <a:avLst/>
+              </a:prstGeom>
+              <a:solidFill>
+                <a:schemeClr val="accent1">
+                  <a:lumMod val="20000"/>
+                  <a:lumOff val="80000"/>
+                </a:schemeClr>
+              </a:solidFill>
+              <a:ln w="38100">
+                <a:noFill/>
+              </a:ln>
+            </p:spPr>
+          </p:pic>
+          <p:pic>
+            <p:nvPicPr>
+              <p:cNvPr id="11" name="Picture 10"/>
+              <p:cNvPicPr>
+                <a:picLocks noChangeAspect="1"/>
+              </p:cNvPicPr>
+              <p:nvPr/>
+            </p:nvPicPr>
+            <p:blipFill rotWithShape="1">
+              <a:blip r:embed="rId6">
+                <a:extLst>
+                  <a:ext uri="{BEBA8EAE-BF5A-486C-A8C5-ECC9F3942E4B}">
+                    <a14:imgProps xmlns:a14="http://schemas.microsoft.com/office/drawing/2010/main">
+                      <a14:imgLayer r:embed="rId7">
+                        <a14:imgEffect>
+                          <a14:backgroundRemoval t="0" b="90000" l="9524" r="90000">
+                            <a14:backgroundMark x1="13238" y1="16986" x2="13238" y2="16986"/>
+                          </a14:backgroundRemoval>
+                        </a14:imgEffect>
+                      </a14:imgLayer>
+                    </a14:imgProps>
+                  </a:ext>
+                  <a:ext uri="{28A0092B-C50C-407E-A947-70E740481C1C}">
+                    <a14:useLocalDpi xmlns:a14="http://schemas.microsoft.com/office/drawing/2010/main" val="0"/>
+                  </a:ext>
+                </a:extLst>
+              </a:blip>
+              <a:srcRect l="14547" t="29410" r="14547" b="45392"/>
+              <a:stretch/>
+            </p:blipFill>
+            <p:spPr>
+              <a:xfrm>
+                <a:off x="1329870" y="2753566"/>
+                <a:ext cx="5097600" cy="1260000"/>
+              </a:xfrm>
+              <a:prstGeom prst="rect">
+                <a:avLst/>
+              </a:prstGeom>
+              <a:ln w="38100">
+                <a:noFill/>
+              </a:ln>
+            </p:spPr>
+          </p:pic>
+          <p:pic>
+            <p:nvPicPr>
+              <p:cNvPr id="12" name="Picture 11"/>
+              <p:cNvPicPr>
+                <a:picLocks noChangeAspect="1"/>
+              </p:cNvPicPr>
+              <p:nvPr/>
+            </p:nvPicPr>
+            <p:blipFill rotWithShape="1">
+              <a:blip r:embed="rId8">
+                <a:extLst>
+                  <a:ext uri="{BEBA8EAE-BF5A-486C-A8C5-ECC9F3942E4B}">
+                    <a14:imgProps xmlns:a14="http://schemas.microsoft.com/office/drawing/2010/main">
+                      <a14:imgLayer r:embed="rId9">
+                        <a14:imgEffect>
+                          <a14:backgroundRemoval t="0" b="90000" l="9238" r="90000">
+                            <a14:backgroundMark x1="12381" y1="11781" x2="12381" y2="11781"/>
+                          </a14:backgroundRemoval>
+                        </a14:imgEffect>
+                      </a14:imgLayer>
+                    </a14:imgProps>
+                  </a:ext>
+                  <a:ext uri="{28A0092B-C50C-407E-A947-70E740481C1C}">
+                    <a14:useLocalDpi xmlns:a14="http://schemas.microsoft.com/office/drawing/2010/main" val="0"/>
+                  </a:ext>
+                </a:extLst>
+              </a:blip>
+              <a:srcRect l="14547" t="29410" r="14547" b="45392"/>
+              <a:stretch/>
+            </p:blipFill>
+            <p:spPr>
+              <a:xfrm>
+                <a:off x="6427470" y="2753566"/>
+                <a:ext cx="5097600" cy="1260000"/>
+              </a:xfrm>
+              <a:prstGeom prst="rect">
+                <a:avLst/>
+              </a:prstGeom>
+              <a:solidFill>
+                <a:schemeClr val="accent1">
+                  <a:lumMod val="20000"/>
+                  <a:lumOff val="80000"/>
+                </a:schemeClr>
+              </a:solidFill>
+              <a:ln w="38100">
+                <a:noFill/>
+              </a:ln>
+            </p:spPr>
+          </p:pic>
+          <p:sp>
+            <p:nvSpPr>
+              <p:cNvPr id="13" name="TextBox 12"/>
+              <p:cNvSpPr txBox="1"/>
+              <p:nvPr/>
+            </p:nvSpPr>
+            <p:spPr>
+              <a:xfrm>
+                <a:off x="3601189" y="734290"/>
+                <a:ext cx="554960" cy="461665"/>
+              </a:xfrm>
+              <a:prstGeom prst="rect">
+                <a:avLst/>
+              </a:prstGeom>
               <a:noFill/>
-            </a:ln>
-          </p:spPr>
-        </p:pic>
-        <p:pic>
-          <p:nvPicPr>
-            <p:cNvPr id="10" name="Picture 9"/>
-            <p:cNvPicPr>
-              <a:picLocks noChangeAspect="1"/>
-            </p:cNvPicPr>
-            <p:nvPr/>
-          </p:nvPicPr>
-          <p:blipFill rotWithShape="1">
-            <a:blip r:embed="rId4">
-              <a:extLst>
-                <a:ext uri="{BEBA8EAE-BF5A-486C-A8C5-ECC9F3942E4B}">
-                  <a14:imgProps xmlns:a14="http://schemas.microsoft.com/office/drawing/2010/main">
-                    <a14:imgLayer r:embed="rId5">
-                      <a14:imgEffect>
-                        <a14:backgroundRemoval t="0" b="90000" l="10000" r="90000">
-                          <a14:backgroundMark x1="12381" y1="10411" x2="12381" y2="10411"/>
-                        </a14:backgroundRemoval>
-                      </a14:imgEffect>
-                    </a14:imgLayer>
-                  </a14:imgProps>
-                </a:ext>
-                <a:ext uri="{28A0092B-C50C-407E-A947-70E740481C1C}">
-                  <a14:useLocalDpi xmlns:a14="http://schemas.microsoft.com/office/drawing/2010/main" val="0"/>
-                </a:ext>
-              </a:extLst>
-            </a:blip>
-            <a:srcRect l="14547" t="29410" r="14547" b="45392"/>
-            <a:stretch/>
-          </p:blipFill>
-          <p:spPr>
-            <a:xfrm>
-              <a:off x="6427470" y="1273020"/>
-              <a:ext cx="5097600" cy="1260000"/>
-            </a:xfrm>
-            <a:prstGeom prst="rect">
-              <a:avLst/>
-            </a:prstGeom>
-            <a:solidFill>
-              <a:schemeClr val="accent1">
-                <a:lumMod val="20000"/>
-                <a:lumOff val="80000"/>
-              </a:schemeClr>
-            </a:solidFill>
-            <a:ln w="38100">
+            </p:spPr>
+            <p:txBody>
+              <a:bodyPr wrap="none" rtlCol="0">
+                <a:spAutoFit/>
+              </a:bodyPr>
+              <a:lstStyle/>
+              <a:p>
+                <a:r>
+                  <a:rPr lang="en-US" sz="2400" b="1" dirty="0" smtClean="0"/>
+                  <a:t>Air</a:t>
+                </a:r>
+                <a:endParaRPr lang="en-US" sz="2400" b="1" dirty="0"/>
+              </a:p>
+            </p:txBody>
+          </p:sp>
+          <p:sp>
+            <p:nvSpPr>
+              <p:cNvPr id="14" name="TextBox 13"/>
+              <p:cNvSpPr txBox="1"/>
+              <p:nvPr/>
+            </p:nvSpPr>
+            <p:spPr>
+              <a:xfrm>
+                <a:off x="8113790" y="734290"/>
+                <a:ext cx="1724959" cy="461665"/>
+              </a:xfrm>
+              <a:prstGeom prst="rect">
+                <a:avLst/>
+              </a:prstGeom>
               <a:noFill/>
-            </a:ln>
-          </p:spPr>
-        </p:pic>
-        <p:pic>
-          <p:nvPicPr>
-            <p:cNvPr id="11" name="Picture 10"/>
-            <p:cNvPicPr>
-              <a:picLocks noChangeAspect="1"/>
-            </p:cNvPicPr>
-            <p:nvPr/>
-          </p:nvPicPr>
-          <p:blipFill rotWithShape="1">
-            <a:blip r:embed="rId6">
-              <a:extLst>
-                <a:ext uri="{BEBA8EAE-BF5A-486C-A8C5-ECC9F3942E4B}">
-                  <a14:imgProps xmlns:a14="http://schemas.microsoft.com/office/drawing/2010/main">
-                    <a14:imgLayer r:embed="rId7">
-                      <a14:imgEffect>
-                        <a14:backgroundRemoval t="0" b="90000" l="9524" r="90000">
-                          <a14:backgroundMark x1="13238" y1="16986" x2="13238" y2="16986"/>
-                        </a14:backgroundRemoval>
-                      </a14:imgEffect>
-                    </a14:imgLayer>
-                  </a14:imgProps>
-                </a:ext>
-                <a:ext uri="{28A0092B-C50C-407E-A947-70E740481C1C}">
-                  <a14:useLocalDpi xmlns:a14="http://schemas.microsoft.com/office/drawing/2010/main" val="0"/>
-                </a:ext>
-              </a:extLst>
-            </a:blip>
-            <a:srcRect l="14547" t="29410" r="14547" b="45392"/>
-            <a:stretch/>
-          </p:blipFill>
-          <p:spPr>
-            <a:xfrm>
-              <a:off x="1329870" y="2753566"/>
-              <a:ext cx="5097600" cy="1260000"/>
-            </a:xfrm>
-            <a:prstGeom prst="rect">
-              <a:avLst/>
-            </a:prstGeom>
-            <a:ln w="38100">
+            </p:spPr>
+            <p:txBody>
+              <a:bodyPr wrap="none" rtlCol="0">
+                <a:spAutoFit/>
+              </a:bodyPr>
+              <a:lstStyle/>
+              <a:p>
+                <a:r>
+                  <a:rPr lang="en-US" sz="2400" b="1" dirty="0" smtClean="0"/>
+                  <a:t>Underwater</a:t>
+                </a:r>
+                <a:endParaRPr lang="en-US" sz="2400" b="1" dirty="0"/>
+              </a:p>
+            </p:txBody>
+          </p:sp>
+          <p:sp>
+            <p:nvSpPr>
+              <p:cNvPr id="15" name="TextBox 14"/>
+              <p:cNvSpPr txBox="1"/>
+              <p:nvPr/>
+            </p:nvSpPr>
+            <p:spPr>
+              <a:xfrm>
+                <a:off x="335512" y="1672187"/>
+                <a:ext cx="854721" cy="461665"/>
+              </a:xfrm>
+              <a:prstGeom prst="rect">
+                <a:avLst/>
+              </a:prstGeom>
               <a:noFill/>
-            </a:ln>
-          </p:spPr>
-        </p:pic>
-        <p:pic>
-          <p:nvPicPr>
-            <p:cNvPr id="12" name="Picture 11"/>
-            <p:cNvPicPr>
-              <a:picLocks noChangeAspect="1"/>
-            </p:cNvPicPr>
-            <p:nvPr/>
-          </p:nvPicPr>
-          <p:blipFill rotWithShape="1">
-            <a:blip r:embed="rId8">
-              <a:extLst>
-                <a:ext uri="{BEBA8EAE-BF5A-486C-A8C5-ECC9F3942E4B}">
-                  <a14:imgProps xmlns:a14="http://schemas.microsoft.com/office/drawing/2010/main">
-                    <a14:imgLayer r:embed="rId9">
-                      <a14:imgEffect>
-                        <a14:backgroundRemoval t="0" b="90000" l="9238" r="90000">
-                          <a14:backgroundMark x1="12381" y1="11781" x2="12381" y2="11781"/>
-                        </a14:backgroundRemoval>
-                      </a14:imgEffect>
-                    </a14:imgLayer>
-                  </a14:imgProps>
-                </a:ext>
-                <a:ext uri="{28A0092B-C50C-407E-A947-70E740481C1C}">
-                  <a14:useLocalDpi xmlns:a14="http://schemas.microsoft.com/office/drawing/2010/main" val="0"/>
-                </a:ext>
-              </a:extLst>
-            </a:blip>
-            <a:srcRect l="14547" t="29410" r="14547" b="45392"/>
-            <a:stretch/>
-          </p:blipFill>
-          <p:spPr>
-            <a:xfrm>
-              <a:off x="6427470" y="2753566"/>
-              <a:ext cx="5097600" cy="1260000"/>
-            </a:xfrm>
-            <a:prstGeom prst="rect">
-              <a:avLst/>
-            </a:prstGeom>
-            <a:solidFill>
-              <a:schemeClr val="accent1">
-                <a:lumMod val="20000"/>
-                <a:lumOff val="80000"/>
-              </a:schemeClr>
-            </a:solidFill>
-            <a:ln w="38100">
+            </p:spPr>
+            <p:txBody>
+              <a:bodyPr wrap="none" rtlCol="0">
+                <a:spAutoFit/>
+              </a:bodyPr>
+              <a:lstStyle/>
+              <a:p>
+                <a:r>
+                  <a:rPr lang="en-US" sz="2400" b="1" dirty="0"/>
+                  <a:t>Glass</a:t>
+                </a:r>
+              </a:p>
+            </p:txBody>
+          </p:sp>
+          <p:sp>
+            <p:nvSpPr>
+              <p:cNvPr id="16" name="TextBox 15"/>
+              <p:cNvSpPr txBox="1"/>
+              <p:nvPr/>
+            </p:nvSpPr>
+            <p:spPr>
+              <a:xfrm>
+                <a:off x="270205" y="3152733"/>
+                <a:ext cx="985334" cy="461665"/>
+              </a:xfrm>
+              <a:prstGeom prst="rect">
+                <a:avLst/>
+              </a:prstGeom>
               <a:noFill/>
-            </a:ln>
-          </p:spPr>
-        </p:pic>
+            </p:spPr>
+            <p:txBody>
+              <a:bodyPr wrap="none" rtlCol="0">
+                <a:spAutoFit/>
+              </a:bodyPr>
+              <a:lstStyle/>
+              <a:p>
+                <a:r>
+                  <a:rPr lang="en-US" sz="2400" b="1" dirty="0"/>
+                  <a:t>PFOTS</a:t>
+                </a:r>
+              </a:p>
+            </p:txBody>
+          </p:sp>
+          <p:cxnSp>
+            <p:nvCxnSpPr>
+              <p:cNvPr id="20" name="Straight Connector 19"/>
+              <p:cNvCxnSpPr/>
+              <p:nvPr/>
+            </p:nvCxnSpPr>
+            <p:spPr>
+              <a:xfrm>
+                <a:off x="1504950" y="2533020"/>
+                <a:ext cx="10020120" cy="0"/>
+              </a:xfrm>
+              <a:prstGeom prst="line">
+                <a:avLst/>
+              </a:prstGeom>
+              <a:ln w="28575">
+                <a:solidFill>
+                  <a:schemeClr val="tx1"/>
+                </a:solidFill>
+              </a:ln>
+            </p:spPr>
+            <p:style>
+              <a:lnRef idx="1">
+                <a:schemeClr val="accent1"/>
+              </a:lnRef>
+              <a:fillRef idx="0">
+                <a:schemeClr val="accent1"/>
+              </a:fillRef>
+              <a:effectRef idx="0">
+                <a:schemeClr val="accent1"/>
+              </a:effectRef>
+              <a:fontRef idx="minor">
+                <a:schemeClr val="tx1"/>
+              </a:fontRef>
+            </p:style>
+          </p:cxnSp>
+          <p:cxnSp>
+            <p:nvCxnSpPr>
+              <p:cNvPr id="21" name="Straight Connector 20"/>
+              <p:cNvCxnSpPr/>
+              <p:nvPr/>
+            </p:nvCxnSpPr>
+            <p:spPr>
+              <a:xfrm>
+                <a:off x="1504950" y="4013566"/>
+                <a:ext cx="10020120" cy="0"/>
+              </a:xfrm>
+              <a:prstGeom prst="line">
+                <a:avLst/>
+              </a:prstGeom>
+              <a:ln w="28575">
+                <a:solidFill>
+                  <a:schemeClr val="tx1"/>
+                </a:solidFill>
+              </a:ln>
+            </p:spPr>
+            <p:style>
+              <a:lnRef idx="1">
+                <a:schemeClr val="accent1"/>
+              </a:lnRef>
+              <a:fillRef idx="0">
+                <a:schemeClr val="accent1"/>
+              </a:fillRef>
+              <a:effectRef idx="0">
+                <a:schemeClr val="accent1"/>
+              </a:effectRef>
+              <a:fontRef idx="minor">
+                <a:schemeClr val="tx1"/>
+              </a:fontRef>
+            </p:style>
+          </p:cxnSp>
+          <p:sp>
+            <p:nvSpPr>
+              <p:cNvPr id="23" name="TextBox 22"/>
+              <p:cNvSpPr txBox="1"/>
+              <p:nvPr/>
+            </p:nvSpPr>
+            <p:spPr>
+              <a:xfrm>
+                <a:off x="3496235" y="2125537"/>
+                <a:ext cx="2252540" cy="400110"/>
+              </a:xfrm>
+              <a:prstGeom prst="rect">
+                <a:avLst/>
+              </a:prstGeom>
+              <a:noFill/>
+            </p:spPr>
+            <p:txBody>
+              <a:bodyPr wrap="none" rtlCol="0">
+                <a:spAutoFit/>
+              </a:bodyPr>
+              <a:lstStyle/>
+              <a:p>
+                <a:r>
+                  <a:rPr lang="el-GR" sz="2000" dirty="0"/>
+                  <a:t>γ</a:t>
+                </a:r>
+                <a:r>
+                  <a:rPr lang="en-IN" sz="2000" dirty="0"/>
+                  <a:t> = </a:t>
+                </a:r>
+                <a:r>
+                  <a:rPr lang="en-IN" sz="2000" dirty="0" smtClean="0"/>
+                  <a:t>24 </a:t>
+                </a:r>
+                <a:r>
+                  <a:rPr lang="en-IN" sz="2000" dirty="0" err="1" smtClean="0"/>
+                  <a:t>mN</a:t>
+                </a:r>
+                <a:r>
+                  <a:rPr lang="en-IN" sz="2000" dirty="0" smtClean="0"/>
+                  <a:t>/m, </a:t>
+                </a:r>
+                <a:r>
+                  <a:rPr lang="el-GR" sz="2000" dirty="0" smtClean="0"/>
+                  <a:t>θ</a:t>
+                </a:r>
+                <a:r>
+                  <a:rPr lang="en-US" sz="2000" dirty="0" smtClean="0"/>
+                  <a:t> </a:t>
+                </a:r>
+                <a:r>
+                  <a:rPr lang="en-US" sz="2000" dirty="0"/>
+                  <a:t>= 6</a:t>
+                </a:r>
+                <a:r>
+                  <a:rPr lang="aa-ET" sz="2000" dirty="0"/>
+                  <a:t>°</a:t>
+                </a:r>
+                <a:endParaRPr lang="en-US" sz="2000" dirty="0"/>
+              </a:p>
+            </p:txBody>
+          </p:sp>
+          <p:sp>
+            <p:nvSpPr>
+              <p:cNvPr id="24" name="TextBox 23"/>
+              <p:cNvSpPr txBox="1"/>
+              <p:nvPr/>
+            </p:nvSpPr>
+            <p:spPr>
+              <a:xfrm>
+                <a:off x="8630271" y="3591765"/>
+                <a:ext cx="2252540" cy="400110"/>
+              </a:xfrm>
+              <a:prstGeom prst="rect">
+                <a:avLst/>
+              </a:prstGeom>
+              <a:noFill/>
+            </p:spPr>
+            <p:txBody>
+              <a:bodyPr wrap="none" rtlCol="0">
+                <a:spAutoFit/>
+              </a:bodyPr>
+              <a:lstStyle/>
+              <a:p>
+                <a:r>
+                  <a:rPr lang="el-GR" sz="2000" dirty="0"/>
+                  <a:t>γ</a:t>
+                </a:r>
+                <a:r>
+                  <a:rPr lang="en-IN" sz="2000" dirty="0"/>
+                  <a:t> = 48 </a:t>
+                </a:r>
+                <a:r>
+                  <a:rPr lang="en-IN" sz="2000" dirty="0" err="1"/>
+                  <a:t>mN</a:t>
+                </a:r>
+                <a:r>
+                  <a:rPr lang="en-IN" sz="2000" dirty="0"/>
+                  <a:t>/m, </a:t>
+                </a:r>
+                <a:r>
+                  <a:rPr lang="el-GR" sz="2000" dirty="0" smtClean="0"/>
+                  <a:t>θ</a:t>
+                </a:r>
+                <a:r>
+                  <a:rPr lang="en-US" sz="2000" dirty="0" smtClean="0"/>
+                  <a:t> </a:t>
+                </a:r>
+                <a:r>
+                  <a:rPr lang="en-US" sz="2000" dirty="0"/>
+                  <a:t>= </a:t>
+                </a:r>
+                <a:r>
+                  <a:rPr lang="en-US" sz="2000" dirty="0" smtClean="0"/>
+                  <a:t>1</a:t>
+                </a:r>
+                <a:r>
+                  <a:rPr lang="aa-ET" sz="2000" dirty="0" smtClean="0"/>
+                  <a:t>°</a:t>
+                </a:r>
+                <a:endParaRPr lang="en-US" sz="2000" dirty="0"/>
+              </a:p>
+            </p:txBody>
+          </p:sp>
+          <p:sp>
+            <p:nvSpPr>
+              <p:cNvPr id="25" name="TextBox 24"/>
+              <p:cNvSpPr txBox="1"/>
+              <p:nvPr/>
+            </p:nvSpPr>
+            <p:spPr>
+              <a:xfrm>
+                <a:off x="3496235" y="3591765"/>
+                <a:ext cx="2464056" cy="400110"/>
+              </a:xfrm>
+              <a:prstGeom prst="rect">
+                <a:avLst/>
+              </a:prstGeom>
+              <a:noFill/>
+            </p:spPr>
+            <p:txBody>
+              <a:bodyPr wrap="square" rtlCol="0">
+                <a:spAutoFit/>
+              </a:bodyPr>
+              <a:lstStyle/>
+              <a:p>
+                <a:r>
+                  <a:rPr lang="el-GR" sz="2000" dirty="0" smtClean="0"/>
+                  <a:t>γ</a:t>
+                </a:r>
+                <a:r>
+                  <a:rPr lang="en-IN" sz="2000" dirty="0" smtClean="0"/>
+                  <a:t> = 24 </a:t>
+                </a:r>
+                <a:r>
+                  <a:rPr lang="en-IN" sz="2000" dirty="0" err="1" smtClean="0"/>
+                  <a:t>mN</a:t>
+                </a:r>
+                <a:r>
+                  <a:rPr lang="en-IN" sz="2000" dirty="0" smtClean="0"/>
+                  <a:t>/m, </a:t>
+                </a:r>
+                <a:r>
+                  <a:rPr lang="el-GR" sz="2000" dirty="0" smtClean="0"/>
+                  <a:t>θ</a:t>
+                </a:r>
+                <a:r>
+                  <a:rPr lang="en-US" sz="2000" dirty="0" smtClean="0"/>
+                  <a:t> </a:t>
+                </a:r>
+                <a:r>
+                  <a:rPr lang="en-US" sz="2000" dirty="0"/>
+                  <a:t>= </a:t>
+                </a:r>
+                <a:r>
+                  <a:rPr lang="en-US" sz="2000" dirty="0" smtClean="0"/>
+                  <a:t>50</a:t>
+                </a:r>
+                <a:r>
+                  <a:rPr lang="aa-ET" sz="2000" dirty="0" smtClean="0"/>
+                  <a:t>°</a:t>
+                </a:r>
+                <a:endParaRPr lang="en-US" sz="2000" dirty="0"/>
+              </a:p>
+            </p:txBody>
+          </p:sp>
+          <p:sp>
+            <p:nvSpPr>
+              <p:cNvPr id="26" name="TextBox 25"/>
+              <p:cNvSpPr txBox="1"/>
+              <p:nvPr/>
+            </p:nvSpPr>
+            <p:spPr>
+              <a:xfrm>
+                <a:off x="8593835" y="2088104"/>
+                <a:ext cx="2512226" cy="400110"/>
+              </a:xfrm>
+              <a:prstGeom prst="rect">
+                <a:avLst/>
+              </a:prstGeom>
+              <a:noFill/>
+            </p:spPr>
+            <p:txBody>
+              <a:bodyPr wrap="none" rtlCol="0">
+                <a:spAutoFit/>
+              </a:bodyPr>
+              <a:lstStyle/>
+              <a:p>
+                <a:r>
+                  <a:rPr lang="el-GR" sz="2000" dirty="0"/>
+                  <a:t>γ</a:t>
+                </a:r>
+                <a:r>
+                  <a:rPr lang="en-IN" sz="2000" dirty="0"/>
+                  <a:t> = </a:t>
+                </a:r>
+                <a:r>
+                  <a:rPr lang="en-IN" sz="2000" dirty="0" smtClean="0"/>
+                  <a:t>48 </a:t>
+                </a:r>
+                <a:r>
+                  <a:rPr lang="en-IN" sz="2000" dirty="0" err="1" smtClean="0"/>
+                  <a:t>mN</a:t>
+                </a:r>
+                <a:r>
+                  <a:rPr lang="en-IN" sz="2000" dirty="0" smtClean="0"/>
+                  <a:t>/m</a:t>
+                </a:r>
+                <a:r>
+                  <a:rPr lang="en-IN" sz="2000" dirty="0"/>
+                  <a:t>, </a:t>
+                </a:r>
+                <a:r>
+                  <a:rPr lang="el-GR" sz="2000" dirty="0" smtClean="0"/>
+                  <a:t>θ</a:t>
+                </a:r>
+                <a:r>
+                  <a:rPr lang="en-US" sz="2000" dirty="0" smtClean="0"/>
+                  <a:t> </a:t>
+                </a:r>
+                <a:r>
+                  <a:rPr lang="en-US" sz="2000" dirty="0"/>
+                  <a:t>= </a:t>
+                </a:r>
+                <a:r>
+                  <a:rPr lang="en-US" sz="2000" dirty="0" smtClean="0"/>
+                  <a:t>150</a:t>
+                </a:r>
+                <a:r>
+                  <a:rPr lang="aa-ET" sz="2000" dirty="0" smtClean="0"/>
+                  <a:t>°</a:t>
+                </a:r>
+                <a:endParaRPr lang="en-US" sz="2000" dirty="0"/>
+              </a:p>
+            </p:txBody>
+          </p:sp>
+        </p:grpSp>
         <p:sp>
           <p:nvSpPr>
-            <p:cNvPr id="13" name="TextBox 12"/>
+            <p:cNvPr id="2" name="TextBox 1"/>
             <p:cNvSpPr txBox="1"/>
             <p:nvPr/>
           </p:nvSpPr>
           <p:spPr>
             <a:xfrm>
-              <a:off x="3601189" y="734290"/>
-              <a:ext cx="554960" cy="461665"/>
+              <a:off x="3028917" y="1439653"/>
+              <a:ext cx="1699504" cy="400110"/>
             </a:xfrm>
             <a:prstGeom prst="rect">
               <a:avLst/>
@@ -26271,23 +26730,31 @@
             <a:lstStyle/>
             <a:p>
               <a:r>
-                <a:rPr lang="en-US" sz="2400" b="1" dirty="0" smtClean="0"/>
-                <a:t>Air</a:t>
+                <a:rPr lang="en-IN" sz="2000" b="1" dirty="0" smtClean="0">
+                  <a:solidFill>
+                    <a:schemeClr val="bg1"/>
+                  </a:solidFill>
+                </a:rPr>
+                <a:t>High adhesion</a:t>
               </a:r>
-              <a:endParaRPr lang="en-US" sz="2400" b="1" dirty="0"/>
+              <a:endParaRPr lang="en-US" sz="2000" b="1" dirty="0">
+                <a:solidFill>
+                  <a:schemeClr val="bg1"/>
+                </a:solidFill>
+              </a:endParaRPr>
             </a:p>
           </p:txBody>
         </p:sp>
         <p:sp>
           <p:nvSpPr>
-            <p:cNvPr id="14" name="TextBox 13"/>
+            <p:cNvPr id="18" name="TextBox 17"/>
             <p:cNvSpPr txBox="1"/>
             <p:nvPr/>
           </p:nvSpPr>
           <p:spPr>
             <a:xfrm>
-              <a:off x="8113790" y="734290"/>
-              <a:ext cx="1724959" cy="461665"/>
+              <a:off x="3028917" y="2893884"/>
+              <a:ext cx="1699504" cy="400110"/>
             </a:xfrm>
             <a:prstGeom prst="rect">
               <a:avLst/>
@@ -26301,23 +26768,31 @@
             <a:lstStyle/>
             <a:p>
               <a:r>
-                <a:rPr lang="en-US" sz="2400" b="1" dirty="0" smtClean="0"/>
-                <a:t>Underwater</a:t>
+                <a:rPr lang="en-IN" sz="2000" b="1" dirty="0" smtClean="0">
+                  <a:solidFill>
+                    <a:schemeClr val="bg1"/>
+                  </a:solidFill>
+                </a:rPr>
+                <a:t>High adhesion</a:t>
               </a:r>
-              <a:endParaRPr lang="en-US" sz="2400" b="1" dirty="0"/>
+              <a:endParaRPr lang="en-US" sz="2000" b="1" dirty="0">
+                <a:solidFill>
+                  <a:schemeClr val="bg1"/>
+                </a:solidFill>
+              </a:endParaRPr>
             </a:p>
           </p:txBody>
         </p:sp>
         <p:sp>
           <p:nvSpPr>
-            <p:cNvPr id="15" name="TextBox 14"/>
+            <p:cNvPr id="19" name="TextBox 18"/>
             <p:cNvSpPr txBox="1"/>
             <p:nvPr/>
           </p:nvSpPr>
           <p:spPr>
             <a:xfrm>
-              <a:off x="335512" y="1672187"/>
-              <a:ext cx="854721" cy="461665"/>
+              <a:off x="8205497" y="2893884"/>
+              <a:ext cx="1920719" cy="400110"/>
             </a:xfrm>
             <a:prstGeom prst="rect">
               <a:avLst/>
@@ -26331,22 +26806,31 @@
             <a:lstStyle/>
             <a:p>
               <a:r>
-                <a:rPr lang="en-US" sz="2400" b="1" dirty="0"/>
-                <a:t>Glass</a:t>
+                <a:rPr lang="en-IN" sz="2000" b="1" dirty="0" smtClean="0">
+                  <a:solidFill>
+                    <a:schemeClr val="bg1"/>
+                  </a:solidFill>
+                </a:rPr>
+                <a:t>Higher adhesion</a:t>
               </a:r>
+              <a:endParaRPr lang="en-US" sz="2000" b="1" dirty="0">
+                <a:solidFill>
+                  <a:schemeClr val="bg1"/>
+                </a:solidFill>
+              </a:endParaRPr>
             </a:p>
           </p:txBody>
         </p:sp>
         <p:sp>
           <p:nvSpPr>
-            <p:cNvPr id="16" name="TextBox 15"/>
+            <p:cNvPr id="22" name="TextBox 21"/>
             <p:cNvSpPr txBox="1"/>
             <p:nvPr/>
           </p:nvSpPr>
           <p:spPr>
             <a:xfrm>
-              <a:off x="270205" y="3152733"/>
-              <a:ext cx="985334" cy="461665"/>
+              <a:off x="8339605" y="1439653"/>
+              <a:ext cx="1652504" cy="400110"/>
             </a:xfrm>
             <a:prstGeom prst="rect">
               <a:avLst/>
@@ -26360,243 +26844,18 @@
             <a:lstStyle/>
             <a:p>
               <a:r>
-                <a:rPr lang="en-US" sz="2400" b="1" dirty="0"/>
-                <a:t>PFOTS</a:t>
+                <a:rPr lang="en-IN" sz="2000" b="1" dirty="0" smtClean="0">
+                  <a:solidFill>
+                    <a:schemeClr val="bg1"/>
+                  </a:solidFill>
+                </a:rPr>
+                <a:t>Low adhesion</a:t>
               </a:r>
-            </a:p>
-          </p:txBody>
-        </p:sp>
-        <p:cxnSp>
-          <p:nvCxnSpPr>
-            <p:cNvPr id="20" name="Straight Connector 19"/>
-            <p:cNvCxnSpPr/>
-            <p:nvPr/>
-          </p:nvCxnSpPr>
-          <p:spPr>
-            <a:xfrm>
-              <a:off x="1504950" y="2533020"/>
-              <a:ext cx="10020120" cy="0"/>
-            </a:xfrm>
-            <a:prstGeom prst="line">
-              <a:avLst/>
-            </a:prstGeom>
-            <a:ln w="28575">
-              <a:solidFill>
-                <a:schemeClr val="tx1"/>
-              </a:solidFill>
-            </a:ln>
-          </p:spPr>
-          <p:style>
-            <a:lnRef idx="1">
-              <a:schemeClr val="accent1"/>
-            </a:lnRef>
-            <a:fillRef idx="0">
-              <a:schemeClr val="accent1"/>
-            </a:fillRef>
-            <a:effectRef idx="0">
-              <a:schemeClr val="accent1"/>
-            </a:effectRef>
-            <a:fontRef idx="minor">
-              <a:schemeClr val="tx1"/>
-            </a:fontRef>
-          </p:style>
-        </p:cxnSp>
-        <p:cxnSp>
-          <p:nvCxnSpPr>
-            <p:cNvPr id="21" name="Straight Connector 20"/>
-            <p:cNvCxnSpPr/>
-            <p:nvPr/>
-          </p:nvCxnSpPr>
-          <p:spPr>
-            <a:xfrm>
-              <a:off x="1504950" y="4013566"/>
-              <a:ext cx="10020120" cy="0"/>
-            </a:xfrm>
-            <a:prstGeom prst="line">
-              <a:avLst/>
-            </a:prstGeom>
-            <a:ln w="28575">
-              <a:solidFill>
-                <a:schemeClr val="tx1"/>
-              </a:solidFill>
-            </a:ln>
-          </p:spPr>
-          <p:style>
-            <a:lnRef idx="1">
-              <a:schemeClr val="accent1"/>
-            </a:lnRef>
-            <a:fillRef idx="0">
-              <a:schemeClr val="accent1"/>
-            </a:fillRef>
-            <a:effectRef idx="0">
-              <a:schemeClr val="accent1"/>
-            </a:effectRef>
-            <a:fontRef idx="minor">
-              <a:schemeClr val="tx1"/>
-            </a:fontRef>
-          </p:style>
-        </p:cxnSp>
-        <p:sp>
-          <p:nvSpPr>
-            <p:cNvPr id="23" name="TextBox 22"/>
-            <p:cNvSpPr txBox="1"/>
-            <p:nvPr/>
-          </p:nvSpPr>
-          <p:spPr>
-            <a:xfrm>
-              <a:off x="5209940" y="2111219"/>
-              <a:ext cx="785793" cy="400110"/>
-            </a:xfrm>
-            <a:prstGeom prst="rect">
-              <a:avLst/>
-            </a:prstGeom>
-            <a:noFill/>
-          </p:spPr>
-          <p:txBody>
-            <a:bodyPr wrap="none" rtlCol="0">
-              <a:spAutoFit/>
-            </a:bodyPr>
-            <a:lstStyle/>
-            <a:p>
-              <a:r>
-                <a:rPr lang="el-GR" sz="2000" dirty="0"/>
-                <a:t>θ</a:t>
-              </a:r>
-              <a:r>
-                <a:rPr lang="en-US" sz="2000" dirty="0"/>
-                <a:t> = 6</a:t>
-              </a:r>
-              <a:r>
-                <a:rPr lang="aa-ET" sz="2000" dirty="0"/>
-                <a:t>°</a:t>
-              </a:r>
-              <a:endParaRPr lang="en-US" sz="2000" dirty="0"/>
-            </a:p>
-          </p:txBody>
-        </p:sp>
-        <p:sp>
-          <p:nvSpPr>
-            <p:cNvPr id="24" name="TextBox 23"/>
-            <p:cNvSpPr txBox="1"/>
-            <p:nvPr/>
-          </p:nvSpPr>
-          <p:spPr>
-            <a:xfrm>
-              <a:off x="10272097" y="3591765"/>
-              <a:ext cx="785793" cy="400110"/>
-            </a:xfrm>
-            <a:prstGeom prst="rect">
-              <a:avLst/>
-            </a:prstGeom>
-            <a:noFill/>
-          </p:spPr>
-          <p:txBody>
-            <a:bodyPr wrap="none" rtlCol="0">
-              <a:spAutoFit/>
-            </a:bodyPr>
-            <a:lstStyle/>
-            <a:p>
-              <a:r>
-                <a:rPr lang="el-GR" sz="2000" dirty="0"/>
-                <a:t>θ</a:t>
-              </a:r>
-              <a:r>
-                <a:rPr lang="en-US" sz="2000" dirty="0"/>
-                <a:t> = </a:t>
-              </a:r>
-              <a:r>
-                <a:rPr lang="en-US" sz="2000" dirty="0" smtClean="0"/>
-                <a:t>1</a:t>
-              </a:r>
-              <a:r>
-                <a:rPr lang="aa-ET" sz="2000" dirty="0" smtClean="0"/>
-                <a:t>°</a:t>
-              </a:r>
-              <a:endParaRPr lang="en-US" sz="2000" dirty="0"/>
-            </a:p>
-          </p:txBody>
-        </p:sp>
-        <p:sp>
-          <p:nvSpPr>
-            <p:cNvPr id="25" name="TextBox 24"/>
-            <p:cNvSpPr txBox="1"/>
-            <p:nvPr/>
-          </p:nvSpPr>
-          <p:spPr>
-            <a:xfrm>
-              <a:off x="5044655" y="3591765"/>
-              <a:ext cx="915635" cy="400110"/>
-            </a:xfrm>
-            <a:prstGeom prst="rect">
-              <a:avLst/>
-            </a:prstGeom>
-            <a:noFill/>
-          </p:spPr>
-          <p:txBody>
-            <a:bodyPr wrap="none" rtlCol="0">
-              <a:spAutoFit/>
-            </a:bodyPr>
-            <a:lstStyle/>
-            <a:p>
-              <a:r>
-                <a:rPr lang="el-GR" sz="2000" dirty="0"/>
-                <a:t>θ</a:t>
-              </a:r>
-              <a:r>
-                <a:rPr lang="en-US" sz="2000" dirty="0"/>
-                <a:t> = </a:t>
-              </a:r>
-              <a:r>
-                <a:rPr lang="en-US" sz="2000" dirty="0" smtClean="0"/>
-                <a:t>50</a:t>
-              </a:r>
-              <a:r>
-                <a:rPr lang="aa-ET" sz="2000" dirty="0" smtClean="0"/>
-                <a:t>°</a:t>
-              </a:r>
-              <a:endParaRPr lang="en-US" sz="2000" dirty="0"/>
-            </a:p>
-          </p:txBody>
-        </p:sp>
-        <p:sp>
-          <p:nvSpPr>
-            <p:cNvPr id="26" name="TextBox 25"/>
-            <p:cNvSpPr txBox="1"/>
-            <p:nvPr/>
-          </p:nvSpPr>
-          <p:spPr>
-            <a:xfrm>
-              <a:off x="10072619" y="2117263"/>
-              <a:ext cx="1045479" cy="400110"/>
-            </a:xfrm>
-            <a:prstGeom prst="rect">
-              <a:avLst/>
-            </a:prstGeom>
-            <a:noFill/>
-          </p:spPr>
-          <p:txBody>
-            <a:bodyPr wrap="none" rtlCol="0">
-              <a:spAutoFit/>
-            </a:bodyPr>
-            <a:lstStyle/>
-            <a:p>
-              <a:r>
-                <a:rPr lang="el-GR" sz="2000" dirty="0"/>
-                <a:t>θ</a:t>
-              </a:r>
-              <a:r>
-                <a:rPr lang="en-US" sz="2000" dirty="0"/>
-                <a:t> = </a:t>
-              </a:r>
-              <a:r>
-                <a:rPr lang="en-US" sz="2000" dirty="0" smtClean="0"/>
-                <a:t>150</a:t>
-              </a:r>
-              <a:r>
-                <a:rPr lang="aa-ET" sz="2000" dirty="0" smtClean="0"/>
-                <a:t>°</a:t>
-              </a:r>
-              <a:endParaRPr lang="en-US" sz="2000" dirty="0"/>
+              <a:endParaRPr lang="en-US" sz="2000" b="1" dirty="0">
+                <a:solidFill>
+                  <a:schemeClr val="bg1"/>
+                </a:solidFill>
+              </a:endParaRPr>
             </a:p>
           </p:txBody>
         </p:sp>

</xml_diff>

<commit_message>
finished edits based on both reviewers comments.
final pdf of manuscript rendered
supplementary files renamed
</commit_message>
<xml_diff>
--- a/Data/schematics.pptx
+++ b/Data/schematics.pptx
@@ -248,7 +248,7 @@
           <a:p>
             <a:fld id="{498A6A98-93B9-470F-BB23-351240910FD2}" type="datetimeFigureOut">
               <a:rPr lang="en-US" smtClean="0"/>
-              <a:t>1/13/2021</a:t>
+              <a:t>5/8/2021</a:t>
             </a:fld>
             <a:endParaRPr lang="en-US"/>
           </a:p>
@@ -418,7 +418,7 @@
           <a:p>
             <a:fld id="{498A6A98-93B9-470F-BB23-351240910FD2}" type="datetimeFigureOut">
               <a:rPr lang="en-US" smtClean="0"/>
-              <a:t>1/13/2021</a:t>
+              <a:t>5/8/2021</a:t>
             </a:fld>
             <a:endParaRPr lang="en-US"/>
           </a:p>
@@ -598,7 +598,7 @@
           <a:p>
             <a:fld id="{498A6A98-93B9-470F-BB23-351240910FD2}" type="datetimeFigureOut">
               <a:rPr lang="en-US" smtClean="0"/>
-              <a:t>1/13/2021</a:t>
+              <a:t>5/8/2021</a:t>
             </a:fld>
             <a:endParaRPr lang="en-US"/>
           </a:p>
@@ -768,7 +768,7 @@
           <a:p>
             <a:fld id="{498A6A98-93B9-470F-BB23-351240910FD2}" type="datetimeFigureOut">
               <a:rPr lang="en-US" smtClean="0"/>
-              <a:t>1/13/2021</a:t>
+              <a:t>5/8/2021</a:t>
             </a:fld>
             <a:endParaRPr lang="en-US"/>
           </a:p>
@@ -1014,7 +1014,7 @@
           <a:p>
             <a:fld id="{498A6A98-93B9-470F-BB23-351240910FD2}" type="datetimeFigureOut">
               <a:rPr lang="en-US" smtClean="0"/>
-              <a:t>1/13/2021</a:t>
+              <a:t>5/8/2021</a:t>
             </a:fld>
             <a:endParaRPr lang="en-US"/>
           </a:p>
@@ -1246,7 +1246,7 @@
           <a:p>
             <a:fld id="{498A6A98-93B9-470F-BB23-351240910FD2}" type="datetimeFigureOut">
               <a:rPr lang="en-US" smtClean="0"/>
-              <a:t>1/13/2021</a:t>
+              <a:t>5/8/2021</a:t>
             </a:fld>
             <a:endParaRPr lang="en-US"/>
           </a:p>
@@ -1613,7 +1613,7 @@
           <a:p>
             <a:fld id="{498A6A98-93B9-470F-BB23-351240910FD2}" type="datetimeFigureOut">
               <a:rPr lang="en-US" smtClean="0"/>
-              <a:t>1/13/2021</a:t>
+              <a:t>5/8/2021</a:t>
             </a:fld>
             <a:endParaRPr lang="en-US"/>
           </a:p>
@@ -1731,7 +1731,7 @@
           <a:p>
             <a:fld id="{498A6A98-93B9-470F-BB23-351240910FD2}" type="datetimeFigureOut">
               <a:rPr lang="en-US" smtClean="0"/>
-              <a:t>1/13/2021</a:t>
+              <a:t>5/8/2021</a:t>
             </a:fld>
             <a:endParaRPr lang="en-US"/>
           </a:p>
@@ -1826,7 +1826,7 @@
           <a:p>
             <a:fld id="{498A6A98-93B9-470F-BB23-351240910FD2}" type="datetimeFigureOut">
               <a:rPr lang="en-US" smtClean="0"/>
-              <a:t>1/13/2021</a:t>
+              <a:t>5/8/2021</a:t>
             </a:fld>
             <a:endParaRPr lang="en-US"/>
           </a:p>
@@ -2103,7 +2103,7 @@
           <a:p>
             <a:fld id="{498A6A98-93B9-470F-BB23-351240910FD2}" type="datetimeFigureOut">
               <a:rPr lang="en-US" smtClean="0"/>
-              <a:t>1/13/2021</a:t>
+              <a:t>5/8/2021</a:t>
             </a:fld>
             <a:endParaRPr lang="en-US"/>
           </a:p>
@@ -2356,7 +2356,7 @@
           <a:p>
             <a:fld id="{498A6A98-93B9-470F-BB23-351240910FD2}" type="datetimeFigureOut">
               <a:rPr lang="en-US" smtClean="0"/>
-              <a:t>1/13/2021</a:t>
+              <a:t>5/8/2021</a:t>
             </a:fld>
             <a:endParaRPr lang="en-US"/>
           </a:p>
@@ -2569,7 +2569,7 @@
           <a:p>
             <a:fld id="{498A6A98-93B9-470F-BB23-351240910FD2}" type="datetimeFigureOut">
               <a:rPr lang="en-US" smtClean="0"/>
-              <a:t>1/13/2021</a:t>
+              <a:t>5/8/2021</a:t>
             </a:fld>
             <a:endParaRPr lang="en-US"/>
           </a:p>
@@ -26459,7 +26459,7 @@
             <p:spPr>
               <a:xfrm>
                 <a:off x="3496235" y="2125537"/>
-                <a:ext cx="2252540" cy="400110"/>
+                <a:ext cx="2350323" cy="400110"/>
               </a:xfrm>
               <a:prstGeom prst="rect">
                 <a:avLst/>
@@ -26490,7 +26490,19 @@
                 </a:r>
                 <a:r>
                   <a:rPr lang="en-IN" sz="2000" dirty="0" smtClean="0"/>
-                  <a:t>/m, </a:t>
+                  <a:t> </a:t>
+                </a:r>
+                <a:r>
+                  <a:rPr lang="en-IN" sz="2000" dirty="0" smtClean="0"/>
+                  <a:t>m</a:t>
+                </a:r>
+                <a:r>
+                  <a:rPr lang="en-IN" sz="2000" baseline="30000" dirty="0" smtClean="0"/>
+                  <a:t>-1</a:t>
+                </a:r>
+                <a:r>
+                  <a:rPr lang="en-IN" sz="2000" dirty="0" smtClean="0"/>
+                  <a:t>, </a:t>
                 </a:r>
                 <a:r>
                   <a:rPr lang="el-GR" sz="2000" dirty="0" smtClean="0"/>
@@ -26521,7 +26533,7 @@
             <p:spPr>
               <a:xfrm>
                 <a:off x="8630271" y="3591765"/>
-                <a:ext cx="2252540" cy="400110"/>
+                <a:ext cx="2350323" cy="400110"/>
               </a:xfrm>
               <a:prstGeom prst="rect">
                 <a:avLst/>
@@ -26548,7 +26560,15 @@
                 </a:r>
                 <a:r>
                   <a:rPr lang="en-IN" sz="2000" dirty="0"/>
-                  <a:t>/m, </a:t>
+                  <a:t> m</a:t>
+                </a:r>
+                <a:r>
+                  <a:rPr lang="en-IN" sz="2000" baseline="30000" dirty="0"/>
+                  <a:t>-1</a:t>
+                </a:r>
+                <a:r>
+                  <a:rPr lang="en-IN" sz="2000" dirty="0" smtClean="0"/>
+                  <a:t>, </a:t>
                 </a:r>
                 <a:r>
                   <a:rPr lang="el-GR" sz="2000" dirty="0" smtClean="0"/>
@@ -26609,8 +26629,16 @@
                   <a:t>mN</a:t>
                 </a:r>
                 <a:r>
+                  <a:rPr lang="en-IN" sz="2000" dirty="0"/>
+                  <a:t> m</a:t>
+                </a:r>
+                <a:r>
+                  <a:rPr lang="en-IN" sz="2000" baseline="30000" dirty="0"/>
+                  <a:t>-1</a:t>
+                </a:r>
+                <a:r>
                   <a:rPr lang="en-IN" sz="2000" dirty="0" smtClean="0"/>
-                  <a:t>/m, </a:t>
+                  <a:t>, </a:t>
                 </a:r>
                 <a:r>
                   <a:rPr lang="el-GR" sz="2000" dirty="0" smtClean="0"/>
@@ -26645,7 +26673,7 @@
             <p:spPr>
               <a:xfrm>
                 <a:off x="8593835" y="2088104"/>
-                <a:ext cx="2512226" cy="400110"/>
+                <a:ext cx="2610010" cy="400110"/>
               </a:xfrm>
               <a:prstGeom prst="rect">
                 <a:avLst/>
@@ -26671,15 +26699,19 @@
                   <a:t>48 </a:t>
                 </a:r>
                 <a:r>
-                  <a:rPr lang="en-IN" sz="2000" dirty="0" err="1" smtClean="0"/>
+                  <a:rPr lang="en-IN" sz="2000" dirty="0" err="1"/>
                   <a:t>mN</a:t>
                 </a:r>
                 <a:r>
-                  <a:rPr lang="en-IN" sz="2000" dirty="0" smtClean="0"/>
-                  <a:t>/m</a:t>
+                  <a:rPr lang="en-IN" sz="2000" dirty="0"/>
+                  <a:t> m</a:t>
                 </a:r>
                 <a:r>
-                  <a:rPr lang="en-IN" sz="2000" dirty="0"/>
+                  <a:rPr lang="en-IN" sz="2000" baseline="30000" dirty="0"/>
+                  <a:t>-1</a:t>
+                </a:r>
+                <a:r>
+                  <a:rPr lang="en-IN" sz="2000" dirty="0" smtClean="0"/>
                   <a:t>, </a:t>
                 </a:r>
                 <a:r>

</xml_diff>

<commit_message>
finalized manuscript based on thomas's suggestions
ready to send to JEB
</commit_message>
<xml_diff>
--- a/Data/schematics.pptx
+++ b/Data/schematics.pptx
@@ -2,7 +2,7 @@
 <file path=ppt/presentation.xml><?xml version="1.0" encoding="utf-8"?>
 <p:presentation xmlns:a="http://schemas.openxmlformats.org/drawingml/2006/main" xmlns:r="http://schemas.openxmlformats.org/officeDocument/2006/relationships" xmlns:p="http://schemas.openxmlformats.org/presentationml/2006/main" saveSubsetFonts="1">
   <p:sldMasterIdLst>
-    <p:sldMasterId id="2147483648" r:id="rId1"/>
+    <p:sldMasterId id="2147483684" r:id="rId1"/>
   </p:sldMasterIdLst>
   <p:sldIdLst>
     <p:sldId id="261" r:id="rId2"/>
@@ -12,13 +12,13 @@
     <p:sldId id="258" r:id="rId6"/>
     <p:sldId id="259" r:id="rId7"/>
   </p:sldIdLst>
-  <p:sldSz cx="12192000" cy="6858000"/>
+  <p:sldSz cx="7199313" cy="2311400"/>
   <p:notesSz cx="6858000" cy="9144000"/>
   <p:defaultTextStyle>
     <a:defPPr>
       <a:defRPr lang="en-US"/>
     </a:defPPr>
-    <a:lvl1pPr marL="0" algn="l" defTabSz="914400" rtl="0" eaLnBrk="1" latinLnBrk="0" hangingPunct="1">
+    <a:lvl1pPr marL="0" algn="l" defTabSz="457200" rtl="0" eaLnBrk="1" latinLnBrk="0" hangingPunct="1">
       <a:defRPr sz="1800" kern="1200">
         <a:solidFill>
           <a:schemeClr val="tx1"/>
@@ -28,7 +28,7 @@
         <a:cs typeface="+mn-cs"/>
       </a:defRPr>
     </a:lvl1pPr>
-    <a:lvl2pPr marL="457200" algn="l" defTabSz="914400" rtl="0" eaLnBrk="1" latinLnBrk="0" hangingPunct="1">
+    <a:lvl2pPr marL="457200" algn="l" defTabSz="457200" rtl="0" eaLnBrk="1" latinLnBrk="0" hangingPunct="1">
       <a:defRPr sz="1800" kern="1200">
         <a:solidFill>
           <a:schemeClr val="tx1"/>
@@ -38,7 +38,7 @@
         <a:cs typeface="+mn-cs"/>
       </a:defRPr>
     </a:lvl2pPr>
-    <a:lvl3pPr marL="914400" algn="l" defTabSz="914400" rtl="0" eaLnBrk="1" latinLnBrk="0" hangingPunct="1">
+    <a:lvl3pPr marL="914400" algn="l" defTabSz="457200" rtl="0" eaLnBrk="1" latinLnBrk="0" hangingPunct="1">
       <a:defRPr sz="1800" kern="1200">
         <a:solidFill>
           <a:schemeClr val="tx1"/>
@@ -48,7 +48,7 @@
         <a:cs typeface="+mn-cs"/>
       </a:defRPr>
     </a:lvl3pPr>
-    <a:lvl4pPr marL="1371600" algn="l" defTabSz="914400" rtl="0" eaLnBrk="1" latinLnBrk="0" hangingPunct="1">
+    <a:lvl4pPr marL="1371600" algn="l" defTabSz="457200" rtl="0" eaLnBrk="1" latinLnBrk="0" hangingPunct="1">
       <a:defRPr sz="1800" kern="1200">
         <a:solidFill>
           <a:schemeClr val="tx1"/>
@@ -58,7 +58,7 @@
         <a:cs typeface="+mn-cs"/>
       </a:defRPr>
     </a:lvl4pPr>
-    <a:lvl5pPr marL="1828800" algn="l" defTabSz="914400" rtl="0" eaLnBrk="1" latinLnBrk="0" hangingPunct="1">
+    <a:lvl5pPr marL="1828800" algn="l" defTabSz="457200" rtl="0" eaLnBrk="1" latinLnBrk="0" hangingPunct="1">
       <a:defRPr sz="1800" kern="1200">
         <a:solidFill>
           <a:schemeClr val="tx1"/>
@@ -68,7 +68,7 @@
         <a:cs typeface="+mn-cs"/>
       </a:defRPr>
     </a:lvl5pPr>
-    <a:lvl6pPr marL="2286000" algn="l" defTabSz="914400" rtl="0" eaLnBrk="1" latinLnBrk="0" hangingPunct="1">
+    <a:lvl6pPr marL="2286000" algn="l" defTabSz="457200" rtl="0" eaLnBrk="1" latinLnBrk="0" hangingPunct="1">
       <a:defRPr sz="1800" kern="1200">
         <a:solidFill>
           <a:schemeClr val="tx1"/>
@@ -78,7 +78,7 @@
         <a:cs typeface="+mn-cs"/>
       </a:defRPr>
     </a:lvl6pPr>
-    <a:lvl7pPr marL="2743200" algn="l" defTabSz="914400" rtl="0" eaLnBrk="1" latinLnBrk="0" hangingPunct="1">
+    <a:lvl7pPr marL="2743200" algn="l" defTabSz="457200" rtl="0" eaLnBrk="1" latinLnBrk="0" hangingPunct="1">
       <a:defRPr sz="1800" kern="1200">
         <a:solidFill>
           <a:schemeClr val="tx1"/>
@@ -88,7 +88,7 @@
         <a:cs typeface="+mn-cs"/>
       </a:defRPr>
     </a:lvl7pPr>
-    <a:lvl8pPr marL="3200400" algn="l" defTabSz="914400" rtl="0" eaLnBrk="1" latinLnBrk="0" hangingPunct="1">
+    <a:lvl8pPr marL="3200400" algn="l" defTabSz="457200" rtl="0" eaLnBrk="1" latinLnBrk="0" hangingPunct="1">
       <a:defRPr sz="1800" kern="1200">
         <a:solidFill>
           <a:schemeClr val="tx1"/>
@@ -98,7 +98,7 @@
         <a:cs typeface="+mn-cs"/>
       </a:defRPr>
     </a:lvl8pPr>
-    <a:lvl9pPr marL="3657600" algn="l" defTabSz="914400" rtl="0" eaLnBrk="1" latinLnBrk="0" hangingPunct="1">
+    <a:lvl9pPr marL="3657600" algn="l" defTabSz="457200" rtl="0" eaLnBrk="1" latinLnBrk="0" hangingPunct="1">
       <a:defRPr sz="1800" kern="1200">
         <a:solidFill>
           <a:schemeClr val="tx1"/>
@@ -146,15 +146,15 @@
         </p:nvSpPr>
         <p:spPr>
           <a:xfrm>
-            <a:off x="1524000" y="1122363"/>
-            <a:ext cx="9144000" cy="2387600"/>
+            <a:off x="899914" y="378278"/>
+            <a:ext cx="5399485" cy="804710"/>
           </a:xfrm>
         </p:spPr>
         <p:txBody>
           <a:bodyPr anchor="b"/>
           <a:lstStyle>
             <a:lvl1pPr algn="ctr">
-              <a:defRPr sz="6000"/>
+              <a:defRPr sz="2022"/>
             </a:lvl1pPr>
           </a:lstStyle>
           <a:p>
@@ -162,7 +162,7 @@
               <a:rPr lang="en-US" smtClean="0"/>
               <a:t>Click to edit Master title style</a:t>
             </a:r>
-            <a:endParaRPr lang="en-US"/>
+            <a:endParaRPr lang="en-US" dirty="0"/>
           </a:p>
         </p:txBody>
       </p:sp>
@@ -178,8 +178,8 @@
         </p:nvSpPr>
         <p:spPr>
           <a:xfrm>
-            <a:off x="1524000" y="3602038"/>
-            <a:ext cx="9144000" cy="1655762"/>
+            <a:off x="899914" y="1214020"/>
+            <a:ext cx="5399485" cy="558053"/>
           </a:xfrm>
         </p:spPr>
         <p:txBody>
@@ -187,39 +187,39 @@
           <a:lstStyle>
             <a:lvl1pPr marL="0" indent="0" algn="ctr">
               <a:buNone/>
-              <a:defRPr sz="2400"/>
+              <a:defRPr sz="809"/>
             </a:lvl1pPr>
-            <a:lvl2pPr marL="457200" indent="0" algn="ctr">
+            <a:lvl2pPr marL="154076" indent="0" algn="ctr">
               <a:buNone/>
-              <a:defRPr sz="2000"/>
+              <a:defRPr sz="674"/>
             </a:lvl2pPr>
-            <a:lvl3pPr marL="914400" indent="0" algn="ctr">
+            <a:lvl3pPr marL="308153" indent="0" algn="ctr">
               <a:buNone/>
-              <a:defRPr sz="1800"/>
+              <a:defRPr sz="607"/>
             </a:lvl3pPr>
-            <a:lvl4pPr marL="1371600" indent="0" algn="ctr">
+            <a:lvl4pPr marL="462229" indent="0" algn="ctr">
               <a:buNone/>
-              <a:defRPr sz="1600"/>
+              <a:defRPr sz="539"/>
             </a:lvl4pPr>
-            <a:lvl5pPr marL="1828800" indent="0" algn="ctr">
+            <a:lvl5pPr marL="616306" indent="0" algn="ctr">
               <a:buNone/>
-              <a:defRPr sz="1600"/>
+              <a:defRPr sz="539"/>
             </a:lvl5pPr>
-            <a:lvl6pPr marL="2286000" indent="0" algn="ctr">
+            <a:lvl6pPr marL="770382" indent="0" algn="ctr">
               <a:buNone/>
-              <a:defRPr sz="1600"/>
+              <a:defRPr sz="539"/>
             </a:lvl6pPr>
-            <a:lvl7pPr marL="2743200" indent="0" algn="ctr">
+            <a:lvl7pPr marL="924458" indent="0" algn="ctr">
               <a:buNone/>
-              <a:defRPr sz="1600"/>
+              <a:defRPr sz="539"/>
             </a:lvl7pPr>
-            <a:lvl8pPr marL="3200400" indent="0" algn="ctr">
+            <a:lvl8pPr marL="1078535" indent="0" algn="ctr">
               <a:buNone/>
-              <a:defRPr sz="1600"/>
+              <a:defRPr sz="539"/>
             </a:lvl8pPr>
-            <a:lvl9pPr marL="3657600" indent="0" algn="ctr">
+            <a:lvl9pPr marL="1232611" indent="0" algn="ctr">
               <a:buNone/>
-              <a:defRPr sz="1600"/>
+              <a:defRPr sz="539"/>
             </a:lvl9pPr>
           </a:lstStyle>
           <a:p>
@@ -227,7 +227,7 @@
               <a:rPr lang="en-US" smtClean="0"/>
               <a:t>Click to edit Master subtitle style</a:t>
             </a:r>
-            <a:endParaRPr lang="en-US"/>
+            <a:endParaRPr lang="en-US" dirty="0"/>
           </a:p>
         </p:txBody>
       </p:sp>
@@ -248,7 +248,7 @@
           <a:p>
             <a:fld id="{498A6A98-93B9-470F-BB23-351240910FD2}" type="datetimeFigureOut">
               <a:rPr lang="en-US" smtClean="0"/>
-              <a:t>5/8/2021</a:t>
+              <a:t>5/10/2021</a:t>
             </a:fld>
             <a:endParaRPr lang="en-US"/>
           </a:p>
@@ -299,7 +299,7 @@
     </p:spTree>
     <p:extLst>
       <p:ext uri="{BB962C8B-B14F-4D97-AF65-F5344CB8AC3E}">
-        <p14:creationId xmlns:p14="http://schemas.microsoft.com/office/powerpoint/2010/main" val="3443584503"/>
+        <p14:creationId xmlns:p14="http://schemas.microsoft.com/office/powerpoint/2010/main" val="3033751139"/>
       </p:ext>
     </p:extLst>
   </p:cSld>
@@ -345,7 +345,7 @@
               <a:rPr lang="en-US" smtClean="0"/>
               <a:t>Click to edit Master title style</a:t>
             </a:r>
-            <a:endParaRPr lang="en-US"/>
+            <a:endParaRPr lang="en-US" dirty="0"/>
           </a:p>
         </p:txBody>
       </p:sp>
@@ -397,7 +397,7 @@
               <a:rPr lang="en-US" smtClean="0"/>
               <a:t>Fifth level</a:t>
             </a:r>
-            <a:endParaRPr lang="en-US"/>
+            <a:endParaRPr lang="en-US" dirty="0"/>
           </a:p>
         </p:txBody>
       </p:sp>
@@ -418,7 +418,7 @@
           <a:p>
             <a:fld id="{498A6A98-93B9-470F-BB23-351240910FD2}" type="datetimeFigureOut">
               <a:rPr lang="en-US" smtClean="0"/>
-              <a:t>5/8/2021</a:t>
+              <a:t>5/10/2021</a:t>
             </a:fld>
             <a:endParaRPr lang="en-US"/>
           </a:p>
@@ -469,7 +469,7 @@
     </p:spTree>
     <p:extLst>
       <p:ext uri="{BB962C8B-B14F-4D97-AF65-F5344CB8AC3E}">
-        <p14:creationId xmlns:p14="http://schemas.microsoft.com/office/powerpoint/2010/main" val="1065656150"/>
+        <p14:creationId xmlns:p14="http://schemas.microsoft.com/office/powerpoint/2010/main" val="2855460795"/>
       </p:ext>
     </p:extLst>
   </p:cSld>
@@ -508,8 +508,8 @@
         </p:nvSpPr>
         <p:spPr>
           <a:xfrm>
-            <a:off x="8724900" y="365125"/>
-            <a:ext cx="2628900" cy="5811838"/>
+            <a:off x="5152008" y="123060"/>
+            <a:ext cx="1552352" cy="1958805"/>
           </a:xfrm>
         </p:spPr>
         <p:txBody>
@@ -520,7 +520,7 @@
               <a:rPr lang="en-US" smtClean="0"/>
               <a:t>Click to edit Master title style</a:t>
             </a:r>
-            <a:endParaRPr lang="en-US"/>
+            <a:endParaRPr lang="en-US" dirty="0"/>
           </a:p>
         </p:txBody>
       </p:sp>
@@ -536,8 +536,8 @@
         </p:nvSpPr>
         <p:spPr>
           <a:xfrm>
-            <a:off x="838200" y="365125"/>
-            <a:ext cx="7734300" cy="5811838"/>
+            <a:off x="494953" y="123060"/>
+            <a:ext cx="4567064" cy="1958805"/>
           </a:xfrm>
         </p:spPr>
         <p:txBody>
@@ -577,7 +577,7 @@
               <a:rPr lang="en-US" smtClean="0"/>
               <a:t>Fifth level</a:t>
             </a:r>
-            <a:endParaRPr lang="en-US"/>
+            <a:endParaRPr lang="en-US" dirty="0"/>
           </a:p>
         </p:txBody>
       </p:sp>
@@ -598,7 +598,7 @@
           <a:p>
             <a:fld id="{498A6A98-93B9-470F-BB23-351240910FD2}" type="datetimeFigureOut">
               <a:rPr lang="en-US" smtClean="0"/>
-              <a:t>5/8/2021</a:t>
+              <a:t>5/10/2021</a:t>
             </a:fld>
             <a:endParaRPr lang="en-US"/>
           </a:p>
@@ -649,7 +649,7 @@
     </p:spTree>
     <p:extLst>
       <p:ext uri="{BB962C8B-B14F-4D97-AF65-F5344CB8AC3E}">
-        <p14:creationId xmlns:p14="http://schemas.microsoft.com/office/powerpoint/2010/main" val="1036634942"/>
+        <p14:creationId xmlns:p14="http://schemas.microsoft.com/office/powerpoint/2010/main" val="1304538009"/>
       </p:ext>
     </p:extLst>
   </p:cSld>
@@ -695,7 +695,7 @@
               <a:rPr lang="en-US" smtClean="0"/>
               <a:t>Click to edit Master title style</a:t>
             </a:r>
-            <a:endParaRPr lang="en-US"/>
+            <a:endParaRPr lang="en-US" dirty="0"/>
           </a:p>
         </p:txBody>
       </p:sp>
@@ -747,7 +747,7 @@
               <a:rPr lang="en-US" smtClean="0"/>
               <a:t>Fifth level</a:t>
             </a:r>
-            <a:endParaRPr lang="en-US"/>
+            <a:endParaRPr lang="en-US" dirty="0"/>
           </a:p>
         </p:txBody>
       </p:sp>
@@ -768,7 +768,7 @@
           <a:p>
             <a:fld id="{498A6A98-93B9-470F-BB23-351240910FD2}" type="datetimeFigureOut">
               <a:rPr lang="en-US" smtClean="0"/>
-              <a:t>5/8/2021</a:t>
+              <a:t>5/10/2021</a:t>
             </a:fld>
             <a:endParaRPr lang="en-US"/>
           </a:p>
@@ -819,7 +819,7 @@
     </p:spTree>
     <p:extLst>
       <p:ext uri="{BB962C8B-B14F-4D97-AF65-F5344CB8AC3E}">
-        <p14:creationId xmlns:p14="http://schemas.microsoft.com/office/powerpoint/2010/main" val="831233144"/>
+        <p14:creationId xmlns:p14="http://schemas.microsoft.com/office/powerpoint/2010/main" val="2523074329"/>
       </p:ext>
     </p:extLst>
   </p:cSld>
@@ -858,15 +858,15 @@
         </p:nvSpPr>
         <p:spPr>
           <a:xfrm>
-            <a:off x="831850" y="1709738"/>
-            <a:ext cx="10515600" cy="2852737"/>
+            <a:off x="491203" y="576245"/>
+            <a:ext cx="6209407" cy="961478"/>
           </a:xfrm>
         </p:spPr>
         <p:txBody>
           <a:bodyPr anchor="b"/>
           <a:lstStyle>
             <a:lvl1pPr>
-              <a:defRPr sz="6000"/>
+              <a:defRPr sz="2022"/>
             </a:lvl1pPr>
           </a:lstStyle>
           <a:p>
@@ -874,7 +874,7 @@
               <a:rPr lang="en-US" smtClean="0"/>
               <a:t>Click to edit Master title style</a:t>
             </a:r>
-            <a:endParaRPr lang="en-US"/>
+            <a:endParaRPr lang="en-US" dirty="0"/>
           </a:p>
         </p:txBody>
       </p:sp>
@@ -890,8 +890,8 @@
         </p:nvSpPr>
         <p:spPr>
           <a:xfrm>
-            <a:off x="831850" y="4589463"/>
-            <a:ext cx="10515600" cy="1500187"/>
+            <a:off x="491203" y="1546819"/>
+            <a:ext cx="6209407" cy="505619"/>
           </a:xfrm>
         </p:spPr>
         <p:txBody>
@@ -899,7 +899,7 @@
           <a:lstStyle>
             <a:lvl1pPr marL="0" indent="0">
               <a:buNone/>
-              <a:defRPr sz="2400">
+              <a:defRPr sz="809">
                 <a:solidFill>
                   <a:schemeClr val="tx1">
                     <a:tint val="75000"/>
@@ -907,9 +907,9 @@
                 </a:solidFill>
               </a:defRPr>
             </a:lvl1pPr>
-            <a:lvl2pPr marL="457200" indent="0">
+            <a:lvl2pPr marL="154076" indent="0">
               <a:buNone/>
-              <a:defRPr sz="2000">
+              <a:defRPr sz="674">
                 <a:solidFill>
                   <a:schemeClr val="tx1">
                     <a:tint val="75000"/>
@@ -917,9 +917,9 @@
                 </a:solidFill>
               </a:defRPr>
             </a:lvl2pPr>
-            <a:lvl3pPr marL="914400" indent="0">
+            <a:lvl3pPr marL="308153" indent="0">
               <a:buNone/>
-              <a:defRPr sz="1800">
+              <a:defRPr sz="607">
                 <a:solidFill>
                   <a:schemeClr val="tx1">
                     <a:tint val="75000"/>
@@ -927,9 +927,9 @@
                 </a:solidFill>
               </a:defRPr>
             </a:lvl3pPr>
-            <a:lvl4pPr marL="1371600" indent="0">
+            <a:lvl4pPr marL="462229" indent="0">
               <a:buNone/>
-              <a:defRPr sz="1600">
+              <a:defRPr sz="539">
                 <a:solidFill>
                   <a:schemeClr val="tx1">
                     <a:tint val="75000"/>
@@ -937,9 +937,9 @@
                 </a:solidFill>
               </a:defRPr>
             </a:lvl4pPr>
-            <a:lvl5pPr marL="1828800" indent="0">
+            <a:lvl5pPr marL="616306" indent="0">
               <a:buNone/>
-              <a:defRPr sz="1600">
+              <a:defRPr sz="539">
                 <a:solidFill>
                   <a:schemeClr val="tx1">
                     <a:tint val="75000"/>
@@ -947,9 +947,9 @@
                 </a:solidFill>
               </a:defRPr>
             </a:lvl5pPr>
-            <a:lvl6pPr marL="2286000" indent="0">
+            <a:lvl6pPr marL="770382" indent="0">
               <a:buNone/>
-              <a:defRPr sz="1600">
+              <a:defRPr sz="539">
                 <a:solidFill>
                   <a:schemeClr val="tx1">
                     <a:tint val="75000"/>
@@ -957,9 +957,9 @@
                 </a:solidFill>
               </a:defRPr>
             </a:lvl6pPr>
-            <a:lvl7pPr marL="2743200" indent="0">
+            <a:lvl7pPr marL="924458" indent="0">
               <a:buNone/>
-              <a:defRPr sz="1600">
+              <a:defRPr sz="539">
                 <a:solidFill>
                   <a:schemeClr val="tx1">
                     <a:tint val="75000"/>
@@ -967,9 +967,9 @@
                 </a:solidFill>
               </a:defRPr>
             </a:lvl7pPr>
-            <a:lvl8pPr marL="3200400" indent="0">
+            <a:lvl8pPr marL="1078535" indent="0">
               <a:buNone/>
-              <a:defRPr sz="1600">
+              <a:defRPr sz="539">
                 <a:solidFill>
                   <a:schemeClr val="tx1">
                     <a:tint val="75000"/>
@@ -977,9 +977,9 @@
                 </a:solidFill>
               </a:defRPr>
             </a:lvl8pPr>
-            <a:lvl9pPr marL="3657600" indent="0">
+            <a:lvl9pPr marL="1232611" indent="0">
               <a:buNone/>
-              <a:defRPr sz="1600">
+              <a:defRPr sz="539">
                 <a:solidFill>
                   <a:schemeClr val="tx1">
                     <a:tint val="75000"/>
@@ -1014,7 +1014,7 @@
           <a:p>
             <a:fld id="{498A6A98-93B9-470F-BB23-351240910FD2}" type="datetimeFigureOut">
               <a:rPr lang="en-US" smtClean="0"/>
-              <a:t>5/8/2021</a:t>
+              <a:t>5/10/2021</a:t>
             </a:fld>
             <a:endParaRPr lang="en-US"/>
           </a:p>
@@ -1065,7 +1065,7 @@
     </p:spTree>
     <p:extLst>
       <p:ext uri="{BB962C8B-B14F-4D97-AF65-F5344CB8AC3E}">
-        <p14:creationId xmlns:p14="http://schemas.microsoft.com/office/powerpoint/2010/main" val="3712677476"/>
+        <p14:creationId xmlns:p14="http://schemas.microsoft.com/office/powerpoint/2010/main" val="847181479"/>
       </p:ext>
     </p:extLst>
   </p:cSld>
@@ -1111,7 +1111,7 @@
               <a:rPr lang="en-US" smtClean="0"/>
               <a:t>Click to edit Master title style</a:t>
             </a:r>
-            <a:endParaRPr lang="en-US"/>
+            <a:endParaRPr lang="en-US" dirty="0"/>
           </a:p>
         </p:txBody>
       </p:sp>
@@ -1127,8 +1127,8 @@
         </p:nvSpPr>
         <p:spPr>
           <a:xfrm>
-            <a:off x="838200" y="1825625"/>
-            <a:ext cx="5181600" cy="4351338"/>
+            <a:off x="494953" y="615303"/>
+            <a:ext cx="3059708" cy="1466562"/>
           </a:xfrm>
         </p:spPr>
         <p:txBody>
@@ -1168,7 +1168,7 @@
               <a:rPr lang="en-US" smtClean="0"/>
               <a:t>Fifth level</a:t>
             </a:r>
-            <a:endParaRPr lang="en-US"/>
+            <a:endParaRPr lang="en-US" dirty="0"/>
           </a:p>
         </p:txBody>
       </p:sp>
@@ -1184,8 +1184,8 @@
         </p:nvSpPr>
         <p:spPr>
           <a:xfrm>
-            <a:off x="6172200" y="1825625"/>
-            <a:ext cx="5181600" cy="4351338"/>
+            <a:off x="3644652" y="615303"/>
+            <a:ext cx="3059708" cy="1466562"/>
           </a:xfrm>
         </p:spPr>
         <p:txBody>
@@ -1225,7 +1225,7 @@
               <a:rPr lang="en-US" smtClean="0"/>
               <a:t>Fifth level</a:t>
             </a:r>
-            <a:endParaRPr lang="en-US"/>
+            <a:endParaRPr lang="en-US" dirty="0"/>
           </a:p>
         </p:txBody>
       </p:sp>
@@ -1246,7 +1246,7 @@
           <a:p>
             <a:fld id="{498A6A98-93B9-470F-BB23-351240910FD2}" type="datetimeFigureOut">
               <a:rPr lang="en-US" smtClean="0"/>
-              <a:t>5/8/2021</a:t>
+              <a:t>5/10/2021</a:t>
             </a:fld>
             <a:endParaRPr lang="en-US"/>
           </a:p>
@@ -1297,7 +1297,7 @@
     </p:spTree>
     <p:extLst>
       <p:ext uri="{BB962C8B-B14F-4D97-AF65-F5344CB8AC3E}">
-        <p14:creationId xmlns:p14="http://schemas.microsoft.com/office/powerpoint/2010/main" val="2673309362"/>
+        <p14:creationId xmlns:p14="http://schemas.microsoft.com/office/powerpoint/2010/main" val="144413806"/>
       </p:ext>
     </p:extLst>
   </p:cSld>
@@ -1336,8 +1336,8 @@
         </p:nvSpPr>
         <p:spPr>
           <a:xfrm>
-            <a:off x="839788" y="365125"/>
-            <a:ext cx="10515600" cy="1325563"/>
+            <a:off x="495891" y="123061"/>
+            <a:ext cx="6209407" cy="446764"/>
           </a:xfrm>
         </p:spPr>
         <p:txBody>
@@ -1348,7 +1348,7 @@
               <a:rPr lang="en-US" smtClean="0"/>
               <a:t>Click to edit Master title style</a:t>
             </a:r>
-            <a:endParaRPr lang="en-US"/>
+            <a:endParaRPr lang="en-US" dirty="0"/>
           </a:p>
         </p:txBody>
       </p:sp>
@@ -1364,8 +1364,8 @@
         </p:nvSpPr>
         <p:spPr>
           <a:xfrm>
-            <a:off x="839788" y="1681163"/>
-            <a:ext cx="5157787" cy="823912"/>
+            <a:off x="495891" y="566614"/>
+            <a:ext cx="3045647" cy="277689"/>
           </a:xfrm>
         </p:spPr>
         <p:txBody>
@@ -1373,39 +1373,39 @@
           <a:lstStyle>
             <a:lvl1pPr marL="0" indent="0">
               <a:buNone/>
-              <a:defRPr sz="2400" b="1"/>
+              <a:defRPr sz="809" b="1"/>
             </a:lvl1pPr>
-            <a:lvl2pPr marL="457200" indent="0">
+            <a:lvl2pPr marL="154076" indent="0">
               <a:buNone/>
-              <a:defRPr sz="2000" b="1"/>
+              <a:defRPr sz="674" b="1"/>
             </a:lvl2pPr>
-            <a:lvl3pPr marL="914400" indent="0">
+            <a:lvl3pPr marL="308153" indent="0">
               <a:buNone/>
-              <a:defRPr sz="1800" b="1"/>
+              <a:defRPr sz="607" b="1"/>
             </a:lvl3pPr>
-            <a:lvl4pPr marL="1371600" indent="0">
+            <a:lvl4pPr marL="462229" indent="0">
               <a:buNone/>
-              <a:defRPr sz="1600" b="1"/>
+              <a:defRPr sz="539" b="1"/>
             </a:lvl4pPr>
-            <a:lvl5pPr marL="1828800" indent="0">
+            <a:lvl5pPr marL="616306" indent="0">
               <a:buNone/>
-              <a:defRPr sz="1600" b="1"/>
+              <a:defRPr sz="539" b="1"/>
             </a:lvl5pPr>
-            <a:lvl6pPr marL="2286000" indent="0">
+            <a:lvl6pPr marL="770382" indent="0">
               <a:buNone/>
-              <a:defRPr sz="1600" b="1"/>
+              <a:defRPr sz="539" b="1"/>
             </a:lvl6pPr>
-            <a:lvl7pPr marL="2743200" indent="0">
+            <a:lvl7pPr marL="924458" indent="0">
               <a:buNone/>
-              <a:defRPr sz="1600" b="1"/>
+              <a:defRPr sz="539" b="1"/>
             </a:lvl7pPr>
-            <a:lvl8pPr marL="3200400" indent="0">
+            <a:lvl8pPr marL="1078535" indent="0">
               <a:buNone/>
-              <a:defRPr sz="1600" b="1"/>
+              <a:defRPr sz="539" b="1"/>
             </a:lvl8pPr>
-            <a:lvl9pPr marL="3657600" indent="0">
+            <a:lvl9pPr marL="1232611" indent="0">
               <a:buNone/>
-              <a:defRPr sz="1600" b="1"/>
+              <a:defRPr sz="539" b="1"/>
             </a:lvl9pPr>
           </a:lstStyle>
           <a:p>
@@ -1429,8 +1429,8 @@
         </p:nvSpPr>
         <p:spPr>
           <a:xfrm>
-            <a:off x="839788" y="2505075"/>
-            <a:ext cx="5157787" cy="3684588"/>
+            <a:off x="495891" y="844303"/>
+            <a:ext cx="3045647" cy="1241843"/>
           </a:xfrm>
         </p:spPr>
         <p:txBody>
@@ -1470,7 +1470,7 @@
               <a:rPr lang="en-US" smtClean="0"/>
               <a:t>Fifth level</a:t>
             </a:r>
-            <a:endParaRPr lang="en-US"/>
+            <a:endParaRPr lang="en-US" dirty="0"/>
           </a:p>
         </p:txBody>
       </p:sp>
@@ -1486,8 +1486,8 @@
         </p:nvSpPr>
         <p:spPr>
           <a:xfrm>
-            <a:off x="6172200" y="1681163"/>
-            <a:ext cx="5183188" cy="823912"/>
+            <a:off x="3644652" y="566614"/>
+            <a:ext cx="3060646" cy="277689"/>
           </a:xfrm>
         </p:spPr>
         <p:txBody>
@@ -1495,39 +1495,39 @@
           <a:lstStyle>
             <a:lvl1pPr marL="0" indent="0">
               <a:buNone/>
-              <a:defRPr sz="2400" b="1"/>
+              <a:defRPr sz="809" b="1"/>
             </a:lvl1pPr>
-            <a:lvl2pPr marL="457200" indent="0">
+            <a:lvl2pPr marL="154076" indent="0">
               <a:buNone/>
-              <a:defRPr sz="2000" b="1"/>
+              <a:defRPr sz="674" b="1"/>
             </a:lvl2pPr>
-            <a:lvl3pPr marL="914400" indent="0">
+            <a:lvl3pPr marL="308153" indent="0">
               <a:buNone/>
-              <a:defRPr sz="1800" b="1"/>
+              <a:defRPr sz="607" b="1"/>
             </a:lvl3pPr>
-            <a:lvl4pPr marL="1371600" indent="0">
+            <a:lvl4pPr marL="462229" indent="0">
               <a:buNone/>
-              <a:defRPr sz="1600" b="1"/>
+              <a:defRPr sz="539" b="1"/>
             </a:lvl4pPr>
-            <a:lvl5pPr marL="1828800" indent="0">
+            <a:lvl5pPr marL="616306" indent="0">
               <a:buNone/>
-              <a:defRPr sz="1600" b="1"/>
+              <a:defRPr sz="539" b="1"/>
             </a:lvl5pPr>
-            <a:lvl6pPr marL="2286000" indent="0">
+            <a:lvl6pPr marL="770382" indent="0">
               <a:buNone/>
-              <a:defRPr sz="1600" b="1"/>
+              <a:defRPr sz="539" b="1"/>
             </a:lvl6pPr>
-            <a:lvl7pPr marL="2743200" indent="0">
+            <a:lvl7pPr marL="924458" indent="0">
               <a:buNone/>
-              <a:defRPr sz="1600" b="1"/>
+              <a:defRPr sz="539" b="1"/>
             </a:lvl7pPr>
-            <a:lvl8pPr marL="3200400" indent="0">
+            <a:lvl8pPr marL="1078535" indent="0">
               <a:buNone/>
-              <a:defRPr sz="1600" b="1"/>
+              <a:defRPr sz="539" b="1"/>
             </a:lvl8pPr>
-            <a:lvl9pPr marL="3657600" indent="0">
+            <a:lvl9pPr marL="1232611" indent="0">
               <a:buNone/>
-              <a:defRPr sz="1600" b="1"/>
+              <a:defRPr sz="539" b="1"/>
             </a:lvl9pPr>
           </a:lstStyle>
           <a:p>
@@ -1551,8 +1551,8 @@
         </p:nvSpPr>
         <p:spPr>
           <a:xfrm>
-            <a:off x="6172200" y="2505075"/>
-            <a:ext cx="5183188" cy="3684588"/>
+            <a:off x="3644652" y="844303"/>
+            <a:ext cx="3060646" cy="1241843"/>
           </a:xfrm>
         </p:spPr>
         <p:txBody>
@@ -1592,7 +1592,7 @@
               <a:rPr lang="en-US" smtClean="0"/>
               <a:t>Fifth level</a:t>
             </a:r>
-            <a:endParaRPr lang="en-US"/>
+            <a:endParaRPr lang="en-US" dirty="0"/>
           </a:p>
         </p:txBody>
       </p:sp>
@@ -1613,7 +1613,7 @@
           <a:p>
             <a:fld id="{498A6A98-93B9-470F-BB23-351240910FD2}" type="datetimeFigureOut">
               <a:rPr lang="en-US" smtClean="0"/>
-              <a:t>5/8/2021</a:t>
+              <a:t>5/10/2021</a:t>
             </a:fld>
             <a:endParaRPr lang="en-US"/>
           </a:p>
@@ -1664,7 +1664,7 @@
     </p:spTree>
     <p:extLst>
       <p:ext uri="{BB962C8B-B14F-4D97-AF65-F5344CB8AC3E}">
-        <p14:creationId xmlns:p14="http://schemas.microsoft.com/office/powerpoint/2010/main" val="868386051"/>
+        <p14:creationId xmlns:p14="http://schemas.microsoft.com/office/powerpoint/2010/main" val="846644521"/>
       </p:ext>
     </p:extLst>
   </p:cSld>
@@ -1710,7 +1710,7 @@
               <a:rPr lang="en-US" smtClean="0"/>
               <a:t>Click to edit Master title style</a:t>
             </a:r>
-            <a:endParaRPr lang="en-US"/>
+            <a:endParaRPr lang="en-US" dirty="0"/>
           </a:p>
         </p:txBody>
       </p:sp>
@@ -1731,7 +1731,7 @@
           <a:p>
             <a:fld id="{498A6A98-93B9-470F-BB23-351240910FD2}" type="datetimeFigureOut">
               <a:rPr lang="en-US" smtClean="0"/>
-              <a:t>5/8/2021</a:t>
+              <a:t>5/10/2021</a:t>
             </a:fld>
             <a:endParaRPr lang="en-US"/>
           </a:p>
@@ -1782,7 +1782,7 @@
     </p:spTree>
     <p:extLst>
       <p:ext uri="{BB962C8B-B14F-4D97-AF65-F5344CB8AC3E}">
-        <p14:creationId xmlns:p14="http://schemas.microsoft.com/office/powerpoint/2010/main" val="1744707972"/>
+        <p14:creationId xmlns:p14="http://schemas.microsoft.com/office/powerpoint/2010/main" val="3911115568"/>
       </p:ext>
     </p:extLst>
   </p:cSld>
@@ -1826,7 +1826,7 @@
           <a:p>
             <a:fld id="{498A6A98-93B9-470F-BB23-351240910FD2}" type="datetimeFigureOut">
               <a:rPr lang="en-US" smtClean="0"/>
-              <a:t>5/8/2021</a:t>
+              <a:t>5/10/2021</a:t>
             </a:fld>
             <a:endParaRPr lang="en-US"/>
           </a:p>
@@ -1877,7 +1877,7 @@
     </p:spTree>
     <p:extLst>
       <p:ext uri="{BB962C8B-B14F-4D97-AF65-F5344CB8AC3E}">
-        <p14:creationId xmlns:p14="http://schemas.microsoft.com/office/powerpoint/2010/main" val="2147168195"/>
+        <p14:creationId xmlns:p14="http://schemas.microsoft.com/office/powerpoint/2010/main" val="3130778679"/>
       </p:ext>
     </p:extLst>
   </p:cSld>
@@ -1916,15 +1916,15 @@
         </p:nvSpPr>
         <p:spPr>
           <a:xfrm>
-            <a:off x="839788" y="457200"/>
-            <a:ext cx="3932237" cy="1600200"/>
+            <a:off x="495891" y="154093"/>
+            <a:ext cx="2321966" cy="539327"/>
           </a:xfrm>
         </p:spPr>
         <p:txBody>
           <a:bodyPr anchor="b"/>
           <a:lstStyle>
             <a:lvl1pPr>
-              <a:defRPr sz="3200"/>
+              <a:defRPr sz="1078"/>
             </a:lvl1pPr>
           </a:lstStyle>
           <a:p>
@@ -1932,7 +1932,7 @@
               <a:rPr lang="en-US" smtClean="0"/>
               <a:t>Click to edit Master title style</a:t>
             </a:r>
-            <a:endParaRPr lang="en-US"/>
+            <a:endParaRPr lang="en-US" dirty="0"/>
           </a:p>
         </p:txBody>
       </p:sp>
@@ -1948,39 +1948,39 @@
         </p:nvSpPr>
         <p:spPr>
           <a:xfrm>
-            <a:off x="5183188" y="987425"/>
-            <a:ext cx="6172200" cy="4873625"/>
+            <a:off x="3060646" y="332799"/>
+            <a:ext cx="3644652" cy="1642592"/>
           </a:xfrm>
         </p:spPr>
         <p:txBody>
           <a:bodyPr/>
           <a:lstStyle>
             <a:lvl1pPr>
-              <a:defRPr sz="3200"/>
+              <a:defRPr sz="1078"/>
             </a:lvl1pPr>
             <a:lvl2pPr>
-              <a:defRPr sz="2800"/>
+              <a:defRPr sz="944"/>
             </a:lvl2pPr>
             <a:lvl3pPr>
-              <a:defRPr sz="2400"/>
+              <a:defRPr sz="809"/>
             </a:lvl3pPr>
             <a:lvl4pPr>
-              <a:defRPr sz="2000"/>
+              <a:defRPr sz="674"/>
             </a:lvl4pPr>
             <a:lvl5pPr>
-              <a:defRPr sz="2000"/>
+              <a:defRPr sz="674"/>
             </a:lvl5pPr>
             <a:lvl6pPr>
-              <a:defRPr sz="2000"/>
+              <a:defRPr sz="674"/>
             </a:lvl6pPr>
             <a:lvl7pPr>
-              <a:defRPr sz="2000"/>
+              <a:defRPr sz="674"/>
             </a:lvl7pPr>
             <a:lvl8pPr>
-              <a:defRPr sz="2000"/>
+              <a:defRPr sz="674"/>
             </a:lvl8pPr>
             <a:lvl9pPr>
-              <a:defRPr sz="2000"/>
+              <a:defRPr sz="674"/>
             </a:lvl9pPr>
           </a:lstStyle>
           <a:p>
@@ -2017,7 +2017,7 @@
               <a:rPr lang="en-US" smtClean="0"/>
               <a:t>Fifth level</a:t>
             </a:r>
-            <a:endParaRPr lang="en-US"/>
+            <a:endParaRPr lang="en-US" dirty="0"/>
           </a:p>
         </p:txBody>
       </p:sp>
@@ -2033,8 +2033,8 @@
         </p:nvSpPr>
         <p:spPr>
           <a:xfrm>
-            <a:off x="839788" y="2057400"/>
-            <a:ext cx="3932237" cy="3811588"/>
+            <a:off x="495891" y="693420"/>
+            <a:ext cx="2321966" cy="1284646"/>
           </a:xfrm>
         </p:spPr>
         <p:txBody>
@@ -2042,39 +2042,39 @@
           <a:lstStyle>
             <a:lvl1pPr marL="0" indent="0">
               <a:buNone/>
-              <a:defRPr sz="1600"/>
+              <a:defRPr sz="539"/>
             </a:lvl1pPr>
-            <a:lvl2pPr marL="457200" indent="0">
+            <a:lvl2pPr marL="154076" indent="0">
               <a:buNone/>
-              <a:defRPr sz="1400"/>
+              <a:defRPr sz="472"/>
             </a:lvl2pPr>
-            <a:lvl3pPr marL="914400" indent="0">
+            <a:lvl3pPr marL="308153" indent="0">
               <a:buNone/>
-              <a:defRPr sz="1200"/>
+              <a:defRPr sz="404"/>
             </a:lvl3pPr>
-            <a:lvl4pPr marL="1371600" indent="0">
+            <a:lvl4pPr marL="462229" indent="0">
               <a:buNone/>
-              <a:defRPr sz="1000"/>
+              <a:defRPr sz="337"/>
             </a:lvl4pPr>
-            <a:lvl5pPr marL="1828800" indent="0">
+            <a:lvl5pPr marL="616306" indent="0">
               <a:buNone/>
-              <a:defRPr sz="1000"/>
+              <a:defRPr sz="337"/>
             </a:lvl5pPr>
-            <a:lvl6pPr marL="2286000" indent="0">
+            <a:lvl6pPr marL="770382" indent="0">
               <a:buNone/>
-              <a:defRPr sz="1000"/>
+              <a:defRPr sz="337"/>
             </a:lvl6pPr>
-            <a:lvl7pPr marL="2743200" indent="0">
+            <a:lvl7pPr marL="924458" indent="0">
               <a:buNone/>
-              <a:defRPr sz="1000"/>
+              <a:defRPr sz="337"/>
             </a:lvl7pPr>
-            <a:lvl8pPr marL="3200400" indent="0">
+            <a:lvl8pPr marL="1078535" indent="0">
               <a:buNone/>
-              <a:defRPr sz="1000"/>
+              <a:defRPr sz="337"/>
             </a:lvl8pPr>
-            <a:lvl9pPr marL="3657600" indent="0">
+            <a:lvl9pPr marL="1232611" indent="0">
               <a:buNone/>
-              <a:defRPr sz="1000"/>
+              <a:defRPr sz="337"/>
             </a:lvl9pPr>
           </a:lstStyle>
           <a:p>
@@ -2103,7 +2103,7 @@
           <a:p>
             <a:fld id="{498A6A98-93B9-470F-BB23-351240910FD2}" type="datetimeFigureOut">
               <a:rPr lang="en-US" smtClean="0"/>
-              <a:t>5/8/2021</a:t>
+              <a:t>5/10/2021</a:t>
             </a:fld>
             <a:endParaRPr lang="en-US"/>
           </a:p>
@@ -2154,7 +2154,7 @@
     </p:spTree>
     <p:extLst>
       <p:ext uri="{BB962C8B-B14F-4D97-AF65-F5344CB8AC3E}">
-        <p14:creationId xmlns:p14="http://schemas.microsoft.com/office/powerpoint/2010/main" val="2821000694"/>
+        <p14:creationId xmlns:p14="http://schemas.microsoft.com/office/powerpoint/2010/main" val="1604291316"/>
       </p:ext>
     </p:extLst>
   </p:cSld>
@@ -2193,15 +2193,15 @@
         </p:nvSpPr>
         <p:spPr>
           <a:xfrm>
-            <a:off x="839788" y="457200"/>
-            <a:ext cx="3932237" cy="1600200"/>
+            <a:off x="495891" y="154093"/>
+            <a:ext cx="2321966" cy="539327"/>
           </a:xfrm>
         </p:spPr>
         <p:txBody>
           <a:bodyPr anchor="b"/>
           <a:lstStyle>
             <a:lvl1pPr>
-              <a:defRPr sz="3200"/>
+              <a:defRPr sz="1078"/>
             </a:lvl1pPr>
           </a:lstStyle>
           <a:p>
@@ -2209,7 +2209,7 @@
               <a:rPr lang="en-US" smtClean="0"/>
               <a:t>Click to edit Master title style</a:t>
             </a:r>
-            <a:endParaRPr lang="en-US"/>
+            <a:endParaRPr lang="en-US" dirty="0"/>
           </a:p>
         </p:txBody>
       </p:sp>
@@ -2217,7 +2217,7 @@
         <p:nvSpPr>
           <p:cNvPr id="3" name="Picture Placeholder 2"/>
           <p:cNvSpPr>
-            <a:spLocks noGrp="1"/>
+            <a:spLocks noGrp="1" noChangeAspect="1"/>
           </p:cNvSpPr>
           <p:nvPr>
             <p:ph type="pic" idx="1"/>
@@ -2225,52 +2225,56 @@
         </p:nvSpPr>
         <p:spPr>
           <a:xfrm>
-            <a:off x="5183188" y="987425"/>
-            <a:ext cx="6172200" cy="4873625"/>
+            <a:off x="3060646" y="332799"/>
+            <a:ext cx="3644652" cy="1642592"/>
           </a:xfrm>
         </p:spPr>
         <p:txBody>
-          <a:bodyPr/>
+          <a:bodyPr anchor="t"/>
           <a:lstStyle>
             <a:lvl1pPr marL="0" indent="0">
               <a:buNone/>
-              <a:defRPr sz="3200"/>
+              <a:defRPr sz="1078"/>
             </a:lvl1pPr>
-            <a:lvl2pPr marL="457200" indent="0">
+            <a:lvl2pPr marL="154076" indent="0">
               <a:buNone/>
-              <a:defRPr sz="2800"/>
+              <a:defRPr sz="944"/>
             </a:lvl2pPr>
-            <a:lvl3pPr marL="914400" indent="0">
+            <a:lvl3pPr marL="308153" indent="0">
               <a:buNone/>
-              <a:defRPr sz="2400"/>
+              <a:defRPr sz="809"/>
             </a:lvl3pPr>
-            <a:lvl4pPr marL="1371600" indent="0">
+            <a:lvl4pPr marL="462229" indent="0">
               <a:buNone/>
-              <a:defRPr sz="2000"/>
+              <a:defRPr sz="674"/>
             </a:lvl4pPr>
-            <a:lvl5pPr marL="1828800" indent="0">
+            <a:lvl5pPr marL="616306" indent="0">
               <a:buNone/>
-              <a:defRPr sz="2000"/>
+              <a:defRPr sz="674"/>
             </a:lvl5pPr>
-            <a:lvl6pPr marL="2286000" indent="0">
+            <a:lvl6pPr marL="770382" indent="0">
               <a:buNone/>
-              <a:defRPr sz="2000"/>
+              <a:defRPr sz="674"/>
             </a:lvl6pPr>
-            <a:lvl7pPr marL="2743200" indent="0">
+            <a:lvl7pPr marL="924458" indent="0">
               <a:buNone/>
-              <a:defRPr sz="2000"/>
+              <a:defRPr sz="674"/>
             </a:lvl7pPr>
-            <a:lvl8pPr marL="3200400" indent="0">
+            <a:lvl8pPr marL="1078535" indent="0">
               <a:buNone/>
-              <a:defRPr sz="2000"/>
+              <a:defRPr sz="674"/>
             </a:lvl8pPr>
-            <a:lvl9pPr marL="3657600" indent="0">
+            <a:lvl9pPr marL="1232611" indent="0">
               <a:buNone/>
-              <a:defRPr sz="2000"/>
+              <a:defRPr sz="674"/>
             </a:lvl9pPr>
           </a:lstStyle>
           <a:p>
-            <a:endParaRPr lang="en-US"/>
+            <a:r>
+              <a:rPr lang="en-US" smtClean="0"/>
+              <a:t>Click icon to add picture</a:t>
+            </a:r>
+            <a:endParaRPr lang="en-US" dirty="0"/>
           </a:p>
         </p:txBody>
       </p:sp>
@@ -2286,8 +2290,8 @@
         </p:nvSpPr>
         <p:spPr>
           <a:xfrm>
-            <a:off x="839788" y="2057400"/>
-            <a:ext cx="3932237" cy="3811588"/>
+            <a:off x="495891" y="693420"/>
+            <a:ext cx="2321966" cy="1284646"/>
           </a:xfrm>
         </p:spPr>
         <p:txBody>
@@ -2295,39 +2299,39 @@
           <a:lstStyle>
             <a:lvl1pPr marL="0" indent="0">
               <a:buNone/>
-              <a:defRPr sz="1600"/>
+              <a:defRPr sz="539"/>
             </a:lvl1pPr>
-            <a:lvl2pPr marL="457200" indent="0">
+            <a:lvl2pPr marL="154076" indent="0">
               <a:buNone/>
-              <a:defRPr sz="1400"/>
+              <a:defRPr sz="472"/>
             </a:lvl2pPr>
-            <a:lvl3pPr marL="914400" indent="0">
+            <a:lvl3pPr marL="308153" indent="0">
               <a:buNone/>
-              <a:defRPr sz="1200"/>
+              <a:defRPr sz="404"/>
             </a:lvl3pPr>
-            <a:lvl4pPr marL="1371600" indent="0">
+            <a:lvl4pPr marL="462229" indent="0">
               <a:buNone/>
-              <a:defRPr sz="1000"/>
+              <a:defRPr sz="337"/>
             </a:lvl4pPr>
-            <a:lvl5pPr marL="1828800" indent="0">
+            <a:lvl5pPr marL="616306" indent="0">
               <a:buNone/>
-              <a:defRPr sz="1000"/>
+              <a:defRPr sz="337"/>
             </a:lvl5pPr>
-            <a:lvl6pPr marL="2286000" indent="0">
+            <a:lvl6pPr marL="770382" indent="0">
               <a:buNone/>
-              <a:defRPr sz="1000"/>
+              <a:defRPr sz="337"/>
             </a:lvl6pPr>
-            <a:lvl7pPr marL="2743200" indent="0">
+            <a:lvl7pPr marL="924458" indent="0">
               <a:buNone/>
-              <a:defRPr sz="1000"/>
+              <a:defRPr sz="337"/>
             </a:lvl7pPr>
-            <a:lvl8pPr marL="3200400" indent="0">
+            <a:lvl8pPr marL="1078535" indent="0">
               <a:buNone/>
-              <a:defRPr sz="1000"/>
+              <a:defRPr sz="337"/>
             </a:lvl8pPr>
-            <a:lvl9pPr marL="3657600" indent="0">
+            <a:lvl9pPr marL="1232611" indent="0">
               <a:buNone/>
-              <a:defRPr sz="1000"/>
+              <a:defRPr sz="337"/>
             </a:lvl9pPr>
           </a:lstStyle>
           <a:p>
@@ -2356,7 +2360,7 @@
           <a:p>
             <a:fld id="{498A6A98-93B9-470F-BB23-351240910FD2}" type="datetimeFigureOut">
               <a:rPr lang="en-US" smtClean="0"/>
-              <a:t>5/8/2021</a:t>
+              <a:t>5/10/2021</a:t>
             </a:fld>
             <a:endParaRPr lang="en-US"/>
           </a:p>
@@ -2407,7 +2411,7 @@
     </p:spTree>
     <p:extLst>
       <p:ext uri="{BB962C8B-B14F-4D97-AF65-F5344CB8AC3E}">
-        <p14:creationId xmlns:p14="http://schemas.microsoft.com/office/powerpoint/2010/main" val="130636864"/>
+        <p14:creationId xmlns:p14="http://schemas.microsoft.com/office/powerpoint/2010/main" val="1981455393"/>
       </p:ext>
     </p:extLst>
   </p:cSld>
@@ -2451,8 +2455,8 @@
         </p:nvSpPr>
         <p:spPr>
           <a:xfrm>
-            <a:off x="838200" y="365125"/>
-            <a:ext cx="10515600" cy="1325563"/>
+            <a:off x="494953" y="123061"/>
+            <a:ext cx="6209407" cy="446764"/>
           </a:xfrm>
           <a:prstGeom prst="rect">
             <a:avLst/>
@@ -2468,7 +2472,7 @@
               <a:rPr lang="en-US" smtClean="0"/>
               <a:t>Click to edit Master title style</a:t>
             </a:r>
-            <a:endParaRPr lang="en-US"/>
+            <a:endParaRPr lang="en-US" dirty="0"/>
           </a:p>
         </p:txBody>
       </p:sp>
@@ -2484,8 +2488,8 @@
         </p:nvSpPr>
         <p:spPr>
           <a:xfrm>
-            <a:off x="838200" y="1825625"/>
-            <a:ext cx="10515600" cy="4351338"/>
+            <a:off x="494953" y="615303"/>
+            <a:ext cx="6209407" cy="1466562"/>
           </a:xfrm>
           <a:prstGeom prst="rect">
             <a:avLst/>
@@ -2530,7 +2534,7 @@
               <a:rPr lang="en-US" smtClean="0"/>
               <a:t>Fifth level</a:t>
             </a:r>
-            <a:endParaRPr lang="en-US"/>
+            <a:endParaRPr lang="en-US" dirty="0"/>
           </a:p>
         </p:txBody>
       </p:sp>
@@ -2546,8 +2550,8 @@
         </p:nvSpPr>
         <p:spPr>
           <a:xfrm>
-            <a:off x="838200" y="6356350"/>
-            <a:ext cx="2743200" cy="365125"/>
+            <a:off x="494953" y="2142325"/>
+            <a:ext cx="1619845" cy="123061"/>
           </a:xfrm>
           <a:prstGeom prst="rect">
             <a:avLst/>
@@ -2557,7 +2561,7 @@
           <a:bodyPr vert="horz" lIns="91440" tIns="45720" rIns="91440" bIns="45720" rtlCol="0" anchor="ctr"/>
           <a:lstStyle>
             <a:lvl1pPr algn="l">
-              <a:defRPr sz="1200">
+              <a:defRPr sz="404">
                 <a:solidFill>
                   <a:schemeClr val="tx1">
                     <a:tint val="75000"/>
@@ -2569,7 +2573,7 @@
           <a:p>
             <a:fld id="{498A6A98-93B9-470F-BB23-351240910FD2}" type="datetimeFigureOut">
               <a:rPr lang="en-US" smtClean="0"/>
-              <a:t>5/8/2021</a:t>
+              <a:t>5/10/2021</a:t>
             </a:fld>
             <a:endParaRPr lang="en-US"/>
           </a:p>
@@ -2587,8 +2591,8 @@
         </p:nvSpPr>
         <p:spPr>
           <a:xfrm>
-            <a:off x="4038600" y="6356350"/>
-            <a:ext cx="4114800" cy="365125"/>
+            <a:off x="2384773" y="2142325"/>
+            <a:ext cx="2429768" cy="123061"/>
           </a:xfrm>
           <a:prstGeom prst="rect">
             <a:avLst/>
@@ -2598,7 +2602,7 @@
           <a:bodyPr vert="horz" lIns="91440" tIns="45720" rIns="91440" bIns="45720" rtlCol="0" anchor="ctr"/>
           <a:lstStyle>
             <a:lvl1pPr algn="ctr">
-              <a:defRPr sz="1200">
+              <a:defRPr sz="404">
                 <a:solidFill>
                   <a:schemeClr val="tx1">
                     <a:tint val="75000"/>
@@ -2624,8 +2628,8 @@
         </p:nvSpPr>
         <p:spPr>
           <a:xfrm>
-            <a:off x="8610600" y="6356350"/>
-            <a:ext cx="2743200" cy="365125"/>
+            <a:off x="5084515" y="2142325"/>
+            <a:ext cx="1619845" cy="123061"/>
           </a:xfrm>
           <a:prstGeom prst="rect">
             <a:avLst/>
@@ -2635,7 +2639,7 @@
           <a:bodyPr vert="horz" lIns="91440" tIns="45720" rIns="91440" bIns="45720" rtlCol="0" anchor="ctr"/>
           <a:lstStyle>
             <a:lvl1pPr algn="r">
-              <a:defRPr sz="1200">
+              <a:defRPr sz="404">
                 <a:solidFill>
                   <a:schemeClr val="tx1">
                     <a:tint val="75000"/>
@@ -2656,27 +2660,27 @@
     </p:spTree>
     <p:extLst>
       <p:ext uri="{BB962C8B-B14F-4D97-AF65-F5344CB8AC3E}">
-        <p14:creationId xmlns:p14="http://schemas.microsoft.com/office/powerpoint/2010/main" val="1192696379"/>
+        <p14:creationId xmlns:p14="http://schemas.microsoft.com/office/powerpoint/2010/main" val="2649310242"/>
       </p:ext>
     </p:extLst>
   </p:cSld>
   <p:clrMap bg1="lt1" tx1="dk1" bg2="lt2" tx2="dk2" accent1="accent1" accent2="accent2" accent3="accent3" accent4="accent4" accent5="accent5" accent6="accent6" hlink="hlink" folHlink="folHlink"/>
   <p:sldLayoutIdLst>
-    <p:sldLayoutId id="2147483649" r:id="rId1"/>
-    <p:sldLayoutId id="2147483650" r:id="rId2"/>
-    <p:sldLayoutId id="2147483651" r:id="rId3"/>
-    <p:sldLayoutId id="2147483652" r:id="rId4"/>
-    <p:sldLayoutId id="2147483653" r:id="rId5"/>
-    <p:sldLayoutId id="2147483654" r:id="rId6"/>
-    <p:sldLayoutId id="2147483655" r:id="rId7"/>
-    <p:sldLayoutId id="2147483656" r:id="rId8"/>
-    <p:sldLayoutId id="2147483657" r:id="rId9"/>
-    <p:sldLayoutId id="2147483658" r:id="rId10"/>
-    <p:sldLayoutId id="2147483659" r:id="rId11"/>
+    <p:sldLayoutId id="2147483685" r:id="rId1"/>
+    <p:sldLayoutId id="2147483686" r:id="rId2"/>
+    <p:sldLayoutId id="2147483687" r:id="rId3"/>
+    <p:sldLayoutId id="2147483688" r:id="rId4"/>
+    <p:sldLayoutId id="2147483689" r:id="rId5"/>
+    <p:sldLayoutId id="2147483690" r:id="rId6"/>
+    <p:sldLayoutId id="2147483691" r:id="rId7"/>
+    <p:sldLayoutId id="2147483692" r:id="rId8"/>
+    <p:sldLayoutId id="2147483693" r:id="rId9"/>
+    <p:sldLayoutId id="2147483694" r:id="rId10"/>
+    <p:sldLayoutId id="2147483695" r:id="rId11"/>
   </p:sldLayoutIdLst>
   <p:txStyles>
     <p:titleStyle>
-      <a:lvl1pPr algn="l" defTabSz="914400" rtl="0" eaLnBrk="1" latinLnBrk="0" hangingPunct="1">
+      <a:lvl1pPr algn="l" defTabSz="308153" rtl="0" eaLnBrk="1" latinLnBrk="0" hangingPunct="1">
         <a:lnSpc>
           <a:spcPct val="90000"/>
         </a:lnSpc>
@@ -2684,7 +2688,7 @@
           <a:spcPct val="0"/>
         </a:spcBef>
         <a:buNone/>
-        <a:defRPr sz="4400" kern="1200">
+        <a:defRPr sz="1483" kern="1200">
           <a:solidFill>
             <a:schemeClr val="tx1"/>
           </a:solidFill>
@@ -2695,16 +2699,16 @@
       </a:lvl1pPr>
     </p:titleStyle>
     <p:bodyStyle>
-      <a:lvl1pPr marL="228600" indent="-228600" algn="l" defTabSz="914400" rtl="0" eaLnBrk="1" latinLnBrk="0" hangingPunct="1">
+      <a:lvl1pPr marL="77038" indent="-77038" algn="l" defTabSz="308153" rtl="0" eaLnBrk="1" latinLnBrk="0" hangingPunct="1">
         <a:lnSpc>
           <a:spcPct val="90000"/>
         </a:lnSpc>
         <a:spcBef>
-          <a:spcPts val="1000"/>
+          <a:spcPts val="337"/>
         </a:spcBef>
         <a:buFont typeface="Arial" panose="020B0604020202020204" pitchFamily="34" charset="0"/>
         <a:buChar char="•"/>
-        <a:defRPr sz="2800" kern="1200">
+        <a:defRPr sz="944" kern="1200">
           <a:solidFill>
             <a:schemeClr val="tx1"/>
           </a:solidFill>
@@ -2713,16 +2717,16 @@
           <a:cs typeface="+mn-cs"/>
         </a:defRPr>
       </a:lvl1pPr>
-      <a:lvl2pPr marL="685800" indent="-228600" algn="l" defTabSz="914400" rtl="0" eaLnBrk="1" latinLnBrk="0" hangingPunct="1">
+      <a:lvl2pPr marL="231115" indent="-77038" algn="l" defTabSz="308153" rtl="0" eaLnBrk="1" latinLnBrk="0" hangingPunct="1">
         <a:lnSpc>
           <a:spcPct val="90000"/>
         </a:lnSpc>
         <a:spcBef>
-          <a:spcPts val="500"/>
+          <a:spcPts val="169"/>
         </a:spcBef>
         <a:buFont typeface="Arial" panose="020B0604020202020204" pitchFamily="34" charset="0"/>
         <a:buChar char="•"/>
-        <a:defRPr sz="2400" kern="1200">
+        <a:defRPr sz="809" kern="1200">
           <a:solidFill>
             <a:schemeClr val="tx1"/>
           </a:solidFill>
@@ -2731,16 +2735,16 @@
           <a:cs typeface="+mn-cs"/>
         </a:defRPr>
       </a:lvl2pPr>
-      <a:lvl3pPr marL="1143000" indent="-228600" algn="l" defTabSz="914400" rtl="0" eaLnBrk="1" latinLnBrk="0" hangingPunct="1">
+      <a:lvl3pPr marL="385191" indent="-77038" algn="l" defTabSz="308153" rtl="0" eaLnBrk="1" latinLnBrk="0" hangingPunct="1">
         <a:lnSpc>
           <a:spcPct val="90000"/>
         </a:lnSpc>
         <a:spcBef>
-          <a:spcPts val="500"/>
+          <a:spcPts val="169"/>
         </a:spcBef>
         <a:buFont typeface="Arial" panose="020B0604020202020204" pitchFamily="34" charset="0"/>
         <a:buChar char="•"/>
-        <a:defRPr sz="2000" kern="1200">
+        <a:defRPr sz="674" kern="1200">
           <a:solidFill>
             <a:schemeClr val="tx1"/>
           </a:solidFill>
@@ -2749,16 +2753,16 @@
           <a:cs typeface="+mn-cs"/>
         </a:defRPr>
       </a:lvl3pPr>
-      <a:lvl4pPr marL="1600200" indent="-228600" algn="l" defTabSz="914400" rtl="0" eaLnBrk="1" latinLnBrk="0" hangingPunct="1">
+      <a:lvl4pPr marL="539267" indent="-77038" algn="l" defTabSz="308153" rtl="0" eaLnBrk="1" latinLnBrk="0" hangingPunct="1">
         <a:lnSpc>
           <a:spcPct val="90000"/>
         </a:lnSpc>
         <a:spcBef>
-          <a:spcPts val="500"/>
+          <a:spcPts val="169"/>
         </a:spcBef>
         <a:buFont typeface="Arial" panose="020B0604020202020204" pitchFamily="34" charset="0"/>
         <a:buChar char="•"/>
-        <a:defRPr sz="1800" kern="1200">
+        <a:defRPr sz="607" kern="1200">
           <a:solidFill>
             <a:schemeClr val="tx1"/>
           </a:solidFill>
@@ -2767,16 +2771,16 @@
           <a:cs typeface="+mn-cs"/>
         </a:defRPr>
       </a:lvl4pPr>
-      <a:lvl5pPr marL="2057400" indent="-228600" algn="l" defTabSz="914400" rtl="0" eaLnBrk="1" latinLnBrk="0" hangingPunct="1">
+      <a:lvl5pPr marL="693344" indent="-77038" algn="l" defTabSz="308153" rtl="0" eaLnBrk="1" latinLnBrk="0" hangingPunct="1">
         <a:lnSpc>
           <a:spcPct val="90000"/>
         </a:lnSpc>
         <a:spcBef>
-          <a:spcPts val="500"/>
+          <a:spcPts val="169"/>
         </a:spcBef>
         <a:buFont typeface="Arial" panose="020B0604020202020204" pitchFamily="34" charset="0"/>
         <a:buChar char="•"/>
-        <a:defRPr sz="1800" kern="1200">
+        <a:defRPr sz="607" kern="1200">
           <a:solidFill>
             <a:schemeClr val="tx1"/>
           </a:solidFill>
@@ -2785,16 +2789,16 @@
           <a:cs typeface="+mn-cs"/>
         </a:defRPr>
       </a:lvl5pPr>
-      <a:lvl6pPr marL="2514600" indent="-228600" algn="l" defTabSz="914400" rtl="0" eaLnBrk="1" latinLnBrk="0" hangingPunct="1">
+      <a:lvl6pPr marL="847420" indent="-77038" algn="l" defTabSz="308153" rtl="0" eaLnBrk="1" latinLnBrk="0" hangingPunct="1">
         <a:lnSpc>
           <a:spcPct val="90000"/>
         </a:lnSpc>
         <a:spcBef>
-          <a:spcPts val="500"/>
+          <a:spcPts val="169"/>
         </a:spcBef>
         <a:buFont typeface="Arial" panose="020B0604020202020204" pitchFamily="34" charset="0"/>
         <a:buChar char="•"/>
-        <a:defRPr sz="1800" kern="1200">
+        <a:defRPr sz="607" kern="1200">
           <a:solidFill>
             <a:schemeClr val="tx1"/>
           </a:solidFill>
@@ -2803,16 +2807,16 @@
           <a:cs typeface="+mn-cs"/>
         </a:defRPr>
       </a:lvl6pPr>
-      <a:lvl7pPr marL="2971800" indent="-228600" algn="l" defTabSz="914400" rtl="0" eaLnBrk="1" latinLnBrk="0" hangingPunct="1">
+      <a:lvl7pPr marL="1001497" indent="-77038" algn="l" defTabSz="308153" rtl="0" eaLnBrk="1" latinLnBrk="0" hangingPunct="1">
         <a:lnSpc>
           <a:spcPct val="90000"/>
         </a:lnSpc>
         <a:spcBef>
-          <a:spcPts val="500"/>
+          <a:spcPts val="169"/>
         </a:spcBef>
         <a:buFont typeface="Arial" panose="020B0604020202020204" pitchFamily="34" charset="0"/>
         <a:buChar char="•"/>
-        <a:defRPr sz="1800" kern="1200">
+        <a:defRPr sz="607" kern="1200">
           <a:solidFill>
             <a:schemeClr val="tx1"/>
           </a:solidFill>
@@ -2821,16 +2825,16 @@
           <a:cs typeface="+mn-cs"/>
         </a:defRPr>
       </a:lvl7pPr>
-      <a:lvl8pPr marL="3429000" indent="-228600" algn="l" defTabSz="914400" rtl="0" eaLnBrk="1" latinLnBrk="0" hangingPunct="1">
+      <a:lvl8pPr marL="1155573" indent="-77038" algn="l" defTabSz="308153" rtl="0" eaLnBrk="1" latinLnBrk="0" hangingPunct="1">
         <a:lnSpc>
           <a:spcPct val="90000"/>
         </a:lnSpc>
         <a:spcBef>
-          <a:spcPts val="500"/>
+          <a:spcPts val="169"/>
         </a:spcBef>
         <a:buFont typeface="Arial" panose="020B0604020202020204" pitchFamily="34" charset="0"/>
         <a:buChar char="•"/>
-        <a:defRPr sz="1800" kern="1200">
+        <a:defRPr sz="607" kern="1200">
           <a:solidFill>
             <a:schemeClr val="tx1"/>
           </a:solidFill>
@@ -2839,16 +2843,16 @@
           <a:cs typeface="+mn-cs"/>
         </a:defRPr>
       </a:lvl8pPr>
-      <a:lvl9pPr marL="3886200" indent="-228600" algn="l" defTabSz="914400" rtl="0" eaLnBrk="1" latinLnBrk="0" hangingPunct="1">
+      <a:lvl9pPr marL="1309649" indent="-77038" algn="l" defTabSz="308153" rtl="0" eaLnBrk="1" latinLnBrk="0" hangingPunct="1">
         <a:lnSpc>
           <a:spcPct val="90000"/>
         </a:lnSpc>
         <a:spcBef>
-          <a:spcPts val="500"/>
+          <a:spcPts val="169"/>
         </a:spcBef>
         <a:buFont typeface="Arial" panose="020B0604020202020204" pitchFamily="34" charset="0"/>
         <a:buChar char="•"/>
-        <a:defRPr sz="1800" kern="1200">
+        <a:defRPr sz="607" kern="1200">
           <a:solidFill>
             <a:schemeClr val="tx1"/>
           </a:solidFill>
@@ -2862,8 +2866,8 @@
       <a:defPPr>
         <a:defRPr lang="en-US"/>
       </a:defPPr>
-      <a:lvl1pPr marL="0" algn="l" defTabSz="914400" rtl="0" eaLnBrk="1" latinLnBrk="0" hangingPunct="1">
-        <a:defRPr sz="1800" kern="1200">
+      <a:lvl1pPr marL="0" algn="l" defTabSz="308153" rtl="0" eaLnBrk="1" latinLnBrk="0" hangingPunct="1">
+        <a:defRPr sz="607" kern="1200">
           <a:solidFill>
             <a:schemeClr val="tx1"/>
           </a:solidFill>
@@ -2872,8 +2876,8 @@
           <a:cs typeface="+mn-cs"/>
         </a:defRPr>
       </a:lvl1pPr>
-      <a:lvl2pPr marL="457200" algn="l" defTabSz="914400" rtl="0" eaLnBrk="1" latinLnBrk="0" hangingPunct="1">
-        <a:defRPr sz="1800" kern="1200">
+      <a:lvl2pPr marL="154076" algn="l" defTabSz="308153" rtl="0" eaLnBrk="1" latinLnBrk="0" hangingPunct="1">
+        <a:defRPr sz="607" kern="1200">
           <a:solidFill>
             <a:schemeClr val="tx1"/>
           </a:solidFill>
@@ -2882,8 +2886,8 @@
           <a:cs typeface="+mn-cs"/>
         </a:defRPr>
       </a:lvl2pPr>
-      <a:lvl3pPr marL="914400" algn="l" defTabSz="914400" rtl="0" eaLnBrk="1" latinLnBrk="0" hangingPunct="1">
-        <a:defRPr sz="1800" kern="1200">
+      <a:lvl3pPr marL="308153" algn="l" defTabSz="308153" rtl="0" eaLnBrk="1" latinLnBrk="0" hangingPunct="1">
+        <a:defRPr sz="607" kern="1200">
           <a:solidFill>
             <a:schemeClr val="tx1"/>
           </a:solidFill>
@@ -2892,8 +2896,8 @@
           <a:cs typeface="+mn-cs"/>
         </a:defRPr>
       </a:lvl3pPr>
-      <a:lvl4pPr marL="1371600" algn="l" defTabSz="914400" rtl="0" eaLnBrk="1" latinLnBrk="0" hangingPunct="1">
-        <a:defRPr sz="1800" kern="1200">
+      <a:lvl4pPr marL="462229" algn="l" defTabSz="308153" rtl="0" eaLnBrk="1" latinLnBrk="0" hangingPunct="1">
+        <a:defRPr sz="607" kern="1200">
           <a:solidFill>
             <a:schemeClr val="tx1"/>
           </a:solidFill>
@@ -2902,8 +2906,8 @@
           <a:cs typeface="+mn-cs"/>
         </a:defRPr>
       </a:lvl4pPr>
-      <a:lvl5pPr marL="1828800" algn="l" defTabSz="914400" rtl="0" eaLnBrk="1" latinLnBrk="0" hangingPunct="1">
-        <a:defRPr sz="1800" kern="1200">
+      <a:lvl5pPr marL="616306" algn="l" defTabSz="308153" rtl="0" eaLnBrk="1" latinLnBrk="0" hangingPunct="1">
+        <a:defRPr sz="607" kern="1200">
           <a:solidFill>
             <a:schemeClr val="tx1"/>
           </a:solidFill>
@@ -2912,8 +2916,8 @@
           <a:cs typeface="+mn-cs"/>
         </a:defRPr>
       </a:lvl5pPr>
-      <a:lvl6pPr marL="2286000" algn="l" defTabSz="914400" rtl="0" eaLnBrk="1" latinLnBrk="0" hangingPunct="1">
-        <a:defRPr sz="1800" kern="1200">
+      <a:lvl6pPr marL="770382" algn="l" defTabSz="308153" rtl="0" eaLnBrk="1" latinLnBrk="0" hangingPunct="1">
+        <a:defRPr sz="607" kern="1200">
           <a:solidFill>
             <a:schemeClr val="tx1"/>
           </a:solidFill>
@@ -2922,8 +2926,8 @@
           <a:cs typeface="+mn-cs"/>
         </a:defRPr>
       </a:lvl6pPr>
-      <a:lvl7pPr marL="2743200" algn="l" defTabSz="914400" rtl="0" eaLnBrk="1" latinLnBrk="0" hangingPunct="1">
-        <a:defRPr sz="1800" kern="1200">
+      <a:lvl7pPr marL="924458" algn="l" defTabSz="308153" rtl="0" eaLnBrk="1" latinLnBrk="0" hangingPunct="1">
+        <a:defRPr sz="607" kern="1200">
           <a:solidFill>
             <a:schemeClr val="tx1"/>
           </a:solidFill>
@@ -2932,8 +2936,8 @@
           <a:cs typeface="+mn-cs"/>
         </a:defRPr>
       </a:lvl7pPr>
-      <a:lvl8pPr marL="3200400" algn="l" defTabSz="914400" rtl="0" eaLnBrk="1" latinLnBrk="0" hangingPunct="1">
-        <a:defRPr sz="1800" kern="1200">
+      <a:lvl8pPr marL="1078535" algn="l" defTabSz="308153" rtl="0" eaLnBrk="1" latinLnBrk="0" hangingPunct="1">
+        <a:defRPr sz="607" kern="1200">
           <a:solidFill>
             <a:schemeClr val="tx1"/>
           </a:solidFill>
@@ -2942,8 +2946,8 @@
           <a:cs typeface="+mn-cs"/>
         </a:defRPr>
       </a:lvl8pPr>
-      <a:lvl9pPr marL="3657600" algn="l" defTabSz="914400" rtl="0" eaLnBrk="1" latinLnBrk="0" hangingPunct="1">
-        <a:defRPr sz="1800" kern="1200">
+      <a:lvl9pPr marL="1232611" algn="l" defTabSz="308153" rtl="0" eaLnBrk="1" latinLnBrk="0" hangingPunct="1">
+        <a:defRPr sz="607" kern="1200">
           <a:solidFill>
             <a:schemeClr val="tx1"/>
           </a:solidFill>
@@ -2982,10 +2986,10 @@
         </p:nvGrpSpPr>
         <p:grpSpPr>
           <a:xfrm>
-            <a:off x="264939" y="1101767"/>
-            <a:ext cx="11673822" cy="5653464"/>
+            <a:off x="-182335" y="-582349"/>
+            <a:ext cx="7458710" cy="3645495"/>
             <a:chOff x="264939" y="1101767"/>
-            <a:chExt cx="11673822" cy="5653464"/>
+            <a:chExt cx="11673822" cy="5705659"/>
           </a:xfrm>
         </p:grpSpPr>
         <p:grpSp>
@@ -2997,9 +3001,9 @@
           <p:grpSpPr>
             <a:xfrm>
               <a:off x="3576684" y="3822402"/>
-              <a:ext cx="7352519" cy="2932829"/>
+              <a:ext cx="7528893" cy="2985024"/>
               <a:chOff x="345318" y="2363519"/>
-              <a:chExt cx="4340573" cy="2808733"/>
+              <a:chExt cx="4444696" cy="2858720"/>
             </a:xfrm>
           </p:grpSpPr>
           <p:sp>
@@ -3011,7 +3015,7 @@
             <p:spPr>
               <a:xfrm>
                 <a:off x="1135238" y="2363519"/>
-                <a:ext cx="1700883" cy="442131"/>
+                <a:ext cx="1700883" cy="491986"/>
               </a:xfrm>
               <a:prstGeom prst="rect">
                 <a:avLst/>
@@ -3025,10 +3029,10 @@
               <a:lstStyle/>
               <a:p>
                 <a:r>
-                  <a:rPr lang="en-US" sz="2400" b="1" dirty="0" smtClean="0"/>
+                  <a:rPr lang="en-US" sz="1533" b="1" dirty="0"/>
                   <a:t>Underwater: Bubble</a:t>
                 </a:r>
-                <a:endParaRPr lang="en-US" sz="2400" b="1" dirty="0"/>
+                <a:endParaRPr lang="en-US" sz="1533" b="1" dirty="0"/>
               </a:p>
             </p:txBody>
           </p:sp>
@@ -3041,9 +3045,9 @@
             <p:grpSpPr>
               <a:xfrm>
                 <a:off x="345318" y="2821292"/>
-                <a:ext cx="4340573" cy="2350960"/>
+                <a:ext cx="4444696" cy="2400947"/>
                 <a:chOff x="472292" y="3047518"/>
-                <a:chExt cx="5787429" cy="3134612"/>
+                <a:chExt cx="5926260" cy="3201261"/>
               </a:xfrm>
             </p:grpSpPr>
             <p:grpSp>
@@ -3055,9 +3059,9 @@
               <p:grpSpPr>
                 <a:xfrm>
                   <a:off x="479102" y="3047518"/>
-                  <a:ext cx="5780619" cy="3134612"/>
+                  <a:ext cx="5919450" cy="3201261"/>
                   <a:chOff x="3635828" y="2492828"/>
-                  <a:chExt cx="5780619" cy="3134612"/>
+                  <a:chExt cx="5919450" cy="3201261"/>
                 </a:xfrm>
               </p:grpSpPr>
               <p:sp>
@@ -3099,7 +3103,7 @@
                   <a:lstStyle/>
                   <a:p>
                     <a:pPr algn="ctr"/>
-                    <a:endParaRPr lang="en-US" sz="1600"/>
+                    <a:endParaRPr lang="en-US" sz="1022"/>
                   </a:p>
                 </p:txBody>
               </p:sp>
@@ -3145,7 +3149,7 @@
                   <a:lstStyle/>
                   <a:p>
                     <a:pPr algn="ctr"/>
-                    <a:endParaRPr lang="en-US" sz="1600"/>
+                    <a:endParaRPr lang="en-US" sz="1022"/>
                   </a:p>
                 </p:txBody>
               </p:sp>
@@ -3189,7 +3193,7 @@
                   <a:p>
                     <a:pPr algn="ctr"/>
                     <a:r>
-                      <a:rPr lang="en-US" sz="1600" dirty="0" err="1" smtClean="0">
+                      <a:rPr lang="en-US" sz="1022" dirty="0" err="1">
                         <a:solidFill>
                           <a:schemeClr val="tx1"/>
                         </a:solidFill>
@@ -3197,14 +3201,14 @@
                       <a:t>D</a:t>
                     </a:r>
                     <a:r>
-                      <a:rPr lang="en-US" sz="1600" baseline="-25000" dirty="0" err="1" smtClean="0">
+                      <a:rPr lang="en-US" sz="1022" baseline="-25000" dirty="0" err="1">
                         <a:solidFill>
                           <a:schemeClr val="tx1"/>
                         </a:solidFill>
                       </a:rPr>
                       <a:t>p</a:t>
                     </a:r>
-                    <a:endParaRPr lang="en-US" sz="1600" baseline="-25000" dirty="0">
+                    <a:endParaRPr lang="en-US" sz="1022" baseline="-25000" dirty="0">
                       <a:solidFill>
                         <a:schemeClr val="tx1"/>
                       </a:solidFill>
@@ -3256,7 +3260,7 @@
                   <a:lstStyle/>
                   <a:p>
                     <a:pPr algn="ctr"/>
-                    <a:endParaRPr lang="en-US" sz="1600"/>
+                    <a:endParaRPr lang="en-US" sz="1022"/>
                   </a:p>
                 </p:txBody>
               </p:sp>
@@ -3304,7 +3308,7 @@
                   <a:lstStyle/>
                   <a:p>
                     <a:pPr algn="ctr"/>
-                    <a:endParaRPr lang="en-US" sz="1600"/>
+                    <a:endParaRPr lang="en-US" sz="1022"/>
                   </a:p>
                 </p:txBody>
               </p:sp>
@@ -3352,7 +3356,7 @@
                   <a:lstStyle/>
                   <a:p>
                     <a:pPr algn="ctr"/>
-                    <a:endParaRPr lang="en-US" sz="1600"/>
+                    <a:endParaRPr lang="en-US" sz="1022"/>
                   </a:p>
                 </p:txBody>
               </p:sp>
@@ -3400,7 +3404,7 @@
                   <a:lstStyle/>
                   <a:p>
                     <a:pPr algn="ctr"/>
-                    <a:endParaRPr lang="en-US" sz="1600"/>
+                    <a:endParaRPr lang="en-US" sz="1022"/>
                   </a:p>
                 </p:txBody>
               </p:sp>
@@ -3448,7 +3452,7 @@
                   <a:lstStyle/>
                   <a:p>
                     <a:pPr algn="ctr"/>
-                    <a:endParaRPr lang="en-US" sz="1600"/>
+                    <a:endParaRPr lang="en-US" sz="1022"/>
                   </a:p>
                 </p:txBody>
               </p:sp>
@@ -3496,7 +3500,7 @@
                   <a:lstStyle/>
                   <a:p>
                     <a:pPr algn="ctr"/>
-                    <a:endParaRPr lang="en-US" sz="1600"/>
+                    <a:endParaRPr lang="en-US" sz="1022"/>
                   </a:p>
                 </p:txBody>
               </p:sp>
@@ -3544,7 +3548,7 @@
                   <a:lstStyle/>
                   <a:p>
                     <a:pPr algn="ctr"/>
-                    <a:endParaRPr lang="en-US" sz="1600"/>
+                    <a:endParaRPr lang="en-US" sz="1022"/>
                   </a:p>
                 </p:txBody>
               </p:sp>
@@ -3592,7 +3596,7 @@
                   <a:lstStyle/>
                   <a:p>
                     <a:pPr algn="ctr"/>
-                    <a:endParaRPr lang="en-US" sz="1600"/>
+                    <a:endParaRPr lang="en-US" sz="1022"/>
                   </a:p>
                 </p:txBody>
               </p:sp>
@@ -3640,7 +3644,7 @@
                   <a:lstStyle/>
                   <a:p>
                     <a:pPr algn="ctr"/>
-                    <a:endParaRPr lang="en-US" sz="1600"/>
+                    <a:endParaRPr lang="en-US" sz="1022"/>
                   </a:p>
                 </p:txBody>
               </p:sp>
@@ -3688,7 +3692,7 @@
                   <a:lstStyle/>
                   <a:p>
                     <a:pPr algn="ctr"/>
-                    <a:endParaRPr lang="en-US" sz="1600"/>
+                    <a:endParaRPr lang="en-US" sz="1022"/>
                   </a:p>
                 </p:txBody>
               </p:sp>
@@ -3736,7 +3740,7 @@
                   <a:lstStyle/>
                   <a:p>
                     <a:pPr algn="ctr"/>
-                    <a:endParaRPr lang="en-US" sz="1600"/>
+                    <a:endParaRPr lang="en-US" sz="1022"/>
                   </a:p>
                 </p:txBody>
               </p:sp>
@@ -3784,7 +3788,7 @@
                   <a:lstStyle/>
                   <a:p>
                     <a:pPr algn="ctr"/>
-                    <a:endParaRPr lang="en-US" sz="1600"/>
+                    <a:endParaRPr lang="en-US" sz="1022"/>
                   </a:p>
                 </p:txBody>
               </p:sp>
@@ -3832,7 +3836,7 @@
                   <a:lstStyle/>
                   <a:p>
                     <a:pPr algn="ctr"/>
-                    <a:endParaRPr lang="en-US" sz="1600"/>
+                    <a:endParaRPr lang="en-US" sz="1022"/>
                   </a:p>
                 </p:txBody>
               </p:sp>
@@ -3880,7 +3884,7 @@
                   <a:lstStyle/>
                   <a:p>
                     <a:pPr algn="ctr"/>
-                    <a:endParaRPr lang="en-US" sz="1600"/>
+                    <a:endParaRPr lang="en-US" sz="1022"/>
                   </a:p>
                 </p:txBody>
               </p:sp>
@@ -3928,7 +3932,7 @@
                   <a:lstStyle/>
                   <a:p>
                     <a:pPr algn="ctr"/>
-                    <a:endParaRPr lang="en-US" sz="1600"/>
+                    <a:endParaRPr lang="en-US" sz="1022"/>
                   </a:p>
                 </p:txBody>
               </p:sp>
@@ -3977,8 +3981,8 @@
                 </p:nvSpPr>
                 <p:spPr>
                   <a:xfrm>
-                    <a:off x="4766942" y="4278657"/>
-                    <a:ext cx="2328197" cy="510907"/>
+                    <a:off x="4766941" y="4278658"/>
+                    <a:ext cx="2328198" cy="577556"/>
                   </a:xfrm>
                   <a:prstGeom prst="rect">
                     <a:avLst/>
@@ -3992,7 +3996,7 @@
                   <a:lstStyle/>
                   <a:p>
                     <a:r>
-                      <a:rPr lang="en-US" sz="2000" dirty="0"/>
+                      <a:rPr lang="en-US" sz="1278" dirty="0"/>
                       <a:t>Bridge contact within air</a:t>
                     </a:r>
                   </a:p>
@@ -4081,7 +4085,7 @@
                 <p:spPr>
                   <a:xfrm>
                     <a:off x="4651168" y="5116533"/>
-                    <a:ext cx="1828573" cy="510907"/>
+                    <a:ext cx="2125172" cy="577556"/>
                   </a:xfrm>
                   <a:prstGeom prst="rect">
                     <a:avLst/>
@@ -4095,7 +4099,7 @@
                   <a:lstStyle/>
                   <a:p>
                     <a:r>
-                      <a:rPr lang="en-US" sz="2000" dirty="0"/>
+                      <a:rPr lang="en-US" sz="1278" dirty="0"/>
                       <a:t>Bridge contact in water</a:t>
                     </a:r>
                   </a:p>
@@ -4219,8 +4223,8 @@
                 </p:nvSpPr>
                 <p:spPr>
                   <a:xfrm>
-                    <a:off x="8115299" y="3583816"/>
-                    <a:ext cx="1301148" cy="510907"/>
+                    <a:off x="8115299" y="3583814"/>
+                    <a:ext cx="1439979" cy="577557"/>
                   </a:xfrm>
                   <a:prstGeom prst="rect">
                     <a:avLst/>
@@ -4234,7 +4238,7 @@
                   <a:lstStyle/>
                   <a:p>
                     <a:r>
-                      <a:rPr lang="en-US" sz="2000" b="1" dirty="0" smtClean="0">
+                      <a:rPr lang="en-US" sz="1278" b="1" dirty="0">
                         <a:solidFill>
                           <a:srgbClr val="002060"/>
                         </a:solidFill>
@@ -4242,7 +4246,7 @@
                       <a:t>“Oil-like </a:t>
                     </a:r>
                     <a:r>
-                      <a:rPr lang="en-US" sz="2000" b="1" dirty="0">
+                      <a:rPr lang="en-US" sz="1278" b="1" dirty="0">
                         <a:solidFill>
                           <a:srgbClr val="002060"/>
                         </a:solidFill>
@@ -4296,8 +4300,8 @@
                 </p:nvSpPr>
                 <p:spPr>
                   <a:xfrm>
-                    <a:off x="8348411" y="2809298"/>
-                    <a:ext cx="872143" cy="510907"/>
+                    <a:off x="8348412" y="2809298"/>
+                    <a:ext cx="989793" cy="577557"/>
                   </a:xfrm>
                   <a:prstGeom prst="rect">
                     <a:avLst/>
@@ -4311,7 +4315,7 @@
                   <a:lstStyle/>
                   <a:p>
                     <a:r>
-                      <a:rPr lang="en-US" sz="2000" b="1" dirty="0">
+                      <a:rPr lang="en-US" sz="1278" b="1" dirty="0">
                         <a:solidFill>
                           <a:srgbClr val="002060"/>
                         </a:solidFill>
@@ -4370,8 +4374,8 @@
                 </p:nvCxnSpPr>
                 <p:spPr>
                   <a:xfrm flipH="1">
-                    <a:off x="5191737" y="3839269"/>
-                    <a:ext cx="2923562" cy="308554"/>
+                    <a:off x="5191738" y="3872592"/>
+                    <a:ext cx="2923561" cy="275230"/>
                   </a:xfrm>
                   <a:prstGeom prst="straightConnector1">
                     <a:avLst/>
@@ -4481,8 +4485,8 @@
               </p:nvSpPr>
               <p:spPr>
                 <a:xfrm>
-                  <a:off x="720314" y="3232449"/>
-                  <a:ext cx="290462" cy="432305"/>
+                  <a:off x="720314" y="3232448"/>
+                  <a:ext cx="383516" cy="498874"/>
                 </a:xfrm>
                 <a:prstGeom prst="rect">
                   <a:avLst/>
@@ -4496,14 +4500,14 @@
                 <a:lstStyle/>
                 <a:p>
                   <a:r>
-                    <a:rPr lang="en-US" sz="1600" dirty="0" smtClean="0"/>
+                    <a:rPr lang="en-US" sz="1022" dirty="0"/>
                     <a:t>D</a:t>
                   </a:r>
                   <a:r>
-                    <a:rPr lang="en-US" sz="1600" baseline="-25000" dirty="0" smtClean="0"/>
+                    <a:rPr lang="en-US" sz="1022" baseline="-25000" dirty="0"/>
                     <a:t>h</a:t>
                   </a:r>
-                  <a:endParaRPr lang="en-US" sz="1600" baseline="-25000" dirty="0"/>
+                  <a:endParaRPr lang="en-US" sz="1022" baseline="-25000" dirty="0"/>
                 </a:p>
               </p:txBody>
             </p:sp>
@@ -4932,7 +4936,7 @@
                 <a:lstStyle/>
                 <a:p>
                   <a:pPr algn="ctr"/>
-                  <a:endParaRPr lang="en-US" sz="1600"/>
+                  <a:endParaRPr lang="en-US" sz="1022"/>
                 </a:p>
               </p:txBody>
             </p:sp>
@@ -5361,7 +5365,7 @@
                 <a:lstStyle/>
                 <a:p>
                   <a:pPr algn="ctr"/>
-                  <a:endParaRPr lang="en-US" sz="1600"/>
+                  <a:endParaRPr lang="en-US" sz="1022"/>
                 </a:p>
               </p:txBody>
             </p:sp>
@@ -5790,7 +5794,7 @@
                 <a:lstStyle/>
                 <a:p>
                   <a:pPr algn="ctr"/>
-                  <a:endParaRPr lang="en-US" sz="1600"/>
+                  <a:endParaRPr lang="en-US" sz="1022"/>
                 </a:p>
               </p:txBody>
             </p:sp>
@@ -6219,7 +6223,7 @@
                 <a:lstStyle/>
                 <a:p>
                   <a:pPr algn="ctr"/>
-                  <a:endParaRPr lang="en-US" sz="1600"/>
+                  <a:endParaRPr lang="en-US" sz="1022"/>
                 </a:p>
               </p:txBody>
             </p:sp>
@@ -6648,7 +6652,7 @@
                 <a:lstStyle/>
                 <a:p>
                   <a:pPr algn="ctr"/>
-                  <a:endParaRPr lang="en-US" sz="1600"/>
+                  <a:endParaRPr lang="en-US" sz="1022"/>
                 </a:p>
               </p:txBody>
             </p:sp>
@@ -7077,7 +7081,7 @@
                 <a:lstStyle/>
                 <a:p>
                   <a:pPr algn="ctr"/>
-                  <a:endParaRPr lang="en-US" sz="1600"/>
+                  <a:endParaRPr lang="en-US" sz="1022"/>
                 </a:p>
               </p:txBody>
             </p:sp>
@@ -7506,7 +7510,7 @@
                 <a:lstStyle/>
                 <a:p>
                   <a:pPr algn="ctr"/>
-                  <a:endParaRPr lang="en-US" sz="1600"/>
+                  <a:endParaRPr lang="en-US" sz="1022"/>
                 </a:p>
               </p:txBody>
             </p:sp>
@@ -7935,7 +7939,7 @@
                 <a:lstStyle/>
                 <a:p>
                   <a:pPr algn="ctr"/>
-                  <a:endParaRPr lang="en-US" sz="1600"/>
+                  <a:endParaRPr lang="en-US" sz="1022"/>
                 </a:p>
               </p:txBody>
             </p:sp>
@@ -8364,7 +8368,7 @@
                 <a:lstStyle/>
                 <a:p>
                   <a:pPr algn="ctr"/>
-                  <a:endParaRPr lang="en-US" sz="1600"/>
+                  <a:endParaRPr lang="en-US" sz="1022"/>
                 </a:p>
               </p:txBody>
             </p:sp>
@@ -8793,7 +8797,7 @@
                 <a:lstStyle/>
                 <a:p>
                   <a:pPr algn="ctr"/>
-                  <a:endParaRPr lang="en-US" sz="1600"/>
+                  <a:endParaRPr lang="en-US" sz="1022"/>
                 </a:p>
               </p:txBody>
             </p:sp>
@@ -9222,7 +9226,7 @@
                 <a:lstStyle/>
                 <a:p>
                   <a:pPr algn="ctr"/>
-                  <a:endParaRPr lang="en-US" sz="1600"/>
+                  <a:endParaRPr lang="en-US" sz="1022"/>
                 </a:p>
               </p:txBody>
             </p:sp>
@@ -9651,7 +9655,7 @@
                 <a:lstStyle/>
                 <a:p>
                   <a:pPr algn="ctr"/>
-                  <a:endParaRPr lang="en-US" sz="1600"/>
+                  <a:endParaRPr lang="en-US" sz="1022"/>
                 </a:p>
               </p:txBody>
             </p:sp>
@@ -10080,7 +10084,7 @@
                 <a:lstStyle/>
                 <a:p>
                   <a:pPr algn="ctr"/>
-                  <a:endParaRPr lang="en-US" sz="1600"/>
+                  <a:endParaRPr lang="en-US" sz="1022"/>
                 </a:p>
               </p:txBody>
             </p:sp>
@@ -10509,7 +10513,7 @@
                 <a:lstStyle/>
                 <a:p>
                   <a:pPr algn="ctr"/>
-                  <a:endParaRPr lang="en-US" sz="1600"/>
+                  <a:endParaRPr lang="en-US" sz="1022"/>
                 </a:p>
               </p:txBody>
             </p:sp>
@@ -10938,7 +10942,7 @@
                 <a:lstStyle/>
                 <a:p>
                   <a:pPr algn="ctr"/>
-                  <a:endParaRPr lang="en-US" sz="1600"/>
+                  <a:endParaRPr lang="en-US" sz="1022"/>
                 </a:p>
               </p:txBody>
             </p:sp>
@@ -10953,9 +10957,9 @@
           <p:grpSpPr>
             <a:xfrm>
               <a:off x="264939" y="1101767"/>
-              <a:ext cx="5748195" cy="2498347"/>
+              <a:ext cx="5748195" cy="2550544"/>
               <a:chOff x="6740744" y="2390966"/>
-              <a:chExt cx="4521306" cy="3331127"/>
+              <a:chExt cx="4521306" cy="3400723"/>
             </a:xfrm>
           </p:grpSpPr>
           <p:grpSp>
@@ -10967,9 +10971,9 @@
             <p:grpSpPr>
               <a:xfrm>
                 <a:off x="6740744" y="2390966"/>
-                <a:ext cx="4514047" cy="3331127"/>
+                <a:ext cx="4514047" cy="3400723"/>
                 <a:chOff x="6729727" y="1785038"/>
-                <a:chExt cx="4514047" cy="3331127"/>
+                <a:chExt cx="4514047" cy="3400723"/>
               </a:xfrm>
             </p:grpSpPr>
             <p:grpSp>
@@ -10981,9 +10985,9 @@
               <p:grpSpPr>
                 <a:xfrm>
                   <a:off x="7090883" y="2441590"/>
-                  <a:ext cx="4152891" cy="2621354"/>
+                  <a:ext cx="4152891" cy="2690948"/>
                   <a:chOff x="3635829" y="2352842"/>
-                  <a:chExt cx="4152891" cy="2621354"/>
+                  <a:chExt cx="4152891" cy="2690948"/>
                 </a:xfrm>
               </p:grpSpPr>
               <p:sp>
@@ -11025,7 +11029,7 @@
                   <a:lstStyle/>
                   <a:p>
                     <a:pPr algn="ctr"/>
-                    <a:endParaRPr lang="en-US" sz="1600"/>
+                    <a:endParaRPr lang="en-US" sz="1022"/>
                   </a:p>
                 </p:txBody>
               </p:sp>
@@ -11068,7 +11072,7 @@
                   <a:lstStyle/>
                   <a:p>
                     <a:pPr algn="ctr"/>
-                    <a:endParaRPr lang="en-US" sz="1600"/>
+                    <a:endParaRPr lang="en-US" sz="1022"/>
                   </a:p>
                 </p:txBody>
               </p:sp>
@@ -11116,7 +11120,7 @@
                   <a:lstStyle/>
                   <a:p>
                     <a:pPr algn="ctr"/>
-                    <a:endParaRPr lang="en-US" sz="1600"/>
+                    <a:endParaRPr lang="en-US" sz="1022"/>
                   </a:p>
                 </p:txBody>
               </p:sp>
@@ -11164,7 +11168,7 @@
                   <a:lstStyle/>
                   <a:p>
                     <a:pPr algn="ctr"/>
-                    <a:endParaRPr lang="en-US" sz="1600"/>
+                    <a:endParaRPr lang="en-US" sz="1022"/>
                   </a:p>
                 </p:txBody>
               </p:sp>
@@ -11212,7 +11216,7 @@
                   <a:lstStyle/>
                   <a:p>
                     <a:pPr algn="ctr"/>
-                    <a:endParaRPr lang="en-US" sz="1600"/>
+                    <a:endParaRPr lang="en-US" sz="1022"/>
                   </a:p>
                 </p:txBody>
               </p:sp>
@@ -11260,7 +11264,7 @@
                   <a:lstStyle/>
                   <a:p>
                     <a:pPr algn="ctr"/>
-                    <a:endParaRPr lang="en-US" sz="1600"/>
+                    <a:endParaRPr lang="en-US" sz="1022"/>
                   </a:p>
                 </p:txBody>
               </p:sp>
@@ -11308,7 +11312,7 @@
                   <a:lstStyle/>
                   <a:p>
                     <a:pPr algn="ctr"/>
-                    <a:endParaRPr lang="en-US" sz="1600"/>
+                    <a:endParaRPr lang="en-US" sz="1022"/>
                   </a:p>
                 </p:txBody>
               </p:sp>
@@ -11356,7 +11360,7 @@
                   <a:lstStyle/>
                   <a:p>
                     <a:pPr algn="ctr"/>
-                    <a:endParaRPr lang="en-US" sz="1600"/>
+                    <a:endParaRPr lang="en-US" sz="1022"/>
                   </a:p>
                 </p:txBody>
               </p:sp>
@@ -11404,7 +11408,7 @@
                   <a:lstStyle/>
                   <a:p>
                     <a:pPr algn="ctr"/>
-                    <a:endParaRPr lang="en-US" sz="1600"/>
+                    <a:endParaRPr lang="en-US" sz="1022"/>
                   </a:p>
                 </p:txBody>
               </p:sp>
@@ -11452,7 +11456,7 @@
                   <a:lstStyle/>
                   <a:p>
                     <a:pPr algn="ctr"/>
-                    <a:endParaRPr lang="en-US" sz="1600"/>
+                    <a:endParaRPr lang="en-US" sz="1022"/>
                   </a:p>
                 </p:txBody>
               </p:sp>
@@ -11500,7 +11504,7 @@
                   <a:lstStyle/>
                   <a:p>
                     <a:pPr algn="ctr"/>
-                    <a:endParaRPr lang="en-US" sz="1600"/>
+                    <a:endParaRPr lang="en-US" sz="1022"/>
                   </a:p>
                 </p:txBody>
               </p:sp>
@@ -11548,7 +11552,7 @@
                   <a:lstStyle/>
                   <a:p>
                     <a:pPr algn="ctr"/>
-                    <a:endParaRPr lang="en-US" sz="1600"/>
+                    <a:endParaRPr lang="en-US" sz="1022"/>
                   </a:p>
                 </p:txBody>
               </p:sp>
@@ -11596,7 +11600,7 @@
                   <a:lstStyle/>
                   <a:p>
                     <a:pPr algn="ctr"/>
-                    <a:endParaRPr lang="en-US" sz="1600"/>
+                    <a:endParaRPr lang="en-US" sz="1022"/>
                   </a:p>
                 </p:txBody>
               </p:sp>
@@ -11644,7 +11648,7 @@
                   <a:lstStyle/>
                   <a:p>
                     <a:pPr algn="ctr"/>
-                    <a:endParaRPr lang="en-US" sz="1600"/>
+                    <a:endParaRPr lang="en-US" sz="1022"/>
                   </a:p>
                 </p:txBody>
               </p:sp>
@@ -11692,7 +11696,7 @@
                   <a:lstStyle/>
                   <a:p>
                     <a:pPr algn="ctr"/>
-                    <a:endParaRPr lang="en-US" sz="1600"/>
+                    <a:endParaRPr lang="en-US" sz="1022"/>
                   </a:p>
                 </p:txBody>
               </p:sp>
@@ -11740,7 +11744,7 @@
                   <a:lstStyle/>
                   <a:p>
                     <a:pPr algn="ctr"/>
-                    <a:endParaRPr lang="en-US" sz="1600"/>
+                    <a:endParaRPr lang="en-US" sz="1022"/>
                   </a:p>
                 </p:txBody>
               </p:sp>
@@ -11788,7 +11792,7 @@
                   <a:lstStyle/>
                   <a:p>
                     <a:pPr algn="ctr"/>
-                    <a:endParaRPr lang="en-US" sz="1600"/>
+                    <a:endParaRPr lang="en-US" sz="1022"/>
                   </a:p>
                 </p:txBody>
               </p:sp>
@@ -11801,7 +11805,7 @@
                 <p:spPr>
                   <a:xfrm>
                     <a:off x="6011841" y="4440716"/>
-                    <a:ext cx="532335" cy="533480"/>
+                    <a:ext cx="642224" cy="603074"/>
                   </a:xfrm>
                   <a:prstGeom prst="rect">
                     <a:avLst/>
@@ -11815,10 +11819,10 @@
                   <a:lstStyle/>
                   <a:p>
                     <a:r>
-                      <a:rPr lang="en-US" sz="2000" dirty="0" smtClean="0"/>
+                      <a:rPr lang="en-US" sz="1278" dirty="0"/>
                       <a:t>Hairs</a:t>
                     </a:r>
-                    <a:endParaRPr lang="en-US" sz="2000" dirty="0"/>
+                    <a:endParaRPr lang="en-US" sz="1278" dirty="0"/>
                   </a:p>
                 </p:txBody>
               </p:sp>
@@ -11832,8 +11836,8 @@
                 </p:nvCxnSpPr>
                 <p:spPr>
                   <a:xfrm flipH="1" flipV="1">
-                    <a:off x="4903849" y="3861754"/>
-                    <a:ext cx="1107992" cy="845702"/>
+                    <a:off x="4903852" y="3861758"/>
+                    <a:ext cx="1107989" cy="880495"/>
                   </a:xfrm>
                   <a:prstGeom prst="straightConnector1">
                     <a:avLst/>
@@ -11870,7 +11874,7 @@
               <p:spPr>
                 <a:xfrm>
                   <a:off x="8943086" y="1785038"/>
-                  <a:ext cx="443638" cy="615553"/>
+                  <a:ext cx="443639" cy="1177243"/>
                 </a:xfrm>
                 <a:prstGeom prst="rect">
                   <a:avLst/>
@@ -11884,10 +11888,10 @@
                 <a:lstStyle/>
                 <a:p>
                   <a:r>
-                    <a:rPr lang="en-US" sz="2400" b="1" dirty="0" smtClean="0"/>
+                    <a:rPr lang="en-US" sz="1533" b="1" dirty="0"/>
                     <a:t>Air</a:t>
                   </a:r>
-                  <a:endParaRPr lang="en-US" sz="2400" b="1" dirty="0"/>
+                  <a:endParaRPr lang="en-US" sz="1533" b="1" dirty="0"/>
                 </a:p>
               </p:txBody>
             </p:sp>
@@ -11935,8 +11939,8 @@
               </p:nvSpPr>
               <p:spPr>
                 <a:xfrm>
-                  <a:off x="6729727" y="4582685"/>
-                  <a:ext cx="348250" cy="533480"/>
+                  <a:off x="6729727" y="4582687"/>
+                  <a:ext cx="460198" cy="603074"/>
                 </a:xfrm>
                 <a:prstGeom prst="rect">
                   <a:avLst/>
@@ -11950,10 +11954,10 @@
                 <a:lstStyle/>
                 <a:p>
                   <a:r>
-                    <a:rPr lang="en-US" sz="2000" dirty="0" smtClean="0"/>
+                    <a:rPr lang="en-US" sz="1278" dirty="0"/>
                     <a:t>Air</a:t>
                   </a:r>
-                  <a:endParaRPr lang="en-US" sz="2000" dirty="0"/>
+                  <a:endParaRPr lang="en-US" sz="1278" dirty="0"/>
                 </a:p>
               </p:txBody>
             </p:sp>
@@ -12383,7 +12387,7 @@
               <a:lstStyle/>
               <a:p>
                 <a:pPr algn="ctr"/>
-                <a:endParaRPr lang="en-US" sz="1600"/>
+                <a:endParaRPr lang="en-US" sz="1022"/>
               </a:p>
             </p:txBody>
           </p:sp>
@@ -12812,7 +12816,7 @@
               <a:lstStyle/>
               <a:p>
                 <a:pPr algn="ctr"/>
-                <a:endParaRPr lang="en-US" sz="1600"/>
+                <a:endParaRPr lang="en-US" sz="1022"/>
               </a:p>
             </p:txBody>
           </p:sp>
@@ -13241,7 +13245,7 @@
               <a:lstStyle/>
               <a:p>
                 <a:pPr algn="ctr"/>
-                <a:endParaRPr lang="en-US" sz="1600"/>
+                <a:endParaRPr lang="en-US" sz="1022"/>
               </a:p>
             </p:txBody>
           </p:sp>
@@ -13670,7 +13674,7 @@
               <a:lstStyle/>
               <a:p>
                 <a:pPr algn="ctr"/>
-                <a:endParaRPr lang="en-US" sz="1600"/>
+                <a:endParaRPr lang="en-US" sz="1022"/>
               </a:p>
             </p:txBody>
           </p:sp>
@@ -14099,7 +14103,7 @@
               <a:lstStyle/>
               <a:p>
                 <a:pPr algn="ctr"/>
-                <a:endParaRPr lang="en-US" sz="1600"/>
+                <a:endParaRPr lang="en-US" sz="1022"/>
               </a:p>
             </p:txBody>
           </p:sp>
@@ -14528,7 +14532,7 @@
               <a:lstStyle/>
               <a:p>
                 <a:pPr algn="ctr"/>
-                <a:endParaRPr lang="en-US" sz="1600"/>
+                <a:endParaRPr lang="en-US" sz="1022"/>
               </a:p>
             </p:txBody>
           </p:sp>
@@ -14957,7 +14961,7 @@
               <a:lstStyle/>
               <a:p>
                 <a:pPr algn="ctr"/>
-                <a:endParaRPr lang="en-US" sz="1600"/>
+                <a:endParaRPr lang="en-US" sz="1022"/>
               </a:p>
             </p:txBody>
           </p:sp>
@@ -15386,7 +15390,7 @@
               <a:lstStyle/>
               <a:p>
                 <a:pPr algn="ctr"/>
-                <a:endParaRPr lang="en-US" sz="1600"/>
+                <a:endParaRPr lang="en-US" sz="1022"/>
               </a:p>
             </p:txBody>
           </p:sp>
@@ -15815,7 +15819,7 @@
               <a:lstStyle/>
               <a:p>
                 <a:pPr algn="ctr"/>
-                <a:endParaRPr lang="en-US" sz="1600"/>
+                <a:endParaRPr lang="en-US" sz="1022"/>
               </a:p>
             </p:txBody>
           </p:sp>
@@ -16244,7 +16248,7 @@
               <a:lstStyle/>
               <a:p>
                 <a:pPr algn="ctr"/>
-                <a:endParaRPr lang="en-US" sz="1600"/>
+                <a:endParaRPr lang="en-US" sz="1022"/>
               </a:p>
             </p:txBody>
           </p:sp>
@@ -16673,7 +16677,7 @@
               <a:lstStyle/>
               <a:p>
                 <a:pPr algn="ctr"/>
-                <a:endParaRPr lang="en-US" sz="1600"/>
+                <a:endParaRPr lang="en-US" sz="1022"/>
               </a:p>
             </p:txBody>
           </p:sp>
@@ -17102,7 +17106,7 @@
               <a:lstStyle/>
               <a:p>
                 <a:pPr algn="ctr"/>
-                <a:endParaRPr lang="en-US" sz="1600"/>
+                <a:endParaRPr lang="en-US" sz="1022"/>
               </a:p>
             </p:txBody>
           </p:sp>
@@ -17531,7 +17535,7 @@
               <a:lstStyle/>
               <a:p>
                 <a:pPr algn="ctr"/>
-                <a:endParaRPr lang="en-US" sz="1600"/>
+                <a:endParaRPr lang="en-US" sz="1022"/>
               </a:p>
             </p:txBody>
           </p:sp>
@@ -17960,7 +17964,7 @@
               <a:lstStyle/>
               <a:p>
                 <a:pPr algn="ctr"/>
-                <a:endParaRPr lang="en-US" sz="1600"/>
+                <a:endParaRPr lang="en-US" sz="1022"/>
               </a:p>
             </p:txBody>
           </p:sp>
@@ -18389,7 +18393,7 @@
               <a:lstStyle/>
               <a:p>
                 <a:pPr algn="ctr"/>
-                <a:endParaRPr lang="en-US" sz="1600"/>
+                <a:endParaRPr lang="en-US" sz="1022"/>
               </a:p>
             </p:txBody>
           </p:sp>
@@ -18475,9 +18479,9 @@
           <p:grpSpPr>
             <a:xfrm>
               <a:off x="6190566" y="1133588"/>
-              <a:ext cx="5748195" cy="2466526"/>
+              <a:ext cx="5748195" cy="2518723"/>
               <a:chOff x="6740744" y="2433394"/>
-              <a:chExt cx="4521306" cy="3288699"/>
+              <a:chExt cx="4521306" cy="3358295"/>
             </a:xfrm>
           </p:grpSpPr>
           <p:grpSp>
@@ -18489,9 +18493,9 @@
             <p:grpSpPr>
               <a:xfrm>
                 <a:off x="6740744" y="2433394"/>
-                <a:ext cx="4514047" cy="3288699"/>
+                <a:ext cx="4514047" cy="3358295"/>
                 <a:chOff x="6729727" y="1827466"/>
-                <a:chExt cx="4514047" cy="3288699"/>
+                <a:chExt cx="4514047" cy="3358295"/>
               </a:xfrm>
             </p:grpSpPr>
             <p:grpSp>
@@ -18503,9 +18507,9 @@
               <p:grpSpPr>
                 <a:xfrm>
                   <a:off x="7090883" y="2441590"/>
-                  <a:ext cx="4152891" cy="2621354"/>
+                  <a:ext cx="4152891" cy="2690948"/>
                   <a:chOff x="3635829" y="2352842"/>
-                  <a:chExt cx="4152891" cy="2621354"/>
+                  <a:chExt cx="4152891" cy="2690948"/>
                 </a:xfrm>
               </p:grpSpPr>
               <p:sp>
@@ -18547,7 +18551,7 @@
                   <a:lstStyle/>
                   <a:p>
                     <a:pPr algn="ctr"/>
-                    <a:endParaRPr lang="en-US" sz="1600"/>
+                    <a:endParaRPr lang="en-US" sz="1022"/>
                   </a:p>
                 </p:txBody>
               </p:sp>
@@ -18590,7 +18594,7 @@
                   <a:lstStyle/>
                   <a:p>
                     <a:pPr algn="ctr"/>
-                    <a:endParaRPr lang="en-US" sz="1600"/>
+                    <a:endParaRPr lang="en-US" sz="1022"/>
                   </a:p>
                 </p:txBody>
               </p:sp>
@@ -18638,7 +18642,7 @@
                   <a:lstStyle/>
                   <a:p>
                     <a:pPr algn="ctr"/>
-                    <a:endParaRPr lang="en-US" sz="1600"/>
+                    <a:endParaRPr lang="en-US" sz="1022"/>
                   </a:p>
                 </p:txBody>
               </p:sp>
@@ -18686,7 +18690,7 @@
                   <a:lstStyle/>
                   <a:p>
                     <a:pPr algn="ctr"/>
-                    <a:endParaRPr lang="en-US" sz="1600"/>
+                    <a:endParaRPr lang="en-US" sz="1022"/>
                   </a:p>
                 </p:txBody>
               </p:sp>
@@ -18734,7 +18738,7 @@
                   <a:lstStyle/>
                   <a:p>
                     <a:pPr algn="ctr"/>
-                    <a:endParaRPr lang="en-US" sz="1600"/>
+                    <a:endParaRPr lang="en-US" sz="1022"/>
                   </a:p>
                 </p:txBody>
               </p:sp>
@@ -18782,7 +18786,7 @@
                   <a:lstStyle/>
                   <a:p>
                     <a:pPr algn="ctr"/>
-                    <a:endParaRPr lang="en-US" sz="1600"/>
+                    <a:endParaRPr lang="en-US" sz="1022"/>
                   </a:p>
                 </p:txBody>
               </p:sp>
@@ -18830,7 +18834,7 @@
                   <a:lstStyle/>
                   <a:p>
                     <a:pPr algn="ctr"/>
-                    <a:endParaRPr lang="en-US" sz="1600"/>
+                    <a:endParaRPr lang="en-US" sz="1022"/>
                   </a:p>
                 </p:txBody>
               </p:sp>
@@ -18878,7 +18882,7 @@
                   <a:lstStyle/>
                   <a:p>
                     <a:pPr algn="ctr"/>
-                    <a:endParaRPr lang="en-US" sz="1600"/>
+                    <a:endParaRPr lang="en-US" sz="1022"/>
                   </a:p>
                 </p:txBody>
               </p:sp>
@@ -18926,7 +18930,7 @@
                   <a:lstStyle/>
                   <a:p>
                     <a:pPr algn="ctr"/>
-                    <a:endParaRPr lang="en-US" sz="1600"/>
+                    <a:endParaRPr lang="en-US" sz="1022"/>
                   </a:p>
                 </p:txBody>
               </p:sp>
@@ -18974,7 +18978,7 @@
                   <a:lstStyle/>
                   <a:p>
                     <a:pPr algn="ctr"/>
-                    <a:endParaRPr lang="en-US" sz="1600"/>
+                    <a:endParaRPr lang="en-US" sz="1022"/>
                   </a:p>
                 </p:txBody>
               </p:sp>
@@ -19022,7 +19026,7 @@
                   <a:lstStyle/>
                   <a:p>
                     <a:pPr algn="ctr"/>
-                    <a:endParaRPr lang="en-US" sz="1600"/>
+                    <a:endParaRPr lang="en-US" sz="1022"/>
                   </a:p>
                 </p:txBody>
               </p:sp>
@@ -19070,7 +19074,7 @@
                   <a:lstStyle/>
                   <a:p>
                     <a:pPr algn="ctr"/>
-                    <a:endParaRPr lang="en-US" sz="1600"/>
+                    <a:endParaRPr lang="en-US" sz="1022"/>
                   </a:p>
                 </p:txBody>
               </p:sp>
@@ -19118,7 +19122,7 @@
                   <a:lstStyle/>
                   <a:p>
                     <a:pPr algn="ctr"/>
-                    <a:endParaRPr lang="en-US" sz="1600"/>
+                    <a:endParaRPr lang="en-US" sz="1022"/>
                   </a:p>
                 </p:txBody>
               </p:sp>
@@ -19166,7 +19170,7 @@
                   <a:lstStyle/>
                   <a:p>
                     <a:pPr algn="ctr"/>
-                    <a:endParaRPr lang="en-US" sz="1600"/>
+                    <a:endParaRPr lang="en-US" sz="1022"/>
                   </a:p>
                 </p:txBody>
               </p:sp>
@@ -19214,7 +19218,7 @@
                   <a:lstStyle/>
                   <a:p>
                     <a:pPr algn="ctr"/>
-                    <a:endParaRPr lang="en-US" sz="1600"/>
+                    <a:endParaRPr lang="en-US" sz="1022"/>
                   </a:p>
                 </p:txBody>
               </p:sp>
@@ -19262,7 +19266,7 @@
                   <a:lstStyle/>
                   <a:p>
                     <a:pPr algn="ctr"/>
-                    <a:endParaRPr lang="en-US" sz="1600"/>
+                    <a:endParaRPr lang="en-US" sz="1022"/>
                   </a:p>
                 </p:txBody>
               </p:sp>
@@ -19310,7 +19314,7 @@
                   <a:lstStyle/>
                   <a:p>
                     <a:pPr algn="ctr"/>
-                    <a:endParaRPr lang="en-US" sz="1600"/>
+                    <a:endParaRPr lang="en-US" sz="1022"/>
                   </a:p>
                 </p:txBody>
               </p:sp>
@@ -19323,7 +19327,7 @@
                 <p:spPr>
                   <a:xfrm>
                     <a:off x="6011841" y="4440716"/>
-                    <a:ext cx="1378372" cy="533480"/>
+                    <a:ext cx="1582355" cy="603074"/>
                   </a:xfrm>
                   <a:prstGeom prst="rect">
                     <a:avLst/>
@@ -19337,7 +19341,7 @@
                   <a:lstStyle/>
                   <a:p>
                     <a:r>
-                      <a:rPr lang="en-US" sz="2000" dirty="0"/>
+                      <a:rPr lang="en-US" sz="1278" dirty="0"/>
                       <a:t>Capillary bridges</a:t>
                     </a:r>
                   </a:p>
@@ -19353,8 +19357,8 @@
                 </p:nvCxnSpPr>
                 <p:spPr>
                   <a:xfrm flipH="1" flipV="1">
-                    <a:off x="4916937" y="4170973"/>
-                    <a:ext cx="1094904" cy="536484"/>
+                    <a:off x="4916939" y="4170976"/>
+                    <a:ext cx="1094901" cy="571277"/>
                   </a:xfrm>
                   <a:prstGeom prst="straightConnector1">
                     <a:avLst/>
@@ -19391,7 +19395,7 @@
               <p:spPr>
                 <a:xfrm>
                   <a:off x="8312297" y="1827466"/>
-                  <a:ext cx="1999625" cy="615553"/>
+                  <a:ext cx="1999625" cy="684963"/>
                 </a:xfrm>
                 <a:prstGeom prst="rect">
                   <a:avLst/>
@@ -19405,10 +19409,10 @@
                 <a:lstStyle/>
                 <a:p>
                   <a:r>
-                    <a:rPr lang="en-US" sz="2400" b="1" dirty="0" smtClean="0"/>
+                    <a:rPr lang="en-US" sz="1533" b="1" dirty="0"/>
                     <a:t>Underwater: Wet</a:t>
                   </a:r>
-                  <a:endParaRPr lang="en-US" sz="2400" b="1" dirty="0"/>
+                  <a:endParaRPr lang="en-US" sz="1533" b="1" dirty="0"/>
                 </a:p>
               </p:txBody>
             </p:sp>
@@ -19456,8 +19460,8 @@
               </p:nvSpPr>
               <p:spPr>
                 <a:xfrm>
-                  <a:off x="6729727" y="4582685"/>
-                  <a:ext cx="580550" cy="533480"/>
+                  <a:off x="6729727" y="4582687"/>
+                  <a:ext cx="731344" cy="603074"/>
                 </a:xfrm>
                 <a:prstGeom prst="rect">
                   <a:avLst/>
@@ -19471,10 +19475,10 @@
                 <a:lstStyle/>
                 <a:p>
                   <a:r>
-                    <a:rPr lang="en-US" sz="2000" dirty="0" smtClean="0"/>
+                    <a:rPr lang="en-US" sz="1278" dirty="0"/>
                     <a:t>Water</a:t>
                   </a:r>
-                  <a:endParaRPr lang="en-US" sz="2000" dirty="0"/>
+                  <a:endParaRPr lang="en-US" sz="1278" dirty="0"/>
                 </a:p>
               </p:txBody>
             </p:sp>
@@ -19904,7 +19908,7 @@
               <a:lstStyle/>
               <a:p>
                 <a:pPr algn="ctr"/>
-                <a:endParaRPr lang="en-US" sz="1600"/>
+                <a:endParaRPr lang="en-US" sz="1022"/>
               </a:p>
             </p:txBody>
           </p:sp>
@@ -20333,7 +20337,7 @@
               <a:lstStyle/>
               <a:p>
                 <a:pPr algn="ctr"/>
-                <a:endParaRPr lang="en-US" sz="1600"/>
+                <a:endParaRPr lang="en-US" sz="1022"/>
               </a:p>
             </p:txBody>
           </p:sp>
@@ -20762,7 +20766,7 @@
               <a:lstStyle/>
               <a:p>
                 <a:pPr algn="ctr"/>
-                <a:endParaRPr lang="en-US" sz="1600"/>
+                <a:endParaRPr lang="en-US" sz="1022"/>
               </a:p>
             </p:txBody>
           </p:sp>
@@ -21191,7 +21195,7 @@
               <a:lstStyle/>
               <a:p>
                 <a:pPr algn="ctr"/>
-                <a:endParaRPr lang="en-US" sz="1600"/>
+                <a:endParaRPr lang="en-US" sz="1022"/>
               </a:p>
             </p:txBody>
           </p:sp>
@@ -21620,7 +21624,7 @@
               <a:lstStyle/>
               <a:p>
                 <a:pPr algn="ctr"/>
-                <a:endParaRPr lang="en-US" sz="1600"/>
+                <a:endParaRPr lang="en-US" sz="1022"/>
               </a:p>
             </p:txBody>
           </p:sp>
@@ -22049,7 +22053,7 @@
               <a:lstStyle/>
               <a:p>
                 <a:pPr algn="ctr"/>
-                <a:endParaRPr lang="en-US" sz="1600"/>
+                <a:endParaRPr lang="en-US" sz="1022"/>
               </a:p>
             </p:txBody>
           </p:sp>
@@ -22478,7 +22482,7 @@
               <a:lstStyle/>
               <a:p>
                 <a:pPr algn="ctr"/>
-                <a:endParaRPr lang="en-US" sz="1600"/>
+                <a:endParaRPr lang="en-US" sz="1022"/>
               </a:p>
             </p:txBody>
           </p:sp>
@@ -22907,7 +22911,7 @@
               <a:lstStyle/>
               <a:p>
                 <a:pPr algn="ctr"/>
-                <a:endParaRPr lang="en-US" sz="1600"/>
+                <a:endParaRPr lang="en-US" sz="1022"/>
               </a:p>
             </p:txBody>
           </p:sp>
@@ -23336,7 +23340,7 @@
               <a:lstStyle/>
               <a:p>
                 <a:pPr algn="ctr"/>
-                <a:endParaRPr lang="en-US" sz="1600"/>
+                <a:endParaRPr lang="en-US" sz="1022"/>
               </a:p>
             </p:txBody>
           </p:sp>
@@ -23765,7 +23769,7 @@
               <a:lstStyle/>
               <a:p>
                 <a:pPr algn="ctr"/>
-                <a:endParaRPr lang="en-US" sz="1600"/>
+                <a:endParaRPr lang="en-US" sz="1022"/>
               </a:p>
             </p:txBody>
           </p:sp>
@@ -24194,7 +24198,7 @@
               <a:lstStyle/>
               <a:p>
                 <a:pPr algn="ctr"/>
-                <a:endParaRPr lang="en-US" sz="1600"/>
+                <a:endParaRPr lang="en-US" sz="1022"/>
               </a:p>
             </p:txBody>
           </p:sp>
@@ -24623,7 +24627,7 @@
               <a:lstStyle/>
               <a:p>
                 <a:pPr algn="ctr"/>
-                <a:endParaRPr lang="en-US" sz="1600"/>
+                <a:endParaRPr lang="en-US" sz="1022"/>
               </a:p>
             </p:txBody>
           </p:sp>
@@ -25052,7 +25056,7 @@
               <a:lstStyle/>
               <a:p>
                 <a:pPr algn="ctr"/>
-                <a:endParaRPr lang="en-US" sz="1600"/>
+                <a:endParaRPr lang="en-US" sz="1022"/>
               </a:p>
             </p:txBody>
           </p:sp>
@@ -25481,7 +25485,7 @@
               <a:lstStyle/>
               <a:p>
                 <a:pPr algn="ctr"/>
-                <a:endParaRPr lang="en-US" sz="1600"/>
+                <a:endParaRPr lang="en-US" sz="1022"/>
               </a:p>
             </p:txBody>
           </p:sp>
@@ -25910,7 +25914,7 @@
               <a:lstStyle/>
               <a:p>
                 <a:pPr algn="ctr"/>
-                <a:endParaRPr lang="en-US" sz="1600"/>
+                <a:endParaRPr lang="en-US" sz="1022"/>
               </a:p>
             </p:txBody>
           </p:sp>
@@ -25997,8 +26001,8 @@
           </p:nvSpPr>
           <p:spPr>
             <a:xfrm>
-              <a:off x="3048850" y="1728879"/>
-              <a:ext cx="730207" cy="369332"/>
+              <a:off x="3048851" y="1728879"/>
+              <a:ext cx="730206" cy="421495"/>
             </a:xfrm>
             <a:prstGeom prst="rect">
               <a:avLst/>
@@ -26012,10 +26016,10 @@
             <a:lstStyle/>
             <a:p>
               <a:r>
-                <a:rPr lang="en-US" dirty="0" smtClean="0"/>
+                <a:rPr lang="en-US" sz="1150" dirty="0"/>
                 <a:t>Pad</a:t>
               </a:r>
-              <a:endParaRPr lang="en-US" dirty="0"/>
+              <a:endParaRPr lang="en-US" sz="1150" dirty="0"/>
             </a:p>
           </p:txBody>
         </p:sp>
@@ -26058,10 +26062,10 @@
         </p:nvGrpSpPr>
         <p:grpSpPr>
           <a:xfrm>
-            <a:off x="270205" y="734290"/>
-            <a:ext cx="11254865" cy="3279276"/>
+            <a:off x="-65801" y="38"/>
+            <a:ext cx="7191027" cy="2114706"/>
             <a:chOff x="270205" y="734290"/>
-            <a:chExt cx="11254865" cy="3279276"/>
+            <a:chExt cx="11254865" cy="3309782"/>
           </a:xfrm>
         </p:grpSpPr>
         <p:grpSp>
@@ -26073,9 +26077,9 @@
           <p:grpSpPr>
             <a:xfrm>
               <a:off x="270205" y="734290"/>
-              <a:ext cx="11254865" cy="3279276"/>
+              <a:ext cx="11254865" cy="3309782"/>
               <a:chOff x="270205" y="734290"/>
-              <a:chExt cx="11254865" cy="3279276"/>
+              <a:chExt cx="11254865" cy="3309782"/>
             </a:xfrm>
           </p:grpSpPr>
           <p:pic>
@@ -26270,8 +26274,8 @@
             </p:nvSpPr>
             <p:spPr>
               <a:xfrm>
-                <a:off x="3601189" y="734290"/>
-                <a:ext cx="554960" cy="461665"/>
+                <a:off x="3601190" y="734290"/>
+                <a:ext cx="660342" cy="513723"/>
               </a:xfrm>
               <a:prstGeom prst="rect">
                 <a:avLst/>
@@ -26285,10 +26289,10 @@
               <a:lstStyle/>
               <a:p>
                 <a:r>
-                  <a:rPr lang="en-US" sz="2400" b="1" dirty="0" smtClean="0"/>
+                  <a:rPr lang="en-US" sz="1533" b="1" dirty="0"/>
                   <a:t>Air</a:t>
                 </a:r>
-                <a:endParaRPr lang="en-US" sz="2400" b="1" dirty="0"/>
+                <a:endParaRPr lang="en-US" sz="1533" b="1" dirty="0"/>
               </a:p>
             </p:txBody>
           </p:sp>
@@ -26301,7 +26305,7 @@
             <p:spPr>
               <a:xfrm>
                 <a:off x="8113790" y="734290"/>
-                <a:ext cx="1724959" cy="461665"/>
+                <a:ext cx="1834009" cy="513723"/>
               </a:xfrm>
               <a:prstGeom prst="rect">
                 <a:avLst/>
@@ -26315,10 +26319,10 @@
               <a:lstStyle/>
               <a:p>
                 <a:r>
-                  <a:rPr lang="en-US" sz="2400" b="1" dirty="0" smtClean="0"/>
+                  <a:rPr lang="en-US" sz="1533" b="1" dirty="0"/>
                   <a:t>Underwater</a:t>
                 </a:r>
-                <a:endParaRPr lang="en-US" sz="2400" b="1" dirty="0"/>
+                <a:endParaRPr lang="en-US" sz="1533" b="1" dirty="0"/>
               </a:p>
             </p:txBody>
           </p:sp>
@@ -26330,8 +26334,8 @@
             </p:nvSpPr>
             <p:spPr>
               <a:xfrm>
-                <a:off x="335512" y="1672187"/>
-                <a:ext cx="854721" cy="461665"/>
+                <a:off x="335511" y="1672186"/>
+                <a:ext cx="958903" cy="513723"/>
               </a:xfrm>
               <a:prstGeom prst="rect">
                 <a:avLst/>
@@ -26345,7 +26349,7 @@
               <a:lstStyle/>
               <a:p>
                 <a:r>
-                  <a:rPr lang="en-US" sz="2400" b="1" dirty="0"/>
+                  <a:rPr lang="en-US" sz="1533" b="1" dirty="0"/>
                   <a:t>Glass</a:t>
                 </a:r>
               </a:p>
@@ -26359,8 +26363,8 @@
             </p:nvSpPr>
             <p:spPr>
               <a:xfrm>
-                <a:off x="270205" y="3152733"/>
-                <a:ext cx="985334" cy="461665"/>
+                <a:off x="270205" y="3152732"/>
+                <a:ext cx="1088965" cy="513723"/>
               </a:xfrm>
               <a:prstGeom prst="rect">
                 <a:avLst/>
@@ -26374,7 +26378,7 @@
               <a:lstStyle/>
               <a:p>
                 <a:r>
-                  <a:rPr lang="en-US" sz="2400" b="1" dirty="0"/>
+                  <a:rPr lang="en-US" sz="1533" b="1" dirty="0"/>
                   <a:t>PFOTS</a:t>
                 </a:r>
               </a:p>
@@ -26459,7 +26463,7 @@
             <p:spPr>
               <a:xfrm>
                 <a:off x="3496235" y="2125537"/>
-                <a:ext cx="2350323" cy="400110"/>
+                <a:ext cx="2461734" cy="452306"/>
               </a:xfrm>
               <a:prstGeom prst="rect">
                 <a:avLst/>
@@ -26473,54 +26477,50 @@
               <a:lstStyle/>
               <a:p>
                 <a:r>
-                  <a:rPr lang="el-GR" sz="2000" dirty="0"/>
+                  <a:rPr lang="el-GR" sz="1278" dirty="0"/>
                   <a:t>γ</a:t>
                 </a:r>
                 <a:r>
-                  <a:rPr lang="en-IN" sz="2000" dirty="0"/>
+                  <a:rPr lang="en-IN" sz="1278" dirty="0"/>
                   <a:t> = </a:t>
                 </a:r>
                 <a:r>
-                  <a:rPr lang="en-IN" sz="2000" dirty="0" smtClean="0"/>
+                  <a:rPr lang="en-IN" sz="1278" dirty="0"/>
                   <a:t>24 </a:t>
                 </a:r>
                 <a:r>
-                  <a:rPr lang="en-IN" sz="2000" dirty="0" err="1" smtClean="0"/>
+                  <a:rPr lang="en-IN" sz="1278" dirty="0" err="1"/>
                   <a:t>mN</a:t>
                 </a:r>
                 <a:r>
-                  <a:rPr lang="en-IN" sz="2000" dirty="0" smtClean="0"/>
+                  <a:rPr lang="en-IN" sz="1278" dirty="0"/>
+                  <a:t> m</a:t>
+                </a:r>
+                <a:r>
+                  <a:rPr lang="en-IN" sz="1278" baseline="30000" dirty="0"/>
+                  <a:t>-1</a:t>
+                </a:r>
+                <a:r>
+                  <a:rPr lang="en-IN" sz="1278" dirty="0"/>
+                  <a:t>, </a:t>
+                </a:r>
+                <a:r>
+                  <a:rPr lang="el-GR" sz="1278" dirty="0"/>
+                  <a:t>θ</a:t>
+                </a:r>
+                <a:r>
+                  <a:rPr lang="en-US" sz="1278" dirty="0"/>
                   <a:t> </a:t>
                 </a:r>
                 <a:r>
-                  <a:rPr lang="en-IN" sz="2000" dirty="0" smtClean="0"/>
-                  <a:t>m</a:t>
-                </a:r>
-                <a:r>
-                  <a:rPr lang="en-IN" sz="2000" baseline="30000" dirty="0" smtClean="0"/>
-                  <a:t>-1</a:t>
-                </a:r>
-                <a:r>
-                  <a:rPr lang="en-IN" sz="2000" dirty="0" smtClean="0"/>
-                  <a:t>, </a:t>
-                </a:r>
-                <a:r>
-                  <a:rPr lang="el-GR" sz="2000" dirty="0" smtClean="0"/>
-                  <a:t>θ</a:t>
-                </a:r>
-                <a:r>
-                  <a:rPr lang="en-US" sz="2000" dirty="0" smtClean="0"/>
-                  <a:t> </a:t>
-                </a:r>
-                <a:r>
-                  <a:rPr lang="en-US" sz="2000" dirty="0"/>
+                  <a:rPr lang="en-US" sz="1278" dirty="0"/>
                   <a:t>= 6</a:t>
                 </a:r>
                 <a:r>
-                  <a:rPr lang="aa-ET" sz="2000" dirty="0"/>
+                  <a:rPr lang="aa-ET" sz="1278" dirty="0"/>
                   <a:t>°</a:t>
                 </a:r>
-                <a:endParaRPr lang="en-US" sz="2000" dirty="0"/>
+                <a:endParaRPr lang="en-US" sz="1278" dirty="0"/>
               </a:p>
             </p:txBody>
           </p:sp>
@@ -26532,8 +26532,8 @@
             </p:nvSpPr>
             <p:spPr>
               <a:xfrm>
-                <a:off x="8630271" y="3591765"/>
-                <a:ext cx="2350323" cy="400110"/>
+                <a:off x="8630270" y="3591764"/>
+                <a:ext cx="2461734" cy="452306"/>
               </a:xfrm>
               <a:prstGeom prst="rect">
                 <a:avLst/>
@@ -26547,50 +26547,50 @@
               <a:lstStyle/>
               <a:p>
                 <a:r>
-                  <a:rPr lang="el-GR" sz="2000" dirty="0"/>
+                  <a:rPr lang="el-GR" sz="1278" dirty="0"/>
                   <a:t>γ</a:t>
                 </a:r>
                 <a:r>
-                  <a:rPr lang="en-IN" sz="2000" dirty="0"/>
+                  <a:rPr lang="en-IN" sz="1278" dirty="0"/>
                   <a:t> = 48 </a:t>
                 </a:r>
                 <a:r>
-                  <a:rPr lang="en-IN" sz="2000" dirty="0" err="1"/>
+                  <a:rPr lang="en-IN" sz="1278" dirty="0" err="1"/>
                   <a:t>mN</a:t>
                 </a:r>
                 <a:r>
-                  <a:rPr lang="en-IN" sz="2000" dirty="0"/>
+                  <a:rPr lang="en-IN" sz="1278" dirty="0"/>
                   <a:t> m</a:t>
                 </a:r>
                 <a:r>
-                  <a:rPr lang="en-IN" sz="2000" baseline="30000" dirty="0"/>
+                  <a:rPr lang="en-IN" sz="1278" baseline="30000" dirty="0"/>
                   <a:t>-1</a:t>
                 </a:r>
                 <a:r>
-                  <a:rPr lang="en-IN" sz="2000" dirty="0" smtClean="0"/>
+                  <a:rPr lang="en-IN" sz="1278" dirty="0"/>
                   <a:t>, </a:t>
                 </a:r>
                 <a:r>
-                  <a:rPr lang="el-GR" sz="2000" dirty="0" smtClean="0"/>
+                  <a:rPr lang="el-GR" sz="1278" dirty="0"/>
                   <a:t>θ</a:t>
                 </a:r>
                 <a:r>
-                  <a:rPr lang="en-US" sz="2000" dirty="0" smtClean="0"/>
+                  <a:rPr lang="en-US" sz="1278" dirty="0"/>
                   <a:t> </a:t>
                 </a:r>
                 <a:r>
-                  <a:rPr lang="en-US" sz="2000" dirty="0"/>
+                  <a:rPr lang="en-US" sz="1278" dirty="0"/>
                   <a:t>= </a:t>
                 </a:r>
                 <a:r>
-                  <a:rPr lang="en-US" sz="2000" dirty="0" smtClean="0"/>
+                  <a:rPr lang="en-US" sz="1278" dirty="0"/>
                   <a:t>1</a:t>
                 </a:r>
                 <a:r>
-                  <a:rPr lang="aa-ET" sz="2000" dirty="0" smtClean="0"/>
+                  <a:rPr lang="aa-ET" sz="1278" dirty="0"/>
                   <a:t>°</a:t>
                 </a:r>
-                <a:endParaRPr lang="en-US" sz="2000" dirty="0"/>
+                <a:endParaRPr lang="en-US" sz="1278" dirty="0"/>
               </a:p>
             </p:txBody>
           </p:sp>
@@ -26602,8 +26602,8 @@
             </p:nvSpPr>
             <p:spPr>
               <a:xfrm>
-                <a:off x="3496235" y="3591765"/>
-                <a:ext cx="2464056" cy="400110"/>
+                <a:off x="3496235" y="3591766"/>
+                <a:ext cx="2574894" cy="452306"/>
               </a:xfrm>
               <a:prstGeom prst="rect">
                 <a:avLst/>
@@ -26617,50 +26617,50 @@
               <a:lstStyle/>
               <a:p>
                 <a:r>
-                  <a:rPr lang="el-GR" sz="2000" dirty="0" smtClean="0"/>
+                  <a:rPr lang="el-GR" sz="1278" dirty="0"/>
                   <a:t>γ</a:t>
                 </a:r>
                 <a:r>
-                  <a:rPr lang="en-IN" sz="2000" dirty="0" smtClean="0"/>
+                  <a:rPr lang="en-IN" sz="1278" dirty="0"/>
                   <a:t> = 24 </a:t>
                 </a:r>
                 <a:r>
-                  <a:rPr lang="en-IN" sz="2000" dirty="0" err="1" smtClean="0"/>
+                  <a:rPr lang="en-IN" sz="1278" dirty="0" err="1"/>
                   <a:t>mN</a:t>
                 </a:r>
                 <a:r>
-                  <a:rPr lang="en-IN" sz="2000" dirty="0"/>
+                  <a:rPr lang="en-IN" sz="1278" dirty="0"/>
                   <a:t> m</a:t>
                 </a:r>
                 <a:r>
-                  <a:rPr lang="en-IN" sz="2000" baseline="30000" dirty="0"/>
+                  <a:rPr lang="en-IN" sz="1278" baseline="30000" dirty="0"/>
                   <a:t>-1</a:t>
                 </a:r>
                 <a:r>
-                  <a:rPr lang="en-IN" sz="2000" dirty="0" smtClean="0"/>
+                  <a:rPr lang="en-IN" sz="1278" dirty="0"/>
                   <a:t>, </a:t>
                 </a:r>
                 <a:r>
-                  <a:rPr lang="el-GR" sz="2000" dirty="0" smtClean="0"/>
+                  <a:rPr lang="el-GR" sz="1278" dirty="0"/>
                   <a:t>θ</a:t>
                 </a:r>
                 <a:r>
-                  <a:rPr lang="en-US" sz="2000" dirty="0" smtClean="0"/>
+                  <a:rPr lang="en-US" sz="1278" dirty="0"/>
                   <a:t> </a:t>
                 </a:r>
                 <a:r>
-                  <a:rPr lang="en-US" sz="2000" dirty="0"/>
+                  <a:rPr lang="en-US" sz="1278" dirty="0"/>
                   <a:t>= </a:t>
                 </a:r>
                 <a:r>
-                  <a:rPr lang="en-US" sz="2000" dirty="0" smtClean="0"/>
+                  <a:rPr lang="en-US" sz="1278" dirty="0"/>
                   <a:t>50</a:t>
                 </a:r>
                 <a:r>
-                  <a:rPr lang="aa-ET" sz="2000" dirty="0" smtClean="0"/>
+                  <a:rPr lang="aa-ET" sz="1278" dirty="0"/>
                   <a:t>°</a:t>
                 </a:r>
-                <a:endParaRPr lang="en-US" sz="2000" dirty="0"/>
+                <a:endParaRPr lang="en-US" sz="1278" dirty="0"/>
               </a:p>
             </p:txBody>
           </p:sp>
@@ -26672,8 +26672,8 @@
             </p:nvSpPr>
             <p:spPr>
               <a:xfrm>
-                <a:off x="8593835" y="2088104"/>
-                <a:ext cx="2610010" cy="400110"/>
+                <a:off x="8593834" y="2088104"/>
+                <a:ext cx="2722661" cy="452306"/>
               </a:xfrm>
               <a:prstGeom prst="rect">
                 <a:avLst/>
@@ -26687,54 +26687,54 @@
               <a:lstStyle/>
               <a:p>
                 <a:r>
-                  <a:rPr lang="el-GR" sz="2000" dirty="0"/>
+                  <a:rPr lang="el-GR" sz="1278" dirty="0"/>
                   <a:t>γ</a:t>
                 </a:r>
                 <a:r>
-                  <a:rPr lang="en-IN" sz="2000" dirty="0"/>
+                  <a:rPr lang="en-IN" sz="1278" dirty="0"/>
                   <a:t> = </a:t>
                 </a:r>
                 <a:r>
-                  <a:rPr lang="en-IN" sz="2000" dirty="0" smtClean="0"/>
+                  <a:rPr lang="en-IN" sz="1278" dirty="0"/>
                   <a:t>48 </a:t>
                 </a:r>
                 <a:r>
-                  <a:rPr lang="en-IN" sz="2000" dirty="0" err="1"/>
+                  <a:rPr lang="en-IN" sz="1278" dirty="0" err="1"/>
                   <a:t>mN</a:t>
                 </a:r>
                 <a:r>
-                  <a:rPr lang="en-IN" sz="2000" dirty="0"/>
+                  <a:rPr lang="en-IN" sz="1278" dirty="0"/>
                   <a:t> m</a:t>
                 </a:r>
                 <a:r>
-                  <a:rPr lang="en-IN" sz="2000" baseline="30000" dirty="0"/>
+                  <a:rPr lang="en-IN" sz="1278" baseline="30000" dirty="0"/>
                   <a:t>-1</a:t>
                 </a:r>
                 <a:r>
-                  <a:rPr lang="en-IN" sz="2000" dirty="0" smtClean="0"/>
+                  <a:rPr lang="en-IN" sz="1278" dirty="0"/>
                   <a:t>, </a:t>
                 </a:r>
                 <a:r>
-                  <a:rPr lang="el-GR" sz="2000" dirty="0" smtClean="0"/>
+                  <a:rPr lang="el-GR" sz="1278" dirty="0"/>
                   <a:t>θ</a:t>
                 </a:r>
                 <a:r>
-                  <a:rPr lang="en-US" sz="2000" dirty="0" smtClean="0"/>
+                  <a:rPr lang="en-US" sz="1278" dirty="0"/>
                   <a:t> </a:t>
                 </a:r>
                 <a:r>
-                  <a:rPr lang="en-US" sz="2000" dirty="0"/>
+                  <a:rPr lang="en-US" sz="1278" dirty="0"/>
                   <a:t>= </a:t>
                 </a:r>
                 <a:r>
-                  <a:rPr lang="en-US" sz="2000" dirty="0" smtClean="0"/>
+                  <a:rPr lang="en-US" sz="1278" dirty="0"/>
                   <a:t>150</a:t>
                 </a:r>
                 <a:r>
-                  <a:rPr lang="aa-ET" sz="2000" dirty="0" smtClean="0"/>
+                  <a:rPr lang="aa-ET" sz="1278" dirty="0"/>
                   <a:t>°</a:t>
                 </a:r>
-                <a:endParaRPr lang="en-US" sz="2000" dirty="0"/>
+                <a:endParaRPr lang="en-US" sz="1278" dirty="0"/>
               </a:p>
             </p:txBody>
           </p:sp>
@@ -26748,7 +26748,7 @@
           <p:spPr>
             <a:xfrm>
               <a:off x="3028917" y="1439653"/>
-              <a:ext cx="1699504" cy="400110"/>
+              <a:ext cx="1799385" cy="452306"/>
             </a:xfrm>
             <a:prstGeom prst="rect">
               <a:avLst/>
@@ -26762,14 +26762,14 @@
             <a:lstStyle/>
             <a:p>
               <a:r>
-                <a:rPr lang="en-IN" sz="2000" b="1" dirty="0" smtClean="0">
+                <a:rPr lang="en-IN" sz="1278" b="1" dirty="0">
                   <a:solidFill>
                     <a:schemeClr val="bg1"/>
                   </a:solidFill>
                 </a:rPr>
                 <a:t>High adhesion</a:t>
               </a:r>
-              <a:endParaRPr lang="en-US" sz="2000" b="1" dirty="0">
+              <a:endParaRPr lang="en-US" sz="1278" b="1" dirty="0">
                 <a:solidFill>
                   <a:schemeClr val="bg1"/>
                 </a:solidFill>
@@ -26786,7 +26786,7 @@
           <p:spPr>
             <a:xfrm>
               <a:off x="3028917" y="2893884"/>
-              <a:ext cx="1699504" cy="400110"/>
+              <a:ext cx="1799385" cy="452306"/>
             </a:xfrm>
             <a:prstGeom prst="rect">
               <a:avLst/>
@@ -26800,14 +26800,14 @@
             <a:lstStyle/>
             <a:p>
               <a:r>
-                <a:rPr lang="en-IN" sz="2000" b="1" dirty="0" smtClean="0">
+                <a:rPr lang="en-IN" sz="1278" b="1" dirty="0">
                   <a:solidFill>
                     <a:schemeClr val="bg1"/>
                   </a:solidFill>
                 </a:rPr>
                 <a:t>High adhesion</a:t>
               </a:r>
-              <a:endParaRPr lang="en-US" sz="2000" b="1" dirty="0">
+              <a:endParaRPr lang="en-US" sz="1278" b="1" dirty="0">
                 <a:solidFill>
                   <a:schemeClr val="bg1"/>
                 </a:solidFill>
@@ -26824,7 +26824,7 @@
           <p:spPr>
             <a:xfrm>
               <a:off x="8205497" y="2893884"/>
-              <a:ext cx="1920719" cy="400110"/>
+              <a:ext cx="2017659" cy="452306"/>
             </a:xfrm>
             <a:prstGeom prst="rect">
               <a:avLst/>
@@ -26838,14 +26838,14 @@
             <a:lstStyle/>
             <a:p>
               <a:r>
-                <a:rPr lang="en-IN" sz="2000" b="1" dirty="0" smtClean="0">
+                <a:rPr lang="en-IN" sz="1278" b="1" dirty="0">
                   <a:solidFill>
                     <a:schemeClr val="bg1"/>
                   </a:solidFill>
                 </a:rPr>
                 <a:t>Higher adhesion</a:t>
               </a:r>
-              <a:endParaRPr lang="en-US" sz="2000" b="1" dirty="0">
+              <a:endParaRPr lang="en-US" sz="1278" b="1" dirty="0">
                 <a:solidFill>
                   <a:schemeClr val="bg1"/>
                 </a:solidFill>
@@ -26862,7 +26862,7 @@
           <p:spPr>
             <a:xfrm>
               <a:off x="8339605" y="1439653"/>
-              <a:ext cx="1652504" cy="400110"/>
+              <a:ext cx="1753724" cy="452306"/>
             </a:xfrm>
             <a:prstGeom prst="rect">
               <a:avLst/>
@@ -26876,14 +26876,14 @@
             <a:lstStyle/>
             <a:p>
               <a:r>
-                <a:rPr lang="en-IN" sz="2000" b="1" dirty="0" smtClean="0">
+                <a:rPr lang="en-IN" sz="1278" b="1" dirty="0">
                   <a:solidFill>
                     <a:schemeClr val="bg1"/>
                   </a:solidFill>
                 </a:rPr>
                 <a:t>Low adhesion</a:t>
               </a:r>
-              <a:endParaRPr lang="en-US" sz="2000" b="1" dirty="0">
+              <a:endParaRPr lang="en-US" sz="1278" b="1" dirty="0">
                 <a:solidFill>
                   <a:schemeClr val="bg1"/>
                 </a:solidFill>
@@ -26930,8 +26930,8 @@
         </p:nvSpPr>
         <p:spPr>
           <a:xfrm>
-            <a:off x="4203032" y="312821"/>
-            <a:ext cx="700833" cy="369332"/>
+            <a:off x="2390189" y="-835307"/>
+            <a:ext cx="513282" cy="269304"/>
           </a:xfrm>
           <a:prstGeom prst="rect">
             <a:avLst/>
@@ -26945,14 +26945,14 @@
           <a:lstStyle/>
           <a:p>
             <a:r>
-              <a:rPr lang="en-US" dirty="0" smtClean="0"/>
+              <a:rPr lang="en-US" sz="1150" dirty="0"/>
               <a:t>6 </a:t>
             </a:r>
             <a:r>
-              <a:rPr lang="en-US" dirty="0" err="1" smtClean="0"/>
+              <a:rPr lang="en-US" sz="1150" dirty="0" err="1"/>
               <a:t>deg</a:t>
             </a:r>
-            <a:endParaRPr lang="en-US" dirty="0"/>
+            <a:endParaRPr lang="en-US" sz="1150" dirty="0"/>
           </a:p>
         </p:txBody>
       </p:sp>
@@ -26989,8 +26989,8 @@
         </p:blipFill>
         <p:spPr>
           <a:xfrm>
-            <a:off x="1075645" y="152402"/>
-            <a:ext cx="2589041" cy="1800000"/>
+            <a:off x="392020" y="-937804"/>
+            <a:ext cx="1654206" cy="1150067"/>
           </a:xfrm>
           <a:prstGeom prst="rect">
             <a:avLst/>
@@ -27030,8 +27030,8 @@
         </p:blipFill>
         <p:spPr>
           <a:xfrm>
-            <a:off x="533400" y="1128602"/>
-            <a:ext cx="9864247" cy="6858000"/>
+            <a:off x="45567" y="-314084"/>
+            <a:ext cx="6302525" cy="4381755"/>
           </a:xfrm>
           <a:prstGeom prst="rect">
             <a:avLst/>
@@ -27101,8 +27101,8 @@
         </p:blipFill>
         <p:spPr>
           <a:xfrm>
-            <a:off x="1051581" y="770022"/>
-            <a:ext cx="2589041" cy="1800000"/>
+            <a:off x="376645" y="-543190"/>
+            <a:ext cx="1654206" cy="1150067"/>
           </a:xfrm>
           <a:prstGeom prst="rect">
             <a:avLst/>
@@ -27117,8 +27117,8 @@
         </p:nvSpPr>
         <p:spPr>
           <a:xfrm>
-            <a:off x="4203032" y="312821"/>
-            <a:ext cx="817853" cy="369332"/>
+            <a:off x="2390191" y="-835307"/>
+            <a:ext cx="588623" cy="269304"/>
           </a:xfrm>
           <a:prstGeom prst="rect">
             <a:avLst/>
@@ -27132,14 +27132,14 @@
           <a:lstStyle/>
           <a:p>
             <a:r>
-              <a:rPr lang="en-US" dirty="0" smtClean="0"/>
+              <a:rPr lang="en-US" sz="1150" dirty="0"/>
               <a:t>50 </a:t>
             </a:r>
             <a:r>
-              <a:rPr lang="en-US" dirty="0" err="1" smtClean="0"/>
+              <a:rPr lang="en-US" sz="1150" dirty="0" err="1"/>
               <a:t>deg</a:t>
             </a:r>
-            <a:endParaRPr lang="en-US" dirty="0"/>
+            <a:endParaRPr lang="en-US" sz="1150" dirty="0"/>
           </a:p>
         </p:txBody>
       </p:sp>
@@ -27176,8 +27176,8 @@
         </p:blipFill>
         <p:spPr>
           <a:xfrm>
-            <a:off x="2663812" y="978569"/>
-            <a:ext cx="9864247" cy="6858000"/>
+            <a:off x="1406743" y="-409944"/>
+            <a:ext cx="6302525" cy="4381755"/>
           </a:xfrm>
           <a:prstGeom prst="rect">
             <a:avLst/>
@@ -27247,8 +27247,8 @@
         </p:blipFill>
         <p:spPr>
           <a:xfrm>
-            <a:off x="891161" y="826168"/>
-            <a:ext cx="2589041" cy="1800000"/>
+            <a:off x="274148" y="-507317"/>
+            <a:ext cx="1654206" cy="1150067"/>
           </a:xfrm>
           <a:prstGeom prst="rect">
             <a:avLst/>
@@ -27263,8 +27263,8 @@
         </p:nvSpPr>
         <p:spPr>
           <a:xfrm>
-            <a:off x="4203032" y="312821"/>
-            <a:ext cx="934871" cy="369332"/>
+            <a:off x="2390190" y="-835307"/>
+            <a:ext cx="663964" cy="269304"/>
           </a:xfrm>
           <a:prstGeom prst="rect">
             <a:avLst/>
@@ -27278,14 +27278,14 @@
           <a:lstStyle/>
           <a:p>
             <a:r>
-              <a:rPr lang="en-US" dirty="0" smtClean="0"/>
+              <a:rPr lang="en-US" sz="1150" dirty="0"/>
               <a:t>150 </a:t>
             </a:r>
             <a:r>
-              <a:rPr lang="en-US" dirty="0" err="1" smtClean="0"/>
+              <a:rPr lang="en-US" sz="1150" dirty="0" err="1"/>
               <a:t>deg</a:t>
             </a:r>
-            <a:endParaRPr lang="en-US" dirty="0"/>
+            <a:endParaRPr lang="en-US" sz="1150" dirty="0"/>
           </a:p>
         </p:txBody>
       </p:sp>
@@ -27322,8 +27322,8 @@
         </p:blipFill>
         <p:spPr>
           <a:xfrm>
-            <a:off x="810949" y="0"/>
-            <a:ext cx="9864247" cy="6858000"/>
+            <a:off x="222901" y="-1035177"/>
+            <a:ext cx="6302525" cy="4381755"/>
           </a:xfrm>
           <a:prstGeom prst="rect">
             <a:avLst/>
@@ -27368,8 +27368,8 @@
         </p:nvSpPr>
         <p:spPr>
           <a:xfrm>
-            <a:off x="4523874" y="184484"/>
-            <a:ext cx="700833" cy="369332"/>
+            <a:off x="2595183" y="-917306"/>
+            <a:ext cx="513282" cy="269304"/>
           </a:xfrm>
           <a:prstGeom prst="rect">
             <a:avLst/>
@@ -27383,14 +27383,14 @@
           <a:lstStyle/>
           <a:p>
             <a:r>
-              <a:rPr lang="en-US" dirty="0" smtClean="0"/>
+              <a:rPr lang="en-US" sz="1150" dirty="0"/>
               <a:t>1 </a:t>
             </a:r>
             <a:r>
-              <a:rPr lang="en-US" dirty="0" err="1" smtClean="0"/>
+              <a:rPr lang="en-US" sz="1150" dirty="0" err="1"/>
               <a:t>deg</a:t>
             </a:r>
-            <a:endParaRPr lang="en-US" dirty="0"/>
+            <a:endParaRPr lang="en-US" sz="1150" dirty="0"/>
           </a:p>
         </p:txBody>
       </p:sp>
@@ -27427,8 +27427,8 @@
         </p:blipFill>
         <p:spPr>
           <a:xfrm>
-            <a:off x="1500760" y="617803"/>
-            <a:ext cx="9864247" cy="6858000"/>
+            <a:off x="663639" y="-640447"/>
+            <a:ext cx="6302525" cy="4381755"/>
           </a:xfrm>
           <a:prstGeom prst="rect">
             <a:avLst/>
@@ -27451,7 +27451,7 @@
 <file path=ppt/theme/theme1.xml><?xml version="1.0" encoding="utf-8"?>
 <a:theme xmlns:a="http://schemas.openxmlformats.org/drawingml/2006/main" name="Office Theme">
   <a:themeElements>
-    <a:clrScheme name="Office">
+    <a:clrScheme name="Office Theme">
       <a:dk1>
         <a:sysClr val="windowText" lastClr="000000"/>
       </a:dk1>
@@ -27489,7 +27489,7 @@
         <a:srgbClr val="954F72"/>
       </a:folHlink>
     </a:clrScheme>
-    <a:fontScheme name="Office">
+    <a:fontScheme name="Office Theme">
       <a:majorFont>
         <a:latin typeface="Calibri Light" panose="020F0302020204030204"/>
         <a:ea typeface=""/>
@@ -27561,7 +27561,7 @@
         <a:font script="Geor" typeface="Sylfaen"/>
       </a:minorFont>
     </a:fontScheme>
-    <a:fmtScheme name="Office">
+    <a:fmtScheme name="Office Theme">
       <a:fillStyleLst>
         <a:solidFill>
           <a:schemeClr val="phClr"/>

</xml_diff>

<commit_message>
sensitivity analysis and LMM analysis done
figures updated
</commit_message>
<xml_diff>
--- a/Data/schematics.pptx
+++ b/Data/schematics.pptx
@@ -248,7 +248,7 @@
           <a:p>
             <a:fld id="{498A6A98-93B9-470F-BB23-351240910FD2}" type="datetimeFigureOut">
               <a:rPr lang="en-US" smtClean="0"/>
-              <a:t>5/10/2021</a:t>
+              <a:t>8/2/2021</a:t>
             </a:fld>
             <a:endParaRPr lang="en-US"/>
           </a:p>
@@ -418,7 +418,7 @@
           <a:p>
             <a:fld id="{498A6A98-93B9-470F-BB23-351240910FD2}" type="datetimeFigureOut">
               <a:rPr lang="en-US" smtClean="0"/>
-              <a:t>5/10/2021</a:t>
+              <a:t>8/2/2021</a:t>
             </a:fld>
             <a:endParaRPr lang="en-US"/>
           </a:p>
@@ -598,7 +598,7 @@
           <a:p>
             <a:fld id="{498A6A98-93B9-470F-BB23-351240910FD2}" type="datetimeFigureOut">
               <a:rPr lang="en-US" smtClean="0"/>
-              <a:t>5/10/2021</a:t>
+              <a:t>8/2/2021</a:t>
             </a:fld>
             <a:endParaRPr lang="en-US"/>
           </a:p>
@@ -768,7 +768,7 @@
           <a:p>
             <a:fld id="{498A6A98-93B9-470F-BB23-351240910FD2}" type="datetimeFigureOut">
               <a:rPr lang="en-US" smtClean="0"/>
-              <a:t>5/10/2021</a:t>
+              <a:t>8/2/2021</a:t>
             </a:fld>
             <a:endParaRPr lang="en-US"/>
           </a:p>
@@ -1014,7 +1014,7 @@
           <a:p>
             <a:fld id="{498A6A98-93B9-470F-BB23-351240910FD2}" type="datetimeFigureOut">
               <a:rPr lang="en-US" smtClean="0"/>
-              <a:t>5/10/2021</a:t>
+              <a:t>8/2/2021</a:t>
             </a:fld>
             <a:endParaRPr lang="en-US"/>
           </a:p>
@@ -1246,7 +1246,7 @@
           <a:p>
             <a:fld id="{498A6A98-93B9-470F-BB23-351240910FD2}" type="datetimeFigureOut">
               <a:rPr lang="en-US" smtClean="0"/>
-              <a:t>5/10/2021</a:t>
+              <a:t>8/2/2021</a:t>
             </a:fld>
             <a:endParaRPr lang="en-US"/>
           </a:p>
@@ -1613,7 +1613,7 @@
           <a:p>
             <a:fld id="{498A6A98-93B9-470F-BB23-351240910FD2}" type="datetimeFigureOut">
               <a:rPr lang="en-US" smtClean="0"/>
-              <a:t>5/10/2021</a:t>
+              <a:t>8/2/2021</a:t>
             </a:fld>
             <a:endParaRPr lang="en-US"/>
           </a:p>
@@ -1731,7 +1731,7 @@
           <a:p>
             <a:fld id="{498A6A98-93B9-470F-BB23-351240910FD2}" type="datetimeFigureOut">
               <a:rPr lang="en-US" smtClean="0"/>
-              <a:t>5/10/2021</a:t>
+              <a:t>8/2/2021</a:t>
             </a:fld>
             <a:endParaRPr lang="en-US"/>
           </a:p>
@@ -1826,7 +1826,7 @@
           <a:p>
             <a:fld id="{498A6A98-93B9-470F-BB23-351240910FD2}" type="datetimeFigureOut">
               <a:rPr lang="en-US" smtClean="0"/>
-              <a:t>5/10/2021</a:t>
+              <a:t>8/2/2021</a:t>
             </a:fld>
             <a:endParaRPr lang="en-US"/>
           </a:p>
@@ -2103,7 +2103,7 @@
           <a:p>
             <a:fld id="{498A6A98-93B9-470F-BB23-351240910FD2}" type="datetimeFigureOut">
               <a:rPr lang="en-US" smtClean="0"/>
-              <a:t>5/10/2021</a:t>
+              <a:t>8/2/2021</a:t>
             </a:fld>
             <a:endParaRPr lang="en-US"/>
           </a:p>
@@ -2360,7 +2360,7 @@
           <a:p>
             <a:fld id="{498A6A98-93B9-470F-BB23-351240910FD2}" type="datetimeFigureOut">
               <a:rPr lang="en-US" smtClean="0"/>
-              <a:t>5/10/2021</a:t>
+              <a:t>8/2/2021</a:t>
             </a:fld>
             <a:endParaRPr lang="en-US"/>
           </a:p>
@@ -2573,7 +2573,7 @@
           <a:p>
             <a:fld id="{498A6A98-93B9-470F-BB23-351240910FD2}" type="datetimeFigureOut">
               <a:rPr lang="en-US" smtClean="0"/>
-              <a:t>5/10/2021</a:t>
+              <a:t>8/2/2021</a:t>
             </a:fld>
             <a:endParaRPr lang="en-US"/>
           </a:p>
@@ -3032,7 +3032,6 @@
                   <a:rPr lang="en-US" sz="1533" b="1" dirty="0"/>
                   <a:t>Underwater: Bubble</a:t>
                 </a:r>
-                <a:endParaRPr lang="en-US" sz="1533" b="1" dirty="0"/>
               </a:p>
             </p:txBody>
           </p:sp>
@@ -4243,15 +4242,7 @@
                           <a:srgbClr val="002060"/>
                         </a:solidFill>
                       </a:rPr>
-                      <a:t>“Oil-like </a:t>
-                    </a:r>
-                    <a:r>
-                      <a:rPr lang="en-US" sz="1278" b="1" dirty="0">
-                        <a:solidFill>
-                          <a:srgbClr val="002060"/>
-                        </a:solidFill>
-                      </a:rPr>
-                      <a:t>Fluid”</a:t>
+                      <a:t>“Oil-like Fluid”</a:t>
                     </a:r>
                   </a:p>
                 </p:txBody>
@@ -4507,7 +4498,6 @@
                     <a:rPr lang="en-US" sz="1022" baseline="-25000" dirty="0"/>
                     <a:t>h</a:t>
                   </a:r>
-                  <a:endParaRPr lang="en-US" sz="1022" baseline="-25000" dirty="0"/>
                 </a:p>
               </p:txBody>
             </p:sp>
@@ -11822,7 +11812,6 @@
                       <a:rPr lang="en-US" sz="1278" dirty="0"/>
                       <a:t>Hairs</a:t>
                     </a:r>
-                    <a:endParaRPr lang="en-US" sz="1278" dirty="0"/>
                   </a:p>
                 </p:txBody>
               </p:sp>
@@ -11891,7 +11880,6 @@
                     <a:rPr lang="en-US" sz="1533" b="1" dirty="0"/>
                     <a:t>Air</a:t>
                   </a:r>
-                  <a:endParaRPr lang="en-US" sz="1533" b="1" dirty="0"/>
                 </a:p>
               </p:txBody>
             </p:sp>
@@ -11957,7 +11945,6 @@
                     <a:rPr lang="en-US" sz="1278" dirty="0"/>
                     <a:t>Air</a:t>
                   </a:r>
-                  <a:endParaRPr lang="en-US" sz="1278" dirty="0"/>
                 </a:p>
               </p:txBody>
             </p:sp>
@@ -19412,7 +19399,6 @@
                     <a:rPr lang="en-US" sz="1533" b="1" dirty="0"/>
                     <a:t>Underwater: Wet</a:t>
                   </a:r>
-                  <a:endParaRPr lang="en-US" sz="1533" b="1" dirty="0"/>
                 </a:p>
               </p:txBody>
             </p:sp>
@@ -19478,7 +19464,6 @@
                     <a:rPr lang="en-US" sz="1278" dirty="0"/>
                     <a:t>Water</a:t>
                   </a:r>
-                  <a:endParaRPr lang="en-US" sz="1278" dirty="0"/>
                 </a:p>
               </p:txBody>
             </p:sp>
@@ -26019,7 +26004,6 @@
                 <a:rPr lang="en-US" sz="1150" dirty="0"/>
                 <a:t>Pad</a:t>
               </a:r>
-              <a:endParaRPr lang="en-US" sz="1150" dirty="0"/>
             </a:p>
           </p:txBody>
         </p:sp>
@@ -26054,844 +26038,804 @@
           <a:chExt cx="0" cy="0"/>
         </a:xfrm>
       </p:grpSpPr>
-      <p:grpSp>
-        <p:nvGrpSpPr>
-          <p:cNvPr id="3" name="Group 2"/>
-          <p:cNvGrpSpPr/>
+      <p:pic>
+        <p:nvPicPr>
+          <p:cNvPr id="28" name="Picture 27"/>
+          <p:cNvPicPr>
+            <a:picLocks noChangeAspect="1"/>
+          </p:cNvPicPr>
           <p:nvPr/>
-        </p:nvGrpSpPr>
-        <p:grpSpPr>
+        </p:nvPicPr>
+        <p:blipFill rotWithShape="1">
+          <a:blip r:embed="rId2">
+            <a:extLst>
+              <a:ext uri="{BEBA8EAE-BF5A-486C-A8C5-ECC9F3942E4B}">
+                <a14:imgProps xmlns:a14="http://schemas.microsoft.com/office/drawing/2010/main">
+                  <a14:imgLayer r:embed="rId3">
+                    <a14:imgEffect>
+                      <a14:backgroundRemoval t="0" b="90000" l="9524" r="90000">
+                        <a14:backgroundMark x1="13238" y1="16986" x2="13238" y2="16986"/>
+                      </a14:backgroundRemoval>
+                    </a14:imgEffect>
+                  </a14:imgLayer>
+                </a14:imgProps>
+              </a:ext>
+              <a:ext uri="{28A0092B-C50C-407E-A947-70E740481C1C}">
+                <a14:useLocalDpi xmlns:a14="http://schemas.microsoft.com/office/drawing/2010/main" val="0"/>
+              </a:ext>
+            </a:extLst>
+          </a:blip>
+          <a:srcRect l="14547" t="29410" r="14547" b="45392"/>
+          <a:stretch/>
+        </p:blipFill>
+        <p:spPr>
           <a:xfrm>
-            <a:off x="-65801" y="38"/>
-            <a:ext cx="7191027" cy="2114706"/>
-            <a:chOff x="270205" y="734290"/>
-            <a:chExt cx="11254865" cy="3309782"/>
+            <a:off x="3868236" y="1279210"/>
+            <a:ext cx="3256990" cy="805047"/>
           </a:xfrm>
-        </p:grpSpPr>
-        <p:grpSp>
-          <p:nvGrpSpPr>
-            <p:cNvPr id="27" name="Group 26"/>
-            <p:cNvGrpSpPr/>
-            <p:nvPr/>
-          </p:nvGrpSpPr>
-          <p:grpSpPr>
-            <a:xfrm>
-              <a:off x="270205" y="734290"/>
-              <a:ext cx="11254865" cy="3309782"/>
-              <a:chOff x="270205" y="734290"/>
-              <a:chExt cx="11254865" cy="3309782"/>
-            </a:xfrm>
-          </p:grpSpPr>
-          <p:pic>
-            <p:nvPicPr>
-              <p:cNvPr id="9" name="Picture 8"/>
-              <p:cNvPicPr>
-                <a:picLocks noChangeAspect="1"/>
-              </p:cNvPicPr>
-              <p:nvPr/>
-            </p:nvPicPr>
-            <p:blipFill rotWithShape="1">
-              <a:blip r:embed="rId2">
-                <a:extLst>
-                  <a:ext uri="{BEBA8EAE-BF5A-486C-A8C5-ECC9F3942E4B}">
-                    <a14:imgProps xmlns:a14="http://schemas.microsoft.com/office/drawing/2010/main">
-                      <a14:imgLayer r:embed="rId3">
-                        <a14:imgEffect>
-                          <a14:backgroundRemoval t="0" b="90000" l="10000" r="90000">
-                            <a14:backgroundMark x1="11905" y1="13014" x2="11905" y2="13014"/>
-                          </a14:backgroundRemoval>
-                        </a14:imgEffect>
-                      </a14:imgLayer>
-                    </a14:imgProps>
-                  </a:ext>
-                  <a:ext uri="{28A0092B-C50C-407E-A947-70E740481C1C}">
-                    <a14:useLocalDpi xmlns:a14="http://schemas.microsoft.com/office/drawing/2010/main" val="0"/>
-                  </a:ext>
-                </a:extLst>
-              </a:blip>
-              <a:srcRect l="14547" t="29446" r="14547" b="45356"/>
-              <a:stretch/>
-            </p:blipFill>
-            <p:spPr>
-              <a:xfrm>
-                <a:off x="1329870" y="1273020"/>
-                <a:ext cx="5097600" cy="1260000"/>
-              </a:xfrm>
-              <a:prstGeom prst="rect">
-                <a:avLst/>
-              </a:prstGeom>
-              <a:ln w="38100">
-                <a:noFill/>
-              </a:ln>
-            </p:spPr>
-          </p:pic>
-          <p:pic>
-            <p:nvPicPr>
-              <p:cNvPr id="10" name="Picture 9"/>
-              <p:cNvPicPr>
-                <a:picLocks noChangeAspect="1"/>
-              </p:cNvPicPr>
-              <p:nvPr/>
-            </p:nvPicPr>
-            <p:blipFill rotWithShape="1">
-              <a:blip r:embed="rId4">
-                <a:extLst>
-                  <a:ext uri="{BEBA8EAE-BF5A-486C-A8C5-ECC9F3942E4B}">
-                    <a14:imgProps xmlns:a14="http://schemas.microsoft.com/office/drawing/2010/main">
-                      <a14:imgLayer r:embed="rId5">
-                        <a14:imgEffect>
-                          <a14:backgroundRemoval t="0" b="90000" l="10000" r="90000">
-                            <a14:backgroundMark x1="12381" y1="10411" x2="12381" y2="10411"/>
-                          </a14:backgroundRemoval>
-                        </a14:imgEffect>
-                      </a14:imgLayer>
-                    </a14:imgProps>
-                  </a:ext>
-                  <a:ext uri="{28A0092B-C50C-407E-A947-70E740481C1C}">
-                    <a14:useLocalDpi xmlns:a14="http://schemas.microsoft.com/office/drawing/2010/main" val="0"/>
-                  </a:ext>
-                </a:extLst>
-              </a:blip>
-              <a:srcRect l="14547" t="29410" r="14547" b="45392"/>
-              <a:stretch/>
-            </p:blipFill>
-            <p:spPr>
-              <a:xfrm>
-                <a:off x="6427470" y="1273020"/>
-                <a:ext cx="5097600" cy="1260000"/>
-              </a:xfrm>
-              <a:prstGeom prst="rect">
-                <a:avLst/>
-              </a:prstGeom>
-              <a:solidFill>
-                <a:schemeClr val="accent1">
-                  <a:lumMod val="20000"/>
-                  <a:lumOff val="80000"/>
-                </a:schemeClr>
-              </a:solidFill>
-              <a:ln w="38100">
-                <a:noFill/>
-              </a:ln>
-            </p:spPr>
-          </p:pic>
-          <p:pic>
-            <p:nvPicPr>
-              <p:cNvPr id="11" name="Picture 10"/>
-              <p:cNvPicPr>
-                <a:picLocks noChangeAspect="1"/>
-              </p:cNvPicPr>
-              <p:nvPr/>
-            </p:nvPicPr>
-            <p:blipFill rotWithShape="1">
-              <a:blip r:embed="rId6">
-                <a:extLst>
-                  <a:ext uri="{BEBA8EAE-BF5A-486C-A8C5-ECC9F3942E4B}">
-                    <a14:imgProps xmlns:a14="http://schemas.microsoft.com/office/drawing/2010/main">
-                      <a14:imgLayer r:embed="rId7">
-                        <a14:imgEffect>
-                          <a14:backgroundRemoval t="0" b="90000" l="9524" r="90000">
-                            <a14:backgroundMark x1="13238" y1="16986" x2="13238" y2="16986"/>
-                          </a14:backgroundRemoval>
-                        </a14:imgEffect>
-                      </a14:imgLayer>
-                    </a14:imgProps>
-                  </a:ext>
-                  <a:ext uri="{28A0092B-C50C-407E-A947-70E740481C1C}">
-                    <a14:useLocalDpi xmlns:a14="http://schemas.microsoft.com/office/drawing/2010/main" val="0"/>
-                  </a:ext>
-                </a:extLst>
-              </a:blip>
-              <a:srcRect l="14547" t="29410" r="14547" b="45392"/>
-              <a:stretch/>
-            </p:blipFill>
-            <p:spPr>
-              <a:xfrm>
-                <a:off x="1329870" y="2753566"/>
-                <a:ext cx="5097600" cy="1260000"/>
-              </a:xfrm>
-              <a:prstGeom prst="rect">
-                <a:avLst/>
-              </a:prstGeom>
-              <a:ln w="38100">
-                <a:noFill/>
-              </a:ln>
-            </p:spPr>
-          </p:pic>
-          <p:pic>
-            <p:nvPicPr>
-              <p:cNvPr id="12" name="Picture 11"/>
-              <p:cNvPicPr>
-                <a:picLocks noChangeAspect="1"/>
-              </p:cNvPicPr>
-              <p:nvPr/>
-            </p:nvPicPr>
-            <p:blipFill rotWithShape="1">
-              <a:blip r:embed="rId8">
-                <a:extLst>
-                  <a:ext uri="{BEBA8EAE-BF5A-486C-A8C5-ECC9F3942E4B}">
-                    <a14:imgProps xmlns:a14="http://schemas.microsoft.com/office/drawing/2010/main">
-                      <a14:imgLayer r:embed="rId9">
-                        <a14:imgEffect>
-                          <a14:backgroundRemoval t="0" b="90000" l="9238" r="90000">
-                            <a14:backgroundMark x1="12381" y1="11781" x2="12381" y2="11781"/>
-                          </a14:backgroundRemoval>
-                        </a14:imgEffect>
-                      </a14:imgLayer>
-                    </a14:imgProps>
-                  </a:ext>
-                  <a:ext uri="{28A0092B-C50C-407E-A947-70E740481C1C}">
-                    <a14:useLocalDpi xmlns:a14="http://schemas.microsoft.com/office/drawing/2010/main" val="0"/>
-                  </a:ext>
-                </a:extLst>
-              </a:blip>
-              <a:srcRect l="14547" t="29410" r="14547" b="45392"/>
-              <a:stretch/>
-            </p:blipFill>
-            <p:spPr>
-              <a:xfrm>
-                <a:off x="6427470" y="2753566"/>
-                <a:ext cx="5097600" cy="1260000"/>
-              </a:xfrm>
-              <a:prstGeom prst="rect">
-                <a:avLst/>
-              </a:prstGeom>
-              <a:solidFill>
-                <a:schemeClr val="accent1">
-                  <a:lumMod val="20000"/>
-                  <a:lumOff val="80000"/>
-                </a:schemeClr>
-              </a:solidFill>
-              <a:ln w="38100">
-                <a:noFill/>
-              </a:ln>
-            </p:spPr>
-          </p:pic>
-          <p:sp>
-            <p:nvSpPr>
-              <p:cNvPr id="13" name="TextBox 12"/>
-              <p:cNvSpPr txBox="1"/>
-              <p:nvPr/>
-            </p:nvSpPr>
-            <p:spPr>
-              <a:xfrm>
-                <a:off x="3601190" y="734290"/>
-                <a:ext cx="660342" cy="513723"/>
-              </a:xfrm>
-              <a:prstGeom prst="rect">
-                <a:avLst/>
-              </a:prstGeom>
-              <a:noFill/>
-            </p:spPr>
-            <p:txBody>
-              <a:bodyPr wrap="none" rtlCol="0">
-                <a:spAutoFit/>
-              </a:bodyPr>
-              <a:lstStyle/>
-              <a:p>
-                <a:r>
-                  <a:rPr lang="en-US" sz="1533" b="1" dirty="0"/>
-                  <a:t>Air</a:t>
-                </a:r>
-                <a:endParaRPr lang="en-US" sz="1533" b="1" dirty="0"/>
-              </a:p>
-            </p:txBody>
-          </p:sp>
-          <p:sp>
-            <p:nvSpPr>
-              <p:cNvPr id="14" name="TextBox 13"/>
-              <p:cNvSpPr txBox="1"/>
-              <p:nvPr/>
-            </p:nvSpPr>
-            <p:spPr>
-              <a:xfrm>
-                <a:off x="8113790" y="734290"/>
-                <a:ext cx="1834009" cy="513723"/>
-              </a:xfrm>
-              <a:prstGeom prst="rect">
-                <a:avLst/>
-              </a:prstGeom>
-              <a:noFill/>
-            </p:spPr>
-            <p:txBody>
-              <a:bodyPr wrap="none" rtlCol="0">
-                <a:spAutoFit/>
-              </a:bodyPr>
-              <a:lstStyle/>
-              <a:p>
-                <a:r>
-                  <a:rPr lang="en-US" sz="1533" b="1" dirty="0"/>
-                  <a:t>Underwater</a:t>
-                </a:r>
-                <a:endParaRPr lang="en-US" sz="1533" b="1" dirty="0"/>
-              </a:p>
-            </p:txBody>
-          </p:sp>
-          <p:sp>
-            <p:nvSpPr>
-              <p:cNvPr id="15" name="TextBox 14"/>
-              <p:cNvSpPr txBox="1"/>
-              <p:nvPr/>
-            </p:nvSpPr>
-            <p:spPr>
-              <a:xfrm>
-                <a:off x="335511" y="1672186"/>
-                <a:ext cx="958903" cy="513723"/>
-              </a:xfrm>
-              <a:prstGeom prst="rect">
-                <a:avLst/>
-              </a:prstGeom>
-              <a:noFill/>
-            </p:spPr>
-            <p:txBody>
-              <a:bodyPr wrap="none" rtlCol="0">
-                <a:spAutoFit/>
-              </a:bodyPr>
-              <a:lstStyle/>
-              <a:p>
-                <a:r>
-                  <a:rPr lang="en-US" sz="1533" b="1" dirty="0"/>
-                  <a:t>Glass</a:t>
-                </a:r>
-              </a:p>
-            </p:txBody>
-          </p:sp>
-          <p:sp>
-            <p:nvSpPr>
-              <p:cNvPr id="16" name="TextBox 15"/>
-              <p:cNvSpPr txBox="1"/>
-              <p:nvPr/>
-            </p:nvSpPr>
-            <p:spPr>
-              <a:xfrm>
-                <a:off x="270205" y="3152732"/>
-                <a:ext cx="1088965" cy="513723"/>
-              </a:xfrm>
-              <a:prstGeom prst="rect">
-                <a:avLst/>
-              </a:prstGeom>
-              <a:noFill/>
-            </p:spPr>
-            <p:txBody>
-              <a:bodyPr wrap="none" rtlCol="0">
-                <a:spAutoFit/>
-              </a:bodyPr>
-              <a:lstStyle/>
-              <a:p>
-                <a:r>
-                  <a:rPr lang="en-US" sz="1533" b="1" dirty="0"/>
-                  <a:t>PFOTS</a:t>
-                </a:r>
-              </a:p>
-            </p:txBody>
-          </p:sp>
-          <p:cxnSp>
-            <p:nvCxnSpPr>
-              <p:cNvPr id="20" name="Straight Connector 19"/>
-              <p:cNvCxnSpPr/>
-              <p:nvPr/>
-            </p:nvCxnSpPr>
-            <p:spPr>
-              <a:xfrm>
-                <a:off x="1504950" y="2533020"/>
-                <a:ext cx="10020120" cy="0"/>
-              </a:xfrm>
-              <a:prstGeom prst="line">
-                <a:avLst/>
-              </a:prstGeom>
-              <a:ln w="28575">
-                <a:solidFill>
-                  <a:schemeClr val="tx1"/>
-                </a:solidFill>
-              </a:ln>
-            </p:spPr>
-            <p:style>
-              <a:lnRef idx="1">
-                <a:schemeClr val="accent1"/>
-              </a:lnRef>
-              <a:fillRef idx="0">
-                <a:schemeClr val="accent1"/>
-              </a:fillRef>
-              <a:effectRef idx="0">
-                <a:schemeClr val="accent1"/>
-              </a:effectRef>
-              <a:fontRef idx="minor">
-                <a:schemeClr val="tx1"/>
-              </a:fontRef>
-            </p:style>
-          </p:cxnSp>
-          <p:cxnSp>
-            <p:nvCxnSpPr>
-              <p:cNvPr id="21" name="Straight Connector 20"/>
-              <p:cNvCxnSpPr/>
-              <p:nvPr/>
-            </p:nvCxnSpPr>
-            <p:spPr>
-              <a:xfrm>
-                <a:off x="1504950" y="4013566"/>
-                <a:ext cx="10020120" cy="0"/>
-              </a:xfrm>
-              <a:prstGeom prst="line">
-                <a:avLst/>
-              </a:prstGeom>
-              <a:ln w="28575">
-                <a:solidFill>
-                  <a:schemeClr val="tx1"/>
-                </a:solidFill>
-              </a:ln>
-            </p:spPr>
-            <p:style>
-              <a:lnRef idx="1">
-                <a:schemeClr val="accent1"/>
-              </a:lnRef>
-              <a:fillRef idx="0">
-                <a:schemeClr val="accent1"/>
-              </a:fillRef>
-              <a:effectRef idx="0">
-                <a:schemeClr val="accent1"/>
-              </a:effectRef>
-              <a:fontRef idx="minor">
-                <a:schemeClr val="tx1"/>
-              </a:fontRef>
-            </p:style>
-          </p:cxnSp>
-          <p:sp>
-            <p:nvSpPr>
-              <p:cNvPr id="23" name="TextBox 22"/>
-              <p:cNvSpPr txBox="1"/>
-              <p:nvPr/>
-            </p:nvSpPr>
-            <p:spPr>
-              <a:xfrm>
-                <a:off x="3496235" y="2125537"/>
-                <a:ext cx="2461734" cy="452306"/>
-              </a:xfrm>
-              <a:prstGeom prst="rect">
-                <a:avLst/>
-              </a:prstGeom>
-              <a:noFill/>
-            </p:spPr>
-            <p:txBody>
-              <a:bodyPr wrap="none" rtlCol="0">
-                <a:spAutoFit/>
-              </a:bodyPr>
-              <a:lstStyle/>
-              <a:p>
-                <a:r>
-                  <a:rPr lang="el-GR" sz="1278" dirty="0"/>
-                  <a:t>γ</a:t>
-                </a:r>
-                <a:r>
-                  <a:rPr lang="en-IN" sz="1278" dirty="0"/>
-                  <a:t> = </a:t>
-                </a:r>
-                <a:r>
-                  <a:rPr lang="en-IN" sz="1278" dirty="0"/>
-                  <a:t>24 </a:t>
-                </a:r>
-                <a:r>
-                  <a:rPr lang="en-IN" sz="1278" dirty="0" err="1"/>
-                  <a:t>mN</a:t>
-                </a:r>
-                <a:r>
-                  <a:rPr lang="en-IN" sz="1278" dirty="0"/>
-                  <a:t> m</a:t>
-                </a:r>
-                <a:r>
-                  <a:rPr lang="en-IN" sz="1278" baseline="30000" dirty="0"/>
-                  <a:t>-1</a:t>
-                </a:r>
-                <a:r>
-                  <a:rPr lang="en-IN" sz="1278" dirty="0"/>
-                  <a:t>, </a:t>
-                </a:r>
-                <a:r>
-                  <a:rPr lang="el-GR" sz="1278" dirty="0"/>
-                  <a:t>θ</a:t>
-                </a:r>
-                <a:r>
-                  <a:rPr lang="en-US" sz="1278" dirty="0"/>
-                  <a:t> </a:t>
-                </a:r>
-                <a:r>
-                  <a:rPr lang="en-US" sz="1278" dirty="0"/>
-                  <a:t>= 6</a:t>
-                </a:r>
-                <a:r>
-                  <a:rPr lang="aa-ET" sz="1278" dirty="0"/>
-                  <a:t>°</a:t>
-                </a:r>
-                <a:endParaRPr lang="en-US" sz="1278" dirty="0"/>
-              </a:p>
-            </p:txBody>
-          </p:sp>
-          <p:sp>
-            <p:nvSpPr>
-              <p:cNvPr id="24" name="TextBox 23"/>
-              <p:cNvSpPr txBox="1"/>
-              <p:nvPr/>
-            </p:nvSpPr>
-            <p:spPr>
-              <a:xfrm>
-                <a:off x="8630270" y="3591764"/>
-                <a:ext cx="2461734" cy="452306"/>
-              </a:xfrm>
-              <a:prstGeom prst="rect">
-                <a:avLst/>
-              </a:prstGeom>
-              <a:noFill/>
-            </p:spPr>
-            <p:txBody>
-              <a:bodyPr wrap="none" rtlCol="0">
-                <a:spAutoFit/>
-              </a:bodyPr>
-              <a:lstStyle/>
-              <a:p>
-                <a:r>
-                  <a:rPr lang="el-GR" sz="1278" dirty="0"/>
-                  <a:t>γ</a:t>
-                </a:r>
-                <a:r>
-                  <a:rPr lang="en-IN" sz="1278" dirty="0"/>
-                  <a:t> = 48 </a:t>
-                </a:r>
-                <a:r>
-                  <a:rPr lang="en-IN" sz="1278" dirty="0" err="1"/>
-                  <a:t>mN</a:t>
-                </a:r>
-                <a:r>
-                  <a:rPr lang="en-IN" sz="1278" dirty="0"/>
-                  <a:t> m</a:t>
-                </a:r>
-                <a:r>
-                  <a:rPr lang="en-IN" sz="1278" baseline="30000" dirty="0"/>
-                  <a:t>-1</a:t>
-                </a:r>
-                <a:r>
-                  <a:rPr lang="en-IN" sz="1278" dirty="0"/>
-                  <a:t>, </a:t>
-                </a:r>
-                <a:r>
-                  <a:rPr lang="el-GR" sz="1278" dirty="0"/>
-                  <a:t>θ</a:t>
-                </a:r>
-                <a:r>
-                  <a:rPr lang="en-US" sz="1278" dirty="0"/>
-                  <a:t> </a:t>
-                </a:r>
-                <a:r>
-                  <a:rPr lang="en-US" sz="1278" dirty="0"/>
-                  <a:t>= </a:t>
-                </a:r>
-                <a:r>
-                  <a:rPr lang="en-US" sz="1278" dirty="0"/>
-                  <a:t>1</a:t>
-                </a:r>
-                <a:r>
-                  <a:rPr lang="aa-ET" sz="1278" dirty="0"/>
-                  <a:t>°</a:t>
-                </a:r>
-                <a:endParaRPr lang="en-US" sz="1278" dirty="0"/>
-              </a:p>
-            </p:txBody>
-          </p:sp>
-          <p:sp>
-            <p:nvSpPr>
-              <p:cNvPr id="25" name="TextBox 24"/>
-              <p:cNvSpPr txBox="1"/>
-              <p:nvPr/>
-            </p:nvSpPr>
-            <p:spPr>
-              <a:xfrm>
-                <a:off x="3496235" y="3591766"/>
-                <a:ext cx="2574894" cy="452306"/>
-              </a:xfrm>
-              <a:prstGeom prst="rect">
-                <a:avLst/>
-              </a:prstGeom>
-              <a:noFill/>
-            </p:spPr>
-            <p:txBody>
-              <a:bodyPr wrap="square" rtlCol="0">
-                <a:spAutoFit/>
-              </a:bodyPr>
-              <a:lstStyle/>
-              <a:p>
-                <a:r>
-                  <a:rPr lang="el-GR" sz="1278" dirty="0"/>
-                  <a:t>γ</a:t>
-                </a:r>
-                <a:r>
-                  <a:rPr lang="en-IN" sz="1278" dirty="0"/>
-                  <a:t> = 24 </a:t>
-                </a:r>
-                <a:r>
-                  <a:rPr lang="en-IN" sz="1278" dirty="0" err="1"/>
-                  <a:t>mN</a:t>
-                </a:r>
-                <a:r>
-                  <a:rPr lang="en-IN" sz="1278" dirty="0"/>
-                  <a:t> m</a:t>
-                </a:r>
-                <a:r>
-                  <a:rPr lang="en-IN" sz="1278" baseline="30000" dirty="0"/>
-                  <a:t>-1</a:t>
-                </a:r>
-                <a:r>
-                  <a:rPr lang="en-IN" sz="1278" dirty="0"/>
-                  <a:t>, </a:t>
-                </a:r>
-                <a:r>
-                  <a:rPr lang="el-GR" sz="1278" dirty="0"/>
-                  <a:t>θ</a:t>
-                </a:r>
-                <a:r>
-                  <a:rPr lang="en-US" sz="1278" dirty="0"/>
-                  <a:t> </a:t>
-                </a:r>
-                <a:r>
-                  <a:rPr lang="en-US" sz="1278" dirty="0"/>
-                  <a:t>= </a:t>
-                </a:r>
-                <a:r>
-                  <a:rPr lang="en-US" sz="1278" dirty="0"/>
-                  <a:t>50</a:t>
-                </a:r>
-                <a:r>
-                  <a:rPr lang="aa-ET" sz="1278" dirty="0"/>
-                  <a:t>°</a:t>
-                </a:r>
-                <a:endParaRPr lang="en-US" sz="1278" dirty="0"/>
-              </a:p>
-            </p:txBody>
-          </p:sp>
-          <p:sp>
-            <p:nvSpPr>
-              <p:cNvPr id="26" name="TextBox 25"/>
-              <p:cNvSpPr txBox="1"/>
-              <p:nvPr/>
-            </p:nvSpPr>
-            <p:spPr>
-              <a:xfrm>
-                <a:off x="8593834" y="2088104"/>
-                <a:ext cx="2722661" cy="452306"/>
-              </a:xfrm>
-              <a:prstGeom prst="rect">
-                <a:avLst/>
-              </a:prstGeom>
-              <a:noFill/>
-            </p:spPr>
-            <p:txBody>
-              <a:bodyPr wrap="none" rtlCol="0">
-                <a:spAutoFit/>
-              </a:bodyPr>
-              <a:lstStyle/>
-              <a:p>
-                <a:r>
-                  <a:rPr lang="el-GR" sz="1278" dirty="0"/>
-                  <a:t>γ</a:t>
-                </a:r>
-                <a:r>
-                  <a:rPr lang="en-IN" sz="1278" dirty="0"/>
-                  <a:t> = </a:t>
-                </a:r>
-                <a:r>
-                  <a:rPr lang="en-IN" sz="1278" dirty="0"/>
-                  <a:t>48 </a:t>
-                </a:r>
-                <a:r>
-                  <a:rPr lang="en-IN" sz="1278" dirty="0" err="1"/>
-                  <a:t>mN</a:t>
-                </a:r>
-                <a:r>
-                  <a:rPr lang="en-IN" sz="1278" dirty="0"/>
-                  <a:t> m</a:t>
-                </a:r>
-                <a:r>
-                  <a:rPr lang="en-IN" sz="1278" baseline="30000" dirty="0"/>
-                  <a:t>-1</a:t>
-                </a:r>
-                <a:r>
-                  <a:rPr lang="en-IN" sz="1278" dirty="0"/>
-                  <a:t>, </a:t>
-                </a:r>
-                <a:r>
-                  <a:rPr lang="el-GR" sz="1278" dirty="0"/>
-                  <a:t>θ</a:t>
-                </a:r>
-                <a:r>
-                  <a:rPr lang="en-US" sz="1278" dirty="0"/>
-                  <a:t> </a:t>
-                </a:r>
-                <a:r>
-                  <a:rPr lang="en-US" sz="1278" dirty="0"/>
-                  <a:t>= </a:t>
-                </a:r>
-                <a:r>
-                  <a:rPr lang="en-US" sz="1278" dirty="0"/>
-                  <a:t>150</a:t>
-                </a:r>
-                <a:r>
-                  <a:rPr lang="aa-ET" sz="1278" dirty="0"/>
-                  <a:t>°</a:t>
-                </a:r>
-                <a:endParaRPr lang="en-US" sz="1278" dirty="0"/>
-              </a:p>
-            </p:txBody>
-          </p:sp>
-        </p:grpSp>
-        <p:sp>
-          <p:nvSpPr>
-            <p:cNvPr id="2" name="TextBox 1"/>
-            <p:cNvSpPr txBox="1"/>
-            <p:nvPr/>
-          </p:nvSpPr>
-          <p:spPr>
-            <a:xfrm>
-              <a:off x="3028917" y="1439653"/>
-              <a:ext cx="1799385" cy="452306"/>
-            </a:xfrm>
-            <a:prstGeom prst="rect">
-              <a:avLst/>
-            </a:prstGeom>
+          <a:prstGeom prst="rect">
+            <a:avLst/>
+          </a:prstGeom>
+          <a:solidFill>
+            <a:schemeClr val="accent1">
+              <a:lumMod val="20000"/>
+              <a:lumOff val="80000"/>
+            </a:schemeClr>
+          </a:solidFill>
+          <a:ln w="38100">
             <a:noFill/>
-          </p:spPr>
-          <p:txBody>
-            <a:bodyPr wrap="none" rtlCol="0">
-              <a:spAutoFit/>
-            </a:bodyPr>
-            <a:lstStyle/>
-            <a:p>
-              <a:r>
-                <a:rPr lang="en-IN" sz="1278" b="1" dirty="0">
-                  <a:solidFill>
-                    <a:schemeClr val="bg1"/>
-                  </a:solidFill>
-                </a:rPr>
-                <a:t>High adhesion</a:t>
-              </a:r>
-              <a:endParaRPr lang="en-US" sz="1278" b="1" dirty="0">
+          </a:ln>
+        </p:spPr>
+      </p:pic>
+      <p:pic>
+        <p:nvPicPr>
+          <p:cNvPr id="9" name="Picture 8"/>
+          <p:cNvPicPr>
+            <a:picLocks noChangeAspect="1"/>
+          </p:cNvPicPr>
+          <p:nvPr/>
+        </p:nvPicPr>
+        <p:blipFill rotWithShape="1">
+          <a:blip r:embed="rId4">
+            <a:extLst>
+              <a:ext uri="{BEBA8EAE-BF5A-486C-A8C5-ECC9F3942E4B}">
+                <a14:imgProps xmlns:a14="http://schemas.microsoft.com/office/drawing/2010/main">
+                  <a14:imgLayer r:embed="rId5">
+                    <a14:imgEffect>
+                      <a14:backgroundRemoval t="0" b="90000" l="10000" r="90000">
+                        <a14:backgroundMark x1="11905" y1="13014" x2="11905" y2="13014"/>
+                      </a14:backgroundRemoval>
+                    </a14:imgEffect>
+                  </a14:imgLayer>
+                </a14:imgProps>
+              </a:ext>
+              <a:ext uri="{28A0092B-C50C-407E-A947-70E740481C1C}">
+                <a14:useLocalDpi xmlns:a14="http://schemas.microsoft.com/office/drawing/2010/main" val="0"/>
+              </a:ext>
+            </a:extLst>
+          </a:blip>
+          <a:srcRect l="14547" t="29446" r="14547" b="45356"/>
+          <a:stretch/>
+        </p:blipFill>
+        <p:spPr>
+          <a:xfrm>
+            <a:off x="611247" y="344247"/>
+            <a:ext cx="3256990" cy="805047"/>
+          </a:xfrm>
+          <a:prstGeom prst="rect">
+            <a:avLst/>
+          </a:prstGeom>
+          <a:ln w="38100">
+            <a:noFill/>
+          </a:ln>
+        </p:spPr>
+      </p:pic>
+      <p:pic>
+        <p:nvPicPr>
+          <p:cNvPr id="10" name="Picture 9"/>
+          <p:cNvPicPr>
+            <a:picLocks noChangeAspect="1"/>
+          </p:cNvPicPr>
+          <p:nvPr/>
+        </p:nvPicPr>
+        <p:blipFill rotWithShape="1">
+          <a:blip r:embed="rId6">
+            <a:extLst>
+              <a:ext uri="{BEBA8EAE-BF5A-486C-A8C5-ECC9F3942E4B}">
+                <a14:imgProps xmlns:a14="http://schemas.microsoft.com/office/drawing/2010/main">
+                  <a14:imgLayer r:embed="rId7">
+                    <a14:imgEffect>
+                      <a14:backgroundRemoval t="0" b="90000" l="10000" r="90000">
+                        <a14:backgroundMark x1="12381" y1="10411" x2="12381" y2="10411"/>
+                      </a14:backgroundRemoval>
+                    </a14:imgEffect>
+                  </a14:imgLayer>
+                </a14:imgProps>
+              </a:ext>
+              <a:ext uri="{28A0092B-C50C-407E-A947-70E740481C1C}">
+                <a14:useLocalDpi xmlns:a14="http://schemas.microsoft.com/office/drawing/2010/main" val="0"/>
+              </a:ext>
+            </a:extLst>
+          </a:blip>
+          <a:srcRect l="14547" t="29410" r="14547" b="45392"/>
+          <a:stretch/>
+        </p:blipFill>
+        <p:spPr>
+          <a:xfrm>
+            <a:off x="3868236" y="344247"/>
+            <a:ext cx="3256990" cy="805047"/>
+          </a:xfrm>
+          <a:prstGeom prst="rect">
+            <a:avLst/>
+          </a:prstGeom>
+          <a:solidFill>
+            <a:schemeClr val="accent1">
+              <a:lumMod val="20000"/>
+              <a:lumOff val="80000"/>
+            </a:schemeClr>
+          </a:solidFill>
+          <a:ln w="38100">
+            <a:noFill/>
+          </a:ln>
+        </p:spPr>
+      </p:pic>
+      <p:pic>
+        <p:nvPicPr>
+          <p:cNvPr id="11" name="Picture 10"/>
+          <p:cNvPicPr>
+            <a:picLocks noChangeAspect="1"/>
+          </p:cNvPicPr>
+          <p:nvPr/>
+        </p:nvPicPr>
+        <p:blipFill rotWithShape="1">
+          <a:blip r:embed="rId2">
+            <a:extLst>
+              <a:ext uri="{BEBA8EAE-BF5A-486C-A8C5-ECC9F3942E4B}">
+                <a14:imgProps xmlns:a14="http://schemas.microsoft.com/office/drawing/2010/main">
+                  <a14:imgLayer r:embed="rId3">
+                    <a14:imgEffect>
+                      <a14:backgroundRemoval t="0" b="90000" l="9524" r="90000">
+                        <a14:backgroundMark x1="13238" y1="16986" x2="13238" y2="16986"/>
+                      </a14:backgroundRemoval>
+                    </a14:imgEffect>
+                  </a14:imgLayer>
+                </a14:imgProps>
+              </a:ext>
+              <a:ext uri="{28A0092B-C50C-407E-A947-70E740481C1C}">
+                <a14:useLocalDpi xmlns:a14="http://schemas.microsoft.com/office/drawing/2010/main" val="0"/>
+              </a:ext>
+            </a:extLst>
+          </a:blip>
+          <a:srcRect l="14547" t="29410" r="14547" b="45392"/>
+          <a:stretch/>
+        </p:blipFill>
+        <p:spPr>
+          <a:xfrm>
+            <a:off x="611247" y="1290206"/>
+            <a:ext cx="3256990" cy="805047"/>
+          </a:xfrm>
+          <a:prstGeom prst="rect">
+            <a:avLst/>
+          </a:prstGeom>
+          <a:ln w="38100">
+            <a:noFill/>
+          </a:ln>
+        </p:spPr>
+      </p:pic>
+      <p:sp>
+        <p:nvSpPr>
+          <p:cNvPr id="13" name="TextBox 12"/>
+          <p:cNvSpPr txBox="1"/>
+          <p:nvPr/>
+        </p:nvSpPr>
+        <p:spPr>
+          <a:xfrm>
+            <a:off x="2062452" y="38"/>
+            <a:ext cx="421910" cy="328231"/>
+          </a:xfrm>
+          <a:prstGeom prst="rect">
+            <a:avLst/>
+          </a:prstGeom>
+          <a:noFill/>
+        </p:spPr>
+        <p:txBody>
+          <a:bodyPr wrap="none" rtlCol="0">
+            <a:spAutoFit/>
+          </a:bodyPr>
+          <a:lstStyle/>
+          <a:p>
+            <a:r>
+              <a:rPr lang="en-US" sz="1533" b="1" dirty="0"/>
+              <a:t>Air</a:t>
+            </a:r>
+          </a:p>
+        </p:txBody>
+      </p:sp>
+      <p:sp>
+        <p:nvSpPr>
+          <p:cNvPr id="14" name="TextBox 13"/>
+          <p:cNvSpPr txBox="1"/>
+          <p:nvPr/>
+        </p:nvSpPr>
+        <p:spPr>
+          <a:xfrm>
+            <a:off x="4945670" y="38"/>
+            <a:ext cx="1171796" cy="328231"/>
+          </a:xfrm>
+          <a:prstGeom prst="rect">
+            <a:avLst/>
+          </a:prstGeom>
+          <a:noFill/>
+        </p:spPr>
+        <p:txBody>
+          <a:bodyPr wrap="none" rtlCol="0">
+            <a:spAutoFit/>
+          </a:bodyPr>
+          <a:lstStyle/>
+          <a:p>
+            <a:r>
+              <a:rPr lang="en-US" sz="1533" b="1" dirty="0"/>
+              <a:t>Underwater</a:t>
+            </a:r>
+          </a:p>
+        </p:txBody>
+      </p:sp>
+      <p:sp>
+        <p:nvSpPr>
+          <p:cNvPr id="15" name="TextBox 14"/>
+          <p:cNvSpPr txBox="1"/>
+          <p:nvPr/>
+        </p:nvSpPr>
+        <p:spPr>
+          <a:xfrm>
+            <a:off x="-24075" y="599284"/>
+            <a:ext cx="612668" cy="328231"/>
+          </a:xfrm>
+          <a:prstGeom prst="rect">
+            <a:avLst/>
+          </a:prstGeom>
+          <a:noFill/>
+        </p:spPr>
+        <p:txBody>
+          <a:bodyPr wrap="none" rtlCol="0">
+            <a:spAutoFit/>
+          </a:bodyPr>
+          <a:lstStyle/>
+          <a:p>
+            <a:r>
+              <a:rPr lang="en-US" sz="1533" b="1" dirty="0"/>
+              <a:t>Glass</a:t>
+            </a:r>
+          </a:p>
+        </p:txBody>
+      </p:sp>
+      <p:sp>
+        <p:nvSpPr>
+          <p:cNvPr id="16" name="TextBox 15"/>
+          <p:cNvSpPr txBox="1"/>
+          <p:nvPr/>
+        </p:nvSpPr>
+        <p:spPr>
+          <a:xfrm>
+            <a:off x="-65801" y="1545244"/>
+            <a:ext cx="695768" cy="328231"/>
+          </a:xfrm>
+          <a:prstGeom prst="rect">
+            <a:avLst/>
+          </a:prstGeom>
+          <a:noFill/>
+        </p:spPr>
+        <p:txBody>
+          <a:bodyPr wrap="none" rtlCol="0">
+            <a:spAutoFit/>
+          </a:bodyPr>
+          <a:lstStyle/>
+          <a:p>
+            <a:r>
+              <a:rPr lang="en-US" sz="1533" b="1" dirty="0"/>
+              <a:t>PFOTS</a:t>
+            </a:r>
+          </a:p>
+        </p:txBody>
+      </p:sp>
+      <p:cxnSp>
+        <p:nvCxnSpPr>
+          <p:cNvPr id="20" name="Straight Connector 19"/>
+          <p:cNvCxnSpPr/>
+          <p:nvPr/>
+        </p:nvCxnSpPr>
+        <p:spPr>
+          <a:xfrm>
+            <a:off x="723110" y="1149294"/>
+            <a:ext cx="6402116" cy="0"/>
+          </a:xfrm>
+          <a:prstGeom prst="line">
+            <a:avLst/>
+          </a:prstGeom>
+          <a:ln w="28575">
+            <a:solidFill>
+              <a:schemeClr val="tx1"/>
+            </a:solidFill>
+          </a:ln>
+        </p:spPr>
+        <p:style>
+          <a:lnRef idx="1">
+            <a:schemeClr val="accent1"/>
+          </a:lnRef>
+          <a:fillRef idx="0">
+            <a:schemeClr val="accent1"/>
+          </a:fillRef>
+          <a:effectRef idx="0">
+            <a:schemeClr val="accent1"/>
+          </a:effectRef>
+          <a:fontRef idx="minor">
+            <a:schemeClr val="tx1"/>
+          </a:fontRef>
+        </p:style>
+      </p:cxnSp>
+      <p:cxnSp>
+        <p:nvCxnSpPr>
+          <p:cNvPr id="21" name="Straight Connector 20"/>
+          <p:cNvCxnSpPr/>
+          <p:nvPr/>
+        </p:nvCxnSpPr>
+        <p:spPr>
+          <a:xfrm>
+            <a:off x="723110" y="2095253"/>
+            <a:ext cx="6402116" cy="0"/>
+          </a:xfrm>
+          <a:prstGeom prst="line">
+            <a:avLst/>
+          </a:prstGeom>
+          <a:ln w="28575">
+            <a:solidFill>
+              <a:schemeClr val="tx1"/>
+            </a:solidFill>
+          </a:ln>
+        </p:spPr>
+        <p:style>
+          <a:lnRef idx="1">
+            <a:schemeClr val="accent1"/>
+          </a:lnRef>
+          <a:fillRef idx="0">
+            <a:schemeClr val="accent1"/>
+          </a:fillRef>
+          <a:effectRef idx="0">
+            <a:schemeClr val="accent1"/>
+          </a:effectRef>
+          <a:fontRef idx="minor">
+            <a:schemeClr val="tx1"/>
+          </a:fontRef>
+        </p:style>
+      </p:cxnSp>
+      <p:sp>
+        <p:nvSpPr>
+          <p:cNvPr id="23" name="TextBox 22"/>
+          <p:cNvSpPr txBox="1"/>
+          <p:nvPr/>
+        </p:nvSpPr>
+        <p:spPr>
+          <a:xfrm>
+            <a:off x="1995394" y="888942"/>
+            <a:ext cx="1572866" cy="288990"/>
+          </a:xfrm>
+          <a:prstGeom prst="rect">
+            <a:avLst/>
+          </a:prstGeom>
+          <a:noFill/>
+        </p:spPr>
+        <p:txBody>
+          <a:bodyPr wrap="none" rtlCol="0">
+            <a:spAutoFit/>
+          </a:bodyPr>
+          <a:lstStyle/>
+          <a:p>
+            <a:r>
+              <a:rPr lang="el-GR" sz="1278" dirty="0"/>
+              <a:t>γ</a:t>
+            </a:r>
+            <a:r>
+              <a:rPr lang="en-IN" sz="1278" dirty="0"/>
+              <a:t> = </a:t>
+            </a:r>
+            <a:r>
+              <a:rPr lang="en-IN" sz="1278" dirty="0" smtClean="0"/>
+              <a:t>27 </a:t>
+            </a:r>
+            <a:r>
+              <a:rPr lang="en-IN" sz="1278" dirty="0" err="1"/>
+              <a:t>mN</a:t>
+            </a:r>
+            <a:r>
+              <a:rPr lang="en-IN" sz="1278" dirty="0"/>
+              <a:t> m</a:t>
+            </a:r>
+            <a:r>
+              <a:rPr lang="en-IN" sz="1278" baseline="30000" dirty="0"/>
+              <a:t>-1</a:t>
+            </a:r>
+            <a:r>
+              <a:rPr lang="en-IN" sz="1278" dirty="0"/>
+              <a:t>, </a:t>
+            </a:r>
+            <a:r>
+              <a:rPr lang="el-GR" sz="1278" dirty="0"/>
+              <a:t>θ</a:t>
+            </a:r>
+            <a:r>
+              <a:rPr lang="en-US" sz="1278" dirty="0"/>
+              <a:t> = 6</a:t>
+            </a:r>
+            <a:r>
+              <a:rPr lang="aa-ET" sz="1278" dirty="0"/>
+              <a:t>°</a:t>
+            </a:r>
+            <a:endParaRPr lang="en-US" sz="1278" dirty="0"/>
+          </a:p>
+        </p:txBody>
+      </p:sp>
+      <p:sp>
+        <p:nvSpPr>
+          <p:cNvPr id="25" name="TextBox 24"/>
+          <p:cNvSpPr txBox="1"/>
+          <p:nvPr/>
+        </p:nvSpPr>
+        <p:spPr>
+          <a:xfrm>
+            <a:off x="1995394" y="1825754"/>
+            <a:ext cx="1645167" cy="288990"/>
+          </a:xfrm>
+          <a:prstGeom prst="rect">
+            <a:avLst/>
+          </a:prstGeom>
+          <a:noFill/>
+        </p:spPr>
+        <p:txBody>
+          <a:bodyPr wrap="square" rtlCol="0">
+            <a:spAutoFit/>
+          </a:bodyPr>
+          <a:lstStyle/>
+          <a:p>
+            <a:r>
+              <a:rPr lang="el-GR" sz="1278" dirty="0"/>
+              <a:t>γ</a:t>
+            </a:r>
+            <a:r>
+              <a:rPr lang="en-IN" sz="1278" dirty="0"/>
+              <a:t> = </a:t>
+            </a:r>
+            <a:r>
+              <a:rPr lang="en-IN" sz="1278" dirty="0" smtClean="0"/>
+              <a:t>27 </a:t>
+            </a:r>
+            <a:r>
+              <a:rPr lang="en-IN" sz="1278" dirty="0" err="1"/>
+              <a:t>mN</a:t>
+            </a:r>
+            <a:r>
+              <a:rPr lang="en-IN" sz="1278" dirty="0"/>
+              <a:t> m</a:t>
+            </a:r>
+            <a:r>
+              <a:rPr lang="en-IN" sz="1278" baseline="30000" dirty="0"/>
+              <a:t>-1</a:t>
+            </a:r>
+            <a:r>
+              <a:rPr lang="en-IN" sz="1278" dirty="0"/>
+              <a:t>, </a:t>
+            </a:r>
+            <a:r>
+              <a:rPr lang="el-GR" sz="1278" dirty="0"/>
+              <a:t>θ</a:t>
+            </a:r>
+            <a:r>
+              <a:rPr lang="en-US" sz="1278" dirty="0"/>
+              <a:t> = </a:t>
+            </a:r>
+            <a:r>
+              <a:rPr lang="en-US" sz="1278" dirty="0" smtClean="0"/>
+              <a:t>56</a:t>
+            </a:r>
+            <a:r>
+              <a:rPr lang="aa-ET" sz="1278" dirty="0" smtClean="0"/>
+              <a:t>°</a:t>
+            </a:r>
+            <a:endParaRPr lang="en-US" sz="1278" dirty="0"/>
+          </a:p>
+        </p:txBody>
+      </p:sp>
+      <p:sp>
+        <p:nvSpPr>
+          <p:cNvPr id="26" name="TextBox 25"/>
+          <p:cNvSpPr txBox="1"/>
+          <p:nvPr/>
+        </p:nvSpPr>
+        <p:spPr>
+          <a:xfrm>
+            <a:off x="5252383" y="865025"/>
+            <a:ext cx="1739579" cy="288990"/>
+          </a:xfrm>
+          <a:prstGeom prst="rect">
+            <a:avLst/>
+          </a:prstGeom>
+          <a:noFill/>
+        </p:spPr>
+        <p:txBody>
+          <a:bodyPr wrap="none" rtlCol="0">
+            <a:spAutoFit/>
+          </a:bodyPr>
+          <a:lstStyle/>
+          <a:p>
+            <a:r>
+              <a:rPr lang="el-GR" sz="1278" dirty="0"/>
+              <a:t>γ</a:t>
+            </a:r>
+            <a:r>
+              <a:rPr lang="en-IN" sz="1278" dirty="0"/>
+              <a:t> = </a:t>
+            </a:r>
+            <a:r>
+              <a:rPr lang="en-IN" sz="1278" dirty="0" smtClean="0"/>
+              <a:t>55 </a:t>
+            </a:r>
+            <a:r>
+              <a:rPr lang="en-IN" sz="1278" dirty="0" err="1"/>
+              <a:t>mN</a:t>
+            </a:r>
+            <a:r>
+              <a:rPr lang="en-IN" sz="1278" dirty="0"/>
+              <a:t> m</a:t>
+            </a:r>
+            <a:r>
+              <a:rPr lang="en-IN" sz="1278" baseline="30000" dirty="0"/>
+              <a:t>-1</a:t>
+            </a:r>
+            <a:r>
+              <a:rPr lang="en-IN" sz="1278" dirty="0"/>
+              <a:t>, </a:t>
+            </a:r>
+            <a:r>
+              <a:rPr lang="el-GR" sz="1278" dirty="0"/>
+              <a:t>θ</a:t>
+            </a:r>
+            <a:r>
+              <a:rPr lang="en-US" sz="1278" dirty="0"/>
+              <a:t> = </a:t>
+            </a:r>
+            <a:r>
+              <a:rPr lang="en-US" sz="1278" dirty="0" smtClean="0"/>
+              <a:t>138</a:t>
+            </a:r>
+            <a:r>
+              <a:rPr lang="aa-ET" sz="1278" dirty="0" smtClean="0"/>
+              <a:t>°</a:t>
+            </a:r>
+            <a:endParaRPr lang="en-US" sz="1278" dirty="0"/>
+          </a:p>
+        </p:txBody>
+      </p:sp>
+      <p:sp>
+        <p:nvSpPr>
+          <p:cNvPr id="24" name="TextBox 23"/>
+          <p:cNvSpPr txBox="1"/>
+          <p:nvPr/>
+        </p:nvSpPr>
+        <p:spPr>
+          <a:xfrm>
+            <a:off x="5275663" y="1825753"/>
+            <a:ext cx="1656223" cy="288990"/>
+          </a:xfrm>
+          <a:prstGeom prst="rect">
+            <a:avLst/>
+          </a:prstGeom>
+          <a:noFill/>
+        </p:spPr>
+        <p:txBody>
+          <a:bodyPr wrap="none" rtlCol="0">
+            <a:spAutoFit/>
+          </a:bodyPr>
+          <a:lstStyle/>
+          <a:p>
+            <a:r>
+              <a:rPr lang="el-GR" sz="1278" dirty="0"/>
+              <a:t>γ</a:t>
+            </a:r>
+            <a:r>
+              <a:rPr lang="en-IN" sz="1278" dirty="0"/>
+              <a:t> = </a:t>
+            </a:r>
+            <a:r>
+              <a:rPr lang="en-IN" sz="1278" dirty="0" smtClean="0"/>
+              <a:t>55 </a:t>
+            </a:r>
+            <a:r>
+              <a:rPr lang="en-IN" sz="1278" dirty="0" err="1"/>
+              <a:t>mN</a:t>
+            </a:r>
+            <a:r>
+              <a:rPr lang="en-IN" sz="1278" dirty="0"/>
+              <a:t> m</a:t>
+            </a:r>
+            <a:r>
+              <a:rPr lang="en-IN" sz="1278" baseline="30000" dirty="0"/>
+              <a:t>-1</a:t>
+            </a:r>
+            <a:r>
+              <a:rPr lang="en-IN" sz="1278" dirty="0"/>
+              <a:t>, </a:t>
+            </a:r>
+            <a:r>
+              <a:rPr lang="el-GR" sz="1278" dirty="0"/>
+              <a:t>θ</a:t>
+            </a:r>
+            <a:r>
+              <a:rPr lang="en-US" sz="1278" dirty="0"/>
+              <a:t> = </a:t>
+            </a:r>
+            <a:r>
+              <a:rPr lang="en-US" sz="1278" dirty="0" smtClean="0"/>
+              <a:t>70</a:t>
+            </a:r>
+            <a:r>
+              <a:rPr lang="aa-ET" sz="1278" dirty="0" smtClean="0"/>
+              <a:t>°</a:t>
+            </a:r>
+            <a:endParaRPr lang="en-US" sz="1278" dirty="0"/>
+          </a:p>
+        </p:txBody>
+      </p:sp>
+      <p:sp>
+        <p:nvSpPr>
+          <p:cNvPr id="2" name="TextBox 1"/>
+          <p:cNvSpPr txBox="1"/>
+          <p:nvPr/>
+        </p:nvSpPr>
+        <p:spPr>
+          <a:xfrm>
+            <a:off x="1696812" y="450713"/>
+            <a:ext cx="1149674" cy="288990"/>
+          </a:xfrm>
+          <a:prstGeom prst="rect">
+            <a:avLst/>
+          </a:prstGeom>
+          <a:noFill/>
+        </p:spPr>
+        <p:txBody>
+          <a:bodyPr wrap="none" rtlCol="0">
+            <a:spAutoFit/>
+          </a:bodyPr>
+          <a:lstStyle/>
+          <a:p>
+            <a:r>
+              <a:rPr lang="en-IN" sz="1278" b="1" dirty="0">
                 <a:solidFill>
                   <a:schemeClr val="bg1"/>
                 </a:solidFill>
-              </a:endParaRPr>
-            </a:p>
-          </p:txBody>
-        </p:sp>
-        <p:sp>
-          <p:nvSpPr>
-            <p:cNvPr id="18" name="TextBox 17"/>
-            <p:cNvSpPr txBox="1"/>
-            <p:nvPr/>
-          </p:nvSpPr>
-          <p:spPr>
-            <a:xfrm>
-              <a:off x="3028917" y="2893884"/>
-              <a:ext cx="1799385" cy="452306"/>
-            </a:xfrm>
-            <a:prstGeom prst="rect">
-              <a:avLst/>
-            </a:prstGeom>
-            <a:noFill/>
-          </p:spPr>
-          <p:txBody>
-            <a:bodyPr wrap="none" rtlCol="0">
-              <a:spAutoFit/>
-            </a:bodyPr>
-            <a:lstStyle/>
-            <a:p>
-              <a:r>
-                <a:rPr lang="en-IN" sz="1278" b="1" dirty="0">
-                  <a:solidFill>
-                    <a:schemeClr val="bg1"/>
-                  </a:solidFill>
-                </a:rPr>
-                <a:t>High adhesion</a:t>
-              </a:r>
-              <a:endParaRPr lang="en-US" sz="1278" b="1" dirty="0">
+              </a:rPr>
+              <a:t>High adhesion</a:t>
+            </a:r>
+            <a:endParaRPr lang="en-US" sz="1278" b="1" dirty="0">
+              <a:solidFill>
+                <a:schemeClr val="bg1"/>
+              </a:solidFill>
+            </a:endParaRPr>
+          </a:p>
+        </p:txBody>
+      </p:sp>
+      <p:sp>
+        <p:nvSpPr>
+          <p:cNvPr id="18" name="TextBox 17"/>
+          <p:cNvSpPr txBox="1"/>
+          <p:nvPr/>
+        </p:nvSpPr>
+        <p:spPr>
+          <a:xfrm>
+            <a:off x="1696812" y="1379859"/>
+            <a:ext cx="1149674" cy="288990"/>
+          </a:xfrm>
+          <a:prstGeom prst="rect">
+            <a:avLst/>
+          </a:prstGeom>
+          <a:noFill/>
+        </p:spPr>
+        <p:txBody>
+          <a:bodyPr wrap="none" rtlCol="0">
+            <a:spAutoFit/>
+          </a:bodyPr>
+          <a:lstStyle/>
+          <a:p>
+            <a:r>
+              <a:rPr lang="en-IN" sz="1278" b="1" dirty="0">
                 <a:solidFill>
                   <a:schemeClr val="bg1"/>
                 </a:solidFill>
-              </a:endParaRPr>
-            </a:p>
-          </p:txBody>
-        </p:sp>
-        <p:sp>
-          <p:nvSpPr>
-            <p:cNvPr id="19" name="TextBox 18"/>
-            <p:cNvSpPr txBox="1"/>
-            <p:nvPr/>
-          </p:nvSpPr>
-          <p:spPr>
-            <a:xfrm>
-              <a:off x="8205497" y="2893884"/>
-              <a:ext cx="2017659" cy="452306"/>
-            </a:xfrm>
-            <a:prstGeom prst="rect">
-              <a:avLst/>
-            </a:prstGeom>
-            <a:noFill/>
-          </p:spPr>
-          <p:txBody>
-            <a:bodyPr wrap="none" rtlCol="0">
-              <a:spAutoFit/>
-            </a:bodyPr>
-            <a:lstStyle/>
-            <a:p>
-              <a:r>
-                <a:rPr lang="en-IN" sz="1278" b="1" dirty="0">
-                  <a:solidFill>
-                    <a:schemeClr val="bg1"/>
-                  </a:solidFill>
-                </a:rPr>
-                <a:t>Higher adhesion</a:t>
-              </a:r>
-              <a:endParaRPr lang="en-US" sz="1278" b="1" dirty="0">
+              </a:rPr>
+              <a:t>High adhesion</a:t>
+            </a:r>
+            <a:endParaRPr lang="en-US" sz="1278" b="1" dirty="0">
+              <a:solidFill>
+                <a:schemeClr val="bg1"/>
+              </a:solidFill>
+            </a:endParaRPr>
+          </a:p>
+        </p:txBody>
+      </p:sp>
+      <p:sp>
+        <p:nvSpPr>
+          <p:cNvPr id="22" name="TextBox 21"/>
+          <p:cNvSpPr txBox="1"/>
+          <p:nvPr/>
+        </p:nvSpPr>
+        <p:spPr>
+          <a:xfrm>
+            <a:off x="5089949" y="450712"/>
+            <a:ext cx="1120500" cy="288990"/>
+          </a:xfrm>
+          <a:prstGeom prst="rect">
+            <a:avLst/>
+          </a:prstGeom>
+          <a:noFill/>
+        </p:spPr>
+        <p:txBody>
+          <a:bodyPr wrap="none" rtlCol="0">
+            <a:spAutoFit/>
+          </a:bodyPr>
+          <a:lstStyle/>
+          <a:p>
+            <a:r>
+              <a:rPr lang="en-IN" sz="1278" b="1" dirty="0">
                 <a:solidFill>
                   <a:schemeClr val="bg1"/>
                 </a:solidFill>
-              </a:endParaRPr>
-            </a:p>
-          </p:txBody>
-        </p:sp>
-        <p:sp>
-          <p:nvSpPr>
-            <p:cNvPr id="22" name="TextBox 21"/>
-            <p:cNvSpPr txBox="1"/>
-            <p:nvPr/>
-          </p:nvSpPr>
-          <p:spPr>
-            <a:xfrm>
-              <a:off x="8339605" y="1439653"/>
-              <a:ext cx="1753724" cy="452306"/>
-            </a:xfrm>
-            <a:prstGeom prst="rect">
-              <a:avLst/>
-            </a:prstGeom>
-            <a:noFill/>
-          </p:spPr>
-          <p:txBody>
-            <a:bodyPr wrap="none" rtlCol="0">
-              <a:spAutoFit/>
-            </a:bodyPr>
-            <a:lstStyle/>
-            <a:p>
-              <a:r>
-                <a:rPr lang="en-IN" sz="1278" b="1" dirty="0">
-                  <a:solidFill>
-                    <a:schemeClr val="bg1"/>
-                  </a:solidFill>
-                </a:rPr>
-                <a:t>Low adhesion</a:t>
-              </a:r>
-              <a:endParaRPr lang="en-US" sz="1278" b="1" dirty="0">
+              </a:rPr>
+              <a:t>Low adhesion</a:t>
+            </a:r>
+            <a:endParaRPr lang="en-US" sz="1278" b="1" dirty="0">
+              <a:solidFill>
+                <a:schemeClr val="bg1"/>
+              </a:solidFill>
+            </a:endParaRPr>
+          </a:p>
+        </p:txBody>
+      </p:sp>
+      <p:sp>
+        <p:nvSpPr>
+          <p:cNvPr id="19" name="TextBox 18"/>
+          <p:cNvSpPr txBox="1"/>
+          <p:nvPr/>
+        </p:nvSpPr>
+        <p:spPr>
+          <a:xfrm>
+            <a:off x="5004264" y="1379859"/>
+            <a:ext cx="1289135" cy="288990"/>
+          </a:xfrm>
+          <a:prstGeom prst="rect">
+            <a:avLst/>
+          </a:prstGeom>
+          <a:noFill/>
+        </p:spPr>
+        <p:txBody>
+          <a:bodyPr wrap="none" rtlCol="0">
+            <a:spAutoFit/>
+          </a:bodyPr>
+          <a:lstStyle/>
+          <a:p>
+            <a:r>
+              <a:rPr lang="en-IN" sz="1278" b="1" dirty="0">
                 <a:solidFill>
                   <a:schemeClr val="bg1"/>
                 </a:solidFill>
-              </a:endParaRPr>
-            </a:p>
-          </p:txBody>
-        </p:sp>
-      </p:grpSp>
+              </a:rPr>
+              <a:t>Higher adhesion</a:t>
+            </a:r>
+            <a:endParaRPr lang="en-US" sz="1278" b="1" dirty="0">
+              <a:solidFill>
+                <a:schemeClr val="bg1"/>
+              </a:solidFill>
+            </a:endParaRPr>
+          </a:p>
+        </p:txBody>
+      </p:sp>
     </p:spTree>
     <p:extLst>
       <p:ext uri="{BB962C8B-B14F-4D97-AF65-F5344CB8AC3E}">

</xml_diff>

<commit_message>
responded to Reviewer 2 comments.
updated MS and figures and supplementary based on his elaborate comments.
</commit_message>
<xml_diff>
--- a/Data/schematics.pptx
+++ b/Data/schematics.pptx
@@ -2,7 +2,7 @@
 <file path=ppt/presentation.xml><?xml version="1.0" encoding="utf-8"?>
 <p:presentation xmlns:a="http://schemas.openxmlformats.org/drawingml/2006/main" xmlns:r="http://schemas.openxmlformats.org/officeDocument/2006/relationships" xmlns:p="http://schemas.openxmlformats.org/presentationml/2006/main" saveSubsetFonts="1">
   <p:sldMasterIdLst>
-    <p:sldMasterId id="2147483684" r:id="rId1"/>
+    <p:sldMasterId id="2147483732" r:id="rId1"/>
   </p:sldMasterIdLst>
   <p:sldIdLst>
     <p:sldId id="261" r:id="rId2"/>
@@ -12,7 +12,7 @@
     <p:sldId id="258" r:id="rId6"/>
     <p:sldId id="259" r:id="rId7"/>
   </p:sldIdLst>
-  <p:sldSz cx="7199313" cy="2311400"/>
+  <p:sldSz cx="7199313" cy="2160588"/>
   <p:notesSz cx="6858000" cy="9144000"/>
   <p:defaultTextStyle>
     <a:defPPr>
@@ -146,15 +146,15 @@
         </p:nvSpPr>
         <p:spPr>
           <a:xfrm>
-            <a:off x="899914" y="378278"/>
-            <a:ext cx="5399485" cy="804710"/>
+            <a:off x="899915" y="353598"/>
+            <a:ext cx="5399484" cy="752205"/>
           </a:xfrm>
         </p:spPr>
         <p:txBody>
           <a:bodyPr anchor="b"/>
           <a:lstStyle>
             <a:lvl1pPr algn="ctr">
-              <a:defRPr sz="2022"/>
+              <a:defRPr sz="1890"/>
             </a:lvl1pPr>
           </a:lstStyle>
           <a:p>
@@ -178,8 +178,8 @@
         </p:nvSpPr>
         <p:spPr>
           <a:xfrm>
-            <a:off x="899914" y="1214020"/>
-            <a:ext cx="5399485" cy="558053"/>
+            <a:off x="899915" y="1134809"/>
+            <a:ext cx="5399484" cy="521642"/>
           </a:xfrm>
         </p:spPr>
         <p:txBody>
@@ -187,39 +187,39 @@
           <a:lstStyle>
             <a:lvl1pPr marL="0" indent="0" algn="ctr">
               <a:buNone/>
-              <a:defRPr sz="809"/>
+              <a:defRPr sz="756"/>
             </a:lvl1pPr>
-            <a:lvl2pPr marL="154076" indent="0" algn="ctr">
+            <a:lvl2pPr marL="144018" indent="0" algn="ctr">
               <a:buNone/>
-              <a:defRPr sz="674"/>
+              <a:defRPr sz="630"/>
             </a:lvl2pPr>
-            <a:lvl3pPr marL="308153" indent="0" algn="ctr">
+            <a:lvl3pPr marL="288036" indent="0" algn="ctr">
               <a:buNone/>
-              <a:defRPr sz="607"/>
+              <a:defRPr sz="567"/>
             </a:lvl3pPr>
-            <a:lvl4pPr marL="462229" indent="0" algn="ctr">
+            <a:lvl4pPr marL="432054" indent="0" algn="ctr">
               <a:buNone/>
-              <a:defRPr sz="539"/>
+              <a:defRPr sz="504"/>
             </a:lvl4pPr>
-            <a:lvl5pPr marL="616306" indent="0" algn="ctr">
+            <a:lvl5pPr marL="576072" indent="0" algn="ctr">
               <a:buNone/>
-              <a:defRPr sz="539"/>
+              <a:defRPr sz="504"/>
             </a:lvl5pPr>
-            <a:lvl6pPr marL="770382" indent="0" algn="ctr">
+            <a:lvl6pPr marL="720090" indent="0" algn="ctr">
               <a:buNone/>
-              <a:defRPr sz="539"/>
+              <a:defRPr sz="504"/>
             </a:lvl6pPr>
-            <a:lvl7pPr marL="924458" indent="0" algn="ctr">
+            <a:lvl7pPr marL="864108" indent="0" algn="ctr">
               <a:buNone/>
-              <a:defRPr sz="539"/>
+              <a:defRPr sz="504"/>
             </a:lvl7pPr>
-            <a:lvl8pPr marL="1078535" indent="0" algn="ctr">
+            <a:lvl8pPr marL="1008126" indent="0" algn="ctr">
               <a:buNone/>
-              <a:defRPr sz="539"/>
+              <a:defRPr sz="504"/>
             </a:lvl8pPr>
-            <a:lvl9pPr marL="1232611" indent="0" algn="ctr">
+            <a:lvl9pPr marL="1152144" indent="0" algn="ctr">
               <a:buNone/>
-              <a:defRPr sz="539"/>
+              <a:defRPr sz="504"/>
             </a:lvl9pPr>
           </a:lstStyle>
           <a:p>
@@ -248,7 +248,7 @@
           <a:p>
             <a:fld id="{498A6A98-93B9-470F-BB23-351240910FD2}" type="datetimeFigureOut">
               <a:rPr lang="en-US" smtClean="0"/>
-              <a:t>8/2/2021</a:t>
+              <a:t>8/6/2021</a:t>
             </a:fld>
             <a:endParaRPr lang="en-US"/>
           </a:p>
@@ -299,7 +299,7 @@
     </p:spTree>
     <p:extLst>
       <p:ext uri="{BB962C8B-B14F-4D97-AF65-F5344CB8AC3E}">
-        <p14:creationId xmlns:p14="http://schemas.microsoft.com/office/powerpoint/2010/main" val="3033751139"/>
+        <p14:creationId xmlns:p14="http://schemas.microsoft.com/office/powerpoint/2010/main" val="773027522"/>
       </p:ext>
     </p:extLst>
   </p:cSld>
@@ -418,7 +418,7 @@
           <a:p>
             <a:fld id="{498A6A98-93B9-470F-BB23-351240910FD2}" type="datetimeFigureOut">
               <a:rPr lang="en-US" smtClean="0"/>
-              <a:t>8/2/2021</a:t>
+              <a:t>8/6/2021</a:t>
             </a:fld>
             <a:endParaRPr lang="en-US"/>
           </a:p>
@@ -469,7 +469,7 @@
     </p:spTree>
     <p:extLst>
       <p:ext uri="{BB962C8B-B14F-4D97-AF65-F5344CB8AC3E}">
-        <p14:creationId xmlns:p14="http://schemas.microsoft.com/office/powerpoint/2010/main" val="2855460795"/>
+        <p14:creationId xmlns:p14="http://schemas.microsoft.com/office/powerpoint/2010/main" val="3859335487"/>
       </p:ext>
     </p:extLst>
   </p:cSld>
@@ -508,8 +508,8 @@
         </p:nvSpPr>
         <p:spPr>
           <a:xfrm>
-            <a:off x="5152008" y="123060"/>
-            <a:ext cx="1552352" cy="1958805"/>
+            <a:off x="5152008" y="115032"/>
+            <a:ext cx="1552352" cy="1830998"/>
           </a:xfrm>
         </p:spPr>
         <p:txBody>
@@ -536,8 +536,8 @@
         </p:nvSpPr>
         <p:spPr>
           <a:xfrm>
-            <a:off x="494953" y="123060"/>
-            <a:ext cx="4567064" cy="1958805"/>
+            <a:off x="494953" y="115032"/>
+            <a:ext cx="4567064" cy="1830998"/>
           </a:xfrm>
         </p:spPr>
         <p:txBody>
@@ -598,7 +598,7 @@
           <a:p>
             <a:fld id="{498A6A98-93B9-470F-BB23-351240910FD2}" type="datetimeFigureOut">
               <a:rPr lang="en-US" smtClean="0"/>
-              <a:t>8/2/2021</a:t>
+              <a:t>8/6/2021</a:t>
             </a:fld>
             <a:endParaRPr lang="en-US"/>
           </a:p>
@@ -649,7 +649,7 @@
     </p:spTree>
     <p:extLst>
       <p:ext uri="{BB962C8B-B14F-4D97-AF65-F5344CB8AC3E}">
-        <p14:creationId xmlns:p14="http://schemas.microsoft.com/office/powerpoint/2010/main" val="1304538009"/>
+        <p14:creationId xmlns:p14="http://schemas.microsoft.com/office/powerpoint/2010/main" val="2608119996"/>
       </p:ext>
     </p:extLst>
   </p:cSld>
@@ -768,7 +768,7 @@
           <a:p>
             <a:fld id="{498A6A98-93B9-470F-BB23-351240910FD2}" type="datetimeFigureOut">
               <a:rPr lang="en-US" smtClean="0"/>
-              <a:t>8/2/2021</a:t>
+              <a:t>8/6/2021</a:t>
             </a:fld>
             <a:endParaRPr lang="en-US"/>
           </a:p>
@@ -819,7 +819,7 @@
     </p:spTree>
     <p:extLst>
       <p:ext uri="{BB962C8B-B14F-4D97-AF65-F5344CB8AC3E}">
-        <p14:creationId xmlns:p14="http://schemas.microsoft.com/office/powerpoint/2010/main" val="2523074329"/>
+        <p14:creationId xmlns:p14="http://schemas.microsoft.com/office/powerpoint/2010/main" val="1447505062"/>
       </p:ext>
     </p:extLst>
   </p:cSld>
@@ -858,15 +858,15 @@
         </p:nvSpPr>
         <p:spPr>
           <a:xfrm>
-            <a:off x="491203" y="576245"/>
-            <a:ext cx="6209407" cy="961478"/>
+            <a:off x="491204" y="538647"/>
+            <a:ext cx="6209408" cy="898744"/>
           </a:xfrm>
         </p:spPr>
         <p:txBody>
           <a:bodyPr anchor="b"/>
           <a:lstStyle>
             <a:lvl1pPr>
-              <a:defRPr sz="2022"/>
+              <a:defRPr sz="1890"/>
             </a:lvl1pPr>
           </a:lstStyle>
           <a:p>
@@ -890,8 +890,8 @@
         </p:nvSpPr>
         <p:spPr>
           <a:xfrm>
-            <a:off x="491203" y="1546819"/>
-            <a:ext cx="6209407" cy="505619"/>
+            <a:off x="491204" y="1445894"/>
+            <a:ext cx="6209408" cy="472628"/>
           </a:xfrm>
         </p:spPr>
         <p:txBody>
@@ -899,7 +899,7 @@
           <a:lstStyle>
             <a:lvl1pPr marL="0" indent="0">
               <a:buNone/>
-              <a:defRPr sz="809">
+              <a:defRPr sz="756">
                 <a:solidFill>
                   <a:schemeClr val="tx1">
                     <a:tint val="75000"/>
@@ -907,9 +907,9 @@
                 </a:solidFill>
               </a:defRPr>
             </a:lvl1pPr>
-            <a:lvl2pPr marL="154076" indent="0">
+            <a:lvl2pPr marL="144018" indent="0">
               <a:buNone/>
-              <a:defRPr sz="674">
+              <a:defRPr sz="630">
                 <a:solidFill>
                   <a:schemeClr val="tx1">
                     <a:tint val="75000"/>
@@ -917,9 +917,9 @@
                 </a:solidFill>
               </a:defRPr>
             </a:lvl2pPr>
-            <a:lvl3pPr marL="308153" indent="0">
+            <a:lvl3pPr marL="288036" indent="0">
               <a:buNone/>
-              <a:defRPr sz="607">
+              <a:defRPr sz="567">
                 <a:solidFill>
                   <a:schemeClr val="tx1">
                     <a:tint val="75000"/>
@@ -927,9 +927,9 @@
                 </a:solidFill>
               </a:defRPr>
             </a:lvl3pPr>
-            <a:lvl4pPr marL="462229" indent="0">
+            <a:lvl4pPr marL="432054" indent="0">
               <a:buNone/>
-              <a:defRPr sz="539">
+              <a:defRPr sz="504">
                 <a:solidFill>
                   <a:schemeClr val="tx1">
                     <a:tint val="75000"/>
@@ -937,9 +937,9 @@
                 </a:solidFill>
               </a:defRPr>
             </a:lvl4pPr>
-            <a:lvl5pPr marL="616306" indent="0">
+            <a:lvl5pPr marL="576072" indent="0">
               <a:buNone/>
-              <a:defRPr sz="539">
+              <a:defRPr sz="504">
                 <a:solidFill>
                   <a:schemeClr val="tx1">
                     <a:tint val="75000"/>
@@ -947,9 +947,9 @@
                 </a:solidFill>
               </a:defRPr>
             </a:lvl5pPr>
-            <a:lvl6pPr marL="770382" indent="0">
+            <a:lvl6pPr marL="720090" indent="0">
               <a:buNone/>
-              <a:defRPr sz="539">
+              <a:defRPr sz="504">
                 <a:solidFill>
                   <a:schemeClr val="tx1">
                     <a:tint val="75000"/>
@@ -957,9 +957,9 @@
                 </a:solidFill>
               </a:defRPr>
             </a:lvl6pPr>
-            <a:lvl7pPr marL="924458" indent="0">
+            <a:lvl7pPr marL="864108" indent="0">
               <a:buNone/>
-              <a:defRPr sz="539">
+              <a:defRPr sz="504">
                 <a:solidFill>
                   <a:schemeClr val="tx1">
                     <a:tint val="75000"/>
@@ -967,9 +967,9 @@
                 </a:solidFill>
               </a:defRPr>
             </a:lvl7pPr>
-            <a:lvl8pPr marL="1078535" indent="0">
+            <a:lvl8pPr marL="1008126" indent="0">
               <a:buNone/>
-              <a:defRPr sz="539">
+              <a:defRPr sz="504">
                 <a:solidFill>
                   <a:schemeClr val="tx1">
                     <a:tint val="75000"/>
@@ -977,9 +977,9 @@
                 </a:solidFill>
               </a:defRPr>
             </a:lvl8pPr>
-            <a:lvl9pPr marL="1232611" indent="0">
+            <a:lvl9pPr marL="1152144" indent="0">
               <a:buNone/>
-              <a:defRPr sz="539">
+              <a:defRPr sz="504">
                 <a:solidFill>
                   <a:schemeClr val="tx1">
                     <a:tint val="75000"/>
@@ -1014,7 +1014,7 @@
           <a:p>
             <a:fld id="{498A6A98-93B9-470F-BB23-351240910FD2}" type="datetimeFigureOut">
               <a:rPr lang="en-US" smtClean="0"/>
-              <a:t>8/2/2021</a:t>
+              <a:t>8/6/2021</a:t>
             </a:fld>
             <a:endParaRPr lang="en-US"/>
           </a:p>
@@ -1065,7 +1065,7 @@
     </p:spTree>
     <p:extLst>
       <p:ext uri="{BB962C8B-B14F-4D97-AF65-F5344CB8AC3E}">
-        <p14:creationId xmlns:p14="http://schemas.microsoft.com/office/powerpoint/2010/main" val="847181479"/>
+        <p14:creationId xmlns:p14="http://schemas.microsoft.com/office/powerpoint/2010/main" val="1278809579"/>
       </p:ext>
     </p:extLst>
   </p:cSld>
@@ -1127,8 +1127,8 @@
         </p:nvSpPr>
         <p:spPr>
           <a:xfrm>
-            <a:off x="494953" y="615303"/>
-            <a:ext cx="3059708" cy="1466562"/>
+            <a:off x="494953" y="575159"/>
+            <a:ext cx="3059708" cy="1370873"/>
           </a:xfrm>
         </p:spPr>
         <p:txBody>
@@ -1184,8 +1184,8 @@
         </p:nvSpPr>
         <p:spPr>
           <a:xfrm>
-            <a:off x="3644652" y="615303"/>
-            <a:ext cx="3059708" cy="1466562"/>
+            <a:off x="3644652" y="575159"/>
+            <a:ext cx="3059708" cy="1370873"/>
           </a:xfrm>
         </p:spPr>
         <p:txBody>
@@ -1246,7 +1246,7 @@
           <a:p>
             <a:fld id="{498A6A98-93B9-470F-BB23-351240910FD2}" type="datetimeFigureOut">
               <a:rPr lang="en-US" smtClean="0"/>
-              <a:t>8/2/2021</a:t>
+              <a:t>8/6/2021</a:t>
             </a:fld>
             <a:endParaRPr lang="en-US"/>
           </a:p>
@@ -1297,7 +1297,7 @@
     </p:spTree>
     <p:extLst>
       <p:ext uri="{BB962C8B-B14F-4D97-AF65-F5344CB8AC3E}">
-        <p14:creationId xmlns:p14="http://schemas.microsoft.com/office/powerpoint/2010/main" val="144413806"/>
+        <p14:creationId xmlns:p14="http://schemas.microsoft.com/office/powerpoint/2010/main" val="3864225985"/>
       </p:ext>
     </p:extLst>
   </p:cSld>
@@ -1336,8 +1336,8 @@
         </p:nvSpPr>
         <p:spPr>
           <a:xfrm>
-            <a:off x="495891" y="123061"/>
-            <a:ext cx="6209407" cy="446764"/>
+            <a:off x="495892" y="115031"/>
+            <a:ext cx="6209408" cy="417614"/>
           </a:xfrm>
         </p:spPr>
         <p:txBody>
@@ -1364,8 +1364,8 @@
         </p:nvSpPr>
         <p:spPr>
           <a:xfrm>
-            <a:off x="495891" y="566614"/>
-            <a:ext cx="3045647" cy="277689"/>
+            <a:off x="495892" y="529645"/>
+            <a:ext cx="3045647" cy="259570"/>
           </a:xfrm>
         </p:spPr>
         <p:txBody>
@@ -1373,39 +1373,39 @@
           <a:lstStyle>
             <a:lvl1pPr marL="0" indent="0">
               <a:buNone/>
-              <a:defRPr sz="809" b="1"/>
+              <a:defRPr sz="756" b="1"/>
             </a:lvl1pPr>
-            <a:lvl2pPr marL="154076" indent="0">
+            <a:lvl2pPr marL="144018" indent="0">
               <a:buNone/>
-              <a:defRPr sz="674" b="1"/>
+              <a:defRPr sz="630" b="1"/>
             </a:lvl2pPr>
-            <a:lvl3pPr marL="308153" indent="0">
+            <a:lvl3pPr marL="288036" indent="0">
               <a:buNone/>
-              <a:defRPr sz="607" b="1"/>
+              <a:defRPr sz="567" b="1"/>
             </a:lvl3pPr>
-            <a:lvl4pPr marL="462229" indent="0">
+            <a:lvl4pPr marL="432054" indent="0">
               <a:buNone/>
-              <a:defRPr sz="539" b="1"/>
+              <a:defRPr sz="504" b="1"/>
             </a:lvl4pPr>
-            <a:lvl5pPr marL="616306" indent="0">
+            <a:lvl5pPr marL="576072" indent="0">
               <a:buNone/>
-              <a:defRPr sz="539" b="1"/>
+              <a:defRPr sz="504" b="1"/>
             </a:lvl5pPr>
-            <a:lvl6pPr marL="770382" indent="0">
+            <a:lvl6pPr marL="720090" indent="0">
               <a:buNone/>
-              <a:defRPr sz="539" b="1"/>
+              <a:defRPr sz="504" b="1"/>
             </a:lvl6pPr>
-            <a:lvl7pPr marL="924458" indent="0">
+            <a:lvl7pPr marL="864108" indent="0">
               <a:buNone/>
-              <a:defRPr sz="539" b="1"/>
+              <a:defRPr sz="504" b="1"/>
             </a:lvl7pPr>
-            <a:lvl8pPr marL="1078535" indent="0">
+            <a:lvl8pPr marL="1008126" indent="0">
               <a:buNone/>
-              <a:defRPr sz="539" b="1"/>
+              <a:defRPr sz="504" b="1"/>
             </a:lvl8pPr>
-            <a:lvl9pPr marL="1232611" indent="0">
+            <a:lvl9pPr marL="1152144" indent="0">
               <a:buNone/>
-              <a:defRPr sz="539" b="1"/>
+              <a:defRPr sz="504" b="1"/>
             </a:lvl9pPr>
           </a:lstStyle>
           <a:p>
@@ -1429,8 +1429,8 @@
         </p:nvSpPr>
         <p:spPr>
           <a:xfrm>
-            <a:off x="495891" y="844303"/>
-            <a:ext cx="3045647" cy="1241843"/>
+            <a:off x="495892" y="789215"/>
+            <a:ext cx="3045647" cy="1160816"/>
           </a:xfrm>
         </p:spPr>
         <p:txBody>
@@ -1486,8 +1486,8 @@
         </p:nvSpPr>
         <p:spPr>
           <a:xfrm>
-            <a:off x="3644652" y="566614"/>
-            <a:ext cx="3060646" cy="277689"/>
+            <a:off x="3644652" y="529645"/>
+            <a:ext cx="3060646" cy="259570"/>
           </a:xfrm>
         </p:spPr>
         <p:txBody>
@@ -1495,39 +1495,39 @@
           <a:lstStyle>
             <a:lvl1pPr marL="0" indent="0">
               <a:buNone/>
-              <a:defRPr sz="809" b="1"/>
+              <a:defRPr sz="756" b="1"/>
             </a:lvl1pPr>
-            <a:lvl2pPr marL="154076" indent="0">
+            <a:lvl2pPr marL="144018" indent="0">
               <a:buNone/>
-              <a:defRPr sz="674" b="1"/>
+              <a:defRPr sz="630" b="1"/>
             </a:lvl2pPr>
-            <a:lvl3pPr marL="308153" indent="0">
+            <a:lvl3pPr marL="288036" indent="0">
               <a:buNone/>
-              <a:defRPr sz="607" b="1"/>
+              <a:defRPr sz="567" b="1"/>
             </a:lvl3pPr>
-            <a:lvl4pPr marL="462229" indent="0">
+            <a:lvl4pPr marL="432054" indent="0">
               <a:buNone/>
-              <a:defRPr sz="539" b="1"/>
+              <a:defRPr sz="504" b="1"/>
             </a:lvl4pPr>
-            <a:lvl5pPr marL="616306" indent="0">
+            <a:lvl5pPr marL="576072" indent="0">
               <a:buNone/>
-              <a:defRPr sz="539" b="1"/>
+              <a:defRPr sz="504" b="1"/>
             </a:lvl5pPr>
-            <a:lvl6pPr marL="770382" indent="0">
+            <a:lvl6pPr marL="720090" indent="0">
               <a:buNone/>
-              <a:defRPr sz="539" b="1"/>
+              <a:defRPr sz="504" b="1"/>
             </a:lvl6pPr>
-            <a:lvl7pPr marL="924458" indent="0">
+            <a:lvl7pPr marL="864108" indent="0">
               <a:buNone/>
-              <a:defRPr sz="539" b="1"/>
+              <a:defRPr sz="504" b="1"/>
             </a:lvl7pPr>
-            <a:lvl8pPr marL="1078535" indent="0">
+            <a:lvl8pPr marL="1008126" indent="0">
               <a:buNone/>
-              <a:defRPr sz="539" b="1"/>
+              <a:defRPr sz="504" b="1"/>
             </a:lvl8pPr>
-            <a:lvl9pPr marL="1232611" indent="0">
+            <a:lvl9pPr marL="1152144" indent="0">
               <a:buNone/>
-              <a:defRPr sz="539" b="1"/>
+              <a:defRPr sz="504" b="1"/>
             </a:lvl9pPr>
           </a:lstStyle>
           <a:p>
@@ -1551,8 +1551,8 @@
         </p:nvSpPr>
         <p:spPr>
           <a:xfrm>
-            <a:off x="3644652" y="844303"/>
-            <a:ext cx="3060646" cy="1241843"/>
+            <a:off x="3644652" y="789215"/>
+            <a:ext cx="3060646" cy="1160816"/>
           </a:xfrm>
         </p:spPr>
         <p:txBody>
@@ -1613,7 +1613,7 @@
           <a:p>
             <a:fld id="{498A6A98-93B9-470F-BB23-351240910FD2}" type="datetimeFigureOut">
               <a:rPr lang="en-US" smtClean="0"/>
-              <a:t>8/2/2021</a:t>
+              <a:t>8/6/2021</a:t>
             </a:fld>
             <a:endParaRPr lang="en-US"/>
           </a:p>
@@ -1664,7 +1664,7 @@
     </p:spTree>
     <p:extLst>
       <p:ext uri="{BB962C8B-B14F-4D97-AF65-F5344CB8AC3E}">
-        <p14:creationId xmlns:p14="http://schemas.microsoft.com/office/powerpoint/2010/main" val="846644521"/>
+        <p14:creationId xmlns:p14="http://schemas.microsoft.com/office/powerpoint/2010/main" val="1126581975"/>
       </p:ext>
     </p:extLst>
   </p:cSld>
@@ -1731,7 +1731,7 @@
           <a:p>
             <a:fld id="{498A6A98-93B9-470F-BB23-351240910FD2}" type="datetimeFigureOut">
               <a:rPr lang="en-US" smtClean="0"/>
-              <a:t>8/2/2021</a:t>
+              <a:t>8/6/2021</a:t>
             </a:fld>
             <a:endParaRPr lang="en-US"/>
           </a:p>
@@ -1782,7 +1782,7 @@
     </p:spTree>
     <p:extLst>
       <p:ext uri="{BB962C8B-B14F-4D97-AF65-F5344CB8AC3E}">
-        <p14:creationId xmlns:p14="http://schemas.microsoft.com/office/powerpoint/2010/main" val="3911115568"/>
+        <p14:creationId xmlns:p14="http://schemas.microsoft.com/office/powerpoint/2010/main" val="1696402275"/>
       </p:ext>
     </p:extLst>
   </p:cSld>
@@ -1826,7 +1826,7 @@
           <a:p>
             <a:fld id="{498A6A98-93B9-470F-BB23-351240910FD2}" type="datetimeFigureOut">
               <a:rPr lang="en-US" smtClean="0"/>
-              <a:t>8/2/2021</a:t>
+              <a:t>8/6/2021</a:t>
             </a:fld>
             <a:endParaRPr lang="en-US"/>
           </a:p>
@@ -1877,7 +1877,7 @@
     </p:spTree>
     <p:extLst>
       <p:ext uri="{BB962C8B-B14F-4D97-AF65-F5344CB8AC3E}">
-        <p14:creationId xmlns:p14="http://schemas.microsoft.com/office/powerpoint/2010/main" val="3130778679"/>
+        <p14:creationId xmlns:p14="http://schemas.microsoft.com/office/powerpoint/2010/main" val="732868688"/>
       </p:ext>
     </p:extLst>
   </p:cSld>
@@ -1916,15 +1916,15 @@
         </p:nvSpPr>
         <p:spPr>
           <a:xfrm>
-            <a:off x="495891" y="154093"/>
-            <a:ext cx="2321966" cy="539327"/>
+            <a:off x="495892" y="144041"/>
+            <a:ext cx="2321966" cy="504137"/>
           </a:xfrm>
         </p:spPr>
         <p:txBody>
           <a:bodyPr anchor="b"/>
           <a:lstStyle>
             <a:lvl1pPr>
-              <a:defRPr sz="1078"/>
+              <a:defRPr sz="1008"/>
             </a:lvl1pPr>
           </a:lstStyle>
           <a:p>
@@ -1948,39 +1948,39 @@
         </p:nvSpPr>
         <p:spPr>
           <a:xfrm>
-            <a:off x="3060646" y="332799"/>
-            <a:ext cx="3644652" cy="1642592"/>
+            <a:off x="3060646" y="311085"/>
+            <a:ext cx="3644652" cy="1535418"/>
           </a:xfrm>
         </p:spPr>
         <p:txBody>
           <a:bodyPr/>
           <a:lstStyle>
             <a:lvl1pPr>
-              <a:defRPr sz="1078"/>
+              <a:defRPr sz="1008"/>
             </a:lvl1pPr>
             <a:lvl2pPr>
-              <a:defRPr sz="944"/>
+              <a:defRPr sz="882"/>
             </a:lvl2pPr>
             <a:lvl3pPr>
-              <a:defRPr sz="809"/>
+              <a:defRPr sz="756"/>
             </a:lvl3pPr>
             <a:lvl4pPr>
-              <a:defRPr sz="674"/>
+              <a:defRPr sz="630"/>
             </a:lvl4pPr>
             <a:lvl5pPr>
-              <a:defRPr sz="674"/>
+              <a:defRPr sz="630"/>
             </a:lvl5pPr>
             <a:lvl6pPr>
-              <a:defRPr sz="674"/>
+              <a:defRPr sz="630"/>
             </a:lvl6pPr>
             <a:lvl7pPr>
-              <a:defRPr sz="674"/>
+              <a:defRPr sz="630"/>
             </a:lvl7pPr>
             <a:lvl8pPr>
-              <a:defRPr sz="674"/>
+              <a:defRPr sz="630"/>
             </a:lvl8pPr>
             <a:lvl9pPr>
-              <a:defRPr sz="674"/>
+              <a:defRPr sz="630"/>
             </a:lvl9pPr>
           </a:lstStyle>
           <a:p>
@@ -2033,8 +2033,8 @@
         </p:nvSpPr>
         <p:spPr>
           <a:xfrm>
-            <a:off x="495891" y="693420"/>
-            <a:ext cx="2321966" cy="1284646"/>
+            <a:off x="495892" y="648178"/>
+            <a:ext cx="2321966" cy="1200827"/>
           </a:xfrm>
         </p:spPr>
         <p:txBody>
@@ -2042,39 +2042,39 @@
           <a:lstStyle>
             <a:lvl1pPr marL="0" indent="0">
               <a:buNone/>
-              <a:defRPr sz="539"/>
+              <a:defRPr sz="504"/>
             </a:lvl1pPr>
-            <a:lvl2pPr marL="154076" indent="0">
+            <a:lvl2pPr marL="144018" indent="0">
               <a:buNone/>
-              <a:defRPr sz="472"/>
+              <a:defRPr sz="441"/>
             </a:lvl2pPr>
-            <a:lvl3pPr marL="308153" indent="0">
+            <a:lvl3pPr marL="288036" indent="0">
               <a:buNone/>
-              <a:defRPr sz="404"/>
+              <a:defRPr sz="378"/>
             </a:lvl3pPr>
-            <a:lvl4pPr marL="462229" indent="0">
+            <a:lvl4pPr marL="432054" indent="0">
               <a:buNone/>
-              <a:defRPr sz="337"/>
+              <a:defRPr sz="315"/>
             </a:lvl4pPr>
-            <a:lvl5pPr marL="616306" indent="0">
+            <a:lvl5pPr marL="576072" indent="0">
               <a:buNone/>
-              <a:defRPr sz="337"/>
+              <a:defRPr sz="315"/>
             </a:lvl5pPr>
-            <a:lvl6pPr marL="770382" indent="0">
+            <a:lvl6pPr marL="720090" indent="0">
               <a:buNone/>
-              <a:defRPr sz="337"/>
+              <a:defRPr sz="315"/>
             </a:lvl6pPr>
-            <a:lvl7pPr marL="924458" indent="0">
+            <a:lvl7pPr marL="864108" indent="0">
               <a:buNone/>
-              <a:defRPr sz="337"/>
+              <a:defRPr sz="315"/>
             </a:lvl7pPr>
-            <a:lvl8pPr marL="1078535" indent="0">
+            <a:lvl8pPr marL="1008126" indent="0">
               <a:buNone/>
-              <a:defRPr sz="337"/>
+              <a:defRPr sz="315"/>
             </a:lvl8pPr>
-            <a:lvl9pPr marL="1232611" indent="0">
+            <a:lvl9pPr marL="1152144" indent="0">
               <a:buNone/>
-              <a:defRPr sz="337"/>
+              <a:defRPr sz="315"/>
             </a:lvl9pPr>
           </a:lstStyle>
           <a:p>
@@ -2103,7 +2103,7 @@
           <a:p>
             <a:fld id="{498A6A98-93B9-470F-BB23-351240910FD2}" type="datetimeFigureOut">
               <a:rPr lang="en-US" smtClean="0"/>
-              <a:t>8/2/2021</a:t>
+              <a:t>8/6/2021</a:t>
             </a:fld>
             <a:endParaRPr lang="en-US"/>
           </a:p>
@@ -2154,7 +2154,7 @@
     </p:spTree>
     <p:extLst>
       <p:ext uri="{BB962C8B-B14F-4D97-AF65-F5344CB8AC3E}">
-        <p14:creationId xmlns:p14="http://schemas.microsoft.com/office/powerpoint/2010/main" val="1604291316"/>
+        <p14:creationId xmlns:p14="http://schemas.microsoft.com/office/powerpoint/2010/main" val="146367963"/>
       </p:ext>
     </p:extLst>
   </p:cSld>
@@ -2193,15 +2193,15 @@
         </p:nvSpPr>
         <p:spPr>
           <a:xfrm>
-            <a:off x="495891" y="154093"/>
-            <a:ext cx="2321966" cy="539327"/>
+            <a:off x="495892" y="144041"/>
+            <a:ext cx="2321966" cy="504137"/>
           </a:xfrm>
         </p:spPr>
         <p:txBody>
           <a:bodyPr anchor="b"/>
           <a:lstStyle>
             <a:lvl1pPr>
-              <a:defRPr sz="1078"/>
+              <a:defRPr sz="1008"/>
             </a:lvl1pPr>
           </a:lstStyle>
           <a:p>
@@ -2225,8 +2225,8 @@
         </p:nvSpPr>
         <p:spPr>
           <a:xfrm>
-            <a:off x="3060646" y="332799"/>
-            <a:ext cx="3644652" cy="1642592"/>
+            <a:off x="3060646" y="311085"/>
+            <a:ext cx="3644652" cy="1535418"/>
           </a:xfrm>
         </p:spPr>
         <p:txBody>
@@ -2234,39 +2234,39 @@
           <a:lstStyle>
             <a:lvl1pPr marL="0" indent="0">
               <a:buNone/>
-              <a:defRPr sz="1078"/>
+              <a:defRPr sz="1008"/>
             </a:lvl1pPr>
-            <a:lvl2pPr marL="154076" indent="0">
+            <a:lvl2pPr marL="144018" indent="0">
               <a:buNone/>
-              <a:defRPr sz="944"/>
+              <a:defRPr sz="882"/>
             </a:lvl2pPr>
-            <a:lvl3pPr marL="308153" indent="0">
+            <a:lvl3pPr marL="288036" indent="0">
               <a:buNone/>
-              <a:defRPr sz="809"/>
+              <a:defRPr sz="756"/>
             </a:lvl3pPr>
-            <a:lvl4pPr marL="462229" indent="0">
+            <a:lvl4pPr marL="432054" indent="0">
               <a:buNone/>
-              <a:defRPr sz="674"/>
+              <a:defRPr sz="630"/>
             </a:lvl4pPr>
-            <a:lvl5pPr marL="616306" indent="0">
+            <a:lvl5pPr marL="576072" indent="0">
               <a:buNone/>
-              <a:defRPr sz="674"/>
+              <a:defRPr sz="630"/>
             </a:lvl5pPr>
-            <a:lvl6pPr marL="770382" indent="0">
+            <a:lvl6pPr marL="720090" indent="0">
               <a:buNone/>
-              <a:defRPr sz="674"/>
+              <a:defRPr sz="630"/>
             </a:lvl6pPr>
-            <a:lvl7pPr marL="924458" indent="0">
+            <a:lvl7pPr marL="864108" indent="0">
               <a:buNone/>
-              <a:defRPr sz="674"/>
+              <a:defRPr sz="630"/>
             </a:lvl7pPr>
-            <a:lvl8pPr marL="1078535" indent="0">
+            <a:lvl8pPr marL="1008126" indent="0">
               <a:buNone/>
-              <a:defRPr sz="674"/>
+              <a:defRPr sz="630"/>
             </a:lvl8pPr>
-            <a:lvl9pPr marL="1232611" indent="0">
+            <a:lvl9pPr marL="1152144" indent="0">
               <a:buNone/>
-              <a:defRPr sz="674"/>
+              <a:defRPr sz="630"/>
             </a:lvl9pPr>
           </a:lstStyle>
           <a:p>
@@ -2290,8 +2290,8 @@
         </p:nvSpPr>
         <p:spPr>
           <a:xfrm>
-            <a:off x="495891" y="693420"/>
-            <a:ext cx="2321966" cy="1284646"/>
+            <a:off x="495892" y="648178"/>
+            <a:ext cx="2321966" cy="1200827"/>
           </a:xfrm>
         </p:spPr>
         <p:txBody>
@@ -2299,39 +2299,39 @@
           <a:lstStyle>
             <a:lvl1pPr marL="0" indent="0">
               <a:buNone/>
-              <a:defRPr sz="539"/>
+              <a:defRPr sz="504"/>
             </a:lvl1pPr>
-            <a:lvl2pPr marL="154076" indent="0">
+            <a:lvl2pPr marL="144018" indent="0">
               <a:buNone/>
-              <a:defRPr sz="472"/>
+              <a:defRPr sz="441"/>
             </a:lvl2pPr>
-            <a:lvl3pPr marL="308153" indent="0">
+            <a:lvl3pPr marL="288036" indent="0">
               <a:buNone/>
-              <a:defRPr sz="404"/>
+              <a:defRPr sz="378"/>
             </a:lvl3pPr>
-            <a:lvl4pPr marL="462229" indent="0">
+            <a:lvl4pPr marL="432054" indent="0">
               <a:buNone/>
-              <a:defRPr sz="337"/>
+              <a:defRPr sz="315"/>
             </a:lvl4pPr>
-            <a:lvl5pPr marL="616306" indent="0">
+            <a:lvl5pPr marL="576072" indent="0">
               <a:buNone/>
-              <a:defRPr sz="337"/>
+              <a:defRPr sz="315"/>
             </a:lvl5pPr>
-            <a:lvl6pPr marL="770382" indent="0">
+            <a:lvl6pPr marL="720090" indent="0">
               <a:buNone/>
-              <a:defRPr sz="337"/>
+              <a:defRPr sz="315"/>
             </a:lvl6pPr>
-            <a:lvl7pPr marL="924458" indent="0">
+            <a:lvl7pPr marL="864108" indent="0">
               <a:buNone/>
-              <a:defRPr sz="337"/>
+              <a:defRPr sz="315"/>
             </a:lvl7pPr>
-            <a:lvl8pPr marL="1078535" indent="0">
+            <a:lvl8pPr marL="1008126" indent="0">
               <a:buNone/>
-              <a:defRPr sz="337"/>
+              <a:defRPr sz="315"/>
             </a:lvl8pPr>
-            <a:lvl9pPr marL="1232611" indent="0">
+            <a:lvl9pPr marL="1152144" indent="0">
               <a:buNone/>
-              <a:defRPr sz="337"/>
+              <a:defRPr sz="315"/>
             </a:lvl9pPr>
           </a:lstStyle>
           <a:p>
@@ -2360,7 +2360,7 @@
           <a:p>
             <a:fld id="{498A6A98-93B9-470F-BB23-351240910FD2}" type="datetimeFigureOut">
               <a:rPr lang="en-US" smtClean="0"/>
-              <a:t>8/2/2021</a:t>
+              <a:t>8/6/2021</a:t>
             </a:fld>
             <a:endParaRPr lang="en-US"/>
           </a:p>
@@ -2411,7 +2411,7 @@
     </p:spTree>
     <p:extLst>
       <p:ext uri="{BB962C8B-B14F-4D97-AF65-F5344CB8AC3E}">
-        <p14:creationId xmlns:p14="http://schemas.microsoft.com/office/powerpoint/2010/main" val="1981455393"/>
+        <p14:creationId xmlns:p14="http://schemas.microsoft.com/office/powerpoint/2010/main" val="2828569287"/>
       </p:ext>
     </p:extLst>
   </p:cSld>
@@ -2455,8 +2455,8 @@
         </p:nvSpPr>
         <p:spPr>
           <a:xfrm>
-            <a:off x="494953" y="123061"/>
-            <a:ext cx="6209407" cy="446764"/>
+            <a:off x="494953" y="115031"/>
+            <a:ext cx="6209408" cy="417614"/>
           </a:xfrm>
           <a:prstGeom prst="rect">
             <a:avLst/>
@@ -2488,8 +2488,8 @@
         </p:nvSpPr>
         <p:spPr>
           <a:xfrm>
-            <a:off x="494953" y="615303"/>
-            <a:ext cx="6209407" cy="1466562"/>
+            <a:off x="494953" y="575159"/>
+            <a:ext cx="6209408" cy="1370873"/>
           </a:xfrm>
           <a:prstGeom prst="rect">
             <a:avLst/>
@@ -2550,8 +2550,8 @@
         </p:nvSpPr>
         <p:spPr>
           <a:xfrm>
-            <a:off x="494953" y="2142325"/>
-            <a:ext cx="1619845" cy="123061"/>
+            <a:off x="494954" y="2002547"/>
+            <a:ext cx="1619845" cy="115031"/>
           </a:xfrm>
           <a:prstGeom prst="rect">
             <a:avLst/>
@@ -2561,7 +2561,7 @@
           <a:bodyPr vert="horz" lIns="91440" tIns="45720" rIns="91440" bIns="45720" rtlCol="0" anchor="ctr"/>
           <a:lstStyle>
             <a:lvl1pPr algn="l">
-              <a:defRPr sz="404">
+              <a:defRPr sz="378">
                 <a:solidFill>
                   <a:schemeClr val="tx1">
                     <a:tint val="75000"/>
@@ -2573,7 +2573,7 @@
           <a:p>
             <a:fld id="{498A6A98-93B9-470F-BB23-351240910FD2}" type="datetimeFigureOut">
               <a:rPr lang="en-US" smtClean="0"/>
-              <a:t>8/2/2021</a:t>
+              <a:t>8/6/2021</a:t>
             </a:fld>
             <a:endParaRPr lang="en-US"/>
           </a:p>
@@ -2591,8 +2591,8 @@
         </p:nvSpPr>
         <p:spPr>
           <a:xfrm>
-            <a:off x="2384773" y="2142325"/>
-            <a:ext cx="2429768" cy="123061"/>
+            <a:off x="2384773" y="2002547"/>
+            <a:ext cx="2429768" cy="115031"/>
           </a:xfrm>
           <a:prstGeom prst="rect">
             <a:avLst/>
@@ -2602,7 +2602,7 @@
           <a:bodyPr vert="horz" lIns="91440" tIns="45720" rIns="91440" bIns="45720" rtlCol="0" anchor="ctr"/>
           <a:lstStyle>
             <a:lvl1pPr algn="ctr">
-              <a:defRPr sz="404">
+              <a:defRPr sz="378">
                 <a:solidFill>
                   <a:schemeClr val="tx1">
                     <a:tint val="75000"/>
@@ -2628,8 +2628,8 @@
         </p:nvSpPr>
         <p:spPr>
           <a:xfrm>
-            <a:off x="5084515" y="2142325"/>
-            <a:ext cx="1619845" cy="123061"/>
+            <a:off x="5084516" y="2002547"/>
+            <a:ext cx="1619845" cy="115031"/>
           </a:xfrm>
           <a:prstGeom prst="rect">
             <a:avLst/>
@@ -2639,7 +2639,7 @@
           <a:bodyPr vert="horz" lIns="91440" tIns="45720" rIns="91440" bIns="45720" rtlCol="0" anchor="ctr"/>
           <a:lstStyle>
             <a:lvl1pPr algn="r">
-              <a:defRPr sz="404">
+              <a:defRPr sz="378">
                 <a:solidFill>
                   <a:schemeClr val="tx1">
                     <a:tint val="75000"/>
@@ -2660,27 +2660,27 @@
     </p:spTree>
     <p:extLst>
       <p:ext uri="{BB962C8B-B14F-4D97-AF65-F5344CB8AC3E}">
-        <p14:creationId xmlns:p14="http://schemas.microsoft.com/office/powerpoint/2010/main" val="2649310242"/>
+        <p14:creationId xmlns:p14="http://schemas.microsoft.com/office/powerpoint/2010/main" val="3715755369"/>
       </p:ext>
     </p:extLst>
   </p:cSld>
   <p:clrMap bg1="lt1" tx1="dk1" bg2="lt2" tx2="dk2" accent1="accent1" accent2="accent2" accent3="accent3" accent4="accent4" accent5="accent5" accent6="accent6" hlink="hlink" folHlink="folHlink"/>
   <p:sldLayoutIdLst>
-    <p:sldLayoutId id="2147483685" r:id="rId1"/>
-    <p:sldLayoutId id="2147483686" r:id="rId2"/>
-    <p:sldLayoutId id="2147483687" r:id="rId3"/>
-    <p:sldLayoutId id="2147483688" r:id="rId4"/>
-    <p:sldLayoutId id="2147483689" r:id="rId5"/>
-    <p:sldLayoutId id="2147483690" r:id="rId6"/>
-    <p:sldLayoutId id="2147483691" r:id="rId7"/>
-    <p:sldLayoutId id="2147483692" r:id="rId8"/>
-    <p:sldLayoutId id="2147483693" r:id="rId9"/>
-    <p:sldLayoutId id="2147483694" r:id="rId10"/>
-    <p:sldLayoutId id="2147483695" r:id="rId11"/>
+    <p:sldLayoutId id="2147483733" r:id="rId1"/>
+    <p:sldLayoutId id="2147483734" r:id="rId2"/>
+    <p:sldLayoutId id="2147483735" r:id="rId3"/>
+    <p:sldLayoutId id="2147483736" r:id="rId4"/>
+    <p:sldLayoutId id="2147483737" r:id="rId5"/>
+    <p:sldLayoutId id="2147483738" r:id="rId6"/>
+    <p:sldLayoutId id="2147483739" r:id="rId7"/>
+    <p:sldLayoutId id="2147483740" r:id="rId8"/>
+    <p:sldLayoutId id="2147483741" r:id="rId9"/>
+    <p:sldLayoutId id="2147483742" r:id="rId10"/>
+    <p:sldLayoutId id="2147483743" r:id="rId11"/>
   </p:sldLayoutIdLst>
   <p:txStyles>
     <p:titleStyle>
-      <a:lvl1pPr algn="l" defTabSz="308153" rtl="0" eaLnBrk="1" latinLnBrk="0" hangingPunct="1">
+      <a:lvl1pPr algn="l" defTabSz="288036" rtl="0" eaLnBrk="1" latinLnBrk="0" hangingPunct="1">
         <a:lnSpc>
           <a:spcPct val="90000"/>
         </a:lnSpc>
@@ -2688,7 +2688,7 @@
           <a:spcPct val="0"/>
         </a:spcBef>
         <a:buNone/>
-        <a:defRPr sz="1483" kern="1200">
+        <a:defRPr sz="1386" kern="1200">
           <a:solidFill>
             <a:schemeClr val="tx1"/>
           </a:solidFill>
@@ -2699,16 +2699,16 @@
       </a:lvl1pPr>
     </p:titleStyle>
     <p:bodyStyle>
-      <a:lvl1pPr marL="77038" indent="-77038" algn="l" defTabSz="308153" rtl="0" eaLnBrk="1" latinLnBrk="0" hangingPunct="1">
+      <a:lvl1pPr marL="72009" indent="-72009" algn="l" defTabSz="288036" rtl="0" eaLnBrk="1" latinLnBrk="0" hangingPunct="1">
         <a:lnSpc>
           <a:spcPct val="90000"/>
         </a:lnSpc>
         <a:spcBef>
-          <a:spcPts val="337"/>
+          <a:spcPts val="315"/>
         </a:spcBef>
         <a:buFont typeface="Arial" panose="020B0604020202020204" pitchFamily="34" charset="0"/>
         <a:buChar char="•"/>
-        <a:defRPr sz="944" kern="1200">
+        <a:defRPr sz="882" kern="1200">
           <a:solidFill>
             <a:schemeClr val="tx1"/>
           </a:solidFill>
@@ -2717,16 +2717,16 @@
           <a:cs typeface="+mn-cs"/>
         </a:defRPr>
       </a:lvl1pPr>
-      <a:lvl2pPr marL="231115" indent="-77038" algn="l" defTabSz="308153" rtl="0" eaLnBrk="1" latinLnBrk="0" hangingPunct="1">
+      <a:lvl2pPr marL="216027" indent="-72009" algn="l" defTabSz="288036" rtl="0" eaLnBrk="1" latinLnBrk="0" hangingPunct="1">
         <a:lnSpc>
           <a:spcPct val="90000"/>
         </a:lnSpc>
         <a:spcBef>
-          <a:spcPts val="169"/>
+          <a:spcPts val="158"/>
         </a:spcBef>
         <a:buFont typeface="Arial" panose="020B0604020202020204" pitchFamily="34" charset="0"/>
         <a:buChar char="•"/>
-        <a:defRPr sz="809" kern="1200">
+        <a:defRPr sz="756" kern="1200">
           <a:solidFill>
             <a:schemeClr val="tx1"/>
           </a:solidFill>
@@ -2735,16 +2735,16 @@
           <a:cs typeface="+mn-cs"/>
         </a:defRPr>
       </a:lvl2pPr>
-      <a:lvl3pPr marL="385191" indent="-77038" algn="l" defTabSz="308153" rtl="0" eaLnBrk="1" latinLnBrk="0" hangingPunct="1">
+      <a:lvl3pPr marL="360045" indent="-72009" algn="l" defTabSz="288036" rtl="0" eaLnBrk="1" latinLnBrk="0" hangingPunct="1">
         <a:lnSpc>
           <a:spcPct val="90000"/>
         </a:lnSpc>
         <a:spcBef>
-          <a:spcPts val="169"/>
+          <a:spcPts val="158"/>
         </a:spcBef>
         <a:buFont typeface="Arial" panose="020B0604020202020204" pitchFamily="34" charset="0"/>
         <a:buChar char="•"/>
-        <a:defRPr sz="674" kern="1200">
+        <a:defRPr sz="630" kern="1200">
           <a:solidFill>
             <a:schemeClr val="tx1"/>
           </a:solidFill>
@@ -2753,16 +2753,16 @@
           <a:cs typeface="+mn-cs"/>
         </a:defRPr>
       </a:lvl3pPr>
-      <a:lvl4pPr marL="539267" indent="-77038" algn="l" defTabSz="308153" rtl="0" eaLnBrk="1" latinLnBrk="0" hangingPunct="1">
+      <a:lvl4pPr marL="504063" indent="-72009" algn="l" defTabSz="288036" rtl="0" eaLnBrk="1" latinLnBrk="0" hangingPunct="1">
         <a:lnSpc>
           <a:spcPct val="90000"/>
         </a:lnSpc>
         <a:spcBef>
-          <a:spcPts val="169"/>
+          <a:spcPts val="158"/>
         </a:spcBef>
         <a:buFont typeface="Arial" panose="020B0604020202020204" pitchFamily="34" charset="0"/>
         <a:buChar char="•"/>
-        <a:defRPr sz="607" kern="1200">
+        <a:defRPr sz="567" kern="1200">
           <a:solidFill>
             <a:schemeClr val="tx1"/>
           </a:solidFill>
@@ -2771,16 +2771,16 @@
           <a:cs typeface="+mn-cs"/>
         </a:defRPr>
       </a:lvl4pPr>
-      <a:lvl5pPr marL="693344" indent="-77038" algn="l" defTabSz="308153" rtl="0" eaLnBrk="1" latinLnBrk="0" hangingPunct="1">
+      <a:lvl5pPr marL="648081" indent="-72009" algn="l" defTabSz="288036" rtl="0" eaLnBrk="1" latinLnBrk="0" hangingPunct="1">
         <a:lnSpc>
           <a:spcPct val="90000"/>
         </a:lnSpc>
         <a:spcBef>
-          <a:spcPts val="169"/>
+          <a:spcPts val="158"/>
         </a:spcBef>
         <a:buFont typeface="Arial" panose="020B0604020202020204" pitchFamily="34" charset="0"/>
         <a:buChar char="•"/>
-        <a:defRPr sz="607" kern="1200">
+        <a:defRPr sz="567" kern="1200">
           <a:solidFill>
             <a:schemeClr val="tx1"/>
           </a:solidFill>
@@ -2789,16 +2789,16 @@
           <a:cs typeface="+mn-cs"/>
         </a:defRPr>
       </a:lvl5pPr>
-      <a:lvl6pPr marL="847420" indent="-77038" algn="l" defTabSz="308153" rtl="0" eaLnBrk="1" latinLnBrk="0" hangingPunct="1">
+      <a:lvl6pPr marL="792099" indent="-72009" algn="l" defTabSz="288036" rtl="0" eaLnBrk="1" latinLnBrk="0" hangingPunct="1">
         <a:lnSpc>
           <a:spcPct val="90000"/>
         </a:lnSpc>
         <a:spcBef>
-          <a:spcPts val="169"/>
+          <a:spcPts val="158"/>
         </a:spcBef>
         <a:buFont typeface="Arial" panose="020B0604020202020204" pitchFamily="34" charset="0"/>
         <a:buChar char="•"/>
-        <a:defRPr sz="607" kern="1200">
+        <a:defRPr sz="567" kern="1200">
           <a:solidFill>
             <a:schemeClr val="tx1"/>
           </a:solidFill>
@@ -2807,16 +2807,16 @@
           <a:cs typeface="+mn-cs"/>
         </a:defRPr>
       </a:lvl6pPr>
-      <a:lvl7pPr marL="1001497" indent="-77038" algn="l" defTabSz="308153" rtl="0" eaLnBrk="1" latinLnBrk="0" hangingPunct="1">
+      <a:lvl7pPr marL="936117" indent="-72009" algn="l" defTabSz="288036" rtl="0" eaLnBrk="1" latinLnBrk="0" hangingPunct="1">
         <a:lnSpc>
           <a:spcPct val="90000"/>
         </a:lnSpc>
         <a:spcBef>
-          <a:spcPts val="169"/>
+          <a:spcPts val="158"/>
         </a:spcBef>
         <a:buFont typeface="Arial" panose="020B0604020202020204" pitchFamily="34" charset="0"/>
         <a:buChar char="•"/>
-        <a:defRPr sz="607" kern="1200">
+        <a:defRPr sz="567" kern="1200">
           <a:solidFill>
             <a:schemeClr val="tx1"/>
           </a:solidFill>
@@ -2825,16 +2825,16 @@
           <a:cs typeface="+mn-cs"/>
         </a:defRPr>
       </a:lvl7pPr>
-      <a:lvl8pPr marL="1155573" indent="-77038" algn="l" defTabSz="308153" rtl="0" eaLnBrk="1" latinLnBrk="0" hangingPunct="1">
+      <a:lvl8pPr marL="1080135" indent="-72009" algn="l" defTabSz="288036" rtl="0" eaLnBrk="1" latinLnBrk="0" hangingPunct="1">
         <a:lnSpc>
           <a:spcPct val="90000"/>
         </a:lnSpc>
         <a:spcBef>
-          <a:spcPts val="169"/>
+          <a:spcPts val="158"/>
         </a:spcBef>
         <a:buFont typeface="Arial" panose="020B0604020202020204" pitchFamily="34" charset="0"/>
         <a:buChar char="•"/>
-        <a:defRPr sz="607" kern="1200">
+        <a:defRPr sz="567" kern="1200">
           <a:solidFill>
             <a:schemeClr val="tx1"/>
           </a:solidFill>
@@ -2843,16 +2843,16 @@
           <a:cs typeface="+mn-cs"/>
         </a:defRPr>
       </a:lvl8pPr>
-      <a:lvl9pPr marL="1309649" indent="-77038" algn="l" defTabSz="308153" rtl="0" eaLnBrk="1" latinLnBrk="0" hangingPunct="1">
+      <a:lvl9pPr marL="1224153" indent="-72009" algn="l" defTabSz="288036" rtl="0" eaLnBrk="1" latinLnBrk="0" hangingPunct="1">
         <a:lnSpc>
           <a:spcPct val="90000"/>
         </a:lnSpc>
         <a:spcBef>
-          <a:spcPts val="169"/>
+          <a:spcPts val="158"/>
         </a:spcBef>
         <a:buFont typeface="Arial" panose="020B0604020202020204" pitchFamily="34" charset="0"/>
         <a:buChar char="•"/>
-        <a:defRPr sz="607" kern="1200">
+        <a:defRPr sz="567" kern="1200">
           <a:solidFill>
             <a:schemeClr val="tx1"/>
           </a:solidFill>
@@ -2866,8 +2866,8 @@
       <a:defPPr>
         <a:defRPr lang="en-US"/>
       </a:defPPr>
-      <a:lvl1pPr marL="0" algn="l" defTabSz="308153" rtl="0" eaLnBrk="1" latinLnBrk="0" hangingPunct="1">
-        <a:defRPr sz="607" kern="1200">
+      <a:lvl1pPr marL="0" algn="l" defTabSz="288036" rtl="0" eaLnBrk="1" latinLnBrk="0" hangingPunct="1">
+        <a:defRPr sz="567" kern="1200">
           <a:solidFill>
             <a:schemeClr val="tx1"/>
           </a:solidFill>
@@ -2876,8 +2876,8 @@
           <a:cs typeface="+mn-cs"/>
         </a:defRPr>
       </a:lvl1pPr>
-      <a:lvl2pPr marL="154076" algn="l" defTabSz="308153" rtl="0" eaLnBrk="1" latinLnBrk="0" hangingPunct="1">
-        <a:defRPr sz="607" kern="1200">
+      <a:lvl2pPr marL="144018" algn="l" defTabSz="288036" rtl="0" eaLnBrk="1" latinLnBrk="0" hangingPunct="1">
+        <a:defRPr sz="567" kern="1200">
           <a:solidFill>
             <a:schemeClr val="tx1"/>
           </a:solidFill>
@@ -2886,8 +2886,8 @@
           <a:cs typeface="+mn-cs"/>
         </a:defRPr>
       </a:lvl2pPr>
-      <a:lvl3pPr marL="308153" algn="l" defTabSz="308153" rtl="0" eaLnBrk="1" latinLnBrk="0" hangingPunct="1">
-        <a:defRPr sz="607" kern="1200">
+      <a:lvl3pPr marL="288036" algn="l" defTabSz="288036" rtl="0" eaLnBrk="1" latinLnBrk="0" hangingPunct="1">
+        <a:defRPr sz="567" kern="1200">
           <a:solidFill>
             <a:schemeClr val="tx1"/>
           </a:solidFill>
@@ -2896,8 +2896,8 @@
           <a:cs typeface="+mn-cs"/>
         </a:defRPr>
       </a:lvl3pPr>
-      <a:lvl4pPr marL="462229" algn="l" defTabSz="308153" rtl="0" eaLnBrk="1" latinLnBrk="0" hangingPunct="1">
-        <a:defRPr sz="607" kern="1200">
+      <a:lvl4pPr marL="432054" algn="l" defTabSz="288036" rtl="0" eaLnBrk="1" latinLnBrk="0" hangingPunct="1">
+        <a:defRPr sz="567" kern="1200">
           <a:solidFill>
             <a:schemeClr val="tx1"/>
           </a:solidFill>
@@ -2906,8 +2906,8 @@
           <a:cs typeface="+mn-cs"/>
         </a:defRPr>
       </a:lvl4pPr>
-      <a:lvl5pPr marL="616306" algn="l" defTabSz="308153" rtl="0" eaLnBrk="1" latinLnBrk="0" hangingPunct="1">
-        <a:defRPr sz="607" kern="1200">
+      <a:lvl5pPr marL="576072" algn="l" defTabSz="288036" rtl="0" eaLnBrk="1" latinLnBrk="0" hangingPunct="1">
+        <a:defRPr sz="567" kern="1200">
           <a:solidFill>
             <a:schemeClr val="tx1"/>
           </a:solidFill>
@@ -2916,8 +2916,8 @@
           <a:cs typeface="+mn-cs"/>
         </a:defRPr>
       </a:lvl5pPr>
-      <a:lvl6pPr marL="770382" algn="l" defTabSz="308153" rtl="0" eaLnBrk="1" latinLnBrk="0" hangingPunct="1">
-        <a:defRPr sz="607" kern="1200">
+      <a:lvl6pPr marL="720090" algn="l" defTabSz="288036" rtl="0" eaLnBrk="1" latinLnBrk="0" hangingPunct="1">
+        <a:defRPr sz="567" kern="1200">
           <a:solidFill>
             <a:schemeClr val="tx1"/>
           </a:solidFill>
@@ -2926,8 +2926,8 @@
           <a:cs typeface="+mn-cs"/>
         </a:defRPr>
       </a:lvl6pPr>
-      <a:lvl7pPr marL="924458" algn="l" defTabSz="308153" rtl="0" eaLnBrk="1" latinLnBrk="0" hangingPunct="1">
-        <a:defRPr sz="607" kern="1200">
+      <a:lvl7pPr marL="864108" algn="l" defTabSz="288036" rtl="0" eaLnBrk="1" latinLnBrk="0" hangingPunct="1">
+        <a:defRPr sz="567" kern="1200">
           <a:solidFill>
             <a:schemeClr val="tx1"/>
           </a:solidFill>
@@ -2936,8 +2936,8 @@
           <a:cs typeface="+mn-cs"/>
         </a:defRPr>
       </a:lvl7pPr>
-      <a:lvl8pPr marL="1078535" algn="l" defTabSz="308153" rtl="0" eaLnBrk="1" latinLnBrk="0" hangingPunct="1">
-        <a:defRPr sz="607" kern="1200">
+      <a:lvl8pPr marL="1008126" algn="l" defTabSz="288036" rtl="0" eaLnBrk="1" latinLnBrk="0" hangingPunct="1">
+        <a:defRPr sz="567" kern="1200">
           <a:solidFill>
             <a:schemeClr val="tx1"/>
           </a:solidFill>
@@ -2946,8 +2946,8 @@
           <a:cs typeface="+mn-cs"/>
         </a:defRPr>
       </a:lvl8pPr>
-      <a:lvl9pPr marL="1232611" algn="l" defTabSz="308153" rtl="0" eaLnBrk="1" latinLnBrk="0" hangingPunct="1">
-        <a:defRPr sz="607" kern="1200">
+      <a:lvl9pPr marL="1152144" algn="l" defTabSz="288036" rtl="0" eaLnBrk="1" latinLnBrk="0" hangingPunct="1">
+        <a:defRPr sz="567" kern="1200">
           <a:solidFill>
             <a:schemeClr val="tx1"/>
           </a:solidFill>
@@ -2986,10 +2986,10 @@
         </p:nvGrpSpPr>
         <p:grpSpPr>
           <a:xfrm>
-            <a:off x="-182335" y="-582349"/>
-            <a:ext cx="7458710" cy="3645495"/>
+            <a:off x="225284" y="-470429"/>
+            <a:ext cx="6654821" cy="3300558"/>
             <a:chOff x="264939" y="1101767"/>
-            <a:chExt cx="11673822" cy="5705659"/>
+            <a:chExt cx="11673822" cy="5713545"/>
           </a:xfrm>
         </p:grpSpPr>
         <p:grpSp>
@@ -3001,9 +3001,9 @@
           <p:grpSpPr>
             <a:xfrm>
               <a:off x="3576684" y="3822402"/>
-              <a:ext cx="7528893" cy="2985024"/>
+              <a:ext cx="7578465" cy="2992910"/>
               <a:chOff x="345318" y="2363519"/>
-              <a:chExt cx="4444696" cy="2858720"/>
+              <a:chExt cx="4473962" cy="2866271"/>
             </a:xfrm>
           </p:grpSpPr>
           <p:sp>
@@ -3015,7 +3015,7 @@
             <p:spPr>
               <a:xfrm>
                 <a:off x="1135238" y="2363519"/>
-                <a:ext cx="1700883" cy="491986"/>
+                <a:ext cx="1700883" cy="844927"/>
               </a:xfrm>
               <a:prstGeom prst="rect">
                 <a:avLst/>
@@ -3029,7 +3029,7 @@
               <a:lstStyle/>
               <a:p>
                 <a:r>
-                  <a:rPr lang="en-US" sz="1533" b="1" dirty="0"/>
+                  <a:rPr lang="en-US" sz="1368" b="1" dirty="0"/>
                   <a:t>Underwater: Bubble</a:t>
                 </a:r>
               </a:p>
@@ -3044,9 +3044,9 @@
             <p:grpSpPr>
               <a:xfrm>
                 <a:off x="345318" y="2821292"/>
-                <a:ext cx="4444696" cy="2400947"/>
+                <a:ext cx="4473962" cy="2408498"/>
                 <a:chOff x="472292" y="3047518"/>
-                <a:chExt cx="5926260" cy="3201261"/>
+                <a:chExt cx="5965280" cy="3211329"/>
               </a:xfrm>
             </p:grpSpPr>
             <p:grpSp>
@@ -3058,9 +3058,9 @@
               <p:grpSpPr>
                 <a:xfrm>
                   <a:off x="479102" y="3047518"/>
-                  <a:ext cx="5919450" cy="3201261"/>
+                  <a:ext cx="5958470" cy="3211329"/>
                   <a:chOff x="3635828" y="2492828"/>
-                  <a:chExt cx="5919450" cy="3201261"/>
+                  <a:chExt cx="5958470" cy="3211329"/>
                 </a:xfrm>
               </p:grpSpPr>
               <p:sp>
@@ -3102,7 +3102,7 @@
                   <a:lstStyle/>
                   <a:p>
                     <a:pPr algn="ctr"/>
-                    <a:endParaRPr lang="en-US" sz="1022"/>
+                    <a:endParaRPr lang="en-US" sz="910"/>
                   </a:p>
                 </p:txBody>
               </p:sp>
@@ -3148,7 +3148,7 @@
                   <a:lstStyle/>
                   <a:p>
                     <a:pPr algn="ctr"/>
-                    <a:endParaRPr lang="en-US" sz="1022"/>
+                    <a:endParaRPr lang="en-US" sz="910"/>
                   </a:p>
                 </p:txBody>
               </p:sp>
@@ -3192,7 +3192,7 @@
                   <a:p>
                     <a:pPr algn="ctr"/>
                     <a:r>
-                      <a:rPr lang="en-US" sz="1022" dirty="0" err="1">
+                      <a:rPr lang="en-US" sz="910" dirty="0" err="1">
                         <a:solidFill>
                           <a:schemeClr val="tx1"/>
                         </a:solidFill>
@@ -3200,14 +3200,14 @@
                       <a:t>D</a:t>
                     </a:r>
                     <a:r>
-                      <a:rPr lang="en-US" sz="1022" baseline="-25000" dirty="0" err="1">
+                      <a:rPr lang="en-US" sz="910" baseline="-25000" dirty="0" err="1">
                         <a:solidFill>
                           <a:schemeClr val="tx1"/>
                         </a:solidFill>
                       </a:rPr>
                       <a:t>p</a:t>
                     </a:r>
-                    <a:endParaRPr lang="en-US" sz="1022" baseline="-25000" dirty="0">
+                    <a:endParaRPr lang="en-US" sz="910" baseline="-25000" dirty="0">
                       <a:solidFill>
                         <a:schemeClr val="tx1"/>
                       </a:solidFill>
@@ -3259,7 +3259,7 @@
                   <a:lstStyle/>
                   <a:p>
                     <a:pPr algn="ctr"/>
-                    <a:endParaRPr lang="en-US" sz="1022"/>
+                    <a:endParaRPr lang="en-US" sz="910"/>
                   </a:p>
                 </p:txBody>
               </p:sp>
@@ -3307,7 +3307,7 @@
                   <a:lstStyle/>
                   <a:p>
                     <a:pPr algn="ctr"/>
-                    <a:endParaRPr lang="en-US" sz="1022"/>
+                    <a:endParaRPr lang="en-US" sz="910"/>
                   </a:p>
                 </p:txBody>
               </p:sp>
@@ -3355,7 +3355,7 @@
                   <a:lstStyle/>
                   <a:p>
                     <a:pPr algn="ctr"/>
-                    <a:endParaRPr lang="en-US" sz="1022"/>
+                    <a:endParaRPr lang="en-US" sz="910"/>
                   </a:p>
                 </p:txBody>
               </p:sp>
@@ -3403,7 +3403,7 @@
                   <a:lstStyle/>
                   <a:p>
                     <a:pPr algn="ctr"/>
-                    <a:endParaRPr lang="en-US" sz="1022"/>
+                    <a:endParaRPr lang="en-US" sz="910"/>
                   </a:p>
                 </p:txBody>
               </p:sp>
@@ -3451,7 +3451,7 @@
                   <a:lstStyle/>
                   <a:p>
                     <a:pPr algn="ctr"/>
-                    <a:endParaRPr lang="en-US" sz="1022"/>
+                    <a:endParaRPr lang="en-US" sz="910"/>
                   </a:p>
                 </p:txBody>
               </p:sp>
@@ -3499,7 +3499,7 @@
                   <a:lstStyle/>
                   <a:p>
                     <a:pPr algn="ctr"/>
-                    <a:endParaRPr lang="en-US" sz="1022"/>
+                    <a:endParaRPr lang="en-US" sz="910"/>
                   </a:p>
                 </p:txBody>
               </p:sp>
@@ -3547,7 +3547,7 @@
                   <a:lstStyle/>
                   <a:p>
                     <a:pPr algn="ctr"/>
-                    <a:endParaRPr lang="en-US" sz="1022"/>
+                    <a:endParaRPr lang="en-US" sz="910"/>
                   </a:p>
                 </p:txBody>
               </p:sp>
@@ -3595,7 +3595,7 @@
                   <a:lstStyle/>
                   <a:p>
                     <a:pPr algn="ctr"/>
-                    <a:endParaRPr lang="en-US" sz="1022"/>
+                    <a:endParaRPr lang="en-US" sz="910"/>
                   </a:p>
                 </p:txBody>
               </p:sp>
@@ -3643,7 +3643,7 @@
                   <a:lstStyle/>
                   <a:p>
                     <a:pPr algn="ctr"/>
-                    <a:endParaRPr lang="en-US" sz="1022"/>
+                    <a:endParaRPr lang="en-US" sz="910"/>
                   </a:p>
                 </p:txBody>
               </p:sp>
@@ -3691,7 +3691,7 @@
                   <a:lstStyle/>
                   <a:p>
                     <a:pPr algn="ctr"/>
-                    <a:endParaRPr lang="en-US" sz="1022"/>
+                    <a:endParaRPr lang="en-US" sz="910"/>
                   </a:p>
                 </p:txBody>
               </p:sp>
@@ -3739,7 +3739,7 @@
                   <a:lstStyle/>
                   <a:p>
                     <a:pPr algn="ctr"/>
-                    <a:endParaRPr lang="en-US" sz="1022"/>
+                    <a:endParaRPr lang="en-US" sz="910"/>
                   </a:p>
                 </p:txBody>
               </p:sp>
@@ -3787,7 +3787,7 @@
                   <a:lstStyle/>
                   <a:p>
                     <a:pPr algn="ctr"/>
-                    <a:endParaRPr lang="en-US" sz="1022"/>
+                    <a:endParaRPr lang="en-US" sz="910"/>
                   </a:p>
                 </p:txBody>
               </p:sp>
@@ -3835,7 +3835,7 @@
                   <a:lstStyle/>
                   <a:p>
                     <a:pPr algn="ctr"/>
-                    <a:endParaRPr lang="en-US" sz="1022"/>
+                    <a:endParaRPr lang="en-US" sz="910"/>
                   </a:p>
                 </p:txBody>
               </p:sp>
@@ -3883,7 +3883,7 @@
                   <a:lstStyle/>
                   <a:p>
                     <a:pPr algn="ctr"/>
-                    <a:endParaRPr lang="en-US" sz="1022"/>
+                    <a:endParaRPr lang="en-US" sz="910"/>
                   </a:p>
                 </p:txBody>
               </p:sp>
@@ -3931,7 +3931,7 @@
                   <a:lstStyle/>
                   <a:p>
                     <a:pPr algn="ctr"/>
-                    <a:endParaRPr lang="en-US" sz="1022"/>
+                    <a:endParaRPr lang="en-US" sz="910"/>
                   </a:p>
                 </p:txBody>
               </p:sp>
@@ -3980,8 +3980,8 @@
                 </p:nvSpPr>
                 <p:spPr>
                   <a:xfrm>
-                    <a:off x="4766941" y="4278658"/>
-                    <a:ext cx="2328198" cy="577556"/>
+                    <a:off x="4766944" y="4278657"/>
+                    <a:ext cx="2328195" cy="587628"/>
                   </a:xfrm>
                   <a:prstGeom prst="rect">
                     <a:avLst/>
@@ -3995,7 +3995,7 @@
                   <a:lstStyle/>
                   <a:p>
                     <a:r>
-                      <a:rPr lang="en-US" sz="1278" dirty="0"/>
+                      <a:rPr lang="en-US" sz="1140" dirty="0"/>
                       <a:t>Bridge contact within air</a:t>
                     </a:r>
                   </a:p>
@@ -4083,8 +4083,8 @@
                 </p:nvSpPr>
                 <p:spPr>
                   <a:xfrm>
-                    <a:off x="4651168" y="5116533"/>
-                    <a:ext cx="2125172" cy="577556"/>
+                    <a:off x="4651171" y="5116529"/>
+                    <a:ext cx="2176218" cy="587628"/>
                   </a:xfrm>
                   <a:prstGeom prst="rect">
                     <a:avLst/>
@@ -4098,7 +4098,7 @@
                   <a:lstStyle/>
                   <a:p>
                     <a:r>
-                      <a:rPr lang="en-US" sz="1278" dirty="0"/>
+                      <a:rPr lang="en-US" sz="1140" dirty="0"/>
                       <a:t>Bridge contact in water</a:t>
                     </a:r>
                   </a:p>
@@ -4222,8 +4222,8 @@
                 </p:nvSpPr>
                 <p:spPr>
                   <a:xfrm>
-                    <a:off x="8115299" y="3583814"/>
-                    <a:ext cx="1439979" cy="577557"/>
+                    <a:off x="8115301" y="3583814"/>
+                    <a:ext cx="1478997" cy="587628"/>
                   </a:xfrm>
                   <a:prstGeom prst="rect">
                     <a:avLst/>
@@ -4237,7 +4237,7 @@
                   <a:lstStyle/>
                   <a:p>
                     <a:r>
-                      <a:rPr lang="en-US" sz="1278" b="1" dirty="0">
+                      <a:rPr lang="en-US" sz="1140" b="1" dirty="0">
                         <a:solidFill>
                           <a:srgbClr val="002060"/>
                         </a:solidFill>
@@ -4291,8 +4291,8 @@
                 </p:nvSpPr>
                 <p:spPr>
                   <a:xfrm>
-                    <a:off x="8348412" y="2809298"/>
-                    <a:ext cx="989793" cy="577557"/>
+                    <a:off x="8348415" y="2809297"/>
+                    <a:ext cx="1020822" cy="587628"/>
                   </a:xfrm>
                   <a:prstGeom prst="rect">
                     <a:avLst/>
@@ -4306,7 +4306,7 @@
                   <a:lstStyle/>
                   <a:p>
                     <a:r>
-                      <a:rPr lang="en-US" sz="1278" b="1" dirty="0">
+                      <a:rPr lang="en-US" sz="1140" b="1" dirty="0">
                         <a:solidFill>
                           <a:srgbClr val="002060"/>
                         </a:solidFill>
@@ -4365,8 +4365,8 @@
                 </p:nvCxnSpPr>
                 <p:spPr>
                   <a:xfrm flipH="1">
-                    <a:off x="5191738" y="3872592"/>
-                    <a:ext cx="2923561" cy="275230"/>
+                    <a:off x="5191737" y="3877628"/>
+                    <a:ext cx="2923564" cy="270194"/>
                   </a:xfrm>
                   <a:prstGeom prst="straightConnector1">
                     <a:avLst/>
@@ -4476,8 +4476,8 @@
               </p:nvSpPr>
               <p:spPr>
                 <a:xfrm>
-                  <a:off x="720314" y="3232448"/>
-                  <a:ext cx="383516" cy="498874"/>
+                  <a:off x="720313" y="3232447"/>
+                  <a:ext cx="409922" cy="509952"/>
                 </a:xfrm>
                 <a:prstGeom prst="rect">
                   <a:avLst/>
@@ -4491,11 +4491,11 @@
                 <a:lstStyle/>
                 <a:p>
                   <a:r>
-                    <a:rPr lang="en-US" sz="1022" dirty="0"/>
+                    <a:rPr lang="en-US" sz="910" dirty="0"/>
                     <a:t>D</a:t>
                   </a:r>
                   <a:r>
-                    <a:rPr lang="en-US" sz="1022" baseline="-25000" dirty="0"/>
+                    <a:rPr lang="en-US" sz="910" baseline="-25000" dirty="0"/>
                     <a:t>h</a:t>
                   </a:r>
                 </a:p>
@@ -4926,7 +4926,7 @@
                 <a:lstStyle/>
                 <a:p>
                   <a:pPr algn="ctr"/>
-                  <a:endParaRPr lang="en-US" sz="1022"/>
+                  <a:endParaRPr lang="en-US" sz="910"/>
                 </a:p>
               </p:txBody>
             </p:sp>
@@ -5355,7 +5355,7 @@
                 <a:lstStyle/>
                 <a:p>
                   <a:pPr algn="ctr"/>
-                  <a:endParaRPr lang="en-US" sz="1022"/>
+                  <a:endParaRPr lang="en-US" sz="910"/>
                 </a:p>
               </p:txBody>
             </p:sp>
@@ -5784,7 +5784,7 @@
                 <a:lstStyle/>
                 <a:p>
                   <a:pPr algn="ctr"/>
-                  <a:endParaRPr lang="en-US" sz="1022"/>
+                  <a:endParaRPr lang="en-US" sz="910"/>
                 </a:p>
               </p:txBody>
             </p:sp>
@@ -6213,7 +6213,7 @@
                 <a:lstStyle/>
                 <a:p>
                   <a:pPr algn="ctr"/>
-                  <a:endParaRPr lang="en-US" sz="1022"/>
+                  <a:endParaRPr lang="en-US" sz="910"/>
                 </a:p>
               </p:txBody>
             </p:sp>
@@ -6642,7 +6642,7 @@
                 <a:lstStyle/>
                 <a:p>
                   <a:pPr algn="ctr"/>
-                  <a:endParaRPr lang="en-US" sz="1022"/>
+                  <a:endParaRPr lang="en-US" sz="910"/>
                 </a:p>
               </p:txBody>
             </p:sp>
@@ -7071,7 +7071,7 @@
                 <a:lstStyle/>
                 <a:p>
                   <a:pPr algn="ctr"/>
-                  <a:endParaRPr lang="en-US" sz="1022"/>
+                  <a:endParaRPr lang="en-US" sz="910"/>
                 </a:p>
               </p:txBody>
             </p:sp>
@@ -7500,7 +7500,7 @@
                 <a:lstStyle/>
                 <a:p>
                   <a:pPr algn="ctr"/>
-                  <a:endParaRPr lang="en-US" sz="1022"/>
+                  <a:endParaRPr lang="en-US" sz="910"/>
                 </a:p>
               </p:txBody>
             </p:sp>
@@ -7929,7 +7929,7 @@
                 <a:lstStyle/>
                 <a:p>
                   <a:pPr algn="ctr"/>
-                  <a:endParaRPr lang="en-US" sz="1022"/>
+                  <a:endParaRPr lang="en-US" sz="910"/>
                 </a:p>
               </p:txBody>
             </p:sp>
@@ -8358,7 +8358,7 @@
                 <a:lstStyle/>
                 <a:p>
                   <a:pPr algn="ctr"/>
-                  <a:endParaRPr lang="en-US" sz="1022"/>
+                  <a:endParaRPr lang="en-US" sz="910"/>
                 </a:p>
               </p:txBody>
             </p:sp>
@@ -8787,7 +8787,7 @@
                 <a:lstStyle/>
                 <a:p>
                   <a:pPr algn="ctr"/>
-                  <a:endParaRPr lang="en-US" sz="1022"/>
+                  <a:endParaRPr lang="en-US" sz="910"/>
                 </a:p>
               </p:txBody>
             </p:sp>
@@ -9216,7 +9216,7 @@
                 <a:lstStyle/>
                 <a:p>
                   <a:pPr algn="ctr"/>
-                  <a:endParaRPr lang="en-US" sz="1022"/>
+                  <a:endParaRPr lang="en-US" sz="910"/>
                 </a:p>
               </p:txBody>
             </p:sp>
@@ -9645,7 +9645,7 @@
                 <a:lstStyle/>
                 <a:p>
                   <a:pPr algn="ctr"/>
-                  <a:endParaRPr lang="en-US" sz="1022"/>
+                  <a:endParaRPr lang="en-US" sz="910"/>
                 </a:p>
               </p:txBody>
             </p:sp>
@@ -10074,7 +10074,7 @@
                 <a:lstStyle/>
                 <a:p>
                   <a:pPr algn="ctr"/>
-                  <a:endParaRPr lang="en-US" sz="1022"/>
+                  <a:endParaRPr lang="en-US" sz="910"/>
                 </a:p>
               </p:txBody>
             </p:sp>
@@ -10503,7 +10503,7 @@
                 <a:lstStyle/>
                 <a:p>
                   <a:pPr algn="ctr"/>
-                  <a:endParaRPr lang="en-US" sz="1022"/>
+                  <a:endParaRPr lang="en-US" sz="910"/>
                 </a:p>
               </p:txBody>
             </p:sp>
@@ -10932,7 +10932,7 @@
                 <a:lstStyle/>
                 <a:p>
                   <a:pPr algn="ctr"/>
-                  <a:endParaRPr lang="en-US" sz="1022"/>
+                  <a:endParaRPr lang="en-US" sz="910"/>
                 </a:p>
               </p:txBody>
             </p:sp>
@@ -10947,9 +10947,9 @@
           <p:grpSpPr>
             <a:xfrm>
               <a:off x="264939" y="1101767"/>
-              <a:ext cx="5748195" cy="2550544"/>
+              <a:ext cx="5748195" cy="2558433"/>
               <a:chOff x="6740744" y="2390966"/>
-              <a:chExt cx="4521306" cy="3400723"/>
+              <a:chExt cx="4521306" cy="3411243"/>
             </a:xfrm>
           </p:grpSpPr>
           <p:grpSp>
@@ -10961,9 +10961,9 @@
             <p:grpSpPr>
               <a:xfrm>
                 <a:off x="6740744" y="2390966"/>
-                <a:ext cx="4514047" cy="3400723"/>
+                <a:ext cx="4514047" cy="3411243"/>
                 <a:chOff x="6729727" y="1785038"/>
-                <a:chExt cx="4514047" cy="3400723"/>
+                <a:chExt cx="4514047" cy="3411243"/>
               </a:xfrm>
             </p:grpSpPr>
             <p:grpSp>
@@ -10975,9 +10975,9 @@
               <p:grpSpPr>
                 <a:xfrm>
                   <a:off x="7090883" y="2441590"/>
-                  <a:ext cx="4152891" cy="2690948"/>
+                  <a:ext cx="4152891" cy="2701467"/>
                   <a:chOff x="3635829" y="2352842"/>
-                  <a:chExt cx="4152891" cy="2690948"/>
+                  <a:chExt cx="4152891" cy="2701467"/>
                 </a:xfrm>
               </p:grpSpPr>
               <p:sp>
@@ -11019,7 +11019,7 @@
                   <a:lstStyle/>
                   <a:p>
                     <a:pPr algn="ctr"/>
-                    <a:endParaRPr lang="en-US" sz="1022"/>
+                    <a:endParaRPr lang="en-US" sz="910"/>
                   </a:p>
                 </p:txBody>
               </p:sp>
@@ -11062,7 +11062,7 @@
                   <a:lstStyle/>
                   <a:p>
                     <a:pPr algn="ctr"/>
-                    <a:endParaRPr lang="en-US" sz="1022"/>
+                    <a:endParaRPr lang="en-US" sz="910"/>
                   </a:p>
                 </p:txBody>
               </p:sp>
@@ -11110,7 +11110,7 @@
                   <a:lstStyle/>
                   <a:p>
                     <a:pPr algn="ctr"/>
-                    <a:endParaRPr lang="en-US" sz="1022"/>
+                    <a:endParaRPr lang="en-US" sz="910"/>
                   </a:p>
                 </p:txBody>
               </p:sp>
@@ -11158,7 +11158,7 @@
                   <a:lstStyle/>
                   <a:p>
                     <a:pPr algn="ctr"/>
-                    <a:endParaRPr lang="en-US" sz="1022"/>
+                    <a:endParaRPr lang="en-US" sz="910"/>
                   </a:p>
                 </p:txBody>
               </p:sp>
@@ -11206,7 +11206,7 @@
                   <a:lstStyle/>
                   <a:p>
                     <a:pPr algn="ctr"/>
-                    <a:endParaRPr lang="en-US" sz="1022"/>
+                    <a:endParaRPr lang="en-US" sz="910"/>
                   </a:p>
                 </p:txBody>
               </p:sp>
@@ -11254,7 +11254,7 @@
                   <a:lstStyle/>
                   <a:p>
                     <a:pPr algn="ctr"/>
-                    <a:endParaRPr lang="en-US" sz="1022"/>
+                    <a:endParaRPr lang="en-US" sz="910"/>
                   </a:p>
                 </p:txBody>
               </p:sp>
@@ -11302,7 +11302,7 @@
                   <a:lstStyle/>
                   <a:p>
                     <a:pPr algn="ctr"/>
-                    <a:endParaRPr lang="en-US" sz="1022"/>
+                    <a:endParaRPr lang="en-US" sz="910"/>
                   </a:p>
                 </p:txBody>
               </p:sp>
@@ -11350,7 +11350,7 @@
                   <a:lstStyle/>
                   <a:p>
                     <a:pPr algn="ctr"/>
-                    <a:endParaRPr lang="en-US" sz="1022"/>
+                    <a:endParaRPr lang="en-US" sz="910"/>
                   </a:p>
                 </p:txBody>
               </p:sp>
@@ -11398,7 +11398,7 @@
                   <a:lstStyle/>
                   <a:p>
                     <a:pPr algn="ctr"/>
-                    <a:endParaRPr lang="en-US" sz="1022"/>
+                    <a:endParaRPr lang="en-US" sz="910"/>
                   </a:p>
                 </p:txBody>
               </p:sp>
@@ -11446,7 +11446,7 @@
                   <a:lstStyle/>
                   <a:p>
                     <a:pPr algn="ctr"/>
-                    <a:endParaRPr lang="en-US" sz="1022"/>
+                    <a:endParaRPr lang="en-US" sz="910"/>
                   </a:p>
                 </p:txBody>
               </p:sp>
@@ -11494,7 +11494,7 @@
                   <a:lstStyle/>
                   <a:p>
                     <a:pPr algn="ctr"/>
-                    <a:endParaRPr lang="en-US" sz="1022"/>
+                    <a:endParaRPr lang="en-US" sz="910"/>
                   </a:p>
                 </p:txBody>
               </p:sp>
@@ -11542,7 +11542,7 @@
                   <a:lstStyle/>
                   <a:p>
                     <a:pPr algn="ctr"/>
-                    <a:endParaRPr lang="en-US" sz="1022"/>
+                    <a:endParaRPr lang="en-US" sz="910"/>
                   </a:p>
                 </p:txBody>
               </p:sp>
@@ -11590,7 +11590,7 @@
                   <a:lstStyle/>
                   <a:p>
                     <a:pPr algn="ctr"/>
-                    <a:endParaRPr lang="en-US" sz="1022"/>
+                    <a:endParaRPr lang="en-US" sz="910"/>
                   </a:p>
                 </p:txBody>
               </p:sp>
@@ -11638,7 +11638,7 @@
                   <a:lstStyle/>
                   <a:p>
                     <a:pPr algn="ctr"/>
-                    <a:endParaRPr lang="en-US" sz="1022"/>
+                    <a:endParaRPr lang="en-US" sz="910"/>
                   </a:p>
                 </p:txBody>
               </p:sp>
@@ -11686,7 +11686,7 @@
                   <a:lstStyle/>
                   <a:p>
                     <a:pPr algn="ctr"/>
-                    <a:endParaRPr lang="en-US" sz="1022"/>
+                    <a:endParaRPr lang="en-US" sz="910"/>
                   </a:p>
                 </p:txBody>
               </p:sp>
@@ -11734,7 +11734,7 @@
                   <a:lstStyle/>
                   <a:p>
                     <a:pPr algn="ctr"/>
-                    <a:endParaRPr lang="en-US" sz="1022"/>
+                    <a:endParaRPr lang="en-US" sz="910"/>
                   </a:p>
                 </p:txBody>
               </p:sp>
@@ -11782,7 +11782,7 @@
                   <a:lstStyle/>
                   <a:p>
                     <a:pPr algn="ctr"/>
-                    <a:endParaRPr lang="en-US" sz="1022"/>
+                    <a:endParaRPr lang="en-US" sz="910"/>
                   </a:p>
                 </p:txBody>
               </p:sp>
@@ -11794,8 +11794,8 @@
                 </p:nvSpPr>
                 <p:spPr>
                   <a:xfrm>
-                    <a:off x="6011841" y="4440716"/>
-                    <a:ext cx="642224" cy="603074"/>
+                    <a:off x="6011841" y="4440718"/>
+                    <a:ext cx="675037" cy="613591"/>
                   </a:xfrm>
                   <a:prstGeom prst="rect">
                     <a:avLst/>
@@ -11809,7 +11809,7 @@
                   <a:lstStyle/>
                   <a:p>
                     <a:r>
-                      <a:rPr lang="en-US" sz="1278" dirty="0"/>
+                      <a:rPr lang="en-US" sz="1140" dirty="0"/>
                       <a:t>Hairs</a:t>
                     </a:r>
                   </a:p>
@@ -11825,8 +11825,8 @@
                 </p:nvCxnSpPr>
                 <p:spPr>
                   <a:xfrm flipH="1" flipV="1">
-                    <a:off x="4903852" y="3861758"/>
-                    <a:ext cx="1107989" cy="880495"/>
+                    <a:off x="4903872" y="3861783"/>
+                    <a:ext cx="1107969" cy="885730"/>
                   </a:xfrm>
                   <a:prstGeom prst="straightConnector1">
                     <a:avLst/>
@@ -11862,8 +11862,8 @@
               </p:nvSpPr>
               <p:spPr>
                 <a:xfrm>
-                  <a:off x="8943086" y="1785038"/>
-                  <a:ext cx="443639" cy="1177243"/>
+                  <a:off x="8943087" y="1785038"/>
+                  <a:ext cx="443640" cy="1176343"/>
                 </a:xfrm>
                 <a:prstGeom prst="rect">
                   <a:avLst/>
@@ -11877,7 +11877,7 @@
                 <a:lstStyle/>
                 <a:p>
                   <a:r>
-                    <a:rPr lang="en-US" sz="1533" b="1" dirty="0"/>
+                    <a:rPr lang="en-US" sz="1368" b="1" dirty="0"/>
                     <a:t>Air</a:t>
                   </a:r>
                 </a:p>
@@ -11927,8 +11927,8 @@
               </p:nvSpPr>
               <p:spPr>
                 <a:xfrm>
-                  <a:off x="6729727" y="4582687"/>
-                  <a:ext cx="460198" cy="603074"/>
+                  <a:off x="6729727" y="4582690"/>
+                  <a:ext cx="489247" cy="613591"/>
                 </a:xfrm>
                 <a:prstGeom prst="rect">
                   <a:avLst/>
@@ -11942,7 +11942,7 @@
                 <a:lstStyle/>
                 <a:p>
                   <a:r>
-                    <a:rPr lang="en-US" sz="1278" dirty="0"/>
+                    <a:rPr lang="en-US" sz="1140" dirty="0"/>
                     <a:t>Air</a:t>
                   </a:r>
                 </a:p>
@@ -12374,7 +12374,7 @@
               <a:lstStyle/>
               <a:p>
                 <a:pPr algn="ctr"/>
-                <a:endParaRPr lang="en-US" sz="1022"/>
+                <a:endParaRPr lang="en-US" sz="910"/>
               </a:p>
             </p:txBody>
           </p:sp>
@@ -12803,7 +12803,7 @@
               <a:lstStyle/>
               <a:p>
                 <a:pPr algn="ctr"/>
-                <a:endParaRPr lang="en-US" sz="1022"/>
+                <a:endParaRPr lang="en-US" sz="910"/>
               </a:p>
             </p:txBody>
           </p:sp>
@@ -13232,7 +13232,7 @@
               <a:lstStyle/>
               <a:p>
                 <a:pPr algn="ctr"/>
-                <a:endParaRPr lang="en-US" sz="1022"/>
+                <a:endParaRPr lang="en-US" sz="910"/>
               </a:p>
             </p:txBody>
           </p:sp>
@@ -13661,7 +13661,7 @@
               <a:lstStyle/>
               <a:p>
                 <a:pPr algn="ctr"/>
-                <a:endParaRPr lang="en-US" sz="1022"/>
+                <a:endParaRPr lang="en-US" sz="910"/>
               </a:p>
             </p:txBody>
           </p:sp>
@@ -14090,7 +14090,7 @@
               <a:lstStyle/>
               <a:p>
                 <a:pPr algn="ctr"/>
-                <a:endParaRPr lang="en-US" sz="1022"/>
+                <a:endParaRPr lang="en-US" sz="910"/>
               </a:p>
             </p:txBody>
           </p:sp>
@@ -14519,7 +14519,7 @@
               <a:lstStyle/>
               <a:p>
                 <a:pPr algn="ctr"/>
-                <a:endParaRPr lang="en-US" sz="1022"/>
+                <a:endParaRPr lang="en-US" sz="910"/>
               </a:p>
             </p:txBody>
           </p:sp>
@@ -14948,7 +14948,7 @@
               <a:lstStyle/>
               <a:p>
                 <a:pPr algn="ctr"/>
-                <a:endParaRPr lang="en-US" sz="1022"/>
+                <a:endParaRPr lang="en-US" sz="910"/>
               </a:p>
             </p:txBody>
           </p:sp>
@@ -15377,7 +15377,7 @@
               <a:lstStyle/>
               <a:p>
                 <a:pPr algn="ctr"/>
-                <a:endParaRPr lang="en-US" sz="1022"/>
+                <a:endParaRPr lang="en-US" sz="910"/>
               </a:p>
             </p:txBody>
           </p:sp>
@@ -15806,7 +15806,7 @@
               <a:lstStyle/>
               <a:p>
                 <a:pPr algn="ctr"/>
-                <a:endParaRPr lang="en-US" sz="1022"/>
+                <a:endParaRPr lang="en-US" sz="910"/>
               </a:p>
             </p:txBody>
           </p:sp>
@@ -16235,7 +16235,7 @@
               <a:lstStyle/>
               <a:p>
                 <a:pPr algn="ctr"/>
-                <a:endParaRPr lang="en-US" sz="1022"/>
+                <a:endParaRPr lang="en-US" sz="910"/>
               </a:p>
             </p:txBody>
           </p:sp>
@@ -16664,7 +16664,7 @@
               <a:lstStyle/>
               <a:p>
                 <a:pPr algn="ctr"/>
-                <a:endParaRPr lang="en-US" sz="1022"/>
+                <a:endParaRPr lang="en-US" sz="910"/>
               </a:p>
             </p:txBody>
           </p:sp>
@@ -17093,7 +17093,7 @@
               <a:lstStyle/>
               <a:p>
                 <a:pPr algn="ctr"/>
-                <a:endParaRPr lang="en-US" sz="1022"/>
+                <a:endParaRPr lang="en-US" sz="910"/>
               </a:p>
             </p:txBody>
           </p:sp>
@@ -17522,7 +17522,7 @@
               <a:lstStyle/>
               <a:p>
                 <a:pPr algn="ctr"/>
-                <a:endParaRPr lang="en-US" sz="1022"/>
+                <a:endParaRPr lang="en-US" sz="910"/>
               </a:p>
             </p:txBody>
           </p:sp>
@@ -17951,7 +17951,7 @@
               <a:lstStyle/>
               <a:p>
                 <a:pPr algn="ctr"/>
-                <a:endParaRPr lang="en-US" sz="1022"/>
+                <a:endParaRPr lang="en-US" sz="910"/>
               </a:p>
             </p:txBody>
           </p:sp>
@@ -18380,7 +18380,7 @@
               <a:lstStyle/>
               <a:p>
                 <a:pPr algn="ctr"/>
-                <a:endParaRPr lang="en-US" sz="1022"/>
+                <a:endParaRPr lang="en-US" sz="910"/>
               </a:p>
             </p:txBody>
           </p:sp>
@@ -18466,9 +18466,9 @@
           <p:grpSpPr>
             <a:xfrm>
               <a:off x="6190566" y="1133588"/>
-              <a:ext cx="5748195" cy="2518723"/>
+              <a:ext cx="5748195" cy="2526614"/>
               <a:chOff x="6740744" y="2433394"/>
-              <a:chExt cx="4521306" cy="3358295"/>
+              <a:chExt cx="4521306" cy="3368816"/>
             </a:xfrm>
           </p:grpSpPr>
           <p:grpSp>
@@ -18480,9 +18480,9 @@
             <p:grpSpPr>
               <a:xfrm>
                 <a:off x="6740744" y="2433394"/>
-                <a:ext cx="4514047" cy="3358295"/>
+                <a:ext cx="4514047" cy="3368816"/>
                 <a:chOff x="6729727" y="1827466"/>
-                <a:chExt cx="4514047" cy="3358295"/>
+                <a:chExt cx="4514047" cy="3368816"/>
               </a:xfrm>
             </p:grpSpPr>
             <p:grpSp>
@@ -18494,9 +18494,9 @@
               <p:grpSpPr>
                 <a:xfrm>
                   <a:off x="7090883" y="2441590"/>
-                  <a:ext cx="4152891" cy="2690948"/>
+                  <a:ext cx="4152891" cy="2701468"/>
                   <a:chOff x="3635829" y="2352842"/>
-                  <a:chExt cx="4152891" cy="2690948"/>
+                  <a:chExt cx="4152891" cy="2701468"/>
                 </a:xfrm>
               </p:grpSpPr>
               <p:sp>
@@ -18538,7 +18538,7 @@
                   <a:lstStyle/>
                   <a:p>
                     <a:pPr algn="ctr"/>
-                    <a:endParaRPr lang="en-US" sz="1022"/>
+                    <a:endParaRPr lang="en-US" sz="910"/>
                   </a:p>
                 </p:txBody>
               </p:sp>
@@ -18581,7 +18581,7 @@
                   <a:lstStyle/>
                   <a:p>
                     <a:pPr algn="ctr"/>
-                    <a:endParaRPr lang="en-US" sz="1022"/>
+                    <a:endParaRPr lang="en-US" sz="910"/>
                   </a:p>
                 </p:txBody>
               </p:sp>
@@ -18629,7 +18629,7 @@
                   <a:lstStyle/>
                   <a:p>
                     <a:pPr algn="ctr"/>
-                    <a:endParaRPr lang="en-US" sz="1022"/>
+                    <a:endParaRPr lang="en-US" sz="910"/>
                   </a:p>
                 </p:txBody>
               </p:sp>
@@ -18677,7 +18677,7 @@
                   <a:lstStyle/>
                   <a:p>
                     <a:pPr algn="ctr"/>
-                    <a:endParaRPr lang="en-US" sz="1022"/>
+                    <a:endParaRPr lang="en-US" sz="910"/>
                   </a:p>
                 </p:txBody>
               </p:sp>
@@ -18725,7 +18725,7 @@
                   <a:lstStyle/>
                   <a:p>
                     <a:pPr algn="ctr"/>
-                    <a:endParaRPr lang="en-US" sz="1022"/>
+                    <a:endParaRPr lang="en-US" sz="910"/>
                   </a:p>
                 </p:txBody>
               </p:sp>
@@ -18773,7 +18773,7 @@
                   <a:lstStyle/>
                   <a:p>
                     <a:pPr algn="ctr"/>
-                    <a:endParaRPr lang="en-US" sz="1022"/>
+                    <a:endParaRPr lang="en-US" sz="910"/>
                   </a:p>
                 </p:txBody>
               </p:sp>
@@ -18821,7 +18821,7 @@
                   <a:lstStyle/>
                   <a:p>
                     <a:pPr algn="ctr"/>
-                    <a:endParaRPr lang="en-US" sz="1022"/>
+                    <a:endParaRPr lang="en-US" sz="910"/>
                   </a:p>
                 </p:txBody>
               </p:sp>
@@ -18869,7 +18869,7 @@
                   <a:lstStyle/>
                   <a:p>
                     <a:pPr algn="ctr"/>
-                    <a:endParaRPr lang="en-US" sz="1022"/>
+                    <a:endParaRPr lang="en-US" sz="910"/>
                   </a:p>
                 </p:txBody>
               </p:sp>
@@ -18917,7 +18917,7 @@
                   <a:lstStyle/>
                   <a:p>
                     <a:pPr algn="ctr"/>
-                    <a:endParaRPr lang="en-US" sz="1022"/>
+                    <a:endParaRPr lang="en-US" sz="910"/>
                   </a:p>
                 </p:txBody>
               </p:sp>
@@ -18965,7 +18965,7 @@
                   <a:lstStyle/>
                   <a:p>
                     <a:pPr algn="ctr"/>
-                    <a:endParaRPr lang="en-US" sz="1022"/>
+                    <a:endParaRPr lang="en-US" sz="910"/>
                   </a:p>
                 </p:txBody>
               </p:sp>
@@ -19013,7 +19013,7 @@
                   <a:lstStyle/>
                   <a:p>
                     <a:pPr algn="ctr"/>
-                    <a:endParaRPr lang="en-US" sz="1022"/>
+                    <a:endParaRPr lang="en-US" sz="910"/>
                   </a:p>
                 </p:txBody>
               </p:sp>
@@ -19061,7 +19061,7 @@
                   <a:lstStyle/>
                   <a:p>
                     <a:pPr algn="ctr"/>
-                    <a:endParaRPr lang="en-US" sz="1022"/>
+                    <a:endParaRPr lang="en-US" sz="910"/>
                   </a:p>
                 </p:txBody>
               </p:sp>
@@ -19109,7 +19109,7 @@
                   <a:lstStyle/>
                   <a:p>
                     <a:pPr algn="ctr"/>
-                    <a:endParaRPr lang="en-US" sz="1022"/>
+                    <a:endParaRPr lang="en-US" sz="910"/>
                   </a:p>
                 </p:txBody>
               </p:sp>
@@ -19157,7 +19157,7 @@
                   <a:lstStyle/>
                   <a:p>
                     <a:pPr algn="ctr"/>
-                    <a:endParaRPr lang="en-US" sz="1022"/>
+                    <a:endParaRPr lang="en-US" sz="910"/>
                   </a:p>
                 </p:txBody>
               </p:sp>
@@ -19205,7 +19205,7 @@
                   <a:lstStyle/>
                   <a:p>
                     <a:pPr algn="ctr"/>
-                    <a:endParaRPr lang="en-US" sz="1022"/>
+                    <a:endParaRPr lang="en-US" sz="910"/>
                   </a:p>
                 </p:txBody>
               </p:sp>
@@ -19253,7 +19253,7 @@
                   <a:lstStyle/>
                   <a:p>
                     <a:pPr algn="ctr"/>
-                    <a:endParaRPr lang="en-US" sz="1022"/>
+                    <a:endParaRPr lang="en-US" sz="910"/>
                   </a:p>
                 </p:txBody>
               </p:sp>
@@ -19301,7 +19301,7 @@
                   <a:lstStyle/>
                   <a:p>
                     <a:pPr algn="ctr"/>
-                    <a:endParaRPr lang="en-US" sz="1022"/>
+                    <a:endParaRPr lang="en-US" sz="910"/>
                   </a:p>
                 </p:txBody>
               </p:sp>
@@ -19313,8 +19313,8 @@
                 </p:nvSpPr>
                 <p:spPr>
                   <a:xfrm>
-                    <a:off x="6011841" y="4440716"/>
-                    <a:ext cx="1582355" cy="603074"/>
+                    <a:off x="6011841" y="4440719"/>
+                    <a:ext cx="1615047" cy="613591"/>
                   </a:xfrm>
                   <a:prstGeom prst="rect">
                     <a:avLst/>
@@ -19328,7 +19328,7 @@
                   <a:lstStyle/>
                   <a:p>
                     <a:r>
-                      <a:rPr lang="en-US" sz="1278" dirty="0"/>
+                      <a:rPr lang="en-US" sz="1140" dirty="0"/>
                       <a:t>Capillary bridges</a:t>
                     </a:r>
                   </a:p>
@@ -19344,8 +19344,8 @@
                 </p:nvCxnSpPr>
                 <p:spPr>
                   <a:xfrm flipH="1" flipV="1">
-                    <a:off x="4916939" y="4170976"/>
-                    <a:ext cx="1094901" cy="571277"/>
+                    <a:off x="4916961" y="4171000"/>
+                    <a:ext cx="1094881" cy="576514"/>
                   </a:xfrm>
                   <a:prstGeom prst="straightConnector1">
                     <a:avLst/>
@@ -19382,7 +19382,7 @@
               <p:spPr>
                 <a:xfrm>
                   <a:off x="8312297" y="1827466"/>
-                  <a:ext cx="1999625" cy="684963"/>
+                  <a:ext cx="1999626" cy="693964"/>
                 </a:xfrm>
                 <a:prstGeom prst="rect">
                   <a:avLst/>
@@ -19396,7 +19396,7 @@
                 <a:lstStyle/>
                 <a:p>
                   <a:r>
-                    <a:rPr lang="en-US" sz="1533" b="1" dirty="0"/>
+                    <a:rPr lang="en-US" sz="1368" b="1" dirty="0"/>
                     <a:t>Underwater: Wet</a:t>
                   </a:r>
                 </a:p>
@@ -19446,8 +19446,8 @@
               </p:nvSpPr>
               <p:spPr>
                 <a:xfrm>
-                  <a:off x="6729727" y="4582687"/>
-                  <a:ext cx="731344" cy="603074"/>
+                  <a:off x="6729727" y="4582691"/>
+                  <a:ext cx="770145" cy="613591"/>
                 </a:xfrm>
                 <a:prstGeom prst="rect">
                   <a:avLst/>
@@ -19461,7 +19461,7 @@
                 <a:lstStyle/>
                 <a:p>
                   <a:r>
-                    <a:rPr lang="en-US" sz="1278" dirty="0"/>
+                    <a:rPr lang="en-US" sz="1140" dirty="0"/>
                     <a:t>Water</a:t>
                   </a:r>
                 </a:p>
@@ -19893,7 +19893,7 @@
               <a:lstStyle/>
               <a:p>
                 <a:pPr algn="ctr"/>
-                <a:endParaRPr lang="en-US" sz="1022"/>
+                <a:endParaRPr lang="en-US" sz="910"/>
               </a:p>
             </p:txBody>
           </p:sp>
@@ -20322,7 +20322,7 @@
               <a:lstStyle/>
               <a:p>
                 <a:pPr algn="ctr"/>
-                <a:endParaRPr lang="en-US" sz="1022"/>
+                <a:endParaRPr lang="en-US" sz="910"/>
               </a:p>
             </p:txBody>
           </p:sp>
@@ -20751,7 +20751,7 @@
               <a:lstStyle/>
               <a:p>
                 <a:pPr algn="ctr"/>
-                <a:endParaRPr lang="en-US" sz="1022"/>
+                <a:endParaRPr lang="en-US" sz="910"/>
               </a:p>
             </p:txBody>
           </p:sp>
@@ -21180,7 +21180,7 @@
               <a:lstStyle/>
               <a:p>
                 <a:pPr algn="ctr"/>
-                <a:endParaRPr lang="en-US" sz="1022"/>
+                <a:endParaRPr lang="en-US" sz="910"/>
               </a:p>
             </p:txBody>
           </p:sp>
@@ -21609,7 +21609,7 @@
               <a:lstStyle/>
               <a:p>
                 <a:pPr algn="ctr"/>
-                <a:endParaRPr lang="en-US" sz="1022"/>
+                <a:endParaRPr lang="en-US" sz="910"/>
               </a:p>
             </p:txBody>
           </p:sp>
@@ -22038,7 +22038,7 @@
               <a:lstStyle/>
               <a:p>
                 <a:pPr algn="ctr"/>
-                <a:endParaRPr lang="en-US" sz="1022"/>
+                <a:endParaRPr lang="en-US" sz="910"/>
               </a:p>
             </p:txBody>
           </p:sp>
@@ -22467,7 +22467,7 @@
               <a:lstStyle/>
               <a:p>
                 <a:pPr algn="ctr"/>
-                <a:endParaRPr lang="en-US" sz="1022"/>
+                <a:endParaRPr lang="en-US" sz="910"/>
               </a:p>
             </p:txBody>
           </p:sp>
@@ -22896,7 +22896,7 @@
               <a:lstStyle/>
               <a:p>
                 <a:pPr algn="ctr"/>
-                <a:endParaRPr lang="en-US" sz="1022"/>
+                <a:endParaRPr lang="en-US" sz="910"/>
               </a:p>
             </p:txBody>
           </p:sp>
@@ -23325,7 +23325,7 @@
               <a:lstStyle/>
               <a:p>
                 <a:pPr algn="ctr"/>
-                <a:endParaRPr lang="en-US" sz="1022"/>
+                <a:endParaRPr lang="en-US" sz="910"/>
               </a:p>
             </p:txBody>
           </p:sp>
@@ -23754,7 +23754,7 @@
               <a:lstStyle/>
               <a:p>
                 <a:pPr algn="ctr"/>
-                <a:endParaRPr lang="en-US" sz="1022"/>
+                <a:endParaRPr lang="en-US" sz="910"/>
               </a:p>
             </p:txBody>
           </p:sp>
@@ -24183,7 +24183,7 @@
               <a:lstStyle/>
               <a:p>
                 <a:pPr algn="ctr"/>
-                <a:endParaRPr lang="en-US" sz="1022"/>
+                <a:endParaRPr lang="en-US" sz="910"/>
               </a:p>
             </p:txBody>
           </p:sp>
@@ -24612,7 +24612,7 @@
               <a:lstStyle/>
               <a:p>
                 <a:pPr algn="ctr"/>
-                <a:endParaRPr lang="en-US" sz="1022"/>
+                <a:endParaRPr lang="en-US" sz="910"/>
               </a:p>
             </p:txBody>
           </p:sp>
@@ -25041,7 +25041,7 @@
               <a:lstStyle/>
               <a:p>
                 <a:pPr algn="ctr"/>
-                <a:endParaRPr lang="en-US" sz="1022"/>
+                <a:endParaRPr lang="en-US" sz="910"/>
               </a:p>
             </p:txBody>
           </p:sp>
@@ -25470,7 +25470,7 @@
               <a:lstStyle/>
               <a:p>
                 <a:pPr algn="ctr"/>
-                <a:endParaRPr lang="en-US" sz="1022"/>
+                <a:endParaRPr lang="en-US" sz="910"/>
               </a:p>
             </p:txBody>
           </p:sp>
@@ -25899,7 +25899,7 @@
               <a:lstStyle/>
               <a:p>
                 <a:pPr algn="ctr"/>
-                <a:endParaRPr lang="en-US" sz="1022"/>
+                <a:endParaRPr lang="en-US" sz="910"/>
               </a:p>
             </p:txBody>
           </p:sp>
@@ -25986,8 +25986,8 @@
           </p:nvSpPr>
           <p:spPr>
             <a:xfrm>
-              <a:off x="3048851" y="1728879"/>
-              <a:ext cx="730206" cy="421495"/>
+              <a:off x="3048849" y="1728877"/>
+              <a:ext cx="730204" cy="429999"/>
             </a:xfrm>
             <a:prstGeom prst="rect">
               <a:avLst/>
@@ -26001,7 +26001,7 @@
             <a:lstStyle/>
             <a:p>
               <a:r>
-                <a:rPr lang="en-US" sz="1150" dirty="0"/>
+                <a:rPr lang="en-US" sz="1026" dirty="0"/>
                 <a:t>Pad</a:t>
               </a:r>
             </a:p>
@@ -26047,7 +26047,7 @@
           <p:nvPr/>
         </p:nvPicPr>
         <p:blipFill rotWithShape="1">
-          <a:blip r:embed="rId2">
+          <a:blip r:embed="rId2" cstate="print">
             <a:extLst>
               <a:ext uri="{BEBA8EAE-BF5A-486C-A8C5-ECC9F3942E4B}">
                 <a14:imgProps xmlns:a14="http://schemas.microsoft.com/office/drawing/2010/main">
@@ -26070,8 +26070,8 @@
         </p:blipFill>
         <p:spPr>
           <a:xfrm>
-            <a:off x="3868236" y="1279210"/>
-            <a:ext cx="3256990" cy="805047"/>
+            <a:off x="4104446" y="1218986"/>
+            <a:ext cx="2905957" cy="718280"/>
           </a:xfrm>
           <a:prstGeom prst="rect">
             <a:avLst/>
@@ -26096,7 +26096,7 @@
           <p:nvPr/>
         </p:nvPicPr>
         <p:blipFill rotWithShape="1">
-          <a:blip r:embed="rId4">
+          <a:blip r:embed="rId4" cstate="print">
             <a:extLst>
               <a:ext uri="{BEBA8EAE-BF5A-486C-A8C5-ECC9F3942E4B}">
                 <a14:imgProps xmlns:a14="http://schemas.microsoft.com/office/drawing/2010/main">
@@ -26119,8 +26119,8 @@
         </p:blipFill>
         <p:spPr>
           <a:xfrm>
-            <a:off x="611247" y="344247"/>
-            <a:ext cx="3256990" cy="805047"/>
+            <a:off x="1198490" y="384793"/>
+            <a:ext cx="2905957" cy="718280"/>
           </a:xfrm>
           <a:prstGeom prst="rect">
             <a:avLst/>
@@ -26139,7 +26139,7 @@
           <p:nvPr/>
         </p:nvPicPr>
         <p:blipFill rotWithShape="1">
-          <a:blip r:embed="rId6">
+          <a:blip r:embed="rId6" cstate="print">
             <a:extLst>
               <a:ext uri="{BEBA8EAE-BF5A-486C-A8C5-ECC9F3942E4B}">
                 <a14:imgProps xmlns:a14="http://schemas.microsoft.com/office/drawing/2010/main">
@@ -26162,8 +26162,8 @@
         </p:blipFill>
         <p:spPr>
           <a:xfrm>
-            <a:off x="3868236" y="344247"/>
-            <a:ext cx="3256990" cy="805047"/>
+            <a:off x="4104446" y="384793"/>
+            <a:ext cx="2905957" cy="718280"/>
           </a:xfrm>
           <a:prstGeom prst="rect">
             <a:avLst/>
@@ -26188,7 +26188,7 @@
           <p:nvPr/>
         </p:nvPicPr>
         <p:blipFill rotWithShape="1">
-          <a:blip r:embed="rId2">
+          <a:blip r:embed="rId2" cstate="print">
             <a:extLst>
               <a:ext uri="{BEBA8EAE-BF5A-486C-A8C5-ECC9F3942E4B}">
                 <a14:imgProps xmlns:a14="http://schemas.microsoft.com/office/drawing/2010/main">
@@ -26211,8 +26211,8 @@
         </p:blipFill>
         <p:spPr>
           <a:xfrm>
-            <a:off x="611247" y="1290206"/>
-            <a:ext cx="3256990" cy="805047"/>
+            <a:off x="1198490" y="1228798"/>
+            <a:ext cx="2905957" cy="718280"/>
           </a:xfrm>
           <a:prstGeom prst="rect">
             <a:avLst/>
@@ -26230,8 +26230,8 @@
         </p:nvSpPr>
         <p:spPr>
           <a:xfrm>
-            <a:off x="2062452" y="38"/>
-            <a:ext cx="421910" cy="328231"/>
+            <a:off x="2493280" y="77681"/>
+            <a:ext cx="396262" cy="302840"/>
           </a:xfrm>
           <a:prstGeom prst="rect">
             <a:avLst/>
@@ -26245,7 +26245,7 @@
           <a:lstStyle/>
           <a:p>
             <a:r>
-              <a:rPr lang="en-US" sz="1533" b="1" dirty="0"/>
+              <a:rPr lang="en-US" sz="1368" b="1" dirty="0"/>
               <a:t>Air</a:t>
             </a:r>
           </a:p>
@@ -26259,8 +26259,8 @@
         </p:nvSpPr>
         <p:spPr>
           <a:xfrm>
-            <a:off x="4945670" y="38"/>
-            <a:ext cx="1171796" cy="328231"/>
+            <a:off x="5065751" y="77681"/>
+            <a:ext cx="1063368" cy="302840"/>
           </a:xfrm>
           <a:prstGeom prst="rect">
             <a:avLst/>
@@ -26274,7 +26274,7 @@
           <a:lstStyle/>
           <a:p>
             <a:r>
-              <a:rPr lang="en-US" sz="1533" b="1" dirty="0"/>
+              <a:rPr lang="en-US" sz="1368" b="1" dirty="0"/>
               <a:t>Underwater</a:t>
             </a:r>
           </a:p>
@@ -26288,8 +26288,8 @@
         </p:nvSpPr>
         <p:spPr>
           <a:xfrm>
-            <a:off x="-24075" y="599284"/>
-            <a:ext cx="612668" cy="328231"/>
+            <a:off x="176967" y="612342"/>
+            <a:ext cx="1062214" cy="302840"/>
           </a:xfrm>
           <a:prstGeom prst="rect">
             <a:avLst/>
@@ -26303,9 +26303,10 @@
           <a:lstStyle/>
           <a:p>
             <a:r>
-              <a:rPr lang="en-US" sz="1533" b="1" dirty="0"/>
-              <a:t>Glass</a:t>
+              <a:rPr lang="en-US" sz="1368" b="1" dirty="0" err="1"/>
+              <a:t>Hydrophillic</a:t>
             </a:r>
+            <a:endParaRPr lang="en-US" sz="1368" b="1" dirty="0"/>
           </a:p>
         </p:txBody>
       </p:sp>
@@ -26317,8 +26318,8 @@
         </p:nvSpPr>
         <p:spPr>
           <a:xfrm>
-            <a:off x="-65801" y="1545244"/>
-            <a:ext cx="695768" cy="328231"/>
+            <a:off x="139739" y="1456347"/>
+            <a:ext cx="1121525" cy="302840"/>
           </a:xfrm>
           <a:prstGeom prst="rect">
             <a:avLst/>
@@ -26332,8 +26333,8 @@
           <a:lstStyle/>
           <a:p>
             <a:r>
-              <a:rPr lang="en-US" sz="1533" b="1" dirty="0"/>
-              <a:t>PFOTS</a:t>
+              <a:rPr lang="en-US" sz="1368" b="1" dirty="0"/>
+              <a:t>Hydrophobic</a:t>
             </a:r>
           </a:p>
         </p:txBody>
@@ -26346,8 +26347,8 @@
         </p:nvCxnSpPr>
         <p:spPr>
           <a:xfrm>
-            <a:off x="723110" y="1149294"/>
-            <a:ext cx="6402116" cy="0"/>
+            <a:off x="1298297" y="1103068"/>
+            <a:ext cx="5712105" cy="0"/>
           </a:xfrm>
           <a:prstGeom prst="line">
             <a:avLst/>
@@ -26381,8 +26382,8 @@
         </p:nvCxnSpPr>
         <p:spPr>
           <a:xfrm>
-            <a:off x="723110" y="2095253"/>
-            <a:ext cx="6402116" cy="0"/>
+            <a:off x="1298296" y="1947074"/>
+            <a:ext cx="5712105" cy="0"/>
           </a:xfrm>
           <a:prstGeom prst="line">
             <a:avLst/>
@@ -26416,8 +26417,8 @@
         </p:nvSpPr>
         <p:spPr>
           <a:xfrm>
-            <a:off x="1995394" y="888942"/>
-            <a:ext cx="1572866" cy="288990"/>
+            <a:off x="2321262" y="856491"/>
+            <a:ext cx="1577676" cy="267766"/>
           </a:xfrm>
           <a:prstGeom prst="rect">
             <a:avLst/>
@@ -26431,46 +26432,50 @@
           <a:lstStyle/>
           <a:p>
             <a:r>
-              <a:rPr lang="el-GR" sz="1278" dirty="0"/>
+              <a:rPr lang="el-GR" sz="1140" dirty="0"/>
               <a:t>γ</a:t>
             </a:r>
             <a:r>
-              <a:rPr lang="en-IN" sz="1278" dirty="0"/>
-              <a:t> = </a:t>
+              <a:rPr lang="en-US" sz="1140" baseline="-25000" dirty="0"/>
+              <a:t>fa</a:t>
             </a:r>
             <a:r>
-              <a:rPr lang="en-IN" sz="1278" dirty="0" smtClean="0"/>
-              <a:t>27 </a:t>
+              <a:rPr lang="en-IN" sz="1140" dirty="0"/>
+              <a:t> = 27 </a:t>
             </a:r>
             <a:r>
-              <a:rPr lang="en-IN" sz="1278" dirty="0" err="1"/>
+              <a:rPr lang="en-IN" sz="1140" dirty="0" err="1"/>
               <a:t>mN</a:t>
             </a:r>
             <a:r>
-              <a:rPr lang="en-IN" sz="1278" dirty="0"/>
+              <a:rPr lang="en-IN" sz="1140" dirty="0"/>
               <a:t> m</a:t>
             </a:r>
             <a:r>
-              <a:rPr lang="en-IN" sz="1278" baseline="30000" dirty="0"/>
+              <a:rPr lang="en-IN" sz="1140" baseline="30000" dirty="0"/>
               <a:t>-1</a:t>
             </a:r>
             <a:r>
-              <a:rPr lang="en-IN" sz="1278" dirty="0"/>
+              <a:rPr lang="en-IN" sz="1140" dirty="0"/>
               <a:t>, </a:t>
             </a:r>
             <a:r>
-              <a:rPr lang="el-GR" sz="1278" dirty="0"/>
+              <a:rPr lang="el-GR" sz="1140" dirty="0"/>
               <a:t>θ</a:t>
             </a:r>
             <a:r>
-              <a:rPr lang="en-US" sz="1278" dirty="0"/>
+              <a:rPr lang="en-US" sz="1140" baseline="-25000" dirty="0"/>
+              <a:t>fa</a:t>
+            </a:r>
+            <a:r>
+              <a:rPr lang="en-US" sz="1140" dirty="0"/>
               <a:t> = 6</a:t>
             </a:r>
             <a:r>
-              <a:rPr lang="aa-ET" sz="1278" dirty="0"/>
+              <a:rPr lang="aa-ET" sz="1140" dirty="0"/>
               <a:t>°</a:t>
             </a:r>
-            <a:endParaRPr lang="en-US" sz="1278" dirty="0"/>
+            <a:endParaRPr lang="en-US" sz="1140" dirty="0"/>
           </a:p>
         </p:txBody>
       </p:sp>
@@ -26482,8 +26487,8 @@
         </p:nvSpPr>
         <p:spPr>
           <a:xfrm>
-            <a:off x="1995394" y="1825754"/>
-            <a:ext cx="1645167" cy="288990"/>
+            <a:off x="2321262" y="1692335"/>
+            <a:ext cx="1715182" cy="267766"/>
           </a:xfrm>
           <a:prstGeom prst="rect">
             <a:avLst/>
@@ -26497,50 +26502,50 @@
           <a:lstStyle/>
           <a:p>
             <a:r>
-              <a:rPr lang="el-GR" sz="1278" dirty="0"/>
+              <a:rPr lang="el-GR" sz="1140" dirty="0"/>
               <a:t>γ</a:t>
             </a:r>
             <a:r>
-              <a:rPr lang="en-IN" sz="1278" dirty="0"/>
-              <a:t> = </a:t>
+              <a:rPr lang="en-US" sz="1140" baseline="-25000" dirty="0"/>
+              <a:t>fa</a:t>
             </a:r>
             <a:r>
-              <a:rPr lang="en-IN" sz="1278" dirty="0" smtClean="0"/>
-              <a:t>27 </a:t>
+              <a:rPr lang="en-IN" sz="1140" dirty="0"/>
+              <a:t> = 27 </a:t>
             </a:r>
             <a:r>
-              <a:rPr lang="en-IN" sz="1278" dirty="0" err="1"/>
+              <a:rPr lang="en-IN" sz="1140" dirty="0" err="1"/>
               <a:t>mN</a:t>
             </a:r>
             <a:r>
-              <a:rPr lang="en-IN" sz="1278" dirty="0"/>
+              <a:rPr lang="en-IN" sz="1140" dirty="0"/>
               <a:t> m</a:t>
             </a:r>
             <a:r>
-              <a:rPr lang="en-IN" sz="1278" baseline="30000" dirty="0"/>
+              <a:rPr lang="en-IN" sz="1140" baseline="30000" dirty="0"/>
               <a:t>-1</a:t>
             </a:r>
             <a:r>
-              <a:rPr lang="en-IN" sz="1278" dirty="0"/>
+              <a:rPr lang="en-IN" sz="1140" dirty="0"/>
               <a:t>, </a:t>
             </a:r>
             <a:r>
-              <a:rPr lang="el-GR" sz="1278" dirty="0"/>
+              <a:rPr lang="el-GR" sz="1140" dirty="0"/>
               <a:t>θ</a:t>
             </a:r>
             <a:r>
-              <a:rPr lang="en-US" sz="1278" dirty="0"/>
-              <a:t> = </a:t>
+              <a:rPr lang="en-US" sz="1140" baseline="-25000" dirty="0"/>
+              <a:t>fa</a:t>
             </a:r>
             <a:r>
-              <a:rPr lang="en-US" sz="1278" dirty="0" smtClean="0"/>
-              <a:t>56</a:t>
+              <a:rPr lang="en-US" sz="1140" dirty="0"/>
+              <a:t> = 56</a:t>
             </a:r>
             <a:r>
-              <a:rPr lang="aa-ET" sz="1278" dirty="0" smtClean="0"/>
+              <a:rPr lang="aa-ET" sz="1140" dirty="0"/>
               <a:t>°</a:t>
             </a:r>
-            <a:endParaRPr lang="en-US" sz="1278" dirty="0"/>
+            <a:endParaRPr lang="en-US" sz="1140" dirty="0"/>
           </a:p>
         </p:txBody>
       </p:sp>
@@ -26552,8 +26557,8 @@
         </p:nvSpPr>
         <p:spPr>
           <a:xfrm>
-            <a:off x="5252383" y="865025"/>
-            <a:ext cx="1739579" cy="288990"/>
+            <a:off x="5110457" y="835152"/>
+            <a:ext cx="1736373" cy="267766"/>
           </a:xfrm>
           <a:prstGeom prst="rect">
             <a:avLst/>
@@ -26567,50 +26572,50 @@
           <a:lstStyle/>
           <a:p>
             <a:r>
-              <a:rPr lang="el-GR" sz="1278" dirty="0"/>
+              <a:rPr lang="el-GR" sz="1140" dirty="0"/>
               <a:t>γ</a:t>
             </a:r>
             <a:r>
-              <a:rPr lang="en-IN" sz="1278" dirty="0"/>
-              <a:t> = </a:t>
+              <a:rPr lang="en-US" sz="1140" baseline="-25000" dirty="0" err="1"/>
+              <a:t>fw</a:t>
             </a:r>
             <a:r>
-              <a:rPr lang="en-IN" sz="1278" dirty="0" smtClean="0"/>
-              <a:t>55 </a:t>
+              <a:rPr lang="en-IN" sz="1140" dirty="0"/>
+              <a:t> = 55 </a:t>
             </a:r>
             <a:r>
-              <a:rPr lang="en-IN" sz="1278" dirty="0" err="1"/>
+              <a:rPr lang="en-IN" sz="1140" dirty="0" err="1"/>
               <a:t>mN</a:t>
             </a:r>
             <a:r>
-              <a:rPr lang="en-IN" sz="1278" dirty="0"/>
+              <a:rPr lang="en-IN" sz="1140" dirty="0"/>
               <a:t> m</a:t>
             </a:r>
             <a:r>
-              <a:rPr lang="en-IN" sz="1278" baseline="30000" dirty="0"/>
+              <a:rPr lang="en-IN" sz="1140" baseline="30000" dirty="0"/>
               <a:t>-1</a:t>
             </a:r>
             <a:r>
-              <a:rPr lang="en-IN" sz="1278" dirty="0"/>
+              <a:rPr lang="en-IN" sz="1140" dirty="0"/>
               <a:t>, </a:t>
             </a:r>
             <a:r>
-              <a:rPr lang="el-GR" sz="1278" dirty="0"/>
+              <a:rPr lang="el-GR" sz="1140" dirty="0"/>
               <a:t>θ</a:t>
             </a:r>
             <a:r>
-              <a:rPr lang="en-US" sz="1278" dirty="0"/>
-              <a:t> = </a:t>
+              <a:rPr lang="en-US" sz="1140" baseline="-25000" dirty="0" err="1"/>
+              <a:t>fw</a:t>
             </a:r>
             <a:r>
-              <a:rPr lang="en-US" sz="1278" dirty="0" smtClean="0"/>
-              <a:t>138</a:t>
+              <a:rPr lang="en-US" sz="1140" dirty="0"/>
+              <a:t>= 138</a:t>
             </a:r>
             <a:r>
-              <a:rPr lang="aa-ET" sz="1278" dirty="0" smtClean="0"/>
+              <a:rPr lang="aa-ET" sz="1140" dirty="0"/>
               <a:t>°</a:t>
             </a:r>
-            <a:endParaRPr lang="en-US" sz="1278" dirty="0"/>
+            <a:endParaRPr lang="en-US" sz="1140" dirty="0"/>
           </a:p>
         </p:txBody>
       </p:sp>
@@ -26622,8 +26627,8 @@
         </p:nvSpPr>
         <p:spPr>
           <a:xfrm>
-            <a:off x="5275663" y="1825753"/>
-            <a:ext cx="1656223" cy="288990"/>
+            <a:off x="5131226" y="1692333"/>
+            <a:ext cx="1696298" cy="267766"/>
           </a:xfrm>
           <a:prstGeom prst="rect">
             <a:avLst/>
@@ -26637,50 +26642,50 @@
           <a:lstStyle/>
           <a:p>
             <a:r>
-              <a:rPr lang="el-GR" sz="1278" dirty="0"/>
+              <a:rPr lang="el-GR" sz="1140" dirty="0"/>
               <a:t>γ</a:t>
             </a:r>
             <a:r>
-              <a:rPr lang="en-IN" sz="1278" dirty="0"/>
-              <a:t> = </a:t>
+              <a:rPr lang="en-US" sz="1140" baseline="-25000" dirty="0" err="1"/>
+              <a:t>fw</a:t>
             </a:r>
             <a:r>
-              <a:rPr lang="en-IN" sz="1278" dirty="0" smtClean="0"/>
-              <a:t>55 </a:t>
+              <a:rPr lang="en-IN" sz="1140" dirty="0"/>
+              <a:t> = 55 </a:t>
             </a:r>
             <a:r>
-              <a:rPr lang="en-IN" sz="1278" dirty="0" err="1"/>
+              <a:rPr lang="en-IN" sz="1140" dirty="0" err="1"/>
               <a:t>mN</a:t>
             </a:r>
             <a:r>
-              <a:rPr lang="en-IN" sz="1278" dirty="0"/>
+              <a:rPr lang="en-IN" sz="1140" dirty="0"/>
               <a:t> m</a:t>
             </a:r>
             <a:r>
-              <a:rPr lang="en-IN" sz="1278" baseline="30000" dirty="0"/>
+              <a:rPr lang="en-IN" sz="1140" baseline="30000" dirty="0"/>
               <a:t>-1</a:t>
             </a:r>
             <a:r>
-              <a:rPr lang="en-IN" sz="1278" dirty="0"/>
+              <a:rPr lang="en-IN" sz="1140" dirty="0"/>
               <a:t>, </a:t>
             </a:r>
             <a:r>
-              <a:rPr lang="el-GR" sz="1278" dirty="0"/>
+              <a:rPr lang="el-GR" sz="1140" dirty="0"/>
               <a:t>θ</a:t>
             </a:r>
             <a:r>
-              <a:rPr lang="en-US" sz="1278" dirty="0"/>
-              <a:t> = </a:t>
+              <a:rPr lang="en-US" sz="1140" baseline="-25000" dirty="0" err="1"/>
+              <a:t>fw</a:t>
             </a:r>
             <a:r>
-              <a:rPr lang="en-US" sz="1278" dirty="0" smtClean="0"/>
-              <a:t>70</a:t>
+              <a:rPr lang="en-US" sz="1140" dirty="0"/>
+              <a:t> = 70</a:t>
             </a:r>
             <a:r>
-              <a:rPr lang="aa-ET" sz="1278" dirty="0" smtClean="0"/>
+              <a:rPr lang="aa-ET" sz="1140" dirty="0"/>
               <a:t>°</a:t>
             </a:r>
-            <a:endParaRPr lang="en-US" sz="1278" dirty="0"/>
+            <a:endParaRPr lang="en-US" sz="1140" dirty="0"/>
           </a:p>
         </p:txBody>
       </p:sp>
@@ -26692,8 +26697,8 @@
         </p:nvSpPr>
         <p:spPr>
           <a:xfrm>
-            <a:off x="1696812" y="450713"/>
-            <a:ext cx="1149674" cy="288990"/>
+            <a:off x="2167049" y="479783"/>
+            <a:ext cx="1047082" cy="267766"/>
           </a:xfrm>
           <a:prstGeom prst="rect">
             <a:avLst/>
@@ -26707,14 +26712,14 @@
           <a:lstStyle/>
           <a:p>
             <a:r>
-              <a:rPr lang="en-IN" sz="1278" b="1" dirty="0">
+              <a:rPr lang="en-IN" sz="1140" b="1" dirty="0">
                 <a:solidFill>
                   <a:schemeClr val="bg1"/>
                 </a:solidFill>
               </a:rPr>
               <a:t>High adhesion</a:t>
             </a:r>
-            <a:endParaRPr lang="en-US" sz="1278" b="1" dirty="0">
+            <a:endParaRPr lang="en-US" sz="1140" b="1" dirty="0">
               <a:solidFill>
                 <a:schemeClr val="bg1"/>
               </a:solidFill>
@@ -26730,8 +26735,8 @@
         </p:nvSpPr>
         <p:spPr>
           <a:xfrm>
-            <a:off x="1696812" y="1379859"/>
-            <a:ext cx="1149674" cy="288990"/>
+            <a:off x="2167049" y="1308787"/>
+            <a:ext cx="1047082" cy="267766"/>
           </a:xfrm>
           <a:prstGeom prst="rect">
             <a:avLst/>
@@ -26745,14 +26750,14 @@
           <a:lstStyle/>
           <a:p>
             <a:r>
-              <a:rPr lang="en-IN" sz="1278" b="1" dirty="0">
+              <a:rPr lang="en-IN" sz="1140" b="1" dirty="0">
                 <a:solidFill>
                   <a:schemeClr val="bg1"/>
                 </a:solidFill>
               </a:rPr>
               <a:t>High adhesion</a:t>
             </a:r>
-            <a:endParaRPr lang="en-US" sz="1278" b="1" dirty="0">
+            <a:endParaRPr lang="en-US" sz="1140" b="1" dirty="0">
               <a:solidFill>
                 <a:schemeClr val="bg1"/>
               </a:solidFill>
@@ -26768,8 +26773,8 @@
         </p:nvSpPr>
         <p:spPr>
           <a:xfrm>
-            <a:off x="5089949" y="450712"/>
-            <a:ext cx="1120500" cy="288990"/>
+            <a:off x="5194482" y="479782"/>
+            <a:ext cx="1021433" cy="267766"/>
           </a:xfrm>
           <a:prstGeom prst="rect">
             <a:avLst/>
@@ -26783,14 +26788,14 @@
           <a:lstStyle/>
           <a:p>
             <a:r>
-              <a:rPr lang="en-IN" sz="1278" b="1" dirty="0">
+              <a:rPr lang="en-IN" sz="1140" b="1" dirty="0">
                 <a:solidFill>
                   <a:schemeClr val="bg1"/>
                 </a:solidFill>
               </a:rPr>
               <a:t>Low adhesion</a:t>
             </a:r>
-            <a:endParaRPr lang="en-US" sz="1278" b="1" dirty="0">
+            <a:endParaRPr lang="en-US" sz="1140" b="1" dirty="0">
               <a:solidFill>
                 <a:schemeClr val="bg1"/>
               </a:solidFill>
@@ -26806,8 +26811,8 @@
         </p:nvSpPr>
         <p:spPr>
           <a:xfrm>
-            <a:off x="5004264" y="1379859"/>
-            <a:ext cx="1289135" cy="288990"/>
+            <a:off x="5194482" y="1308787"/>
+            <a:ext cx="1047082" cy="267766"/>
           </a:xfrm>
           <a:prstGeom prst="rect">
             <a:avLst/>
@@ -26821,14 +26826,22 @@
           <a:lstStyle/>
           <a:p>
             <a:r>
-              <a:rPr lang="en-IN" sz="1278" b="1" dirty="0">
+              <a:rPr lang="en-IN" sz="1140" b="1" dirty="0" smtClean="0">
                 <a:solidFill>
                   <a:schemeClr val="bg1"/>
                 </a:solidFill>
               </a:rPr>
-              <a:t>Higher adhesion</a:t>
+              <a:t>High </a:t>
             </a:r>
-            <a:endParaRPr lang="en-US" sz="1278" b="1" dirty="0">
+            <a:r>
+              <a:rPr lang="en-IN" sz="1140" b="1" dirty="0">
+                <a:solidFill>
+                  <a:schemeClr val="bg1"/>
+                </a:solidFill>
+              </a:rPr>
+              <a:t>adhesion</a:t>
+            </a:r>
+            <a:endParaRPr lang="en-US" sz="1140" b="1" dirty="0">
               <a:solidFill>
                 <a:schemeClr val="bg1"/>
               </a:solidFill>
@@ -26874,8 +26887,8 @@
         </p:nvSpPr>
         <p:spPr>
           <a:xfrm>
-            <a:off x="2390189" y="-835307"/>
-            <a:ext cx="513282" cy="269304"/>
+            <a:off x="2520544" y="-745279"/>
+            <a:ext cx="479618" cy="250197"/>
           </a:xfrm>
           <a:prstGeom prst="rect">
             <a:avLst/>
@@ -26889,14 +26902,14 @@
           <a:lstStyle/>
           <a:p>
             <a:r>
-              <a:rPr lang="en-US" sz="1150" dirty="0"/>
+              <a:rPr lang="en-US" sz="1026" dirty="0"/>
               <a:t>6 </a:t>
             </a:r>
             <a:r>
-              <a:rPr lang="en-US" sz="1150" dirty="0" err="1"/>
+              <a:rPr lang="en-US" sz="1026" dirty="0" err="1"/>
               <a:t>deg</a:t>
             </a:r>
-            <a:endParaRPr lang="en-US" sz="1150" dirty="0"/>
+            <a:endParaRPr lang="en-US" sz="1026" dirty="0"/>
           </a:p>
         </p:txBody>
       </p:sp>
@@ -26933,8 +26946,8 @@
         </p:blipFill>
         <p:spPr>
           <a:xfrm>
-            <a:off x="392020" y="-937804"/>
-            <a:ext cx="1654206" cy="1150067"/>
+            <a:off x="737735" y="-787575"/>
+            <a:ext cx="1475918" cy="1026115"/>
           </a:xfrm>
           <a:prstGeom prst="rect">
             <a:avLst/>
@@ -26974,8 +26987,8 @@
         </p:blipFill>
         <p:spPr>
           <a:xfrm>
-            <a:off x="45567" y="-314084"/>
-            <a:ext cx="6302525" cy="4381755"/>
+            <a:off x="428626" y="-231074"/>
+            <a:ext cx="5623248" cy="3909496"/>
           </a:xfrm>
           <a:prstGeom prst="rect">
             <a:avLst/>
@@ -27045,8 +27058,8 @@
         </p:blipFill>
         <p:spPr>
           <a:xfrm>
-            <a:off x="376645" y="-543190"/>
-            <a:ext cx="1654206" cy="1150067"/>
+            <a:off x="724017" y="-435491"/>
+            <a:ext cx="1475918" cy="1026115"/>
           </a:xfrm>
           <a:prstGeom prst="rect">
             <a:avLst/>
@@ -27061,8 +27074,8 @@
         </p:nvSpPr>
         <p:spPr>
           <a:xfrm>
-            <a:off x="2390191" y="-835307"/>
-            <a:ext cx="588623" cy="269304"/>
+            <a:off x="2520548" y="-745279"/>
+            <a:ext cx="546945" cy="250197"/>
           </a:xfrm>
           <a:prstGeom prst="rect">
             <a:avLst/>
@@ -27076,14 +27089,14 @@
           <a:lstStyle/>
           <a:p>
             <a:r>
-              <a:rPr lang="en-US" sz="1150" dirty="0"/>
+              <a:rPr lang="en-US" sz="1026" dirty="0"/>
               <a:t>50 </a:t>
             </a:r>
             <a:r>
-              <a:rPr lang="en-US" sz="1150" dirty="0" err="1"/>
+              <a:rPr lang="en-US" sz="1026" dirty="0" err="1"/>
               <a:t>deg</a:t>
             </a:r>
-            <a:endParaRPr lang="en-US" sz="1150" dirty="0"/>
+            <a:endParaRPr lang="en-US" sz="1026" dirty="0"/>
           </a:p>
         </p:txBody>
       </p:sp>
@@ -27120,8 +27133,8 @@
         </p:blipFill>
         <p:spPr>
           <a:xfrm>
-            <a:off x="1406743" y="-409944"/>
-            <a:ext cx="6302525" cy="4381755"/>
+            <a:off x="1643095" y="-316606"/>
+            <a:ext cx="5623248" cy="3909496"/>
           </a:xfrm>
           <a:prstGeom prst="rect">
             <a:avLst/>
@@ -27191,8 +27204,8 @@
         </p:blipFill>
         <p:spPr>
           <a:xfrm>
-            <a:off x="274148" y="-507317"/>
-            <a:ext cx="1654206" cy="1150067"/>
+            <a:off x="632567" y="-403485"/>
+            <a:ext cx="1475918" cy="1026115"/>
           </a:xfrm>
           <a:prstGeom prst="rect">
             <a:avLst/>
@@ -27207,8 +27220,8 @@
         </p:nvSpPr>
         <p:spPr>
           <a:xfrm>
-            <a:off x="2390190" y="-835307"/>
-            <a:ext cx="663964" cy="269304"/>
+            <a:off x="2520546" y="-745279"/>
+            <a:ext cx="614271" cy="250197"/>
           </a:xfrm>
           <a:prstGeom prst="rect">
             <a:avLst/>
@@ -27222,14 +27235,14 @@
           <a:lstStyle/>
           <a:p>
             <a:r>
-              <a:rPr lang="en-US" sz="1150" dirty="0"/>
+              <a:rPr lang="en-US" sz="1026" dirty="0"/>
               <a:t>150 </a:t>
             </a:r>
             <a:r>
-              <a:rPr lang="en-US" sz="1150" dirty="0" err="1"/>
+              <a:rPr lang="en-US" sz="1026" dirty="0" err="1"/>
               <a:t>deg</a:t>
             </a:r>
-            <a:endParaRPr lang="en-US" sz="1150" dirty="0"/>
+            <a:endParaRPr lang="en-US" sz="1026" dirty="0"/>
           </a:p>
         </p:txBody>
       </p:sp>
@@ -27266,8 +27279,8 @@
         </p:blipFill>
         <p:spPr>
           <a:xfrm>
-            <a:off x="222901" y="-1035177"/>
-            <a:ext cx="6302525" cy="4381755"/>
+            <a:off x="586845" y="-874451"/>
+            <a:ext cx="5623248" cy="3909496"/>
           </a:xfrm>
           <a:prstGeom prst="rect">
             <a:avLst/>
@@ -27312,8 +27325,8 @@
         </p:nvSpPr>
         <p:spPr>
           <a:xfrm>
-            <a:off x="2595183" y="-917306"/>
-            <a:ext cx="513282" cy="269304"/>
+            <a:off x="2703443" y="-818440"/>
+            <a:ext cx="479618" cy="250197"/>
           </a:xfrm>
           <a:prstGeom prst="rect">
             <a:avLst/>
@@ -27327,14 +27340,14 @@
           <a:lstStyle/>
           <a:p>
             <a:r>
-              <a:rPr lang="en-US" sz="1150" dirty="0"/>
+              <a:rPr lang="en-US" sz="1026" dirty="0"/>
               <a:t>1 </a:t>
             </a:r>
             <a:r>
-              <a:rPr lang="en-US" sz="1150" dirty="0" err="1"/>
+              <a:rPr lang="en-US" sz="1026" dirty="0" err="1"/>
               <a:t>deg</a:t>
             </a:r>
-            <a:endParaRPr lang="en-US" sz="1150" dirty="0"/>
+            <a:endParaRPr lang="en-US" sz="1026" dirty="0"/>
           </a:p>
         </p:txBody>
       </p:sp>
@@ -27371,8 +27384,8 @@
         </p:blipFill>
         <p:spPr>
           <a:xfrm>
-            <a:off x="663639" y="-640447"/>
-            <a:ext cx="6302525" cy="4381755"/>
+            <a:off x="980082" y="-522263"/>
+            <a:ext cx="5623248" cy="3909496"/>
           </a:xfrm>
           <a:prstGeom prst="rect">
             <a:avLst/>

</xml_diff>